<commit_message>
Replacing English terms with Bulgarian
</commit_message>
<xml_diff>
--- a/Courses/Software-Sciences/Module-3-Databases-New/06-Modeling-Databases/06-Modeling-Databases.pptx
+++ b/Courses/Software-Sciences/Module-3-Databases-New/06-Modeling-Databases/06-Modeling-Databases.pptx
@@ -128,7 +128,7 @@
   </p:defaultTextStyle>
   <p:extLst>
     <p:ext uri="{521415D9-36F7-43E2-AB2F-B90AF26B5E84}">
-      <p14:sectionLst xmlns:p14="http://schemas.microsoft.com/office/powerpoint/2010/main" xmlns="">
+      <p14:sectionLst xmlns="" xmlns:p14="http://schemas.microsoft.com/office/powerpoint/2010/main">
         <p14:section name="Въведение" id="{A0C7653D-1924-4F56-9E27-AA2B21F1DA92}">
           <p14:sldIdLst>
             <p14:sldId id="503"/>
@@ -187,7 +187,7 @@
       </p14:sectionLst>
     </p:ext>
     <p:ext uri="{EFAFB233-063F-42B5-8137-9DF3F51BA10A}">
-      <p15:sldGuideLst xmlns:p15="http://schemas.microsoft.com/office/powerpoint/2012/main" xmlns="">
+      <p15:sldGuideLst xmlns="" xmlns:p15="http://schemas.microsoft.com/office/powerpoint/2012/main">
         <p15:guide id="1" orient="horz" pos="2184" userDrawn="1">
           <p15:clr>
             <a:srgbClr val="A4A3A4"/>
@@ -201,7 +201,7 @@
       </p15:sldGuideLst>
     </p:ext>
     <p:ext uri="{2D200454-40CA-4A62-9FC3-DE9A4176ACB9}">
-      <p15:notesGuideLst xmlns:p15="http://schemas.microsoft.com/office/powerpoint/2012/main" xmlns=""/>
+      <p15:notesGuideLst xmlns="" xmlns:p15="http://schemas.microsoft.com/office/powerpoint/2012/main"/>
     </p:ext>
   </p:extLst>
 </p:presentation>
@@ -234,7 +234,7 @@
           <p:cNvPr id="2" name="Header Placeholder 1">
             <a:extLst>
               <a:ext uri="{FF2B5EF4-FFF2-40B4-BE49-F238E27FC236}">
-                <a16:creationId xmlns:a16="http://schemas.microsoft.com/office/drawing/2014/main" xmlns="" id="{56F20103-83CC-4A54-8FDE-9D37FC2629C0}"/>
+                <a16:creationId xmlns="" xmlns:a16="http://schemas.microsoft.com/office/drawing/2014/main" id="{56F20103-83CC-4A54-8FDE-9D37FC2629C0}"/>
               </a:ext>
             </a:extLst>
           </p:cNvPr>
@@ -271,7 +271,7 @@
           <p:cNvPr id="3" name="Date Placeholder 2">
             <a:extLst>
               <a:ext uri="{FF2B5EF4-FFF2-40B4-BE49-F238E27FC236}">
-                <a16:creationId xmlns:a16="http://schemas.microsoft.com/office/drawing/2014/main" xmlns="" id="{27A53962-26EF-44E4-9E69-61B1727AB1C2}"/>
+                <a16:creationId xmlns="" xmlns:a16="http://schemas.microsoft.com/office/drawing/2014/main" id="{27A53962-26EF-44E4-9E69-61B1727AB1C2}"/>
               </a:ext>
             </a:extLst>
           </p:cNvPr>
@@ -313,7 +313,7 @@
           <p:cNvPr id="4" name="Footer Placeholder 3">
             <a:extLst>
               <a:ext uri="{FF2B5EF4-FFF2-40B4-BE49-F238E27FC236}">
-                <a16:creationId xmlns:a16="http://schemas.microsoft.com/office/drawing/2014/main" xmlns="" id="{28A6967E-448F-4887-8FCB-34482EFBCC74}"/>
+                <a16:creationId xmlns="" xmlns:a16="http://schemas.microsoft.com/office/drawing/2014/main" id="{28A6967E-448F-4887-8FCB-34482EFBCC74}"/>
               </a:ext>
             </a:extLst>
           </p:cNvPr>
@@ -363,7 +363,7 @@
           <p:cNvPr id="5" name="Slide Number Placeholder 4">
             <a:extLst>
               <a:ext uri="{FF2B5EF4-FFF2-40B4-BE49-F238E27FC236}">
-                <a16:creationId xmlns:a16="http://schemas.microsoft.com/office/drawing/2014/main" xmlns="" id="{8B6554C2-DDBA-40E2-9536-53A07EC50274}"/>
+                <a16:creationId xmlns="" xmlns:a16="http://schemas.microsoft.com/office/drawing/2014/main" id="{8B6554C2-DDBA-40E2-9536-53A07EC50274}"/>
               </a:ext>
             </a:extLst>
           </p:cNvPr>
@@ -403,7 +403,7 @@
     </p:spTree>
     <p:extLst>
       <p:ext uri="{BB962C8B-B14F-4D97-AF65-F5344CB8AC3E}">
-        <p14:creationId xmlns:p14="http://schemas.microsoft.com/office/powerpoint/2010/main" xmlns="" val="4150602968"/>
+        <p14:creationId xmlns="" xmlns:p14="http://schemas.microsoft.com/office/powerpoint/2010/main" val="4150602968"/>
       </p:ext>
     </p:extLst>
   </p:cSld>
@@ -634,7 +634,7 @@
           <p:cNvPr id="8" name="Footer Placeholder 7">
             <a:extLst>
               <a:ext uri="{FF2B5EF4-FFF2-40B4-BE49-F238E27FC236}">
-                <a16:creationId xmlns:a16="http://schemas.microsoft.com/office/drawing/2014/main" xmlns="" id="{CAC3A49B-3196-44DF-AC28-085C72EFBFF0}"/>
+                <a16:creationId xmlns="" xmlns:a16="http://schemas.microsoft.com/office/drawing/2014/main" id="{CAC3A49B-3196-44DF-AC28-085C72EFBFF0}"/>
               </a:ext>
             </a:extLst>
           </p:cNvPr>
@@ -682,7 +682,7 @@
     </p:spTree>
     <p:extLst>
       <p:ext uri="{BB962C8B-B14F-4D97-AF65-F5344CB8AC3E}">
-        <p14:creationId xmlns:p14="http://schemas.microsoft.com/office/powerpoint/2010/main" xmlns="" val="1530847692"/>
+        <p14:creationId xmlns="" xmlns:p14="http://schemas.microsoft.com/office/powerpoint/2010/main" val="1530847692"/>
       </p:ext>
     </p:extLst>
   </p:cSld>
@@ -829,7 +829,7 @@
           <p:cNvPr id="8" name="Slide Image Placeholder 7">
             <a:extLst>
               <a:ext uri="{FF2B5EF4-FFF2-40B4-BE49-F238E27FC236}">
-                <a16:creationId xmlns:a16="http://schemas.microsoft.com/office/drawing/2014/main" xmlns="" id="{78811095-27E9-49AB-972B-D4E20B3963A6}"/>
+                <a16:creationId xmlns="" xmlns:a16="http://schemas.microsoft.com/office/drawing/2014/main" id="{78811095-27E9-49AB-972B-D4E20B3963A6}"/>
               </a:ext>
             </a:extLst>
           </p:cNvPr>
@@ -847,7 +847,7 @@
           <p:cNvPr id="9" name="Notes Placeholder 8">
             <a:extLst>
               <a:ext uri="{FF2B5EF4-FFF2-40B4-BE49-F238E27FC236}">
-                <a16:creationId xmlns:a16="http://schemas.microsoft.com/office/drawing/2014/main" xmlns="" id="{E923224B-0CC3-475A-8628-8A90751AE61A}"/>
+                <a16:creationId xmlns="" xmlns:a16="http://schemas.microsoft.com/office/drawing/2014/main" id="{E923224B-0CC3-475A-8628-8A90751AE61A}"/>
               </a:ext>
             </a:extLst>
           </p:cNvPr>
@@ -872,7 +872,7 @@
           <p:cNvPr id="2" name="Footer Placeholder 1">
             <a:extLst>
               <a:ext uri="{FF2B5EF4-FFF2-40B4-BE49-F238E27FC236}">
-                <a16:creationId xmlns:a16="http://schemas.microsoft.com/office/drawing/2014/main" xmlns="" id="{3288A3F3-90B1-4930-8D00-5603BDABEF10}"/>
+                <a16:creationId xmlns="" xmlns:a16="http://schemas.microsoft.com/office/drawing/2014/main" id="{3288A3F3-90B1-4930-8D00-5603BDABEF10}"/>
               </a:ext>
             </a:extLst>
           </p:cNvPr>
@@ -908,7 +908,7 @@
     </p:spTree>
     <p:extLst>
       <p:ext uri="{BB962C8B-B14F-4D97-AF65-F5344CB8AC3E}">
-        <p14:creationId xmlns:p14="http://schemas.microsoft.com/office/powerpoint/2010/main" xmlns="" val="2594489433"/>
+        <p14:creationId xmlns="" xmlns:p14="http://schemas.microsoft.com/office/powerpoint/2010/main" val="2594489433"/>
       </p:ext>
     </p:extLst>
   </p:cSld>
@@ -940,7 +940,7 @@
           <p:cNvPr id="14" name="Slide Image Placeholder 13">
             <a:extLst>
               <a:ext uri="{FF2B5EF4-FFF2-40B4-BE49-F238E27FC236}">
-                <a16:creationId xmlns:a16="http://schemas.microsoft.com/office/drawing/2014/main" xmlns="" id="{A1F0B3C6-2E53-4CA3-86D1-53D46EC35267}"/>
+                <a16:creationId xmlns="" xmlns:a16="http://schemas.microsoft.com/office/drawing/2014/main" id="{A1F0B3C6-2E53-4CA3-86D1-53D46EC35267}"/>
               </a:ext>
             </a:extLst>
           </p:cNvPr>
@@ -958,7 +958,7 @@
           <p:cNvPr id="15" name="Notes Placeholder 14">
             <a:extLst>
               <a:ext uri="{FF2B5EF4-FFF2-40B4-BE49-F238E27FC236}">
-                <a16:creationId xmlns:a16="http://schemas.microsoft.com/office/drawing/2014/main" xmlns="" id="{149CC699-A079-49A5-A4D6-73B7F849A7DC}"/>
+                <a16:creationId xmlns="" xmlns:a16="http://schemas.microsoft.com/office/drawing/2014/main" id="{149CC699-A079-49A5-A4D6-73B7F849A7DC}"/>
               </a:ext>
             </a:extLst>
           </p:cNvPr>
@@ -983,7 +983,7 @@
           <p:cNvPr id="19" name="Slide Number Placeholder 5">
             <a:extLst>
               <a:ext uri="{FF2B5EF4-FFF2-40B4-BE49-F238E27FC236}">
-                <a16:creationId xmlns:a16="http://schemas.microsoft.com/office/drawing/2014/main" xmlns="" id="{121F4233-7E9A-40D2-9066-2DB14E2FA5AD}"/>
+                <a16:creationId xmlns="" xmlns:a16="http://schemas.microsoft.com/office/drawing/2014/main" id="{121F4233-7E9A-40D2-9066-2DB14E2FA5AD}"/>
               </a:ext>
             </a:extLst>
           </p:cNvPr>
@@ -1113,7 +1113,7 @@
           <p:cNvPr id="2" name="Footer Placeholder 1">
             <a:extLst>
               <a:ext uri="{FF2B5EF4-FFF2-40B4-BE49-F238E27FC236}">
-                <a16:creationId xmlns:a16="http://schemas.microsoft.com/office/drawing/2014/main" xmlns="" id="{D18F1DFF-B3E7-4ABF-97EE-0BBF3A961EC5}"/>
+                <a16:creationId xmlns="" xmlns:a16="http://schemas.microsoft.com/office/drawing/2014/main" id="{D18F1DFF-B3E7-4ABF-97EE-0BBF3A961EC5}"/>
               </a:ext>
             </a:extLst>
           </p:cNvPr>
@@ -1149,7 +1149,7 @@
     </p:spTree>
     <p:extLst>
       <p:ext uri="{BB962C8B-B14F-4D97-AF65-F5344CB8AC3E}">
-        <p14:creationId xmlns:p14="http://schemas.microsoft.com/office/powerpoint/2010/main" xmlns="" val="4028530743"/>
+        <p14:creationId xmlns="" xmlns:p14="http://schemas.microsoft.com/office/powerpoint/2010/main" val="4028530743"/>
       </p:ext>
     </p:extLst>
   </p:cSld>
@@ -1244,7 +1244,7 @@
           <p:cNvPr id="7" name="Footer Placeholder 5">
             <a:extLst>
               <a:ext uri="{FF2B5EF4-FFF2-40B4-BE49-F238E27FC236}">
-                <a16:creationId xmlns="" xmlns:a16="http://schemas.microsoft.com/office/drawing/2014/main" id="{F163D818-5569-4E6E-9BE9-C6247EB177D4}"/>
+                <a16:creationId xmlns:a16="http://schemas.microsoft.com/office/drawing/2014/main" xmlns="" id="{F163D818-5569-4E6E-9BE9-C6247EB177D4}"/>
               </a:ext>
             </a:extLst>
           </p:cNvPr>
@@ -1292,7 +1292,7 @@
     </p:spTree>
     <p:extLst>
       <p:ext uri="{BB962C8B-B14F-4D97-AF65-F5344CB8AC3E}">
-        <p14:creationId xmlns="" xmlns:p14="http://schemas.microsoft.com/office/powerpoint/2010/main" val="1098138642"/>
+        <p14:creationId xmlns:p14="http://schemas.microsoft.com/office/powerpoint/2010/main" xmlns="" val="1098138642"/>
       </p:ext>
     </p:extLst>
   </p:cSld>
@@ -1470,7 +1470,7 @@
           <p:cNvPr id="7" name="Slide Number Placeholder 5">
             <a:extLst>
               <a:ext uri="{FF2B5EF4-FFF2-40B4-BE49-F238E27FC236}">
-                <a16:creationId xmlns:a16="http://schemas.microsoft.com/office/drawing/2014/main" xmlns="" id="{E65F1CA9-65DC-416B-8882-B3A5E415CE67}"/>
+                <a16:creationId xmlns="" xmlns:a16="http://schemas.microsoft.com/office/drawing/2014/main" id="{E65F1CA9-65DC-416B-8882-B3A5E415CE67}"/>
               </a:ext>
             </a:extLst>
           </p:cNvPr>
@@ -1600,7 +1600,7 @@
           <p:cNvPr id="4" name="Footer Placeholder 3">
             <a:extLst>
               <a:ext uri="{FF2B5EF4-FFF2-40B4-BE49-F238E27FC236}">
-                <a16:creationId xmlns:a16="http://schemas.microsoft.com/office/drawing/2014/main" xmlns="" id="{C5BD11C3-9FCD-4EAE-876D-E766924FAFF2}"/>
+                <a16:creationId xmlns="" xmlns:a16="http://schemas.microsoft.com/office/drawing/2014/main" id="{C5BD11C3-9FCD-4EAE-876D-E766924FAFF2}"/>
               </a:ext>
             </a:extLst>
           </p:cNvPr>
@@ -1636,7 +1636,7 @@
     </p:spTree>
     <p:extLst>
       <p:ext uri="{BB962C8B-B14F-4D97-AF65-F5344CB8AC3E}">
-        <p14:creationId xmlns:p14="http://schemas.microsoft.com/office/powerpoint/2010/main" xmlns="" val="1860974293"/>
+        <p14:creationId xmlns="" xmlns:p14="http://schemas.microsoft.com/office/powerpoint/2010/main" val="1860974293"/>
       </p:ext>
     </p:extLst>
   </p:cSld>
@@ -1721,7 +1721,7 @@
     </p:spTree>
     <p:extLst>
       <p:ext uri="{BB962C8B-B14F-4D97-AF65-F5344CB8AC3E}">
-        <p14:creationId xmlns:p14="http://schemas.microsoft.com/office/powerpoint/2010/main" xmlns="" val="1201445929"/>
+        <p14:creationId xmlns="" xmlns:p14="http://schemas.microsoft.com/office/powerpoint/2010/main" val="1201445929"/>
       </p:ext>
     </p:extLst>
   </p:cSld>
@@ -1784,7 +1784,7 @@
           <p:cNvPr id="6" name="Slide Number Placeholder 5">
             <a:extLst>
               <a:ext uri="{FF2B5EF4-FFF2-40B4-BE49-F238E27FC236}">
-                <a16:creationId xmlns:a16="http://schemas.microsoft.com/office/drawing/2014/main" xmlns="" id="{6627548A-4D3C-449B-81A5-FA4BE4628490}"/>
+                <a16:creationId xmlns="" xmlns:a16="http://schemas.microsoft.com/office/drawing/2014/main" id="{6627548A-4D3C-449B-81A5-FA4BE4628490}"/>
               </a:ext>
             </a:extLst>
           </p:cNvPr>
@@ -1914,7 +1914,7 @@
           <p:cNvPr id="4" name="Footer Placeholder 3">
             <a:extLst>
               <a:ext uri="{FF2B5EF4-FFF2-40B4-BE49-F238E27FC236}">
-                <a16:creationId xmlns:a16="http://schemas.microsoft.com/office/drawing/2014/main" xmlns="" id="{D2472CE7-61C1-4B7B-B0C8-5A45F0178717}"/>
+                <a16:creationId xmlns="" xmlns:a16="http://schemas.microsoft.com/office/drawing/2014/main" id="{D2472CE7-61C1-4B7B-B0C8-5A45F0178717}"/>
               </a:ext>
             </a:extLst>
           </p:cNvPr>
@@ -1950,7 +1950,7 @@
     </p:spTree>
     <p:extLst>
       <p:ext uri="{BB962C8B-B14F-4D97-AF65-F5344CB8AC3E}">
-        <p14:creationId xmlns:p14="http://schemas.microsoft.com/office/powerpoint/2010/main" xmlns="" val="729041308"/>
+        <p14:creationId xmlns="" xmlns:p14="http://schemas.microsoft.com/office/powerpoint/2010/main" val="729041308"/>
       </p:ext>
     </p:extLst>
   </p:cSld>
@@ -1982,7 +1982,7 @@
           <p:cNvPr id="16" name="Rectangle Bottom">
             <a:extLst>
               <a:ext uri="{FF2B5EF4-FFF2-40B4-BE49-F238E27FC236}">
-                <a16:creationId xmlns:a16="http://schemas.microsoft.com/office/drawing/2014/main" xmlns="" id="{6854D183-0374-4B3E-B2CE-32F308A81591}"/>
+                <a16:creationId xmlns="" xmlns:a16="http://schemas.microsoft.com/office/drawing/2014/main" id="{6854D183-0374-4B3E-B2CE-32F308A81591}"/>
               </a:ext>
             </a:extLst>
           </p:cNvPr>
@@ -2063,7 +2063,7 @@
           <p:cNvPr id="14" name="Picture Logo SoftUni" descr="SoftUni logo">
             <a:extLst>
               <a:ext uri="{FF2B5EF4-FFF2-40B4-BE49-F238E27FC236}">
-                <a16:creationId xmlns:a16="http://schemas.microsoft.com/office/drawing/2014/main" xmlns="" id="{C4D6B2A2-DFF0-4712-BFEC-6676BEC99FEC}"/>
+                <a16:creationId xmlns="" xmlns:a16="http://schemas.microsoft.com/office/drawing/2014/main" id="{C4D6B2A2-DFF0-4712-BFEC-6676BEC99FEC}"/>
               </a:ext>
             </a:extLst>
           </p:cNvPr>
@@ -2086,7 +2086,7 @@
             </a:clrChange>
             <a:extLst>
               <a:ext uri="{28A0092B-C50C-407E-A947-70E740481C1C}">
-                <a14:useLocalDpi xmlns:a14="http://schemas.microsoft.com/office/drawing/2010/main" xmlns="" val="0"/>
+                <a14:useLocalDpi xmlns="" xmlns:a14="http://schemas.microsoft.com/office/drawing/2010/main" val="0"/>
               </a:ext>
             </a:extLst>
           </a:blip>
@@ -2109,7 +2109,7 @@
           <p:cNvPr id="31" name="Text Placeholder Company Site">
             <a:extLst>
               <a:ext uri="{FF2B5EF4-FFF2-40B4-BE49-F238E27FC236}">
-                <a16:creationId xmlns:a16="http://schemas.microsoft.com/office/drawing/2014/main" xmlns="" id="{3E6B87B7-9D33-4EBB-BD4F-C0436BA3FD72}"/>
+                <a16:creationId xmlns="" xmlns:a16="http://schemas.microsoft.com/office/drawing/2014/main" id="{3E6B87B7-9D33-4EBB-BD4F-C0436BA3FD72}"/>
               </a:ext>
             </a:extLst>
           </p:cNvPr>
@@ -2171,7 +2171,7 @@
           <p:cNvPr id="30" name="Text Placeholder Company Name">
             <a:extLst>
               <a:ext uri="{FF2B5EF4-FFF2-40B4-BE49-F238E27FC236}">
-                <a16:creationId xmlns:a16="http://schemas.microsoft.com/office/drawing/2014/main" xmlns="" id="{2EA92DCA-4DB5-4D03-ACD3-A6A296592D0C}"/>
+                <a16:creationId xmlns="" xmlns:a16="http://schemas.microsoft.com/office/drawing/2014/main" id="{2EA92DCA-4DB5-4D03-ACD3-A6A296592D0C}"/>
               </a:ext>
             </a:extLst>
           </p:cNvPr>
@@ -2233,7 +2233,7 @@
           <p:cNvPr id="35" name="Picture SoftUni Mascot" descr="SoftUni mascot">
             <a:extLst>
               <a:ext uri="{FF2B5EF4-FFF2-40B4-BE49-F238E27FC236}">
-                <a16:creationId xmlns:a16="http://schemas.microsoft.com/office/drawing/2014/main" xmlns="" id="{951E7DA9-C5F0-43D9-B013-3BDF9EEF029D}"/>
+                <a16:creationId xmlns="" xmlns:a16="http://schemas.microsoft.com/office/drawing/2014/main" id="{951E7DA9-C5F0-43D9-B013-3BDF9EEF029D}"/>
               </a:ext>
             </a:extLst>
           </p:cNvPr>
@@ -2246,7 +2246,7 @@
           <a:blip r:embed="rId3" cstate="print">
             <a:extLst>
               <a:ext uri="{28A0092B-C50C-407E-A947-70E740481C1C}">
-                <a14:useLocalDpi xmlns:a14="http://schemas.microsoft.com/office/drawing/2010/main" xmlns="" val="0"/>
+                <a14:useLocalDpi xmlns="" xmlns:a14="http://schemas.microsoft.com/office/drawing/2010/main" val="0"/>
               </a:ext>
             </a:extLst>
           </a:blip>
@@ -2269,7 +2269,7 @@
             <a:hlinkClick r:id="rId4"/>
             <a:extLst>
               <a:ext uri="{FF2B5EF4-FFF2-40B4-BE49-F238E27FC236}">
-                <a16:creationId xmlns:a16="http://schemas.microsoft.com/office/drawing/2014/main" xmlns="" id="{F2315EB3-3FE4-4D3B-921E-5F209CEC13CB}"/>
+                <a16:creationId xmlns="" xmlns:a16="http://schemas.microsoft.com/office/drawing/2014/main" id="{F2315EB3-3FE4-4D3B-921E-5F209CEC13CB}"/>
               </a:ext>
             </a:extLst>
           </p:cNvPr>
@@ -2292,7 +2292,7 @@
             </a:clrChange>
             <a:extLst>
               <a:ext uri="{28A0092B-C50C-407E-A947-70E740481C1C}">
-                <a14:useLocalDpi xmlns:a14="http://schemas.microsoft.com/office/drawing/2010/main" xmlns="" val="0"/>
+                <a14:useLocalDpi xmlns="" xmlns:a14="http://schemas.microsoft.com/office/drawing/2010/main" val="0"/>
               </a:ext>
             </a:extLst>
           </a:blip>
@@ -2315,7 +2315,7 @@
           <p:cNvPr id="40" name="Text Placeholder Author Position">
             <a:extLst>
               <a:ext uri="{FF2B5EF4-FFF2-40B4-BE49-F238E27FC236}">
-                <a16:creationId xmlns:a16="http://schemas.microsoft.com/office/drawing/2014/main" xmlns="" id="{CD940256-851E-46C8-8BFB-A5ECA6C7DA07}"/>
+                <a16:creationId xmlns="" xmlns:a16="http://schemas.microsoft.com/office/drawing/2014/main" id="{CD940256-851E-46C8-8BFB-A5ECA6C7DA07}"/>
               </a:ext>
             </a:extLst>
           </p:cNvPr>
@@ -2375,7 +2375,7 @@
           <p:cNvPr id="36" name="Text Placeholder Author Name">
             <a:extLst>
               <a:ext uri="{FF2B5EF4-FFF2-40B4-BE49-F238E27FC236}">
-                <a16:creationId xmlns:a16="http://schemas.microsoft.com/office/drawing/2014/main" xmlns="" id="{3B21F47B-DE1F-442D-A2B7-6866F8786704}"/>
+                <a16:creationId xmlns="" xmlns:a16="http://schemas.microsoft.com/office/drawing/2014/main" id="{3B21F47B-DE1F-442D-A2B7-6866F8786704}"/>
               </a:ext>
             </a:extLst>
           </p:cNvPr>
@@ -2435,7 +2435,7 @@
           <p:cNvPr id="33" name="Picture Placeholder Title Image">
             <a:extLst>
               <a:ext uri="{FF2B5EF4-FFF2-40B4-BE49-F238E27FC236}">
-                <a16:creationId xmlns:a16="http://schemas.microsoft.com/office/drawing/2014/main" xmlns="" id="{A04D819A-89E2-4714-8C56-1838BF467EF7}"/>
+                <a16:creationId xmlns="" xmlns:a16="http://schemas.microsoft.com/office/drawing/2014/main" id="{A04D819A-89E2-4714-8C56-1838BF467EF7}"/>
               </a:ext>
             </a:extLst>
           </p:cNvPr>
@@ -2477,7 +2477,7 @@
           <p:cNvPr id="43" name="Presentation Subtitle">
             <a:extLst>
               <a:ext uri="{FF2B5EF4-FFF2-40B4-BE49-F238E27FC236}">
-                <a16:creationId xmlns:a16="http://schemas.microsoft.com/office/drawing/2014/main" xmlns="" id="{37BDB812-1395-4B02-ABCF-6A331EEE23E5}"/>
+                <a16:creationId xmlns="" xmlns:a16="http://schemas.microsoft.com/office/drawing/2014/main" id="{37BDB812-1395-4B02-ABCF-6A331EEE23E5}"/>
               </a:ext>
             </a:extLst>
           </p:cNvPr>
@@ -2521,7 +2521,7 @@
           <p:cNvPr id="2" name="Presentation Title">
             <a:extLst>
               <a:ext uri="{FF2B5EF4-FFF2-40B4-BE49-F238E27FC236}">
-                <a16:creationId xmlns:a16="http://schemas.microsoft.com/office/drawing/2014/main" xmlns="" id="{A4DF3AB8-E6E3-4FCE-8A4A-ECD147720A5D}"/>
+                <a16:creationId xmlns="" xmlns:a16="http://schemas.microsoft.com/office/drawing/2014/main" id="{A4DF3AB8-E6E3-4FCE-8A4A-ECD147720A5D}"/>
               </a:ext>
             </a:extLst>
           </p:cNvPr>
@@ -2556,7 +2556,7 @@
     </p:spTree>
     <p:extLst>
       <p:ext uri="{BB962C8B-B14F-4D97-AF65-F5344CB8AC3E}">
-        <p14:creationId xmlns:p14="http://schemas.microsoft.com/office/powerpoint/2010/main" xmlns="" val="970179299"/>
+        <p14:creationId xmlns="" xmlns:p14="http://schemas.microsoft.com/office/powerpoint/2010/main" val="970179299"/>
       </p:ext>
     </p:extLst>
   </p:cSld>
@@ -2564,7 +2564,7 @@
     <a:masterClrMapping/>
   </p:clrMapOvr>
   <mc:AlternateContent xmlns:mc="http://schemas.openxmlformats.org/markup-compatibility/2006">
-    <mc:Choice xmlns:p14="http://schemas.microsoft.com/office/powerpoint/2010/main" xmlns="" Requires="p14">
+    <mc:Choice xmlns="" xmlns:p14="http://schemas.microsoft.com/office/powerpoint/2010/main" Requires="p14">
       <p:transition spd="slow" p14:dur="2000" advClick="0" advTm="5000"/>
     </mc:Choice>
     <mc:Fallback>
@@ -2573,7 +2573,7 @@
   </mc:AlternateContent>
   <p:extLst>
     <p:ext uri="{DCECCB84-F9BA-43D5-87BE-67443E8EF086}">
-      <p15:sldGuideLst xmlns:p15="http://schemas.microsoft.com/office/powerpoint/2012/main" xmlns="">
+      <p15:sldGuideLst xmlns="" xmlns:p15="http://schemas.microsoft.com/office/powerpoint/2012/main">
         <p15:guide id="1" orient="horz" pos="2160">
           <p15:clr>
             <a:srgbClr val="FBAE40"/>
@@ -2612,7 +2612,7 @@
           <p:cNvPr id="15" name="Slide Number">
             <a:extLst>
               <a:ext uri="{FF2B5EF4-FFF2-40B4-BE49-F238E27FC236}">
-                <a16:creationId xmlns:a16="http://schemas.microsoft.com/office/drawing/2014/main" xmlns="" id="{F888EE71-82B3-40F1-A63F-7417422FB4A4}"/>
+                <a16:creationId xmlns="" xmlns:a16="http://schemas.microsoft.com/office/drawing/2014/main" id="{F888EE71-82B3-40F1-A63F-7417422FB4A4}"/>
               </a:ext>
             </a:extLst>
           </p:cNvPr>
@@ -2654,7 +2654,7 @@
           <p:cNvPr id="14" name="Text Placeholder Body">
             <a:extLst>
               <a:ext uri="{FF2B5EF4-FFF2-40B4-BE49-F238E27FC236}">
-                <a16:creationId xmlns:a16="http://schemas.microsoft.com/office/drawing/2014/main" xmlns="" id="{A2ABE920-240F-4CF6-AD45-23ED489FAD6E}"/>
+                <a16:creationId xmlns="" xmlns:a16="http://schemas.microsoft.com/office/drawing/2014/main" id="{A2ABE920-240F-4CF6-AD45-23ED489FAD6E}"/>
               </a:ext>
             </a:extLst>
           </p:cNvPr>
@@ -2960,7 +2960,7 @@
           <p:cNvPr id="10" name="Rectangle Down">
             <a:extLst>
               <a:ext uri="{FF2B5EF4-FFF2-40B4-BE49-F238E27FC236}">
-                <a16:creationId xmlns:a16="http://schemas.microsoft.com/office/drawing/2014/main" xmlns="" id="{E9B994EC-35A8-4A11-98CB-25DC28852F94}"/>
+                <a16:creationId xmlns="" xmlns:a16="http://schemas.microsoft.com/office/drawing/2014/main" id="{E9B994EC-35A8-4A11-98CB-25DC28852F94}"/>
               </a:ext>
             </a:extLst>
           </p:cNvPr>
@@ -3041,7 +3041,7 @@
           <p:cNvPr id="11" name="Rectangle Top">
             <a:extLst>
               <a:ext uri="{FF2B5EF4-FFF2-40B4-BE49-F238E27FC236}">
-                <a16:creationId xmlns:a16="http://schemas.microsoft.com/office/drawing/2014/main" xmlns="" id="{274B8F05-DFCE-47BD-BAFD-DF93E1A63BDD}"/>
+                <a16:creationId xmlns="" xmlns:a16="http://schemas.microsoft.com/office/drawing/2014/main" id="{274B8F05-DFCE-47BD-BAFD-DF93E1A63BDD}"/>
               </a:ext>
             </a:extLst>
           </p:cNvPr>
@@ -3122,7 +3122,7 @@
           <p:cNvPr id="12" name="Logo Software University" descr="Software University logo">
             <a:extLst>
               <a:ext uri="{FF2B5EF4-FFF2-40B4-BE49-F238E27FC236}">
-                <a16:creationId xmlns:a16="http://schemas.microsoft.com/office/drawing/2014/main" xmlns="" id="{233CBB95-791E-4630-B3D9-FADFCE7BCF52}"/>
+                <a16:creationId xmlns="" xmlns:a16="http://schemas.microsoft.com/office/drawing/2014/main" id="{233CBB95-791E-4630-B3D9-FADFCE7BCF52}"/>
               </a:ext>
             </a:extLst>
           </p:cNvPr>
@@ -3135,7 +3135,7 @@
           <a:blip r:embed="rId2" cstate="print">
             <a:extLst>
               <a:ext uri="{28A0092B-C50C-407E-A947-70E740481C1C}">
-                <a14:useLocalDpi xmlns:a14="http://schemas.microsoft.com/office/drawing/2010/main" xmlns="" val="0"/>
+                <a14:useLocalDpi xmlns="" xmlns:a14="http://schemas.microsoft.com/office/drawing/2010/main" val="0"/>
               </a:ext>
             </a:extLst>
           </a:blip>
@@ -3158,7 +3158,7 @@
           <p:cNvPr id="13" name="Slide Title">
             <a:extLst>
               <a:ext uri="{FF2B5EF4-FFF2-40B4-BE49-F238E27FC236}">
-                <a16:creationId xmlns:a16="http://schemas.microsoft.com/office/drawing/2014/main" xmlns="" id="{3F218E34-55D7-4290-BFE4-80F31F941551}"/>
+                <a16:creationId xmlns="" xmlns:a16="http://schemas.microsoft.com/office/drawing/2014/main" id="{3F218E34-55D7-4290-BFE4-80F31F941551}"/>
               </a:ext>
             </a:extLst>
           </p:cNvPr>
@@ -3197,7 +3197,7 @@
     </p:spTree>
     <p:extLst>
       <p:ext uri="{BB962C8B-B14F-4D97-AF65-F5344CB8AC3E}">
-        <p14:creationId xmlns:p14="http://schemas.microsoft.com/office/powerpoint/2010/main" xmlns="" val="3774019400"/>
+        <p14:creationId xmlns="" xmlns:p14="http://schemas.microsoft.com/office/powerpoint/2010/main" val="3774019400"/>
       </p:ext>
     </p:extLst>
   </p:cSld>
@@ -3205,7 +3205,7 @@
     <a:masterClrMapping/>
   </p:clrMapOvr>
   <mc:AlternateContent xmlns:mc="http://schemas.openxmlformats.org/markup-compatibility/2006">
-    <mc:Choice xmlns:p14="http://schemas.microsoft.com/office/powerpoint/2010/main" xmlns="" Requires="p14">
+    <mc:Choice xmlns="" xmlns:p14="http://schemas.microsoft.com/office/powerpoint/2010/main" Requires="p14">
       <p:transition spd="slow" p14:dur="2000" advClick="0" advTm="5000"/>
     </mc:Choice>
     <mc:Fallback>
@@ -3245,7 +3245,7 @@
           <p:cNvPr id="35" name="Rectangle Bottom">
             <a:extLst>
               <a:ext uri="{FF2B5EF4-FFF2-40B4-BE49-F238E27FC236}">
-                <a16:creationId xmlns:a16="http://schemas.microsoft.com/office/drawing/2014/main" xmlns="" id="{550A59F9-9A9D-4956-95B4-F78CC0DB1D59}"/>
+                <a16:creationId xmlns="" xmlns:a16="http://schemas.microsoft.com/office/drawing/2014/main" id="{550A59F9-9A9D-4956-95B4-F78CC0DB1D59}"/>
               </a:ext>
             </a:extLst>
           </p:cNvPr>
@@ -3326,7 +3326,7 @@
           <p:cNvPr id="53" name="Rectangle Bottom Copyright">
             <a:extLst>
               <a:ext uri="{FF2B5EF4-FFF2-40B4-BE49-F238E27FC236}">
-                <a16:creationId xmlns:a16="http://schemas.microsoft.com/office/drawing/2014/main" xmlns="" id="{B07FB7FB-DA6C-4F5D-B068-357F0FCE27D8}"/>
+                <a16:creationId xmlns="" xmlns:a16="http://schemas.microsoft.com/office/drawing/2014/main" id="{B07FB7FB-DA6C-4F5D-B068-357F0FCE27D8}"/>
               </a:ext>
             </a:extLst>
           </p:cNvPr>
@@ -3383,7 +3383,7 @@
                 <a:hlinkClick r:id="rId2">
                   <a:extLst>
                     <a:ext uri="{A12FA001-AC4F-418D-AE19-62706E023703}">
-                      <ahyp:hlinkClr xmlns:ahyp="http://schemas.microsoft.com/office/drawing/2018/hyperlinkcolor" xmlns="" val="tx"/>
+                      <ahyp:hlinkClr xmlns="" xmlns:ahyp="http://schemas.microsoft.com/office/drawing/2018/hyperlinkcolor" val="tx"/>
                     </a:ext>
                   </a:extLst>
                 </a:hlinkClick>
@@ -3419,7 +3419,7 @@
           <p:cNvPr id="26" name="Picture SoftUni Mascot" descr="SoftUni mascot with open hand">
             <a:extLst>
               <a:ext uri="{FF2B5EF4-FFF2-40B4-BE49-F238E27FC236}">
-                <a16:creationId xmlns:a16="http://schemas.microsoft.com/office/drawing/2014/main" xmlns="" id="{247CFF3C-C4FA-493D-8505-DF469F4D36A4}"/>
+                <a16:creationId xmlns="" xmlns:a16="http://schemas.microsoft.com/office/drawing/2014/main" id="{247CFF3C-C4FA-493D-8505-DF469F4D36A4}"/>
               </a:ext>
             </a:extLst>
           </p:cNvPr>
@@ -3432,7 +3432,7 @@
           <a:blip r:embed="rId3" cstate="print">
             <a:extLst>
               <a:ext uri="{28A0092B-C50C-407E-A947-70E740481C1C}">
-                <a14:useLocalDpi xmlns:a14="http://schemas.microsoft.com/office/drawing/2010/main" xmlns="" val="0"/>
+                <a14:useLocalDpi xmlns="" xmlns:a14="http://schemas.microsoft.com/office/drawing/2010/main" val="0"/>
               </a:ext>
             </a:extLst>
           </a:blip>
@@ -3455,7 +3455,7 @@
           <p:cNvPr id="2" name="Group SoftUni Brands">
             <a:extLst>
               <a:ext uri="{FF2B5EF4-FFF2-40B4-BE49-F238E27FC236}">
-                <a16:creationId xmlns:a16="http://schemas.microsoft.com/office/drawing/2014/main" xmlns="" id="{418FAE34-C1F8-46C7-A4AE-F270D1E70F25}"/>
+                <a16:creationId xmlns="" xmlns:a16="http://schemas.microsoft.com/office/drawing/2014/main" id="{418FAE34-C1F8-46C7-A4AE-F270D1E70F25}"/>
               </a:ext>
             </a:extLst>
           </p:cNvPr>
@@ -3475,7 +3475,7 @@
             <p:cNvPr id="24" name="Picture SoftUni Kids Logo" descr="SoftUni Kids logo">
               <a:extLst>
                 <a:ext uri="{FF2B5EF4-FFF2-40B4-BE49-F238E27FC236}">
-                  <a16:creationId xmlns:a16="http://schemas.microsoft.com/office/drawing/2014/main" xmlns="" id="{B0812936-74B6-4265-8C08-AEDC8C798702}"/>
+                  <a16:creationId xmlns="" xmlns:a16="http://schemas.microsoft.com/office/drawing/2014/main" id="{B0812936-74B6-4265-8C08-AEDC8C798702}"/>
                 </a:ext>
               </a:extLst>
             </p:cNvPr>
@@ -3488,7 +3488,7 @@
             <a:blip r:embed="rId4" cstate="print">
               <a:extLst>
                 <a:ext uri="{28A0092B-C50C-407E-A947-70E740481C1C}">
-                  <a14:useLocalDpi xmlns:a14="http://schemas.microsoft.com/office/drawing/2010/main" xmlns="" val="0"/>
+                  <a14:useLocalDpi xmlns="" xmlns:a14="http://schemas.microsoft.com/office/drawing/2010/main" val="0"/>
                 </a:ext>
               </a:extLst>
             </a:blip>
@@ -3511,7 +3511,7 @@
             <p:cNvPr id="23" name="Picture SoftUni Foundation Logo" descr="SoftUni Foundation logo">
               <a:extLst>
                 <a:ext uri="{FF2B5EF4-FFF2-40B4-BE49-F238E27FC236}">
-                  <a16:creationId xmlns:a16="http://schemas.microsoft.com/office/drawing/2014/main" xmlns="" id="{6643F71A-2013-433A-8322-FBAAED3162D8}"/>
+                  <a16:creationId xmlns="" xmlns:a16="http://schemas.microsoft.com/office/drawing/2014/main" id="{6643F71A-2013-433A-8322-FBAAED3162D8}"/>
                 </a:ext>
               </a:extLst>
             </p:cNvPr>
@@ -3524,7 +3524,7 @@
             <a:blip r:embed="rId5" cstate="print">
               <a:extLst>
                 <a:ext uri="{28A0092B-C50C-407E-A947-70E740481C1C}">
-                  <a14:useLocalDpi xmlns:a14="http://schemas.microsoft.com/office/drawing/2010/main" xmlns="" val="0"/>
+                  <a14:useLocalDpi xmlns="" xmlns:a14="http://schemas.microsoft.com/office/drawing/2010/main" val="0"/>
                 </a:ext>
               </a:extLst>
             </a:blip>
@@ -3547,7 +3547,7 @@
             <p:cNvPr id="22" name="Picture SoftUni Digital Logo" descr="SoftUni Digital logo">
               <a:extLst>
                 <a:ext uri="{FF2B5EF4-FFF2-40B4-BE49-F238E27FC236}">
-                  <a16:creationId xmlns:a16="http://schemas.microsoft.com/office/drawing/2014/main" xmlns="" id="{0A83D66F-855B-463B-920B-BF239B01A206}"/>
+                  <a16:creationId xmlns="" xmlns:a16="http://schemas.microsoft.com/office/drawing/2014/main" id="{0A83D66F-855B-463B-920B-BF239B01A206}"/>
                 </a:ext>
               </a:extLst>
             </p:cNvPr>
@@ -3560,7 +3560,7 @@
             <a:blip r:embed="rId6" cstate="print">
               <a:extLst>
                 <a:ext uri="{28A0092B-C50C-407E-A947-70E740481C1C}">
-                  <a14:useLocalDpi xmlns:a14="http://schemas.microsoft.com/office/drawing/2010/main" xmlns="" val="0"/>
+                  <a14:useLocalDpi xmlns="" xmlns:a14="http://schemas.microsoft.com/office/drawing/2010/main" val="0"/>
                 </a:ext>
               </a:extLst>
             </a:blip>
@@ -3583,7 +3583,7 @@
             <p:cNvPr id="21" name="Picture SoftUni Creative Logo" descr="SoftUni Creative logo">
               <a:extLst>
                 <a:ext uri="{FF2B5EF4-FFF2-40B4-BE49-F238E27FC236}">
-                  <a16:creationId xmlns:a16="http://schemas.microsoft.com/office/drawing/2014/main" xmlns="" id="{EA755AAE-BA08-481C-9224-0061170EE4B8}"/>
+                  <a16:creationId xmlns="" xmlns:a16="http://schemas.microsoft.com/office/drawing/2014/main" id="{EA755AAE-BA08-481C-9224-0061170EE4B8}"/>
                 </a:ext>
               </a:extLst>
             </p:cNvPr>
@@ -3596,7 +3596,7 @@
             <a:blip r:embed="rId7" cstate="print">
               <a:extLst>
                 <a:ext uri="{28A0092B-C50C-407E-A947-70E740481C1C}">
-                  <a14:useLocalDpi xmlns:a14="http://schemas.microsoft.com/office/drawing/2010/main" xmlns="" val="0"/>
+                  <a14:useLocalDpi xmlns="" xmlns:a14="http://schemas.microsoft.com/office/drawing/2010/main" val="0"/>
                 </a:ext>
               </a:extLst>
             </a:blip>
@@ -3619,7 +3619,7 @@
             <p:cNvPr id="20" name="Picture SoftUni Svetlina Logo" descr="SoftUni Svetlina logo">
               <a:extLst>
                 <a:ext uri="{FF2B5EF4-FFF2-40B4-BE49-F238E27FC236}">
-                  <a16:creationId xmlns:a16="http://schemas.microsoft.com/office/drawing/2014/main" xmlns="" id="{827D15FD-4C66-4B85-98E6-7826AA8F61C6}"/>
+                  <a16:creationId xmlns="" xmlns:a16="http://schemas.microsoft.com/office/drawing/2014/main" id="{827D15FD-4C66-4B85-98E6-7826AA8F61C6}"/>
                 </a:ext>
               </a:extLst>
             </p:cNvPr>
@@ -3632,7 +3632,7 @@
             <a:blip r:embed="rId8" cstate="print">
               <a:extLst>
                 <a:ext uri="{28A0092B-C50C-407E-A947-70E740481C1C}">
-                  <a14:useLocalDpi xmlns:a14="http://schemas.microsoft.com/office/drawing/2010/main" xmlns="" val="0"/>
+                  <a14:useLocalDpi xmlns="" xmlns:a14="http://schemas.microsoft.com/office/drawing/2010/main" val="0"/>
                 </a:ext>
               </a:extLst>
             </a:blip>
@@ -3655,7 +3655,7 @@
             <p:cNvPr id="25" name="Picture Software University Logo" descr="Software University logo">
               <a:extLst>
                 <a:ext uri="{FF2B5EF4-FFF2-40B4-BE49-F238E27FC236}">
-                  <a16:creationId xmlns:a16="http://schemas.microsoft.com/office/drawing/2014/main" xmlns="" id="{C74C190C-5856-41B9-8819-AE8DE0E10980}"/>
+                  <a16:creationId xmlns="" xmlns:a16="http://schemas.microsoft.com/office/drawing/2014/main" id="{C74C190C-5856-41B9-8819-AE8DE0E10980}"/>
                 </a:ext>
               </a:extLst>
             </p:cNvPr>
@@ -3668,7 +3668,7 @@
             <a:blip r:embed="rId9" cstate="print">
               <a:extLst>
                 <a:ext uri="{28A0092B-C50C-407E-A947-70E740481C1C}">
-                  <a14:useLocalDpi xmlns:a14="http://schemas.microsoft.com/office/drawing/2010/main" xmlns="" val="0"/>
+                  <a14:useLocalDpi xmlns="" xmlns:a14="http://schemas.microsoft.com/office/drawing/2010/main" val="0"/>
                 </a:ext>
               </a:extLst>
             </a:blip>
@@ -3691,7 +3691,7 @@
             <p:cNvPr id="33" name="Straight Connector 6">
               <a:extLst>
                 <a:ext uri="{FF2B5EF4-FFF2-40B4-BE49-F238E27FC236}">
-                  <a16:creationId xmlns:a16="http://schemas.microsoft.com/office/drawing/2014/main" xmlns="" id="{5C63D1E8-4A92-4691-8A24-A2FC7E8008E5}"/>
+                  <a16:creationId xmlns="" xmlns:a16="http://schemas.microsoft.com/office/drawing/2014/main" id="{5C63D1E8-4A92-4691-8A24-A2FC7E8008E5}"/>
                 </a:ext>
               </a:extLst>
             </p:cNvPr>
@@ -3730,7 +3730,7 @@
             <p:cNvPr id="32" name="Straight Connector 5">
               <a:extLst>
                 <a:ext uri="{FF2B5EF4-FFF2-40B4-BE49-F238E27FC236}">
-                  <a16:creationId xmlns:a16="http://schemas.microsoft.com/office/drawing/2014/main" xmlns="" id="{6E91D320-3732-40B8-864D-142D0A277ED1}"/>
+                  <a16:creationId xmlns="" xmlns:a16="http://schemas.microsoft.com/office/drawing/2014/main" id="{6E91D320-3732-40B8-864D-142D0A277ED1}"/>
                 </a:ext>
               </a:extLst>
             </p:cNvPr>
@@ -3769,7 +3769,7 @@
             <p:cNvPr id="31" name="Straight Connector 4">
               <a:extLst>
                 <a:ext uri="{FF2B5EF4-FFF2-40B4-BE49-F238E27FC236}">
-                  <a16:creationId xmlns:a16="http://schemas.microsoft.com/office/drawing/2014/main" xmlns="" id="{299ABE09-E33C-46B7-A80D-7BF4A6956211}"/>
+                  <a16:creationId xmlns="" xmlns:a16="http://schemas.microsoft.com/office/drawing/2014/main" id="{299ABE09-E33C-46B7-A80D-7BF4A6956211}"/>
                 </a:ext>
               </a:extLst>
             </p:cNvPr>
@@ -3806,7 +3806,7 @@
             <p:cNvPr id="30" name="Straight Connector 3">
               <a:extLst>
                 <a:ext uri="{FF2B5EF4-FFF2-40B4-BE49-F238E27FC236}">
-                  <a16:creationId xmlns:a16="http://schemas.microsoft.com/office/drawing/2014/main" xmlns="" id="{93DDBF37-0764-47AA-94E3-9A44F3ED8FB5}"/>
+                  <a16:creationId xmlns="" xmlns:a16="http://schemas.microsoft.com/office/drawing/2014/main" id="{93DDBF37-0764-47AA-94E3-9A44F3ED8FB5}"/>
                 </a:ext>
               </a:extLst>
             </p:cNvPr>
@@ -3843,7 +3843,7 @@
             <p:cNvPr id="29" name="Straight Connector 2">
               <a:extLst>
                 <a:ext uri="{FF2B5EF4-FFF2-40B4-BE49-F238E27FC236}">
-                  <a16:creationId xmlns:a16="http://schemas.microsoft.com/office/drawing/2014/main" xmlns="" id="{72BFE2F3-0845-4E5B-9375-E9D4027DD675}"/>
+                  <a16:creationId xmlns="" xmlns:a16="http://schemas.microsoft.com/office/drawing/2014/main" id="{72BFE2F3-0845-4E5B-9375-E9D4027DD675}"/>
                 </a:ext>
               </a:extLst>
             </p:cNvPr>
@@ -3880,7 +3880,7 @@
             <p:cNvPr id="28" name="Straight Connector 1">
               <a:extLst>
                 <a:ext uri="{FF2B5EF4-FFF2-40B4-BE49-F238E27FC236}">
-                  <a16:creationId xmlns:a16="http://schemas.microsoft.com/office/drawing/2014/main" xmlns="" id="{D4E5982E-3110-47E1-A5BB-91B7BECC3093}"/>
+                  <a16:creationId xmlns="" xmlns:a16="http://schemas.microsoft.com/office/drawing/2014/main" id="{D4E5982E-3110-47E1-A5BB-91B7BECC3093}"/>
                 </a:ext>
               </a:extLst>
             </p:cNvPr>
@@ -3917,7 +3917,7 @@
             <p:cNvPr id="27" name="Straight Connector Horizontal">
               <a:extLst>
                 <a:ext uri="{FF2B5EF4-FFF2-40B4-BE49-F238E27FC236}">
-                  <a16:creationId xmlns:a16="http://schemas.microsoft.com/office/drawing/2014/main" xmlns="" id="{5F62FB7C-BD6E-4383-98C1-2CF30F34CAFD}"/>
+                  <a16:creationId xmlns="" xmlns:a16="http://schemas.microsoft.com/office/drawing/2014/main" id="{5F62FB7C-BD6E-4383-98C1-2CF30F34CAFD}"/>
                 </a:ext>
               </a:extLst>
             </p:cNvPr>
@@ -3956,7 +3956,7 @@
             <p:cNvPr id="34" name="Straight Connector 0">
               <a:extLst>
                 <a:ext uri="{FF2B5EF4-FFF2-40B4-BE49-F238E27FC236}">
-                  <a16:creationId xmlns:a16="http://schemas.microsoft.com/office/drawing/2014/main" xmlns="" id="{C84A0FE1-723D-4682-8682-77BAD950EE15}"/>
+                  <a16:creationId xmlns="" xmlns:a16="http://schemas.microsoft.com/office/drawing/2014/main" id="{C84A0FE1-723D-4682-8682-77BAD950EE15}"/>
                 </a:ext>
               </a:extLst>
             </p:cNvPr>
@@ -3993,7 +3993,7 @@
             <p:cNvPr id="18" name="Picture SoftUni Logo" descr="SoftUni logo">
               <a:extLst>
                 <a:ext uri="{FF2B5EF4-FFF2-40B4-BE49-F238E27FC236}">
-                  <a16:creationId xmlns:a16="http://schemas.microsoft.com/office/drawing/2014/main" xmlns="" id="{A0675455-B7FA-4569-A5FD-A3B0F20B2A26}"/>
+                  <a16:creationId xmlns="" xmlns:a16="http://schemas.microsoft.com/office/drawing/2014/main" id="{A0675455-B7FA-4569-A5FD-A3B0F20B2A26}"/>
                 </a:ext>
               </a:extLst>
             </p:cNvPr>
@@ -4006,7 +4006,7 @@
             <a:blip r:embed="rId10" cstate="print">
               <a:extLst>
                 <a:ext uri="{28A0092B-C50C-407E-A947-70E740481C1C}">
-                  <a14:useLocalDpi xmlns:a14="http://schemas.microsoft.com/office/drawing/2010/main" xmlns="" val="0"/>
+                  <a14:useLocalDpi xmlns="" xmlns:a14="http://schemas.microsoft.com/office/drawing/2010/main" val="0"/>
                 </a:ext>
               </a:extLst>
             </a:blip>
@@ -4030,7 +4030,7 @@
           <p:cNvPr id="19" name="Slide Title">
             <a:extLst>
               <a:ext uri="{FF2B5EF4-FFF2-40B4-BE49-F238E27FC236}">
-                <a16:creationId xmlns:a16="http://schemas.microsoft.com/office/drawing/2014/main" xmlns="" id="{7CFDBB16-985C-4CC7-B6DB-B81B36037922}"/>
+                <a16:creationId xmlns="" xmlns:a16="http://schemas.microsoft.com/office/drawing/2014/main" id="{7CFDBB16-985C-4CC7-B6DB-B81B36037922}"/>
               </a:ext>
             </a:extLst>
           </p:cNvPr>
@@ -4133,7 +4133,7 @@
           <p:cNvPr id="36" name="Logo Software University" descr="Software University logo">
             <a:extLst>
               <a:ext uri="{FF2B5EF4-FFF2-40B4-BE49-F238E27FC236}">
-                <a16:creationId xmlns:a16="http://schemas.microsoft.com/office/drawing/2014/main" xmlns="" id="{67FC4D2E-913D-432A-B658-F0D82839FA5E}"/>
+                <a16:creationId xmlns="" xmlns:a16="http://schemas.microsoft.com/office/drawing/2014/main" id="{67FC4D2E-913D-432A-B658-F0D82839FA5E}"/>
               </a:ext>
             </a:extLst>
           </p:cNvPr>
@@ -4156,7 +4156,7 @@
             </a:clrChange>
             <a:extLst>
               <a:ext uri="{28A0092B-C50C-407E-A947-70E740481C1C}">
-                <a14:useLocalDpi xmlns:a14="http://schemas.microsoft.com/office/drawing/2010/main" xmlns="" val="0"/>
+                <a14:useLocalDpi xmlns="" xmlns:a14="http://schemas.microsoft.com/office/drawing/2010/main" val="0"/>
               </a:ext>
             </a:extLst>
           </a:blip>
@@ -4177,7 +4177,7 @@
     </p:spTree>
     <p:extLst>
       <p:ext uri="{BB962C8B-B14F-4D97-AF65-F5344CB8AC3E}">
-        <p14:creationId xmlns:p14="http://schemas.microsoft.com/office/powerpoint/2010/main" xmlns="" val="4192061223"/>
+        <p14:creationId xmlns="" xmlns:p14="http://schemas.microsoft.com/office/powerpoint/2010/main" val="4192061223"/>
       </p:ext>
     </p:extLst>
   </p:cSld>
@@ -4185,7 +4185,7 @@
     <a:masterClrMapping/>
   </p:clrMapOvr>
   <mc:AlternateContent xmlns:mc="http://schemas.openxmlformats.org/markup-compatibility/2006">
-    <mc:Choice xmlns:p14="http://schemas.microsoft.com/office/powerpoint/2010/main" xmlns="" Requires="p14">
+    <mc:Choice xmlns="" xmlns:p14="http://schemas.microsoft.com/office/powerpoint/2010/main" Requires="p14">
       <p:transition spd="slow" p14:dur="2000" advClick="0" advTm="5000"/>
     </mc:Choice>
     <mc:Fallback>
@@ -4194,7 +4194,7 @@
   </mc:AlternateContent>
   <p:extLst>
     <p:ext uri="{DCECCB84-F9BA-43D5-87BE-67443E8EF086}">
-      <p15:sldGuideLst xmlns:p15="http://schemas.microsoft.com/office/powerpoint/2012/main" xmlns="">
+      <p15:sldGuideLst xmlns="" xmlns:p15="http://schemas.microsoft.com/office/powerpoint/2012/main">
         <p15:guide id="1" orient="horz" pos="2160">
           <p15:clr>
             <a:srgbClr val="FBAE40"/>
@@ -4233,7 +4233,7 @@
           <p:cNvPr id="13" name="Slide Number">
             <a:extLst>
               <a:ext uri="{FF2B5EF4-FFF2-40B4-BE49-F238E27FC236}">
-                <a16:creationId xmlns:a16="http://schemas.microsoft.com/office/drawing/2014/main" xmlns="" id="{5B8761D8-B42F-4A70-A0CE-682CEB2AE31B}"/>
+                <a16:creationId xmlns="" xmlns:a16="http://schemas.microsoft.com/office/drawing/2014/main" id="{5B8761D8-B42F-4A70-A0CE-682CEB2AE31B}"/>
               </a:ext>
             </a:extLst>
           </p:cNvPr>
@@ -4276,7 +4276,7 @@
             <a:hlinkClick r:id="rId2" tooltip="Software University Discussion Forum"/>
             <a:extLst>
               <a:ext uri="{FF2B5EF4-FFF2-40B4-BE49-F238E27FC236}">
-                <a16:creationId xmlns:a16="http://schemas.microsoft.com/office/drawing/2014/main" xmlns="" id="{98C579AD-FAF5-4B28-9B52-5457F1E90061}"/>
+                <a16:creationId xmlns="" xmlns:a16="http://schemas.microsoft.com/office/drawing/2014/main" id="{98C579AD-FAF5-4B28-9B52-5457F1E90061}"/>
               </a:ext>
             </a:extLst>
           </p:cNvPr>
@@ -4289,7 +4289,7 @@
           <a:blip r:embed="rId3" cstate="print">
             <a:extLst>
               <a:ext uri="{28A0092B-C50C-407E-A947-70E740481C1C}">
-                <a14:useLocalDpi xmlns:a14="http://schemas.microsoft.com/office/drawing/2010/main" xmlns=""/>
+                <a14:useLocalDpi xmlns="" xmlns:a14="http://schemas.microsoft.com/office/drawing/2010/main"/>
               </a:ext>
             </a:extLst>
           </a:blip>
@@ -4313,7 +4313,7 @@
             <a:hlinkClick r:id="rId4" tooltip="Software University @ Facebook"/>
             <a:extLst>
               <a:ext uri="{FF2B5EF4-FFF2-40B4-BE49-F238E27FC236}">
-                <a16:creationId xmlns:a16="http://schemas.microsoft.com/office/drawing/2014/main" xmlns="" id="{6B2C510E-5EF2-49F6-B926-2BD74CD3C7F8}"/>
+                <a16:creationId xmlns="" xmlns:a16="http://schemas.microsoft.com/office/drawing/2014/main" id="{6B2C510E-5EF2-49F6-B926-2BD74CD3C7F8}"/>
               </a:ext>
             </a:extLst>
           </p:cNvPr>
@@ -4326,7 +4326,7 @@
           <a:blip r:embed="rId5" cstate="print">
             <a:extLst>
               <a:ext uri="{28A0092B-C50C-407E-A947-70E740481C1C}">
-                <a14:useLocalDpi xmlns:a14="http://schemas.microsoft.com/office/drawing/2010/main" xmlns=""/>
+                <a14:useLocalDpi xmlns="" xmlns:a14="http://schemas.microsoft.com/office/drawing/2010/main"/>
               </a:ext>
             </a:extLst>
           </a:blip>
@@ -4344,7 +4344,7 @@
           <a:noFill/>
           <a:extLst>
             <a:ext uri="{909E8E84-426E-40DD-AFC4-6F175D3DCCD1}">
-              <a14:hiddenFill xmlns:a14="http://schemas.microsoft.com/office/drawing/2010/main" xmlns="">
+              <a14:hiddenFill xmlns="" xmlns:a14="http://schemas.microsoft.com/office/drawing/2010/main">
                 <a:solidFill>
                   <a:srgbClr val="FFFFFF"/>
                 </a:solidFill>
@@ -4359,7 +4359,7 @@
             <a:hlinkClick r:id="rId6"/>
             <a:extLst>
               <a:ext uri="{FF2B5EF4-FFF2-40B4-BE49-F238E27FC236}">
-                <a16:creationId xmlns:a16="http://schemas.microsoft.com/office/drawing/2014/main" xmlns="" id="{F4604840-E810-44B7-9FF1-3B28CD68B758}"/>
+                <a16:creationId xmlns="" xmlns:a16="http://schemas.microsoft.com/office/drawing/2014/main" id="{F4604840-E810-44B7-9FF1-3B28CD68B758}"/>
               </a:ext>
             </a:extLst>
           </p:cNvPr>
@@ -4372,7 +4372,7 @@
           <a:blip r:embed="rId7" cstate="print">
             <a:extLst>
               <a:ext uri="{28A0092B-C50C-407E-A947-70E740481C1C}">
-                <a14:useLocalDpi xmlns:a14="http://schemas.microsoft.com/office/drawing/2010/main" xmlns="" val="0"/>
+                <a14:useLocalDpi xmlns="" xmlns:a14="http://schemas.microsoft.com/office/drawing/2010/main" val="0"/>
               </a:ext>
             </a:extLst>
           </a:blip>
@@ -4396,7 +4396,7 @@
             <a:hlinkClick r:id="rId8"/>
             <a:extLst>
               <a:ext uri="{FF2B5EF4-FFF2-40B4-BE49-F238E27FC236}">
-                <a16:creationId xmlns:a16="http://schemas.microsoft.com/office/drawing/2014/main" xmlns="" id="{07C965FA-A87E-4824-AFA8-C67AF548A76A}"/>
+                <a16:creationId xmlns="" xmlns:a16="http://schemas.microsoft.com/office/drawing/2014/main" id="{07C965FA-A87E-4824-AFA8-C67AF548A76A}"/>
               </a:ext>
             </a:extLst>
           </p:cNvPr>
@@ -4409,7 +4409,7 @@
           <a:blip r:embed="rId9" cstate="print">
             <a:extLst>
               <a:ext uri="{28A0092B-C50C-407E-A947-70E740481C1C}">
-                <a14:useLocalDpi xmlns:a14="http://schemas.microsoft.com/office/drawing/2010/main" xmlns="" val="0"/>
+                <a14:useLocalDpi xmlns="" xmlns:a14="http://schemas.microsoft.com/office/drawing/2010/main" val="0"/>
               </a:ext>
             </a:extLst>
           </a:blip>
@@ -4431,7 +4431,7 @@
           <p:cNvPr id="12" name="Slide Body Text">
             <a:extLst>
               <a:ext uri="{FF2B5EF4-FFF2-40B4-BE49-F238E27FC236}">
-                <a16:creationId xmlns:a16="http://schemas.microsoft.com/office/drawing/2014/main" xmlns="" id="{0C1F9416-8B6E-46DE-973C-777785E27A26}"/>
+                <a16:creationId xmlns="" xmlns:a16="http://schemas.microsoft.com/office/drawing/2014/main" id="{0C1F9416-8B6E-46DE-973C-777785E27A26}"/>
               </a:ext>
             </a:extLst>
           </p:cNvPr>
@@ -4556,7 +4556,7 @@
           <p:cNvPr id="10" name="Rectangle Top">
             <a:extLst>
               <a:ext uri="{FF2B5EF4-FFF2-40B4-BE49-F238E27FC236}">
-                <a16:creationId xmlns:a16="http://schemas.microsoft.com/office/drawing/2014/main" xmlns="" id="{86646B95-5E3B-4DE8-9118-031C2C296D8C}"/>
+                <a16:creationId xmlns="" xmlns:a16="http://schemas.microsoft.com/office/drawing/2014/main" id="{86646B95-5E3B-4DE8-9118-031C2C296D8C}"/>
               </a:ext>
             </a:extLst>
           </p:cNvPr>
@@ -4637,7 +4637,7 @@
           <p:cNvPr id="11" name="Logo Software University" descr="Software University logo">
             <a:extLst>
               <a:ext uri="{FF2B5EF4-FFF2-40B4-BE49-F238E27FC236}">
-                <a16:creationId xmlns:a16="http://schemas.microsoft.com/office/drawing/2014/main" xmlns="" id="{58AB1944-B146-4E89-B2D9-426EB610F319}"/>
+                <a16:creationId xmlns="" xmlns:a16="http://schemas.microsoft.com/office/drawing/2014/main" id="{58AB1944-B146-4E89-B2D9-426EB610F319}"/>
               </a:ext>
             </a:extLst>
           </p:cNvPr>
@@ -4650,7 +4650,7 @@
           <a:blip r:embed="rId11" cstate="print">
             <a:extLst>
               <a:ext uri="{28A0092B-C50C-407E-A947-70E740481C1C}">
-                <a14:useLocalDpi xmlns:a14="http://schemas.microsoft.com/office/drawing/2010/main" xmlns="" val="0"/>
+                <a14:useLocalDpi xmlns="" xmlns:a14="http://schemas.microsoft.com/office/drawing/2010/main" val="0"/>
               </a:ext>
             </a:extLst>
           </a:blip>
@@ -4673,7 +4673,7 @@
           <p:cNvPr id="18" name="Slide Title">
             <a:extLst>
               <a:ext uri="{FF2B5EF4-FFF2-40B4-BE49-F238E27FC236}">
-                <a16:creationId xmlns:a16="http://schemas.microsoft.com/office/drawing/2014/main" xmlns="" id="{AE87ED9C-76E1-4D85-9B06-3AF44AABB668}"/>
+                <a16:creationId xmlns="" xmlns:a16="http://schemas.microsoft.com/office/drawing/2014/main" id="{AE87ED9C-76E1-4D85-9B06-3AF44AABB668}"/>
               </a:ext>
             </a:extLst>
           </p:cNvPr>
@@ -4712,7 +4712,7 @@
     </p:spTree>
     <p:extLst>
       <p:ext uri="{BB962C8B-B14F-4D97-AF65-F5344CB8AC3E}">
-        <p14:creationId xmlns:p14="http://schemas.microsoft.com/office/powerpoint/2010/main" xmlns="" val="2196466322"/>
+        <p14:creationId xmlns="" xmlns:p14="http://schemas.microsoft.com/office/powerpoint/2010/main" val="2196466322"/>
       </p:ext>
     </p:extLst>
   </p:cSld>
@@ -4720,7 +4720,7 @@
     <a:masterClrMapping/>
   </p:clrMapOvr>
   <mc:AlternateContent xmlns:mc="http://schemas.openxmlformats.org/markup-compatibility/2006">
-    <mc:Choice xmlns:p14="http://schemas.microsoft.com/office/powerpoint/2010/main" xmlns="" Requires="p14">
+    <mc:Choice xmlns="" xmlns:p14="http://schemas.microsoft.com/office/powerpoint/2010/main" Requires="p14">
       <p:transition spd="slow" p14:dur="2000" advClick="0" advTm="5000"/>
     </mc:Choice>
     <mc:Fallback>
@@ -4752,7 +4752,7 @@
           <p:cNvPr id="9" name="Oval Center Icon">
             <a:extLst>
               <a:ext uri="{FF2B5EF4-FFF2-40B4-BE49-F238E27FC236}">
-                <a16:creationId xmlns:a16="http://schemas.microsoft.com/office/drawing/2014/main" xmlns="" id="{13B9A8FE-2718-4F2C-98D4-CBF86AD69D58}"/>
+                <a16:creationId xmlns="" xmlns:a16="http://schemas.microsoft.com/office/drawing/2014/main" id="{13B9A8FE-2718-4F2C-98D4-CBF86AD69D58}"/>
               </a:ext>
             </a:extLst>
           </p:cNvPr>
@@ -4833,7 +4833,7 @@
           <p:cNvPr id="8" name="Slide Subtitle">
             <a:extLst>
               <a:ext uri="{FF2B5EF4-FFF2-40B4-BE49-F238E27FC236}">
-                <a16:creationId xmlns:a16="http://schemas.microsoft.com/office/drawing/2014/main" xmlns="" id="{588387B4-E99E-4145-9D1D-F17CA5190DFD}"/>
+                <a16:creationId xmlns="" xmlns:a16="http://schemas.microsoft.com/office/drawing/2014/main" id="{588387B4-E99E-4145-9D1D-F17CA5190DFD}"/>
               </a:ext>
             </a:extLst>
           </p:cNvPr>
@@ -4883,7 +4883,7 @@
           <p:cNvPr id="13" name="Slide Title">
             <a:extLst>
               <a:ext uri="{FF2B5EF4-FFF2-40B4-BE49-F238E27FC236}">
-                <a16:creationId xmlns:a16="http://schemas.microsoft.com/office/drawing/2014/main" xmlns="" id="{8A28C56F-AE84-49D0-9AD1-1F0CEEABF710}"/>
+                <a16:creationId xmlns="" xmlns:a16="http://schemas.microsoft.com/office/drawing/2014/main" id="{8A28C56F-AE84-49D0-9AD1-1F0CEEABF710}"/>
               </a:ext>
             </a:extLst>
           </p:cNvPr>
@@ -4928,7 +4928,7 @@
     </p:spTree>
     <p:extLst>
       <p:ext uri="{BB962C8B-B14F-4D97-AF65-F5344CB8AC3E}">
-        <p14:creationId xmlns:p14="http://schemas.microsoft.com/office/powerpoint/2010/main" xmlns="" val="475389923"/>
+        <p14:creationId xmlns="" xmlns:p14="http://schemas.microsoft.com/office/powerpoint/2010/main" val="475389923"/>
       </p:ext>
     </p:extLst>
   </p:cSld>
@@ -4936,7 +4936,7 @@
     <a:masterClrMapping/>
   </p:clrMapOvr>
   <mc:AlternateContent xmlns:mc="http://schemas.openxmlformats.org/markup-compatibility/2006">
-    <mc:Choice xmlns:p14="http://schemas.microsoft.com/office/powerpoint/2010/main" xmlns="" Requires="p14">
+    <mc:Choice xmlns="" xmlns:p14="http://schemas.microsoft.com/office/powerpoint/2010/main" Requires="p14">
       <p:transition spd="slow" p14:dur="2000" advClick="0" advTm="5000"/>
     </mc:Choice>
     <mc:Fallback>
@@ -4969,7 +4969,7 @@
           <p:cNvPr id="2" name="Title 1">
             <a:extLst>
               <a:ext uri="{FF2B5EF4-FFF2-40B4-BE49-F238E27FC236}">
-                <a16:creationId xmlns:a16="http://schemas.microsoft.com/office/drawing/2014/main" xmlns="" id="{5213C145-EA12-94EF-AA17-5F628EA0AD2D}"/>
+                <a16:creationId xmlns="" xmlns:a16="http://schemas.microsoft.com/office/drawing/2014/main" id="{5213C145-EA12-94EF-AA17-5F628EA0AD2D}"/>
               </a:ext>
             </a:extLst>
           </p:cNvPr>
@@ -5007,7 +5007,7 @@
           <p:cNvPr id="3" name="Subtitle 2">
             <a:extLst>
               <a:ext uri="{FF2B5EF4-FFF2-40B4-BE49-F238E27FC236}">
-                <a16:creationId xmlns:a16="http://schemas.microsoft.com/office/drawing/2014/main" xmlns="" id="{5F55E72E-5B45-B6EE-75AE-03B188AD9A08}"/>
+                <a16:creationId xmlns="" xmlns:a16="http://schemas.microsoft.com/office/drawing/2014/main" id="{5F55E72E-5B45-B6EE-75AE-03B188AD9A08}"/>
               </a:ext>
             </a:extLst>
           </p:cNvPr>
@@ -5078,7 +5078,7 @@
           <p:cNvPr id="4" name="Date Placeholder 3">
             <a:extLst>
               <a:ext uri="{FF2B5EF4-FFF2-40B4-BE49-F238E27FC236}">
-                <a16:creationId xmlns:a16="http://schemas.microsoft.com/office/drawing/2014/main" xmlns="" id="{30C6A8EA-0240-01AB-A7C2-BD1CD885E1C1}"/>
+                <a16:creationId xmlns="" xmlns:a16="http://schemas.microsoft.com/office/drawing/2014/main" id="{30C6A8EA-0240-01AB-A7C2-BD1CD885E1C1}"/>
               </a:ext>
             </a:extLst>
           </p:cNvPr>
@@ -5108,7 +5108,7 @@
           <p:cNvPr id="5" name="Footer Placeholder 4">
             <a:extLst>
               <a:ext uri="{FF2B5EF4-FFF2-40B4-BE49-F238E27FC236}">
-                <a16:creationId xmlns:a16="http://schemas.microsoft.com/office/drawing/2014/main" xmlns="" id="{F95CBF96-4249-1541-E44E-FBCECA233B3C}"/>
+                <a16:creationId xmlns="" xmlns:a16="http://schemas.microsoft.com/office/drawing/2014/main" id="{F95CBF96-4249-1541-E44E-FBCECA233B3C}"/>
               </a:ext>
             </a:extLst>
           </p:cNvPr>
@@ -5133,7 +5133,7 @@
           <p:cNvPr id="6" name="Slide Number Placeholder 5">
             <a:extLst>
               <a:ext uri="{FF2B5EF4-FFF2-40B4-BE49-F238E27FC236}">
-                <a16:creationId xmlns:a16="http://schemas.microsoft.com/office/drawing/2014/main" xmlns="" id="{7ACB54F2-814F-F79B-8CD7-FA3133365CBC}"/>
+                <a16:creationId xmlns="" xmlns:a16="http://schemas.microsoft.com/office/drawing/2014/main" id="{7ACB54F2-814F-F79B-8CD7-FA3133365CBC}"/>
               </a:ext>
             </a:extLst>
           </p:cNvPr>
@@ -5161,7 +5161,7 @@
     </p:spTree>
     <p:extLst>
       <p:ext uri="{BB962C8B-B14F-4D97-AF65-F5344CB8AC3E}">
-        <p14:creationId xmlns:p14="http://schemas.microsoft.com/office/powerpoint/2010/main" xmlns="" val="2773863354"/>
+        <p14:creationId xmlns="" xmlns:p14="http://schemas.microsoft.com/office/powerpoint/2010/main" val="2773863354"/>
       </p:ext>
     </p:extLst>
   </p:cSld>
@@ -5193,7 +5193,7 @@
           <p:cNvPr id="8" name="Rectangle Top">
             <a:extLst>
               <a:ext uri="{FF2B5EF4-FFF2-40B4-BE49-F238E27FC236}">
-                <a16:creationId xmlns:a16="http://schemas.microsoft.com/office/drawing/2014/main" xmlns="" id="{454BD9C2-93A6-4860-A758-846ED0E1C8FA}"/>
+                <a16:creationId xmlns="" xmlns:a16="http://schemas.microsoft.com/office/drawing/2014/main" id="{454BD9C2-93A6-4860-A758-846ED0E1C8FA}"/>
               </a:ext>
             </a:extLst>
           </p:cNvPr>
@@ -5274,7 +5274,7 @@
           <p:cNvPr id="7" name="Slide Number">
             <a:extLst>
               <a:ext uri="{FF2B5EF4-FFF2-40B4-BE49-F238E27FC236}">
-                <a16:creationId xmlns:a16="http://schemas.microsoft.com/office/drawing/2014/main" xmlns="" id="{C1780DB1-0AF0-4108-AFE1-9DA99F0DBCB8}"/>
+                <a16:creationId xmlns="" xmlns:a16="http://schemas.microsoft.com/office/drawing/2014/main" id="{C1780DB1-0AF0-4108-AFE1-9DA99F0DBCB8}"/>
               </a:ext>
             </a:extLst>
           </p:cNvPr>
@@ -5316,7 +5316,7 @@
           <p:cNvPr id="3" name="Slide Body Text">
             <a:extLst>
               <a:ext uri="{FF2B5EF4-FFF2-40B4-BE49-F238E27FC236}">
-                <a16:creationId xmlns:a16="http://schemas.microsoft.com/office/drawing/2014/main" xmlns="" id="{5A9D2960-6D42-439F-82E8-812822013A10}"/>
+                <a16:creationId xmlns="" xmlns:a16="http://schemas.microsoft.com/office/drawing/2014/main" id="{5A9D2960-6D42-439F-82E8-812822013A10}"/>
               </a:ext>
             </a:extLst>
           </p:cNvPr>
@@ -5394,7 +5394,7 @@
           <p:cNvPr id="13" name="Rectangle Top">
             <a:extLst>
               <a:ext uri="{FF2B5EF4-FFF2-40B4-BE49-F238E27FC236}">
-                <a16:creationId xmlns:a16="http://schemas.microsoft.com/office/drawing/2014/main" xmlns="" id="{391AFA4E-7870-4561-A1B8-AC956B0C8931}"/>
+                <a16:creationId xmlns="" xmlns:a16="http://schemas.microsoft.com/office/drawing/2014/main" id="{391AFA4E-7870-4561-A1B8-AC956B0C8931}"/>
               </a:ext>
             </a:extLst>
           </p:cNvPr>
@@ -5475,7 +5475,7 @@
           <p:cNvPr id="12" name="Logo Software University" descr="Software University logo">
             <a:extLst>
               <a:ext uri="{FF2B5EF4-FFF2-40B4-BE49-F238E27FC236}">
-                <a16:creationId xmlns:a16="http://schemas.microsoft.com/office/drawing/2014/main" xmlns="" id="{B1D3B425-B9BF-43ED-9DEC-C05002FBA22F}"/>
+                <a16:creationId xmlns="" xmlns:a16="http://schemas.microsoft.com/office/drawing/2014/main" id="{B1D3B425-B9BF-43ED-9DEC-C05002FBA22F}"/>
               </a:ext>
             </a:extLst>
           </p:cNvPr>
@@ -5488,7 +5488,7 @@
           <a:blip r:embed="rId2" cstate="print">
             <a:extLst>
               <a:ext uri="{28A0092B-C50C-407E-A947-70E740481C1C}">
-                <a14:useLocalDpi xmlns:a14="http://schemas.microsoft.com/office/drawing/2010/main" xmlns="" val="0"/>
+                <a14:useLocalDpi xmlns="" xmlns:a14="http://schemas.microsoft.com/office/drawing/2010/main" val="0"/>
               </a:ext>
             </a:extLst>
           </a:blip>
@@ -5511,7 +5511,7 @@
           <p:cNvPr id="6" name="Slide Title">
             <a:extLst>
               <a:ext uri="{FF2B5EF4-FFF2-40B4-BE49-F238E27FC236}">
-                <a16:creationId xmlns:a16="http://schemas.microsoft.com/office/drawing/2014/main" xmlns="" id="{19B5B676-7892-440F-8191-7109B2C59885}"/>
+                <a16:creationId xmlns="" xmlns:a16="http://schemas.microsoft.com/office/drawing/2014/main" id="{19B5B676-7892-440F-8191-7109B2C59885}"/>
               </a:ext>
             </a:extLst>
           </p:cNvPr>
@@ -5550,7 +5550,7 @@
     </p:spTree>
     <p:extLst>
       <p:ext uri="{BB962C8B-B14F-4D97-AF65-F5344CB8AC3E}">
-        <p14:creationId xmlns:p14="http://schemas.microsoft.com/office/powerpoint/2010/main" xmlns="" val="2685365194"/>
+        <p14:creationId xmlns="" xmlns:p14="http://schemas.microsoft.com/office/powerpoint/2010/main" val="2685365194"/>
       </p:ext>
     </p:extLst>
   </p:cSld>
@@ -5558,7 +5558,7 @@
     <a:masterClrMapping/>
   </p:clrMapOvr>
   <mc:AlternateContent xmlns:mc="http://schemas.openxmlformats.org/markup-compatibility/2006">
-    <mc:Choice xmlns:p14="http://schemas.microsoft.com/office/powerpoint/2010/main" xmlns="" Requires="p14">
+    <mc:Choice xmlns="" xmlns:p14="http://schemas.microsoft.com/office/powerpoint/2010/main" Requires="p14">
       <p:transition spd="slow" p14:dur="2000" advClick="0" advTm="5000"/>
     </mc:Choice>
     <mc:Fallback>
@@ -6668,7 +6668,7 @@
     </p:spTree>
     <p:extLst>
       <p:ext uri="{BB962C8B-B14F-4D97-AF65-F5344CB8AC3E}">
-        <p14:creationId xmlns:p14="http://schemas.microsoft.com/office/powerpoint/2010/main" xmlns="" val="2531485629"/>
+        <p14:creationId xmlns="" xmlns:p14="http://schemas.microsoft.com/office/powerpoint/2010/main" val="2531485629"/>
       </p:ext>
     </p:extLst>
   </p:cSld>
@@ -6864,7 +6864,7 @@
     </p:spTree>
     <p:extLst>
       <p:ext uri="{BB962C8B-B14F-4D97-AF65-F5344CB8AC3E}">
-        <p14:creationId xmlns:p14="http://schemas.microsoft.com/office/powerpoint/2010/main" xmlns="" val="3529216409"/>
+        <p14:creationId xmlns="" xmlns:p14="http://schemas.microsoft.com/office/powerpoint/2010/main" val="3529216409"/>
       </p:ext>
     </p:extLst>
   </p:cSld>
@@ -6872,7 +6872,7 @@
     <a:masterClrMapping/>
   </p:clrMapOvr>
   <mc:AlternateContent xmlns:mc="http://schemas.openxmlformats.org/markup-compatibility/2006">
-    <mc:Choice xmlns:p14="http://schemas.microsoft.com/office/powerpoint/2010/main" xmlns="" Requires="p14">
+    <mc:Choice xmlns="" xmlns:p14="http://schemas.microsoft.com/office/powerpoint/2010/main" Requires="p14">
       <p:transition spd="slow" p14:dur="2000" advClick="0" advTm="5000"/>
     </mc:Choice>
     <mc:Fallback>
@@ -6904,7 +6904,7 @@
           <p:cNvPr id="7" name="Slide Number">
             <a:extLst>
               <a:ext uri="{FF2B5EF4-FFF2-40B4-BE49-F238E27FC236}">
-                <a16:creationId xmlns:a16="http://schemas.microsoft.com/office/drawing/2014/main" xmlns="" id="{C1780DB1-0AF0-4108-AFE1-9DA99F0DBCB8}"/>
+                <a16:creationId xmlns="" xmlns:a16="http://schemas.microsoft.com/office/drawing/2014/main" id="{C1780DB1-0AF0-4108-AFE1-9DA99F0DBCB8}"/>
               </a:ext>
             </a:extLst>
           </p:cNvPr>
@@ -6946,7 +6946,7 @@
           <p:cNvPr id="3" name="Slide Body Text">
             <a:extLst>
               <a:ext uri="{FF2B5EF4-FFF2-40B4-BE49-F238E27FC236}">
-                <a16:creationId xmlns:a16="http://schemas.microsoft.com/office/drawing/2014/main" xmlns="" id="{5A9D2960-6D42-439F-82E8-812822013A10}"/>
+                <a16:creationId xmlns="" xmlns:a16="http://schemas.microsoft.com/office/drawing/2014/main" id="{5A9D2960-6D42-439F-82E8-812822013A10}"/>
               </a:ext>
             </a:extLst>
           </p:cNvPr>
@@ -7024,7 +7024,7 @@
           <p:cNvPr id="13" name="Rectangle Top">
             <a:extLst>
               <a:ext uri="{FF2B5EF4-FFF2-40B4-BE49-F238E27FC236}">
-                <a16:creationId xmlns:a16="http://schemas.microsoft.com/office/drawing/2014/main" xmlns="" id="{391AFA4E-7870-4561-A1B8-AC956B0C8931}"/>
+                <a16:creationId xmlns="" xmlns:a16="http://schemas.microsoft.com/office/drawing/2014/main" id="{391AFA4E-7870-4561-A1B8-AC956B0C8931}"/>
               </a:ext>
             </a:extLst>
           </p:cNvPr>
@@ -7105,7 +7105,7 @@
           <p:cNvPr id="12" name="Logo Software University" descr="Software University logo">
             <a:extLst>
               <a:ext uri="{FF2B5EF4-FFF2-40B4-BE49-F238E27FC236}">
-                <a16:creationId xmlns:a16="http://schemas.microsoft.com/office/drawing/2014/main" xmlns="" id="{B1D3B425-B9BF-43ED-9DEC-C05002FBA22F}"/>
+                <a16:creationId xmlns="" xmlns:a16="http://schemas.microsoft.com/office/drawing/2014/main" id="{B1D3B425-B9BF-43ED-9DEC-C05002FBA22F}"/>
               </a:ext>
             </a:extLst>
           </p:cNvPr>
@@ -7118,7 +7118,7 @@
           <a:blip r:embed="rId2" cstate="print">
             <a:extLst>
               <a:ext uri="{28A0092B-C50C-407E-A947-70E740481C1C}">
-                <a14:useLocalDpi xmlns:a14="http://schemas.microsoft.com/office/drawing/2010/main" xmlns="" val="0"/>
+                <a14:useLocalDpi xmlns="" xmlns:a14="http://schemas.microsoft.com/office/drawing/2010/main" val="0"/>
               </a:ext>
             </a:extLst>
           </a:blip>
@@ -7141,7 +7141,7 @@
           <p:cNvPr id="6" name="Slide Title">
             <a:extLst>
               <a:ext uri="{FF2B5EF4-FFF2-40B4-BE49-F238E27FC236}">
-                <a16:creationId xmlns:a16="http://schemas.microsoft.com/office/drawing/2014/main" xmlns="" id="{19B5B676-7892-440F-8191-7109B2C59885}"/>
+                <a16:creationId xmlns="" xmlns:a16="http://schemas.microsoft.com/office/drawing/2014/main" id="{19B5B676-7892-440F-8191-7109B2C59885}"/>
               </a:ext>
             </a:extLst>
           </p:cNvPr>
@@ -7180,7 +7180,7 @@
     </p:spTree>
     <p:extLst>
       <p:ext uri="{BB962C8B-B14F-4D97-AF65-F5344CB8AC3E}">
-        <p14:creationId xmlns:p14="http://schemas.microsoft.com/office/powerpoint/2010/main" xmlns="" val="1102970716"/>
+        <p14:creationId xmlns="" xmlns:p14="http://schemas.microsoft.com/office/powerpoint/2010/main" val="1102970716"/>
       </p:ext>
     </p:extLst>
   </p:cSld>
@@ -7188,7 +7188,7 @@
     <a:masterClrMapping/>
   </p:clrMapOvr>
   <mc:AlternateContent xmlns:mc="http://schemas.openxmlformats.org/markup-compatibility/2006">
-    <mc:Choice xmlns:p14="http://schemas.microsoft.com/office/powerpoint/2010/main" xmlns="" Requires="p14">
+    <mc:Choice xmlns="" xmlns:p14="http://schemas.microsoft.com/office/powerpoint/2010/main" Requires="p14">
       <p:transition spd="slow" p14:dur="2000" advClick="0" advTm="5000"/>
     </mc:Choice>
     <mc:Fallback>
@@ -7220,7 +7220,7 @@
           <p:cNvPr id="9" name="Slide Number">
             <a:extLst>
               <a:ext uri="{FF2B5EF4-FFF2-40B4-BE49-F238E27FC236}">
-                <a16:creationId xmlns:a16="http://schemas.microsoft.com/office/drawing/2014/main" xmlns="" id="{0020EB61-2079-41A3-B356-B1D8D48D786E}"/>
+                <a16:creationId xmlns="" xmlns:a16="http://schemas.microsoft.com/office/drawing/2014/main" id="{0020EB61-2079-41A3-B356-B1D8D48D786E}"/>
               </a:ext>
             </a:extLst>
           </p:cNvPr>
@@ -7337,7 +7337,7 @@
           <p:cNvPr id="7" name="Slide Body Text">
             <a:extLst>
               <a:ext uri="{FF2B5EF4-FFF2-40B4-BE49-F238E27FC236}">
-                <a16:creationId xmlns:a16="http://schemas.microsoft.com/office/drawing/2014/main" xmlns="" id="{CB4CB13C-66A1-466B-A6C1-B0BABF5CFEC1}"/>
+                <a16:creationId xmlns="" xmlns:a16="http://schemas.microsoft.com/office/drawing/2014/main" id="{CB4CB13C-66A1-466B-A6C1-B0BABF5CFEC1}"/>
               </a:ext>
             </a:extLst>
           </p:cNvPr>
@@ -7435,7 +7435,7 @@
           <p:cNvPr id="3" name="Logo Software University" descr="Software University logo">
             <a:extLst>
               <a:ext uri="{FF2B5EF4-FFF2-40B4-BE49-F238E27FC236}">
-                <a16:creationId xmlns:a16="http://schemas.microsoft.com/office/drawing/2014/main" xmlns="" id="{5573C101-930B-47AC-967A-A64513DFFDEE}"/>
+                <a16:creationId xmlns="" xmlns:a16="http://schemas.microsoft.com/office/drawing/2014/main" id="{5573C101-930B-47AC-967A-A64513DFFDEE}"/>
               </a:ext>
             </a:extLst>
           </p:cNvPr>
@@ -7458,7 +7458,7 @@
             </a:clrChange>
             <a:extLst>
               <a:ext uri="{28A0092B-C50C-407E-A947-70E740481C1C}">
-                <a14:useLocalDpi xmlns:a14="http://schemas.microsoft.com/office/drawing/2010/main" xmlns="" val="0"/>
+                <a14:useLocalDpi xmlns="" xmlns:a14="http://schemas.microsoft.com/office/drawing/2010/main" val="0"/>
               </a:ext>
             </a:extLst>
           </a:blip>
@@ -7481,7 +7481,7 @@
           <p:cNvPr id="8" name="Slide Title">
             <a:extLst>
               <a:ext uri="{FF2B5EF4-FFF2-40B4-BE49-F238E27FC236}">
-                <a16:creationId xmlns:a16="http://schemas.microsoft.com/office/drawing/2014/main" xmlns="" id="{E2DA9691-CDF5-499C-94BB-AAA61DAC1BFB}"/>
+                <a16:creationId xmlns="" xmlns:a16="http://schemas.microsoft.com/office/drawing/2014/main" id="{E2DA9691-CDF5-499C-94BB-AAA61DAC1BFB}"/>
               </a:ext>
             </a:extLst>
           </p:cNvPr>
@@ -7518,7 +7518,7 @@
           <p:cNvPr id="10" name="Group 9">
             <a:extLst>
               <a:ext uri="{FF2B5EF4-FFF2-40B4-BE49-F238E27FC236}">
-                <a16:creationId xmlns:a16="http://schemas.microsoft.com/office/drawing/2014/main" xmlns="" id="{43CDBCC2-1C96-44BC-B992-7B0C49C34904}"/>
+                <a16:creationId xmlns="" xmlns:a16="http://schemas.microsoft.com/office/drawing/2014/main" id="{43CDBCC2-1C96-44BC-B992-7B0C49C34904}"/>
               </a:ext>
             </a:extLst>
           </p:cNvPr>
@@ -7538,7 +7538,7 @@
             <p:cNvPr id="11" name="Group 10">
               <a:extLst>
                 <a:ext uri="{FF2B5EF4-FFF2-40B4-BE49-F238E27FC236}">
-                  <a16:creationId xmlns:a16="http://schemas.microsoft.com/office/drawing/2014/main" xmlns="" id="{7D71B3A8-4D39-42CF-9255-81EA3A622DD6}"/>
+                  <a16:creationId xmlns="" xmlns:a16="http://schemas.microsoft.com/office/drawing/2014/main" id="{7D71B3A8-4D39-42CF-9255-81EA3A622DD6}"/>
                 </a:ext>
               </a:extLst>
             </p:cNvPr>
@@ -7558,7 +7558,7 @@
               <p:cNvPr id="25" name="Oval 24">
                 <a:extLst>
                   <a:ext uri="{FF2B5EF4-FFF2-40B4-BE49-F238E27FC236}">
-                    <a16:creationId xmlns:a16="http://schemas.microsoft.com/office/drawing/2014/main" xmlns="" id="{B98059F9-1874-426D-8AF7-A12C21F37DD9}"/>
+                    <a16:creationId xmlns="" xmlns:a16="http://schemas.microsoft.com/office/drawing/2014/main" id="{B98059F9-1874-426D-8AF7-A12C21F37DD9}"/>
                   </a:ext>
                 </a:extLst>
               </p:cNvPr>
@@ -7610,7 +7610,7 @@
               <p:cNvPr id="26" name="Rectangle 5">
                 <a:extLst>
                   <a:ext uri="{FF2B5EF4-FFF2-40B4-BE49-F238E27FC236}">
-                    <a16:creationId xmlns:a16="http://schemas.microsoft.com/office/drawing/2014/main" xmlns="" id="{A3A1E077-DBDF-48F0-A924-604984B940A2}"/>
+                    <a16:creationId xmlns="" xmlns:a16="http://schemas.microsoft.com/office/drawing/2014/main" id="{A3A1E077-DBDF-48F0-A924-604984B940A2}"/>
                   </a:ext>
                 </a:extLst>
               </p:cNvPr>
@@ -7755,7 +7755,7 @@
               <p:cNvPr id="27" name="Rectangle 5">
                 <a:extLst>
                   <a:ext uri="{FF2B5EF4-FFF2-40B4-BE49-F238E27FC236}">
-                    <a16:creationId xmlns:a16="http://schemas.microsoft.com/office/drawing/2014/main" xmlns="" id="{798B1F51-1FA4-4199-81C7-62356C936CC9}"/>
+                    <a16:creationId xmlns="" xmlns:a16="http://schemas.microsoft.com/office/drawing/2014/main" id="{798B1F51-1FA4-4199-81C7-62356C936CC9}"/>
                   </a:ext>
                 </a:extLst>
               </p:cNvPr>
@@ -7900,7 +7900,7 @@
               <p:cNvPr id="28" name="Arc 27">
                 <a:extLst>
                   <a:ext uri="{FF2B5EF4-FFF2-40B4-BE49-F238E27FC236}">
-                    <a16:creationId xmlns:a16="http://schemas.microsoft.com/office/drawing/2014/main" xmlns="" id="{40A224C8-1233-40F7-96AB-BFF79AF6CDCB}"/>
+                    <a16:creationId xmlns="" xmlns:a16="http://schemas.microsoft.com/office/drawing/2014/main" id="{40A224C8-1233-40F7-96AB-BFF79AF6CDCB}"/>
                   </a:ext>
                 </a:extLst>
               </p:cNvPr>
@@ -7959,7 +7959,7 @@
               <p:cNvPr id="29" name="Arc 28">
                 <a:extLst>
                   <a:ext uri="{FF2B5EF4-FFF2-40B4-BE49-F238E27FC236}">
-                    <a16:creationId xmlns:a16="http://schemas.microsoft.com/office/drawing/2014/main" xmlns="" id="{B57C7CCC-E218-4321-8C7B-3F0C5753C7A1}"/>
+                    <a16:creationId xmlns="" xmlns:a16="http://schemas.microsoft.com/office/drawing/2014/main" id="{B57C7CCC-E218-4321-8C7B-3F0C5753C7A1}"/>
                   </a:ext>
                 </a:extLst>
               </p:cNvPr>
@@ -8019,7 +8019,7 @@
             <p:cNvPr id="13" name="Rectangle: Rounded Corners 12">
               <a:extLst>
                 <a:ext uri="{FF2B5EF4-FFF2-40B4-BE49-F238E27FC236}">
-                  <a16:creationId xmlns:a16="http://schemas.microsoft.com/office/drawing/2014/main" xmlns="" id="{6AF309CA-A56C-4ABC-B293-420F4EB1A9B4}"/>
+                  <a16:creationId xmlns="" xmlns:a16="http://schemas.microsoft.com/office/drawing/2014/main" id="{6AF309CA-A56C-4ABC-B293-420F4EB1A9B4}"/>
                 </a:ext>
               </a:extLst>
             </p:cNvPr>
@@ -8073,7 +8073,7 @@
             <p:cNvPr id="14" name="Rectangle: Rounded Corners 13">
               <a:extLst>
                 <a:ext uri="{FF2B5EF4-FFF2-40B4-BE49-F238E27FC236}">
-                  <a16:creationId xmlns:a16="http://schemas.microsoft.com/office/drawing/2014/main" xmlns="" id="{07955808-2AC7-44EB-8B6D-82B974E53A3C}"/>
+                  <a16:creationId xmlns="" xmlns:a16="http://schemas.microsoft.com/office/drawing/2014/main" id="{07955808-2AC7-44EB-8B6D-82B974E53A3C}"/>
                 </a:ext>
               </a:extLst>
             </p:cNvPr>
@@ -8134,7 +8134,7 @@
             <p:cNvPr id="15" name="Straight Connector 14">
               <a:extLst>
                 <a:ext uri="{FF2B5EF4-FFF2-40B4-BE49-F238E27FC236}">
-                  <a16:creationId xmlns:a16="http://schemas.microsoft.com/office/drawing/2014/main" xmlns="" id="{AC6420D7-AEAB-45EF-8D46-11EB06E4AFEA}"/>
+                  <a16:creationId xmlns="" xmlns:a16="http://schemas.microsoft.com/office/drawing/2014/main" id="{AC6420D7-AEAB-45EF-8D46-11EB06E4AFEA}"/>
                 </a:ext>
               </a:extLst>
             </p:cNvPr>
@@ -8180,7 +8180,7 @@
             <p:cNvPr id="16" name="Straight Connector 15">
               <a:extLst>
                 <a:ext uri="{FF2B5EF4-FFF2-40B4-BE49-F238E27FC236}">
-                  <a16:creationId xmlns:a16="http://schemas.microsoft.com/office/drawing/2014/main" xmlns="" id="{76C7FABC-6773-44F6-990B-3EB082BE9B35}"/>
+                  <a16:creationId xmlns="" xmlns:a16="http://schemas.microsoft.com/office/drawing/2014/main" id="{76C7FABC-6773-44F6-990B-3EB082BE9B35}"/>
                 </a:ext>
               </a:extLst>
             </p:cNvPr>
@@ -8226,7 +8226,7 @@
             <p:cNvPr id="17" name="Group 16">
               <a:extLst>
                 <a:ext uri="{FF2B5EF4-FFF2-40B4-BE49-F238E27FC236}">
-                  <a16:creationId xmlns:a16="http://schemas.microsoft.com/office/drawing/2014/main" xmlns="" id="{1FAD48E1-DC45-4B3D-9CE5-613250708496}"/>
+                  <a16:creationId xmlns="" xmlns:a16="http://schemas.microsoft.com/office/drawing/2014/main" id="{1FAD48E1-DC45-4B3D-9CE5-613250708496}"/>
                 </a:ext>
               </a:extLst>
             </p:cNvPr>
@@ -8249,7 +8249,7 @@
               <p:cNvPr id="23" name="Straight Connector 22">
                 <a:extLst>
                   <a:ext uri="{FF2B5EF4-FFF2-40B4-BE49-F238E27FC236}">
-                    <a16:creationId xmlns:a16="http://schemas.microsoft.com/office/drawing/2014/main" xmlns="" id="{B01FD1D1-046F-457B-AB63-2702CE3E906E}"/>
+                    <a16:creationId xmlns="" xmlns:a16="http://schemas.microsoft.com/office/drawing/2014/main" id="{B01FD1D1-046F-457B-AB63-2702CE3E906E}"/>
                   </a:ext>
                 </a:extLst>
               </p:cNvPr>
@@ -8293,7 +8293,7 @@
               <p:cNvPr id="24" name="Straight Connector 23">
                 <a:extLst>
                   <a:ext uri="{FF2B5EF4-FFF2-40B4-BE49-F238E27FC236}">
-                    <a16:creationId xmlns:a16="http://schemas.microsoft.com/office/drawing/2014/main" xmlns="" id="{895660C3-C72C-43EE-9C4A-170F85E5BE08}"/>
+                    <a16:creationId xmlns="" xmlns:a16="http://schemas.microsoft.com/office/drawing/2014/main" id="{895660C3-C72C-43EE-9C4A-170F85E5BE08}"/>
                   </a:ext>
                 </a:extLst>
               </p:cNvPr>
@@ -8338,7 +8338,7 @@
             <p:cNvPr id="19" name="Straight Connector 18">
               <a:extLst>
                 <a:ext uri="{FF2B5EF4-FFF2-40B4-BE49-F238E27FC236}">
-                  <a16:creationId xmlns:a16="http://schemas.microsoft.com/office/drawing/2014/main" xmlns="" id="{A74EE503-8FC0-42A6-8860-CA4EE42272E4}"/>
+                  <a16:creationId xmlns="" xmlns:a16="http://schemas.microsoft.com/office/drawing/2014/main" id="{A74EE503-8FC0-42A6-8860-CA4EE42272E4}"/>
                 </a:ext>
               </a:extLst>
             </p:cNvPr>
@@ -8384,7 +8384,7 @@
             <p:cNvPr id="12" name="Rectangle: Rounded Corners 11">
               <a:extLst>
                 <a:ext uri="{FF2B5EF4-FFF2-40B4-BE49-F238E27FC236}">
-                  <a16:creationId xmlns:a16="http://schemas.microsoft.com/office/drawing/2014/main" xmlns="" id="{F4189FDA-9FE8-490B-8A70-2E941811021F}"/>
+                  <a16:creationId xmlns="" xmlns:a16="http://schemas.microsoft.com/office/drawing/2014/main" id="{F4189FDA-9FE8-490B-8A70-2E941811021F}"/>
                 </a:ext>
               </a:extLst>
             </p:cNvPr>
@@ -8438,7 +8438,7 @@
             <p:cNvPr id="18" name="Group 17">
               <a:extLst>
                 <a:ext uri="{FF2B5EF4-FFF2-40B4-BE49-F238E27FC236}">
-                  <a16:creationId xmlns:a16="http://schemas.microsoft.com/office/drawing/2014/main" xmlns="" id="{FDA3EFCD-0DF8-419D-8533-D781521E597E}"/>
+                  <a16:creationId xmlns="" xmlns:a16="http://schemas.microsoft.com/office/drawing/2014/main" id="{FDA3EFCD-0DF8-419D-8533-D781521E597E}"/>
                 </a:ext>
               </a:extLst>
             </p:cNvPr>
@@ -8461,7 +8461,7 @@
               <p:cNvPr id="21" name="Straight Connector 20">
                 <a:extLst>
                   <a:ext uri="{FF2B5EF4-FFF2-40B4-BE49-F238E27FC236}">
-                    <a16:creationId xmlns:a16="http://schemas.microsoft.com/office/drawing/2014/main" xmlns="" id="{C3CC6A5A-182E-4A09-9C04-EB191881D789}"/>
+                    <a16:creationId xmlns="" xmlns:a16="http://schemas.microsoft.com/office/drawing/2014/main" id="{C3CC6A5A-182E-4A09-9C04-EB191881D789}"/>
                   </a:ext>
                 </a:extLst>
               </p:cNvPr>
@@ -8505,7 +8505,7 @@
               <p:cNvPr id="22" name="Straight Connector 21">
                 <a:extLst>
                   <a:ext uri="{FF2B5EF4-FFF2-40B4-BE49-F238E27FC236}">
-                    <a16:creationId xmlns:a16="http://schemas.microsoft.com/office/drawing/2014/main" xmlns="" id="{440C8953-0555-48CC-8255-78F17E053EE7}"/>
+                    <a16:creationId xmlns="" xmlns:a16="http://schemas.microsoft.com/office/drawing/2014/main" id="{440C8953-0555-48CC-8255-78F17E053EE7}"/>
                   </a:ext>
                 </a:extLst>
               </p:cNvPr>
@@ -8551,7 +8551,7 @@
           <p:cNvPr id="34" name="Straight Connector 33">
             <a:extLst>
               <a:ext uri="{FF2B5EF4-FFF2-40B4-BE49-F238E27FC236}">
-                <a16:creationId xmlns:a16="http://schemas.microsoft.com/office/drawing/2014/main" xmlns="" id="{29B538CA-8CCB-43FB-B5E5-5FC04EBC1F54}"/>
+                <a16:creationId xmlns="" xmlns:a16="http://schemas.microsoft.com/office/drawing/2014/main" id="{29B538CA-8CCB-43FB-B5E5-5FC04EBC1F54}"/>
               </a:ext>
             </a:extLst>
           </p:cNvPr>
@@ -8596,7 +8596,7 @@
     </p:spTree>
     <p:extLst>
       <p:ext uri="{BB962C8B-B14F-4D97-AF65-F5344CB8AC3E}">
-        <p14:creationId xmlns:p14="http://schemas.microsoft.com/office/powerpoint/2010/main" xmlns="" val="743545348"/>
+        <p14:creationId xmlns="" xmlns:p14="http://schemas.microsoft.com/office/powerpoint/2010/main" val="743545348"/>
       </p:ext>
     </p:extLst>
   </p:cSld>
@@ -8604,7 +8604,7 @@
     <a:masterClrMapping/>
   </p:clrMapOvr>
   <mc:AlternateContent xmlns:mc="http://schemas.openxmlformats.org/markup-compatibility/2006">
-    <mc:Choice xmlns:p14="http://schemas.microsoft.com/office/powerpoint/2010/main" xmlns="" Requires="p14">
+    <mc:Choice xmlns="" xmlns:p14="http://schemas.microsoft.com/office/powerpoint/2010/main" Requires="p14">
       <p:transition spd="slow" p14:dur="2000" advClick="0" advTm="5000"/>
     </mc:Choice>
     <mc:Fallback>
@@ -8636,7 +8636,7 @@
           <p:cNvPr id="9" name="Slide Number">
             <a:extLst>
               <a:ext uri="{FF2B5EF4-FFF2-40B4-BE49-F238E27FC236}">
-                <a16:creationId xmlns:a16="http://schemas.microsoft.com/office/drawing/2014/main" xmlns="" id="{1865BF6B-7F07-4E9C-879F-80E36EEB3405}"/>
+                <a16:creationId xmlns="" xmlns:a16="http://schemas.microsoft.com/office/drawing/2014/main" id="{1865BF6B-7F07-4E9C-879F-80E36EEB3405}"/>
               </a:ext>
             </a:extLst>
           </p:cNvPr>
@@ -8678,7 +8678,7 @@
           <p:cNvPr id="12" name="Rectangle Left">
             <a:extLst>
               <a:ext uri="{FF2B5EF4-FFF2-40B4-BE49-F238E27FC236}">
-                <a16:creationId xmlns:a16="http://schemas.microsoft.com/office/drawing/2014/main" xmlns="" id="{345FB1C8-7F66-4D5C-ACCE-AE919936BCFD}"/>
+                <a16:creationId xmlns="" xmlns:a16="http://schemas.microsoft.com/office/drawing/2014/main" id="{345FB1C8-7F66-4D5C-ACCE-AE919936BCFD}"/>
               </a:ext>
             </a:extLst>
           </p:cNvPr>
@@ -8759,7 +8759,7 @@
           <p:cNvPr id="15" name="Slide Body Text">
             <a:extLst>
               <a:ext uri="{FF2B5EF4-FFF2-40B4-BE49-F238E27FC236}">
-                <a16:creationId xmlns:a16="http://schemas.microsoft.com/office/drawing/2014/main" xmlns="" id="{6157C8DE-E0AF-422B-BBB1-F0AF1264B5E9}"/>
+                <a16:creationId xmlns="" xmlns:a16="http://schemas.microsoft.com/office/drawing/2014/main" id="{6157C8DE-E0AF-422B-BBB1-F0AF1264B5E9}"/>
               </a:ext>
             </a:extLst>
           </p:cNvPr>
@@ -8857,7 +8857,7 @@
           <p:cNvPr id="16" name="Logo Software University" descr="Software University logo">
             <a:extLst>
               <a:ext uri="{FF2B5EF4-FFF2-40B4-BE49-F238E27FC236}">
-                <a16:creationId xmlns:a16="http://schemas.microsoft.com/office/drawing/2014/main" xmlns="" id="{EFEBB553-EACE-4B4F-8B4F-7629FDD910A4}"/>
+                <a16:creationId xmlns="" xmlns:a16="http://schemas.microsoft.com/office/drawing/2014/main" id="{EFEBB553-EACE-4B4F-8B4F-7629FDD910A4}"/>
               </a:ext>
             </a:extLst>
           </p:cNvPr>
@@ -8880,7 +8880,7 @@
             </a:clrChange>
             <a:extLst>
               <a:ext uri="{28A0092B-C50C-407E-A947-70E740481C1C}">
-                <a14:useLocalDpi xmlns:a14="http://schemas.microsoft.com/office/drawing/2010/main" xmlns="" val="0"/>
+                <a14:useLocalDpi xmlns="" xmlns:a14="http://schemas.microsoft.com/office/drawing/2010/main" val="0"/>
               </a:ext>
             </a:extLst>
           </a:blip>
@@ -8903,7 +8903,7 @@
           <p:cNvPr id="13" name="Slide Title">
             <a:extLst>
               <a:ext uri="{FF2B5EF4-FFF2-40B4-BE49-F238E27FC236}">
-                <a16:creationId xmlns:a16="http://schemas.microsoft.com/office/drawing/2014/main" xmlns="" id="{0D5CC956-5C4A-44BE-8F8B-327FAFA51E97}"/>
+                <a16:creationId xmlns="" xmlns:a16="http://schemas.microsoft.com/office/drawing/2014/main" id="{0D5CC956-5C4A-44BE-8F8B-327FAFA51E97}"/>
               </a:ext>
             </a:extLst>
           </p:cNvPr>
@@ -8940,7 +8940,7 @@
           <p:cNvPr id="33" name="Group 32">
             <a:extLst>
               <a:ext uri="{FF2B5EF4-FFF2-40B4-BE49-F238E27FC236}">
-                <a16:creationId xmlns:a16="http://schemas.microsoft.com/office/drawing/2014/main" xmlns="" id="{7CF60135-47AA-48F0-96BA-0E795668ABDB}"/>
+                <a16:creationId xmlns="" xmlns:a16="http://schemas.microsoft.com/office/drawing/2014/main" id="{7CF60135-47AA-48F0-96BA-0E795668ABDB}"/>
               </a:ext>
             </a:extLst>
           </p:cNvPr>
@@ -8960,7 +8960,7 @@
             <p:cNvPr id="34" name="Group 33">
               <a:extLst>
                 <a:ext uri="{FF2B5EF4-FFF2-40B4-BE49-F238E27FC236}">
-                  <a16:creationId xmlns:a16="http://schemas.microsoft.com/office/drawing/2014/main" xmlns="" id="{2823380E-3936-41AF-BDF7-DA54D75BBF6B}"/>
+                  <a16:creationId xmlns="" xmlns:a16="http://schemas.microsoft.com/office/drawing/2014/main" id="{2823380E-3936-41AF-BDF7-DA54D75BBF6B}"/>
                 </a:ext>
               </a:extLst>
             </p:cNvPr>
@@ -8980,7 +8980,7 @@
               <p:cNvPr id="47" name="Oval 46">
                 <a:extLst>
                   <a:ext uri="{FF2B5EF4-FFF2-40B4-BE49-F238E27FC236}">
-                    <a16:creationId xmlns:a16="http://schemas.microsoft.com/office/drawing/2014/main" xmlns="" id="{52B047D9-D8DD-45C7-9BC8-6D4F682F5182}"/>
+                    <a16:creationId xmlns="" xmlns:a16="http://schemas.microsoft.com/office/drawing/2014/main" id="{52B047D9-D8DD-45C7-9BC8-6D4F682F5182}"/>
                   </a:ext>
                 </a:extLst>
               </p:cNvPr>
@@ -9032,7 +9032,7 @@
               <p:cNvPr id="48" name="Rectangle 5">
                 <a:extLst>
                   <a:ext uri="{FF2B5EF4-FFF2-40B4-BE49-F238E27FC236}">
-                    <a16:creationId xmlns:a16="http://schemas.microsoft.com/office/drawing/2014/main" xmlns="" id="{4D84FE51-BD8E-47EA-9463-CE02FEA31766}"/>
+                    <a16:creationId xmlns="" xmlns:a16="http://schemas.microsoft.com/office/drawing/2014/main" id="{4D84FE51-BD8E-47EA-9463-CE02FEA31766}"/>
                   </a:ext>
                 </a:extLst>
               </p:cNvPr>
@@ -9177,7 +9177,7 @@
               <p:cNvPr id="49" name="Rectangle 5">
                 <a:extLst>
                   <a:ext uri="{FF2B5EF4-FFF2-40B4-BE49-F238E27FC236}">
-                    <a16:creationId xmlns:a16="http://schemas.microsoft.com/office/drawing/2014/main" xmlns="" id="{F5C8F037-C197-4219-AC87-3A81763512BC}"/>
+                    <a16:creationId xmlns="" xmlns:a16="http://schemas.microsoft.com/office/drawing/2014/main" id="{F5C8F037-C197-4219-AC87-3A81763512BC}"/>
                   </a:ext>
                 </a:extLst>
               </p:cNvPr>
@@ -9322,7 +9322,7 @@
               <p:cNvPr id="50" name="Arc 49">
                 <a:extLst>
                   <a:ext uri="{FF2B5EF4-FFF2-40B4-BE49-F238E27FC236}">
-                    <a16:creationId xmlns:a16="http://schemas.microsoft.com/office/drawing/2014/main" xmlns="" id="{786EE401-CF8E-439B-94A0-EE6F3A7D5798}"/>
+                    <a16:creationId xmlns="" xmlns:a16="http://schemas.microsoft.com/office/drawing/2014/main" id="{786EE401-CF8E-439B-94A0-EE6F3A7D5798}"/>
                   </a:ext>
                 </a:extLst>
               </p:cNvPr>
@@ -9381,7 +9381,7 @@
               <p:cNvPr id="51" name="Arc 50">
                 <a:extLst>
                   <a:ext uri="{FF2B5EF4-FFF2-40B4-BE49-F238E27FC236}">
-                    <a16:creationId xmlns:a16="http://schemas.microsoft.com/office/drawing/2014/main" xmlns="" id="{8D9ACD38-B3EB-4A63-9730-CBF0501BF235}"/>
+                    <a16:creationId xmlns="" xmlns:a16="http://schemas.microsoft.com/office/drawing/2014/main" id="{8D9ACD38-B3EB-4A63-9730-CBF0501BF235}"/>
                   </a:ext>
                 </a:extLst>
               </p:cNvPr>
@@ -9441,7 +9441,7 @@
             <p:cNvPr id="35" name="Rectangle: Rounded Corners 34">
               <a:extLst>
                 <a:ext uri="{FF2B5EF4-FFF2-40B4-BE49-F238E27FC236}">
-                  <a16:creationId xmlns:a16="http://schemas.microsoft.com/office/drawing/2014/main" xmlns="" id="{64EE493E-A353-4C75-A3B9-D48ABA2C57CC}"/>
+                  <a16:creationId xmlns="" xmlns:a16="http://schemas.microsoft.com/office/drawing/2014/main" id="{64EE493E-A353-4C75-A3B9-D48ABA2C57CC}"/>
                 </a:ext>
               </a:extLst>
             </p:cNvPr>
@@ -9495,7 +9495,7 @@
             <p:cNvPr id="36" name="Rectangle: Rounded Corners 35">
               <a:extLst>
                 <a:ext uri="{FF2B5EF4-FFF2-40B4-BE49-F238E27FC236}">
-                  <a16:creationId xmlns:a16="http://schemas.microsoft.com/office/drawing/2014/main" xmlns="" id="{718408B9-204E-42E3-9E79-33E047E869BC}"/>
+                  <a16:creationId xmlns="" xmlns:a16="http://schemas.microsoft.com/office/drawing/2014/main" id="{718408B9-204E-42E3-9E79-33E047E869BC}"/>
                 </a:ext>
               </a:extLst>
             </p:cNvPr>
@@ -9556,7 +9556,7 @@
             <p:cNvPr id="37" name="Straight Connector 36">
               <a:extLst>
                 <a:ext uri="{FF2B5EF4-FFF2-40B4-BE49-F238E27FC236}">
-                  <a16:creationId xmlns:a16="http://schemas.microsoft.com/office/drawing/2014/main" xmlns="" id="{0AB66D97-DF6F-4CD2-AF13-42B5C852F673}"/>
+                  <a16:creationId xmlns="" xmlns:a16="http://schemas.microsoft.com/office/drawing/2014/main" id="{0AB66D97-DF6F-4CD2-AF13-42B5C852F673}"/>
                 </a:ext>
               </a:extLst>
             </p:cNvPr>
@@ -9602,7 +9602,7 @@
             <p:cNvPr id="38" name="Straight Connector 37">
               <a:extLst>
                 <a:ext uri="{FF2B5EF4-FFF2-40B4-BE49-F238E27FC236}">
-                  <a16:creationId xmlns:a16="http://schemas.microsoft.com/office/drawing/2014/main" xmlns="" id="{F2AFBA69-C196-4703-8AAB-5F72A8EDCEB5}"/>
+                  <a16:creationId xmlns="" xmlns:a16="http://schemas.microsoft.com/office/drawing/2014/main" id="{F2AFBA69-C196-4703-8AAB-5F72A8EDCEB5}"/>
                 </a:ext>
               </a:extLst>
             </p:cNvPr>
@@ -9648,7 +9648,7 @@
             <p:cNvPr id="39" name="Group 38">
               <a:extLst>
                 <a:ext uri="{FF2B5EF4-FFF2-40B4-BE49-F238E27FC236}">
-                  <a16:creationId xmlns:a16="http://schemas.microsoft.com/office/drawing/2014/main" xmlns="" id="{9AFC66C1-0C1C-4332-9C4E-782574C896B8}"/>
+                  <a16:creationId xmlns="" xmlns:a16="http://schemas.microsoft.com/office/drawing/2014/main" id="{9AFC66C1-0C1C-4332-9C4E-782574C896B8}"/>
                 </a:ext>
               </a:extLst>
             </p:cNvPr>
@@ -9671,7 +9671,7 @@
               <p:cNvPr id="45" name="Straight Connector 44">
                 <a:extLst>
                   <a:ext uri="{FF2B5EF4-FFF2-40B4-BE49-F238E27FC236}">
-                    <a16:creationId xmlns:a16="http://schemas.microsoft.com/office/drawing/2014/main" xmlns="" id="{872CA8AD-EAF6-40BE-9DDE-ECDB4A980CA5}"/>
+                    <a16:creationId xmlns="" xmlns:a16="http://schemas.microsoft.com/office/drawing/2014/main" id="{872CA8AD-EAF6-40BE-9DDE-ECDB4A980CA5}"/>
                   </a:ext>
                 </a:extLst>
               </p:cNvPr>
@@ -9715,7 +9715,7 @@
               <p:cNvPr id="46" name="Straight Connector 45">
                 <a:extLst>
                   <a:ext uri="{FF2B5EF4-FFF2-40B4-BE49-F238E27FC236}">
-                    <a16:creationId xmlns:a16="http://schemas.microsoft.com/office/drawing/2014/main" xmlns="" id="{57DD3EC7-1A13-4AFE-BD6F-DA12C281FAFB}"/>
+                    <a16:creationId xmlns="" xmlns:a16="http://schemas.microsoft.com/office/drawing/2014/main" id="{57DD3EC7-1A13-4AFE-BD6F-DA12C281FAFB}"/>
                   </a:ext>
                 </a:extLst>
               </p:cNvPr>
@@ -9760,7 +9760,7 @@
             <p:cNvPr id="40" name="Straight Connector 39">
               <a:extLst>
                 <a:ext uri="{FF2B5EF4-FFF2-40B4-BE49-F238E27FC236}">
-                  <a16:creationId xmlns:a16="http://schemas.microsoft.com/office/drawing/2014/main" xmlns="" id="{E46151FA-19E9-4E84-A082-EDAC6F76EA9D}"/>
+                  <a16:creationId xmlns="" xmlns:a16="http://schemas.microsoft.com/office/drawing/2014/main" id="{E46151FA-19E9-4E84-A082-EDAC6F76EA9D}"/>
                 </a:ext>
               </a:extLst>
             </p:cNvPr>
@@ -9806,7 +9806,7 @@
             <p:cNvPr id="41" name="Rectangle: Rounded Corners 40">
               <a:extLst>
                 <a:ext uri="{FF2B5EF4-FFF2-40B4-BE49-F238E27FC236}">
-                  <a16:creationId xmlns:a16="http://schemas.microsoft.com/office/drawing/2014/main" xmlns="" id="{3423EEF0-5B70-4091-B2DA-0740D2609643}"/>
+                  <a16:creationId xmlns="" xmlns:a16="http://schemas.microsoft.com/office/drawing/2014/main" id="{3423EEF0-5B70-4091-B2DA-0740D2609643}"/>
                 </a:ext>
               </a:extLst>
             </p:cNvPr>
@@ -9860,7 +9860,7 @@
             <p:cNvPr id="42" name="Group 41">
               <a:extLst>
                 <a:ext uri="{FF2B5EF4-FFF2-40B4-BE49-F238E27FC236}">
-                  <a16:creationId xmlns:a16="http://schemas.microsoft.com/office/drawing/2014/main" xmlns="" id="{49A8AAA7-98E7-4224-B027-830FFCC285A3}"/>
+                  <a16:creationId xmlns="" xmlns:a16="http://schemas.microsoft.com/office/drawing/2014/main" id="{49A8AAA7-98E7-4224-B027-830FFCC285A3}"/>
                 </a:ext>
               </a:extLst>
             </p:cNvPr>
@@ -9883,7 +9883,7 @@
               <p:cNvPr id="43" name="Straight Connector 42">
                 <a:extLst>
                   <a:ext uri="{FF2B5EF4-FFF2-40B4-BE49-F238E27FC236}">
-                    <a16:creationId xmlns:a16="http://schemas.microsoft.com/office/drawing/2014/main" xmlns="" id="{2129EC38-471E-4685-973E-BA7A7F567C42}"/>
+                    <a16:creationId xmlns="" xmlns:a16="http://schemas.microsoft.com/office/drawing/2014/main" id="{2129EC38-471E-4685-973E-BA7A7F567C42}"/>
                   </a:ext>
                 </a:extLst>
               </p:cNvPr>
@@ -9927,7 +9927,7 @@
               <p:cNvPr id="44" name="Straight Connector 43">
                 <a:extLst>
                   <a:ext uri="{FF2B5EF4-FFF2-40B4-BE49-F238E27FC236}">
-                    <a16:creationId xmlns:a16="http://schemas.microsoft.com/office/drawing/2014/main" xmlns="" id="{678142BE-84C9-4834-B6CC-6623E401661C}"/>
+                    <a16:creationId xmlns="" xmlns:a16="http://schemas.microsoft.com/office/drawing/2014/main" id="{678142BE-84C9-4834-B6CC-6623E401661C}"/>
                   </a:ext>
                 </a:extLst>
               </p:cNvPr>
@@ -9971,7 +9971,7 @@
     </p:spTree>
     <p:extLst>
       <p:ext uri="{BB962C8B-B14F-4D97-AF65-F5344CB8AC3E}">
-        <p14:creationId xmlns:p14="http://schemas.microsoft.com/office/powerpoint/2010/main" xmlns="" val="1679651758"/>
+        <p14:creationId xmlns="" xmlns:p14="http://schemas.microsoft.com/office/powerpoint/2010/main" val="1679651758"/>
       </p:ext>
     </p:extLst>
   </p:cSld>
@@ -9979,7 +9979,7 @@
     <a:masterClrMapping/>
   </p:clrMapOvr>
   <mc:AlternateContent xmlns:mc="http://schemas.openxmlformats.org/markup-compatibility/2006">
-    <mc:Choice xmlns:p14="http://schemas.microsoft.com/office/powerpoint/2010/main" xmlns="" Requires="p14">
+    <mc:Choice xmlns="" xmlns:p14="http://schemas.microsoft.com/office/powerpoint/2010/main" Requires="p14">
       <p:transition spd="slow" p14:dur="2000" advClick="0" advTm="5000"/>
     </mc:Choice>
     <mc:Fallback>
@@ -10011,7 +10011,7 @@
           <p:cNvPr id="5" name="Slide Number">
             <a:extLst>
               <a:ext uri="{FF2B5EF4-FFF2-40B4-BE49-F238E27FC236}">
-                <a16:creationId xmlns:a16="http://schemas.microsoft.com/office/drawing/2014/main" xmlns="" id="{F0B8C963-1813-4B69-AD27-6D02EBBBB569}"/>
+                <a16:creationId xmlns="" xmlns:a16="http://schemas.microsoft.com/office/drawing/2014/main" id="{F0B8C963-1813-4B69-AD27-6D02EBBBB569}"/>
               </a:ext>
             </a:extLst>
           </p:cNvPr>
@@ -10053,7 +10053,7 @@
           <p:cNvPr id="3" name="Rectangle Left">
             <a:extLst>
               <a:ext uri="{FF2B5EF4-FFF2-40B4-BE49-F238E27FC236}">
-                <a16:creationId xmlns:a16="http://schemas.microsoft.com/office/drawing/2014/main" xmlns="" id="{345FB1C8-7F66-4D5C-ACCE-AE919936BCFD}"/>
+                <a16:creationId xmlns="" xmlns:a16="http://schemas.microsoft.com/office/drawing/2014/main" id="{345FB1C8-7F66-4D5C-ACCE-AE919936BCFD}"/>
               </a:ext>
             </a:extLst>
           </p:cNvPr>
@@ -10134,7 +10134,7 @@
           <p:cNvPr id="7" name="Slide Body Text">
             <a:extLst>
               <a:ext uri="{FF2B5EF4-FFF2-40B4-BE49-F238E27FC236}">
-                <a16:creationId xmlns:a16="http://schemas.microsoft.com/office/drawing/2014/main" xmlns="" id="{7296EDA7-D37D-4B31-A888-371F0804124F}"/>
+                <a16:creationId xmlns="" xmlns:a16="http://schemas.microsoft.com/office/drawing/2014/main" id="{7296EDA7-D37D-4B31-A888-371F0804124F}"/>
               </a:ext>
             </a:extLst>
           </p:cNvPr>
@@ -10232,7 +10232,7 @@
           <p:cNvPr id="6" name="Slide Title">
             <a:extLst>
               <a:ext uri="{FF2B5EF4-FFF2-40B4-BE49-F238E27FC236}">
-                <a16:creationId xmlns:a16="http://schemas.microsoft.com/office/drawing/2014/main" xmlns="" id="{55A88B09-3557-48A3-BF27-42699C269215}"/>
+                <a16:creationId xmlns="" xmlns:a16="http://schemas.microsoft.com/office/drawing/2014/main" id="{55A88B09-3557-48A3-BF27-42699C269215}"/>
               </a:ext>
             </a:extLst>
           </p:cNvPr>
@@ -10269,7 +10269,7 @@
           <p:cNvPr id="28" name="Group 27">
             <a:extLst>
               <a:ext uri="{FF2B5EF4-FFF2-40B4-BE49-F238E27FC236}">
-                <a16:creationId xmlns:a16="http://schemas.microsoft.com/office/drawing/2014/main" xmlns="" id="{C4248838-4E67-439E-AE0A-0043D2CB04D6}"/>
+                <a16:creationId xmlns="" xmlns:a16="http://schemas.microsoft.com/office/drawing/2014/main" id="{C4248838-4E67-439E-AE0A-0043D2CB04D6}"/>
               </a:ext>
             </a:extLst>
           </p:cNvPr>
@@ -10289,7 +10289,7 @@
             <p:cNvPr id="29" name="Group 28">
               <a:extLst>
                 <a:ext uri="{FF2B5EF4-FFF2-40B4-BE49-F238E27FC236}">
-                  <a16:creationId xmlns:a16="http://schemas.microsoft.com/office/drawing/2014/main" xmlns="" id="{810CFD6A-2427-49D5-846A-5F93601D4184}"/>
+                  <a16:creationId xmlns="" xmlns:a16="http://schemas.microsoft.com/office/drawing/2014/main" id="{810CFD6A-2427-49D5-846A-5F93601D4184}"/>
                 </a:ext>
               </a:extLst>
             </p:cNvPr>
@@ -10309,7 +10309,7 @@
               <p:cNvPr id="42" name="Oval 41">
                 <a:extLst>
                   <a:ext uri="{FF2B5EF4-FFF2-40B4-BE49-F238E27FC236}">
-                    <a16:creationId xmlns:a16="http://schemas.microsoft.com/office/drawing/2014/main" xmlns="" id="{017B1AE5-5C36-4839-BA1F-B404EA44E701}"/>
+                    <a16:creationId xmlns="" xmlns:a16="http://schemas.microsoft.com/office/drawing/2014/main" id="{017B1AE5-5C36-4839-BA1F-B404EA44E701}"/>
                   </a:ext>
                 </a:extLst>
               </p:cNvPr>
@@ -10361,7 +10361,7 @@
               <p:cNvPr id="43" name="Rectangle 5">
                 <a:extLst>
                   <a:ext uri="{FF2B5EF4-FFF2-40B4-BE49-F238E27FC236}">
-                    <a16:creationId xmlns:a16="http://schemas.microsoft.com/office/drawing/2014/main" xmlns="" id="{FB963D79-BB49-4A1D-BA66-EA0670C79BAE}"/>
+                    <a16:creationId xmlns="" xmlns:a16="http://schemas.microsoft.com/office/drawing/2014/main" id="{FB963D79-BB49-4A1D-BA66-EA0670C79BAE}"/>
                   </a:ext>
                 </a:extLst>
               </p:cNvPr>
@@ -10506,7 +10506,7 @@
               <p:cNvPr id="44" name="Rectangle 5">
                 <a:extLst>
                   <a:ext uri="{FF2B5EF4-FFF2-40B4-BE49-F238E27FC236}">
-                    <a16:creationId xmlns:a16="http://schemas.microsoft.com/office/drawing/2014/main" xmlns="" id="{6D7746D8-B913-493B-AAE9-25BC6893D40E}"/>
+                    <a16:creationId xmlns="" xmlns:a16="http://schemas.microsoft.com/office/drawing/2014/main" id="{6D7746D8-B913-493B-AAE9-25BC6893D40E}"/>
                   </a:ext>
                 </a:extLst>
               </p:cNvPr>
@@ -10651,7 +10651,7 @@
               <p:cNvPr id="45" name="Arc 44">
                 <a:extLst>
                   <a:ext uri="{FF2B5EF4-FFF2-40B4-BE49-F238E27FC236}">
-                    <a16:creationId xmlns:a16="http://schemas.microsoft.com/office/drawing/2014/main" xmlns="" id="{29031C02-E965-417B-8799-96061B14F30D}"/>
+                    <a16:creationId xmlns="" xmlns:a16="http://schemas.microsoft.com/office/drawing/2014/main" id="{29031C02-E965-417B-8799-96061B14F30D}"/>
                   </a:ext>
                 </a:extLst>
               </p:cNvPr>
@@ -10710,7 +10710,7 @@
               <p:cNvPr id="46" name="Arc 45">
                 <a:extLst>
                   <a:ext uri="{FF2B5EF4-FFF2-40B4-BE49-F238E27FC236}">
-                    <a16:creationId xmlns:a16="http://schemas.microsoft.com/office/drawing/2014/main" xmlns="" id="{26BFD8A6-BC99-4B16-BA10-08A9E5C681C0}"/>
+                    <a16:creationId xmlns="" xmlns:a16="http://schemas.microsoft.com/office/drawing/2014/main" id="{26BFD8A6-BC99-4B16-BA10-08A9E5C681C0}"/>
                   </a:ext>
                 </a:extLst>
               </p:cNvPr>
@@ -10770,7 +10770,7 @@
             <p:cNvPr id="30" name="Rectangle: Rounded Corners 29">
               <a:extLst>
                 <a:ext uri="{FF2B5EF4-FFF2-40B4-BE49-F238E27FC236}">
-                  <a16:creationId xmlns:a16="http://schemas.microsoft.com/office/drawing/2014/main" xmlns="" id="{B310277F-A78E-4FB9-9EA9-88BE4F1D585B}"/>
+                  <a16:creationId xmlns="" xmlns:a16="http://schemas.microsoft.com/office/drawing/2014/main" id="{B310277F-A78E-4FB9-9EA9-88BE4F1D585B}"/>
                 </a:ext>
               </a:extLst>
             </p:cNvPr>
@@ -10824,7 +10824,7 @@
             <p:cNvPr id="31" name="Rectangle: Rounded Corners 30">
               <a:extLst>
                 <a:ext uri="{FF2B5EF4-FFF2-40B4-BE49-F238E27FC236}">
-                  <a16:creationId xmlns:a16="http://schemas.microsoft.com/office/drawing/2014/main" xmlns="" id="{A92CF92B-C212-4542-83AE-A0058B5BB5EA}"/>
+                  <a16:creationId xmlns="" xmlns:a16="http://schemas.microsoft.com/office/drawing/2014/main" id="{A92CF92B-C212-4542-83AE-A0058B5BB5EA}"/>
                 </a:ext>
               </a:extLst>
             </p:cNvPr>
@@ -10885,7 +10885,7 @@
             <p:cNvPr id="32" name="Straight Connector 31">
               <a:extLst>
                 <a:ext uri="{FF2B5EF4-FFF2-40B4-BE49-F238E27FC236}">
-                  <a16:creationId xmlns:a16="http://schemas.microsoft.com/office/drawing/2014/main" xmlns="" id="{563B4374-5C0D-461F-B3BD-78D99614D365}"/>
+                  <a16:creationId xmlns="" xmlns:a16="http://schemas.microsoft.com/office/drawing/2014/main" id="{563B4374-5C0D-461F-B3BD-78D99614D365}"/>
                 </a:ext>
               </a:extLst>
             </p:cNvPr>
@@ -10931,7 +10931,7 @@
             <p:cNvPr id="33" name="Straight Connector 32">
               <a:extLst>
                 <a:ext uri="{FF2B5EF4-FFF2-40B4-BE49-F238E27FC236}">
-                  <a16:creationId xmlns:a16="http://schemas.microsoft.com/office/drawing/2014/main" xmlns="" id="{FBC6FDE7-AEA1-4230-8433-4C088A0FF5F9}"/>
+                  <a16:creationId xmlns="" xmlns:a16="http://schemas.microsoft.com/office/drawing/2014/main" id="{FBC6FDE7-AEA1-4230-8433-4C088A0FF5F9}"/>
                 </a:ext>
               </a:extLst>
             </p:cNvPr>
@@ -10977,7 +10977,7 @@
             <p:cNvPr id="34" name="Group 33">
               <a:extLst>
                 <a:ext uri="{FF2B5EF4-FFF2-40B4-BE49-F238E27FC236}">
-                  <a16:creationId xmlns:a16="http://schemas.microsoft.com/office/drawing/2014/main" xmlns="" id="{C4D1021D-07C7-4331-8FF6-36980A30978B}"/>
+                  <a16:creationId xmlns="" xmlns:a16="http://schemas.microsoft.com/office/drawing/2014/main" id="{C4D1021D-07C7-4331-8FF6-36980A30978B}"/>
                 </a:ext>
               </a:extLst>
             </p:cNvPr>
@@ -11000,7 +11000,7 @@
               <p:cNvPr id="40" name="Straight Connector 39">
                 <a:extLst>
                   <a:ext uri="{FF2B5EF4-FFF2-40B4-BE49-F238E27FC236}">
-                    <a16:creationId xmlns:a16="http://schemas.microsoft.com/office/drawing/2014/main" xmlns="" id="{13B7FE99-95CF-45D5-966B-87A979B93431}"/>
+                    <a16:creationId xmlns="" xmlns:a16="http://schemas.microsoft.com/office/drawing/2014/main" id="{13B7FE99-95CF-45D5-966B-87A979B93431}"/>
                   </a:ext>
                 </a:extLst>
               </p:cNvPr>
@@ -11044,7 +11044,7 @@
               <p:cNvPr id="41" name="Straight Connector 40">
                 <a:extLst>
                   <a:ext uri="{FF2B5EF4-FFF2-40B4-BE49-F238E27FC236}">
-                    <a16:creationId xmlns:a16="http://schemas.microsoft.com/office/drawing/2014/main" xmlns="" id="{71BBA69B-19FF-4ADB-A739-AD8136A5F0A6}"/>
+                    <a16:creationId xmlns="" xmlns:a16="http://schemas.microsoft.com/office/drawing/2014/main" id="{71BBA69B-19FF-4ADB-A739-AD8136A5F0A6}"/>
                   </a:ext>
                 </a:extLst>
               </p:cNvPr>
@@ -11089,7 +11089,7 @@
             <p:cNvPr id="35" name="Straight Connector 34">
               <a:extLst>
                 <a:ext uri="{FF2B5EF4-FFF2-40B4-BE49-F238E27FC236}">
-                  <a16:creationId xmlns:a16="http://schemas.microsoft.com/office/drawing/2014/main" xmlns="" id="{BFD1D86B-562B-40B2-8E46-34233EFEE7FC}"/>
+                  <a16:creationId xmlns="" xmlns:a16="http://schemas.microsoft.com/office/drawing/2014/main" id="{BFD1D86B-562B-40B2-8E46-34233EFEE7FC}"/>
                 </a:ext>
               </a:extLst>
             </p:cNvPr>
@@ -11135,7 +11135,7 @@
             <p:cNvPr id="36" name="Rectangle: Rounded Corners 35">
               <a:extLst>
                 <a:ext uri="{FF2B5EF4-FFF2-40B4-BE49-F238E27FC236}">
-                  <a16:creationId xmlns:a16="http://schemas.microsoft.com/office/drawing/2014/main" xmlns="" id="{388C17BD-16A1-43C5-BFFA-2FF9174719E1}"/>
+                  <a16:creationId xmlns="" xmlns:a16="http://schemas.microsoft.com/office/drawing/2014/main" id="{388C17BD-16A1-43C5-BFFA-2FF9174719E1}"/>
                 </a:ext>
               </a:extLst>
             </p:cNvPr>
@@ -11189,7 +11189,7 @@
             <p:cNvPr id="37" name="Group 36">
               <a:extLst>
                 <a:ext uri="{FF2B5EF4-FFF2-40B4-BE49-F238E27FC236}">
-                  <a16:creationId xmlns:a16="http://schemas.microsoft.com/office/drawing/2014/main" xmlns="" id="{1B3B910E-ACFC-4F28-8E28-F02E1588B87E}"/>
+                  <a16:creationId xmlns="" xmlns:a16="http://schemas.microsoft.com/office/drawing/2014/main" id="{1B3B910E-ACFC-4F28-8E28-F02E1588B87E}"/>
                 </a:ext>
               </a:extLst>
             </p:cNvPr>
@@ -11212,7 +11212,7 @@
               <p:cNvPr id="38" name="Straight Connector 37">
                 <a:extLst>
                   <a:ext uri="{FF2B5EF4-FFF2-40B4-BE49-F238E27FC236}">
-                    <a16:creationId xmlns:a16="http://schemas.microsoft.com/office/drawing/2014/main" xmlns="" id="{F57772B6-06C0-4F54-AA94-D3F92DA4716A}"/>
+                    <a16:creationId xmlns="" xmlns:a16="http://schemas.microsoft.com/office/drawing/2014/main" id="{F57772B6-06C0-4F54-AA94-D3F92DA4716A}"/>
                   </a:ext>
                 </a:extLst>
               </p:cNvPr>
@@ -11256,7 +11256,7 @@
               <p:cNvPr id="39" name="Straight Connector 38">
                 <a:extLst>
                   <a:ext uri="{FF2B5EF4-FFF2-40B4-BE49-F238E27FC236}">
-                    <a16:creationId xmlns:a16="http://schemas.microsoft.com/office/drawing/2014/main" xmlns="" id="{23370C1F-7876-4278-AB20-78F6CAA385E2}"/>
+                    <a16:creationId xmlns="" xmlns:a16="http://schemas.microsoft.com/office/drawing/2014/main" id="{23370C1F-7876-4278-AB20-78F6CAA385E2}"/>
                   </a:ext>
                 </a:extLst>
               </p:cNvPr>
@@ -11300,7 +11300,7 @@
     </p:spTree>
     <p:extLst>
       <p:ext uri="{BB962C8B-B14F-4D97-AF65-F5344CB8AC3E}">
-        <p14:creationId xmlns:p14="http://schemas.microsoft.com/office/powerpoint/2010/main" xmlns="" val="3284562556"/>
+        <p14:creationId xmlns="" xmlns:p14="http://schemas.microsoft.com/office/powerpoint/2010/main" val="3284562556"/>
       </p:ext>
     </p:extLst>
   </p:cSld>
@@ -11308,7 +11308,7 @@
     <a:masterClrMapping/>
   </p:clrMapOvr>
   <mc:AlternateContent xmlns:mc="http://schemas.openxmlformats.org/markup-compatibility/2006">
-    <mc:Choice xmlns:p14="http://schemas.microsoft.com/office/powerpoint/2010/main" xmlns="" Requires="p14">
+    <mc:Choice xmlns="" xmlns:p14="http://schemas.microsoft.com/office/powerpoint/2010/main" Requires="p14">
       <p:transition spd="slow" p14:dur="2000" advClick="0" advTm="5000"/>
     </mc:Choice>
     <mc:Fallback>
@@ -11340,7 +11340,7 @@
           <p:cNvPr id="8" name="Slide Number">
             <a:extLst>
               <a:ext uri="{FF2B5EF4-FFF2-40B4-BE49-F238E27FC236}">
-                <a16:creationId xmlns:a16="http://schemas.microsoft.com/office/drawing/2014/main" xmlns="" id="{509D954E-A844-4072-A556-DE584BEB9321}"/>
+                <a16:creationId xmlns="" xmlns:a16="http://schemas.microsoft.com/office/drawing/2014/main" id="{509D954E-A844-4072-A556-DE584BEB9321}"/>
               </a:ext>
             </a:extLst>
           </p:cNvPr>
@@ -11382,7 +11382,7 @@
           <p:cNvPr id="6" name="Code Box">
             <a:extLst>
               <a:ext uri="{FF2B5EF4-FFF2-40B4-BE49-F238E27FC236}">
-                <a16:creationId xmlns:a16="http://schemas.microsoft.com/office/drawing/2014/main" xmlns="" id="{3278A82F-5546-4977-9F75-2A933B415945}"/>
+                <a16:creationId xmlns="" xmlns:a16="http://schemas.microsoft.com/office/drawing/2014/main" id="{3278A82F-5546-4977-9F75-2A933B415945}"/>
               </a:ext>
             </a:extLst>
           </p:cNvPr>
@@ -11469,7 +11469,7 @@
           <p:cNvPr id="21" name="Slide Body Text">
             <a:extLst>
               <a:ext uri="{FF2B5EF4-FFF2-40B4-BE49-F238E27FC236}">
-                <a16:creationId xmlns:a16="http://schemas.microsoft.com/office/drawing/2014/main" xmlns="" id="{04F318BE-2BAD-4677-871C-D78A4BF0CBA6}"/>
+                <a16:creationId xmlns="" xmlns:a16="http://schemas.microsoft.com/office/drawing/2014/main" id="{04F318BE-2BAD-4677-871C-D78A4BF0CBA6}"/>
               </a:ext>
             </a:extLst>
           </p:cNvPr>
@@ -11516,7 +11516,7 @@
           <p:cNvPr id="9" name="Rectangle Top">
             <a:extLst>
               <a:ext uri="{FF2B5EF4-FFF2-40B4-BE49-F238E27FC236}">
-                <a16:creationId xmlns:a16="http://schemas.microsoft.com/office/drawing/2014/main" xmlns="" id="{A15CE03A-0933-4E5D-9EA1-718D4F802FFC}"/>
+                <a16:creationId xmlns="" xmlns:a16="http://schemas.microsoft.com/office/drawing/2014/main" id="{A15CE03A-0933-4E5D-9EA1-718D4F802FFC}"/>
               </a:ext>
             </a:extLst>
           </p:cNvPr>
@@ -11597,7 +11597,7 @@
           <p:cNvPr id="10" name="Logo Software University" descr="Software University logo">
             <a:extLst>
               <a:ext uri="{FF2B5EF4-FFF2-40B4-BE49-F238E27FC236}">
-                <a16:creationId xmlns:a16="http://schemas.microsoft.com/office/drawing/2014/main" xmlns="" id="{8C01D7AF-7CBD-46E1-99F3-8EB60E838D91}"/>
+                <a16:creationId xmlns="" xmlns:a16="http://schemas.microsoft.com/office/drawing/2014/main" id="{8C01D7AF-7CBD-46E1-99F3-8EB60E838D91}"/>
               </a:ext>
             </a:extLst>
           </p:cNvPr>
@@ -11610,7 +11610,7 @@
           <a:blip r:embed="rId2" cstate="print">
             <a:extLst>
               <a:ext uri="{28A0092B-C50C-407E-A947-70E740481C1C}">
-                <a14:useLocalDpi xmlns:a14="http://schemas.microsoft.com/office/drawing/2010/main" xmlns="" val="0"/>
+                <a14:useLocalDpi xmlns="" xmlns:a14="http://schemas.microsoft.com/office/drawing/2010/main" val="0"/>
               </a:ext>
             </a:extLst>
           </a:blip>
@@ -11633,7 +11633,7 @@
           <p:cNvPr id="11" name="Slide Title">
             <a:extLst>
               <a:ext uri="{FF2B5EF4-FFF2-40B4-BE49-F238E27FC236}">
-                <a16:creationId xmlns:a16="http://schemas.microsoft.com/office/drawing/2014/main" xmlns="" id="{47D60833-F0A9-4F29-8C06-A963A7C8BE93}"/>
+                <a16:creationId xmlns="" xmlns:a16="http://schemas.microsoft.com/office/drawing/2014/main" id="{47D60833-F0A9-4F29-8C06-A963A7C8BE93}"/>
               </a:ext>
             </a:extLst>
           </p:cNvPr>
@@ -11672,7 +11672,7 @@
     </p:spTree>
     <p:extLst>
       <p:ext uri="{BB962C8B-B14F-4D97-AF65-F5344CB8AC3E}">
-        <p14:creationId xmlns:p14="http://schemas.microsoft.com/office/powerpoint/2010/main" xmlns="" val="1000829826"/>
+        <p14:creationId xmlns="" xmlns:p14="http://schemas.microsoft.com/office/powerpoint/2010/main" val="1000829826"/>
       </p:ext>
     </p:extLst>
   </p:cSld>
@@ -11680,7 +11680,7 @@
     <a:masterClrMapping/>
   </p:clrMapOvr>
   <mc:AlternateContent xmlns:mc="http://schemas.openxmlformats.org/markup-compatibility/2006">
-    <mc:Choice xmlns:p14="http://schemas.microsoft.com/office/powerpoint/2010/main" xmlns="" Requires="p14">
+    <mc:Choice xmlns="" xmlns:p14="http://schemas.microsoft.com/office/powerpoint/2010/main" Requires="p14">
       <p:transition spd="slow" p14:dur="2000" advClick="0" advTm="5000"/>
     </mc:Choice>
     <mc:Fallback>
@@ -11712,7 +11712,7 @@
           <p:cNvPr id="10" name="Slide Number">
             <a:extLst>
               <a:ext uri="{FF2B5EF4-FFF2-40B4-BE49-F238E27FC236}">
-                <a16:creationId xmlns:a16="http://schemas.microsoft.com/office/drawing/2014/main" xmlns="" id="{39DDE17E-5472-41F3-AF5F-54DFF10DC63C}"/>
+                <a16:creationId xmlns="" xmlns:a16="http://schemas.microsoft.com/office/drawing/2014/main" id="{39DDE17E-5472-41F3-AF5F-54DFF10DC63C}"/>
               </a:ext>
             </a:extLst>
           </p:cNvPr>
@@ -11754,7 +11754,7 @@
           <p:cNvPr id="9" name="Picture SoftUni Mascot" descr="SoftUni mascot with laptop">
             <a:extLst>
               <a:ext uri="{FF2B5EF4-FFF2-40B4-BE49-F238E27FC236}">
-                <a16:creationId xmlns:a16="http://schemas.microsoft.com/office/drawing/2014/main" xmlns="" id="{DC4365F6-D2C1-47B4-8477-38FD2C7711AA}"/>
+                <a16:creationId xmlns="" xmlns:a16="http://schemas.microsoft.com/office/drawing/2014/main" id="{DC4365F6-D2C1-47B4-8477-38FD2C7711AA}"/>
               </a:ext>
             </a:extLst>
           </p:cNvPr>
@@ -11767,7 +11767,7 @@
           <a:blip r:embed="rId2" cstate="print">
             <a:extLst>
               <a:ext uri="{28A0092B-C50C-407E-A947-70E740481C1C}">
-                <a14:useLocalDpi xmlns:a14="http://schemas.microsoft.com/office/drawing/2010/main" xmlns="" val="0"/>
+                <a14:useLocalDpi xmlns="" xmlns:a14="http://schemas.microsoft.com/office/drawing/2010/main" val="0"/>
               </a:ext>
             </a:extLst>
           </a:blip>
@@ -11790,7 +11790,7 @@
           <p:cNvPr id="23" name="Slide Body Text">
             <a:extLst>
               <a:ext uri="{FF2B5EF4-FFF2-40B4-BE49-F238E27FC236}">
-                <a16:creationId xmlns:a16="http://schemas.microsoft.com/office/drawing/2014/main" xmlns="" id="{889D93F4-ABFA-46BF-8E5D-FE6562ACB20F}"/>
+                <a16:creationId xmlns="" xmlns:a16="http://schemas.microsoft.com/office/drawing/2014/main" id="{889D93F4-ABFA-46BF-8E5D-FE6562ACB20F}"/>
               </a:ext>
             </a:extLst>
           </p:cNvPr>
@@ -11881,7 +11881,7 @@
           <p:cNvPr id="8" name="Rectangle Top">
             <a:extLst>
               <a:ext uri="{FF2B5EF4-FFF2-40B4-BE49-F238E27FC236}">
-                <a16:creationId xmlns:a16="http://schemas.microsoft.com/office/drawing/2014/main" xmlns="" id="{930E0800-9260-4369-8330-8264DD33C5CE}"/>
+                <a16:creationId xmlns="" xmlns:a16="http://schemas.microsoft.com/office/drawing/2014/main" id="{930E0800-9260-4369-8330-8264DD33C5CE}"/>
               </a:ext>
             </a:extLst>
           </p:cNvPr>
@@ -11962,7 +11962,7 @@
           <p:cNvPr id="11" name="Logo Software University" descr="Software University logo">
             <a:extLst>
               <a:ext uri="{FF2B5EF4-FFF2-40B4-BE49-F238E27FC236}">
-                <a16:creationId xmlns:a16="http://schemas.microsoft.com/office/drawing/2014/main" xmlns="" id="{14F779A7-4A91-448B-BEFA-956C70A1C22F}"/>
+                <a16:creationId xmlns="" xmlns:a16="http://schemas.microsoft.com/office/drawing/2014/main" id="{14F779A7-4A91-448B-BEFA-956C70A1C22F}"/>
               </a:ext>
             </a:extLst>
           </p:cNvPr>
@@ -11975,7 +11975,7 @@
           <a:blip r:embed="rId3" cstate="print">
             <a:extLst>
               <a:ext uri="{28A0092B-C50C-407E-A947-70E740481C1C}">
-                <a14:useLocalDpi xmlns:a14="http://schemas.microsoft.com/office/drawing/2010/main" xmlns="" val="0"/>
+                <a14:useLocalDpi xmlns="" xmlns:a14="http://schemas.microsoft.com/office/drawing/2010/main" val="0"/>
               </a:ext>
             </a:extLst>
           </a:blip>
@@ -11998,7 +11998,7 @@
           <p:cNvPr id="13" name="Slide Title">
             <a:extLst>
               <a:ext uri="{FF2B5EF4-FFF2-40B4-BE49-F238E27FC236}">
-                <a16:creationId xmlns:a16="http://schemas.microsoft.com/office/drawing/2014/main" xmlns="" id="{357D7BE1-6358-42CC-94F3-7BCDD91DCB6D}"/>
+                <a16:creationId xmlns="" xmlns:a16="http://schemas.microsoft.com/office/drawing/2014/main" id="{357D7BE1-6358-42CC-94F3-7BCDD91DCB6D}"/>
               </a:ext>
             </a:extLst>
           </p:cNvPr>
@@ -12037,7 +12037,7 @@
     </p:spTree>
     <p:extLst>
       <p:ext uri="{BB962C8B-B14F-4D97-AF65-F5344CB8AC3E}">
-        <p14:creationId xmlns:p14="http://schemas.microsoft.com/office/powerpoint/2010/main" xmlns="" val="1028724482"/>
+        <p14:creationId xmlns="" xmlns:p14="http://schemas.microsoft.com/office/powerpoint/2010/main" val="1028724482"/>
       </p:ext>
     </p:extLst>
   </p:cSld>
@@ -12045,7 +12045,7 @@
     <a:masterClrMapping/>
   </p:clrMapOvr>
   <mc:AlternateContent xmlns:mc="http://schemas.openxmlformats.org/markup-compatibility/2006">
-    <mc:Choice xmlns:p14="http://schemas.microsoft.com/office/powerpoint/2010/main" xmlns="" Requires="p14">
+    <mc:Choice xmlns="" xmlns:p14="http://schemas.microsoft.com/office/powerpoint/2010/main" Requires="p14">
       <p:transition spd="slow" p14:dur="2000" advClick="0" advTm="5000"/>
     </mc:Choice>
     <mc:Fallback>
@@ -12157,7 +12157,7 @@
           <p:cNvPr id="11" name="Slide Number">
             <a:extLst>
               <a:ext uri="{FF2B5EF4-FFF2-40B4-BE49-F238E27FC236}">
-                <a16:creationId xmlns:a16="http://schemas.microsoft.com/office/drawing/2014/main" xmlns="" id="{6750ECE4-94E0-469B-B8E4-562792823B0F}"/>
+                <a16:creationId xmlns="" xmlns:a16="http://schemas.microsoft.com/office/drawing/2014/main" id="{6750ECE4-94E0-469B-B8E4-562792823B0F}"/>
               </a:ext>
             </a:extLst>
           </p:cNvPr>
@@ -12280,7 +12280,7 @@
           <p:cNvPr id="12" name="Logo Software University Down" descr="Software University logo">
             <a:extLst>
               <a:ext uri="{FF2B5EF4-FFF2-40B4-BE49-F238E27FC236}">
-                <a16:creationId xmlns:a16="http://schemas.microsoft.com/office/drawing/2014/main" xmlns="" id="{7028D2F0-1E67-414B-A93D-D3F8F131A132}"/>
+                <a16:creationId xmlns="" xmlns:a16="http://schemas.microsoft.com/office/drawing/2014/main" id="{7028D2F0-1E67-414B-A93D-D3F8F131A132}"/>
               </a:ext>
             </a:extLst>
           </p:cNvPr>
@@ -12293,7 +12293,7 @@
           <a:blip r:embed="rId2" cstate="print">
             <a:extLst>
               <a:ext uri="{28A0092B-C50C-407E-A947-70E740481C1C}">
-                <a14:useLocalDpi xmlns:a14="http://schemas.microsoft.com/office/drawing/2010/main" xmlns="" val="0"/>
+                <a14:useLocalDpi xmlns="" xmlns:a14="http://schemas.microsoft.com/office/drawing/2010/main" val="0"/>
               </a:ext>
             </a:extLst>
           </a:blip>
@@ -12316,7 +12316,7 @@
           <p:cNvPr id="10" name="Text Placeholder Right">
             <a:extLst>
               <a:ext uri="{FF2B5EF4-FFF2-40B4-BE49-F238E27FC236}">
-                <a16:creationId xmlns:a16="http://schemas.microsoft.com/office/drawing/2014/main" xmlns="" id="{AF69A59F-C564-4A04-B1CC-31C261499991}"/>
+                <a16:creationId xmlns="" xmlns:a16="http://schemas.microsoft.com/office/drawing/2014/main" id="{AF69A59F-C564-4A04-B1CC-31C261499991}"/>
               </a:ext>
             </a:extLst>
           </p:cNvPr>
@@ -12394,7 +12394,7 @@
           <p:cNvPr id="9" name="Text Placeholder Left">
             <a:extLst>
               <a:ext uri="{FF2B5EF4-FFF2-40B4-BE49-F238E27FC236}">
-                <a16:creationId xmlns:a16="http://schemas.microsoft.com/office/drawing/2014/main" xmlns="" id="{C8A626D2-456B-41EF-9818-EA8DD7E314DA}"/>
+                <a16:creationId xmlns="" xmlns:a16="http://schemas.microsoft.com/office/drawing/2014/main" id="{C8A626D2-456B-41EF-9818-EA8DD7E314DA}"/>
               </a:ext>
             </a:extLst>
           </p:cNvPr>
@@ -12472,7 +12472,7 @@
           <p:cNvPr id="13" name="Rectangle Top">
             <a:extLst>
               <a:ext uri="{FF2B5EF4-FFF2-40B4-BE49-F238E27FC236}">
-                <a16:creationId xmlns:a16="http://schemas.microsoft.com/office/drawing/2014/main" xmlns="" id="{E03301DA-D0AF-46FD-8740-2F761250203A}"/>
+                <a16:creationId xmlns="" xmlns:a16="http://schemas.microsoft.com/office/drawing/2014/main" id="{E03301DA-D0AF-46FD-8740-2F761250203A}"/>
               </a:ext>
             </a:extLst>
           </p:cNvPr>
@@ -12553,7 +12553,7 @@
           <p:cNvPr id="14" name="Logo Software University" descr="Software University logo">
             <a:extLst>
               <a:ext uri="{FF2B5EF4-FFF2-40B4-BE49-F238E27FC236}">
-                <a16:creationId xmlns:a16="http://schemas.microsoft.com/office/drawing/2014/main" xmlns="" id="{19A67BB9-D880-4EAD-B90E-89C4219BFC0B}"/>
+                <a16:creationId xmlns="" xmlns:a16="http://schemas.microsoft.com/office/drawing/2014/main" id="{19A67BB9-D880-4EAD-B90E-89C4219BFC0B}"/>
               </a:ext>
             </a:extLst>
           </p:cNvPr>
@@ -12566,7 +12566,7 @@
           <a:blip r:embed="rId3" cstate="print">
             <a:extLst>
               <a:ext uri="{28A0092B-C50C-407E-A947-70E740481C1C}">
-                <a14:useLocalDpi xmlns:a14="http://schemas.microsoft.com/office/drawing/2010/main" xmlns="" val="0"/>
+                <a14:useLocalDpi xmlns="" xmlns:a14="http://schemas.microsoft.com/office/drawing/2010/main" val="0"/>
               </a:ext>
             </a:extLst>
           </a:blip>
@@ -12589,7 +12589,7 @@
           <p:cNvPr id="15" name="Slide Title">
             <a:extLst>
               <a:ext uri="{FF2B5EF4-FFF2-40B4-BE49-F238E27FC236}">
-                <a16:creationId xmlns:a16="http://schemas.microsoft.com/office/drawing/2014/main" xmlns="" id="{EA9A94D1-F9F6-4D7B-85E3-896A987B6A4D}"/>
+                <a16:creationId xmlns="" xmlns:a16="http://schemas.microsoft.com/office/drawing/2014/main" id="{EA9A94D1-F9F6-4D7B-85E3-896A987B6A4D}"/>
               </a:ext>
             </a:extLst>
           </p:cNvPr>
@@ -12628,7 +12628,7 @@
     </p:spTree>
     <p:extLst>
       <p:ext uri="{BB962C8B-B14F-4D97-AF65-F5344CB8AC3E}">
-        <p14:creationId xmlns:p14="http://schemas.microsoft.com/office/powerpoint/2010/main" xmlns="" val="3044033461"/>
+        <p14:creationId xmlns="" xmlns:p14="http://schemas.microsoft.com/office/powerpoint/2010/main" val="3044033461"/>
       </p:ext>
     </p:extLst>
   </p:cSld>
@@ -12636,7 +12636,7 @@
     <a:masterClrMapping/>
   </p:clrMapOvr>
   <mc:AlternateContent xmlns:mc="http://schemas.openxmlformats.org/markup-compatibility/2006">
-    <mc:Choice xmlns:p14="http://schemas.microsoft.com/office/powerpoint/2010/main" xmlns="" Requires="p14">
+    <mc:Choice xmlns="" xmlns:p14="http://schemas.microsoft.com/office/powerpoint/2010/main" Requires="p14">
       <p:transition spd="slow" p14:dur="2000" advClick="0" advTm="5000"/>
     </mc:Choice>
     <mc:Fallback>
@@ -12645,7 +12645,7 @@
   </mc:AlternateContent>
   <p:extLst>
     <p:ext uri="{DCECCB84-F9BA-43D5-87BE-67443E8EF086}">
-      <p15:sldGuideLst xmlns:p15="http://schemas.microsoft.com/office/powerpoint/2012/main" xmlns="">
+      <p15:sldGuideLst xmlns="" xmlns:p15="http://schemas.microsoft.com/office/powerpoint/2012/main">
         <p15:guide id="1" orient="horz" pos="2160">
           <p15:clr>
             <a:srgbClr val="FBAE40"/>
@@ -12692,7 +12692,7 @@
           <p:cNvPr id="4" name="Picture Background" descr="SoftUni Background">
             <a:extLst>
               <a:ext uri="{FF2B5EF4-FFF2-40B4-BE49-F238E27FC236}">
-                <a16:creationId xmlns:a16="http://schemas.microsoft.com/office/drawing/2014/main" xmlns="" id="{5BE90A63-DDD9-4B3B-A234-DF69B9BC812F}"/>
+                <a16:creationId xmlns="" xmlns:a16="http://schemas.microsoft.com/office/drawing/2014/main" id="{5BE90A63-DDD9-4B3B-A234-DF69B9BC812F}"/>
               </a:ext>
             </a:extLst>
           </p:cNvPr>
@@ -12721,7 +12721,7 @@
           <p:cNvPr id="11" name="Slide Body Text">
             <a:extLst>
               <a:ext uri="{FF2B5EF4-FFF2-40B4-BE49-F238E27FC236}">
-                <a16:creationId xmlns:a16="http://schemas.microsoft.com/office/drawing/2014/main" xmlns="" id="{90CBFB32-9F46-4F2F-8A54-9EE8BED27855}"/>
+                <a16:creationId xmlns="" xmlns:a16="http://schemas.microsoft.com/office/drawing/2014/main" id="{90CBFB32-9F46-4F2F-8A54-9EE8BED27855}"/>
               </a:ext>
             </a:extLst>
           </p:cNvPr>
@@ -12789,7 +12789,7 @@
           <p:cNvPr id="10" name="Slide Title">
             <a:extLst>
               <a:ext uri="{FF2B5EF4-FFF2-40B4-BE49-F238E27FC236}">
-                <a16:creationId xmlns:a16="http://schemas.microsoft.com/office/drawing/2014/main" xmlns="" id="{B770C392-3003-4C35-9625-BB041F8257BA}"/>
+                <a16:creationId xmlns="" xmlns:a16="http://schemas.microsoft.com/office/drawing/2014/main" id="{B770C392-3003-4C35-9625-BB041F8257BA}"/>
               </a:ext>
             </a:extLst>
           </p:cNvPr>
@@ -12826,7 +12826,7 @@
     </p:spTree>
     <p:extLst>
       <p:ext uri="{BB962C8B-B14F-4D97-AF65-F5344CB8AC3E}">
-        <p14:creationId xmlns:p14="http://schemas.microsoft.com/office/powerpoint/2010/main" xmlns="" val="156789181"/>
+        <p14:creationId xmlns="" xmlns:p14="http://schemas.microsoft.com/office/powerpoint/2010/main" val="156789181"/>
       </p:ext>
     </p:extLst>
   </p:cSld>
@@ -12850,7 +12850,7 @@
     <p:sldLayoutId id="2147483696" r:id="rId16"/>
   </p:sldLayoutIdLst>
   <mc:AlternateContent xmlns:mc="http://schemas.openxmlformats.org/markup-compatibility/2006">
-    <mc:Choice xmlns:p14="http://schemas.microsoft.com/office/powerpoint/2010/main" xmlns="" Requires="p14">
+    <mc:Choice xmlns="" xmlns:p14="http://schemas.microsoft.com/office/powerpoint/2010/main" Requires="p14">
       <p:transition spd="slow" p14:dur="2000" advClick="0" advTm="5000"/>
     </mc:Choice>
     <mc:Fallback>
@@ -13140,7 +13140,7 @@
   </p:txStyles>
   <p:extLst>
     <p:ext uri="{27BBF7A9-308A-43DC-89C8-2F10F3537804}">
-      <p15:sldGuideLst xmlns:p15="http://schemas.microsoft.com/office/powerpoint/2012/main" xmlns="">
+      <p15:sldGuideLst xmlns="" xmlns:p15="http://schemas.microsoft.com/office/powerpoint/2012/main">
         <p15:guide id="1" orient="horz" pos="2160">
           <p15:clr>
             <a:srgbClr val="F26B43"/>
@@ -13236,7 +13236,7 @@
           <p:cNvPr id="10" name="Author Position">
             <a:extLst>
               <a:ext uri="{FF2B5EF4-FFF2-40B4-BE49-F238E27FC236}">
-                <a16:creationId xmlns:a16="http://schemas.microsoft.com/office/drawing/2014/main" xmlns="" id="{F585BC4C-0F13-4FD4-8F23-99FD46618370}"/>
+                <a16:creationId xmlns="" xmlns:a16="http://schemas.microsoft.com/office/drawing/2014/main" id="{F585BC4C-0F13-4FD4-8F23-99FD46618370}"/>
               </a:ext>
             </a:extLst>
           </p:cNvPr>
@@ -13269,7 +13269,7 @@
           <p:cNvPr id="9" name="Author Name">
             <a:extLst>
               <a:ext uri="{FF2B5EF4-FFF2-40B4-BE49-F238E27FC236}">
-                <a16:creationId xmlns:a16="http://schemas.microsoft.com/office/drawing/2014/main" xmlns="" id="{FA396BB6-2053-4690-9672-BC528007D370}"/>
+                <a16:creationId xmlns="" xmlns:a16="http://schemas.microsoft.com/office/drawing/2014/main" id="{FA396BB6-2053-4690-9672-BC528007D370}"/>
               </a:ext>
             </a:extLst>
           </p:cNvPr>
@@ -13302,7 +13302,7 @@
           <p:cNvPr id="3" name="Presentation Subtitle">
             <a:extLst>
               <a:ext uri="{FF2B5EF4-FFF2-40B4-BE49-F238E27FC236}">
-                <a16:creationId xmlns:a16="http://schemas.microsoft.com/office/drawing/2014/main" xmlns="" id="{A004DC04-DA2A-41C0-8578-4B8D2F08EA7D}"/>
+                <a16:creationId xmlns="" xmlns:a16="http://schemas.microsoft.com/office/drawing/2014/main" id="{A004DC04-DA2A-41C0-8578-4B8D2F08EA7D}"/>
               </a:ext>
             </a:extLst>
           </p:cNvPr>
@@ -13338,7 +13338,7 @@
           <p:cNvPr id="16" name="Title 15">
             <a:extLst>
               <a:ext uri="{FF2B5EF4-FFF2-40B4-BE49-F238E27FC236}">
-                <a16:creationId xmlns:a16="http://schemas.microsoft.com/office/drawing/2014/main" xmlns="" id="{09D526E5-16F9-CDC3-F025-1D308EB5C234}"/>
+                <a16:creationId xmlns="" xmlns:a16="http://schemas.microsoft.com/office/drawing/2014/main" id="{09D526E5-16F9-CDC3-F025-1D308EB5C234}"/>
               </a:ext>
             </a:extLst>
           </p:cNvPr>
@@ -13402,7 +13402,7 @@
     </p:spTree>
     <p:extLst>
       <p:ext uri="{BB962C8B-B14F-4D97-AF65-F5344CB8AC3E}">
-        <p14:creationId xmlns:p14="http://schemas.microsoft.com/office/powerpoint/2010/main" xmlns="" val="3666405375"/>
+        <p14:creationId xmlns="" xmlns:p14="http://schemas.microsoft.com/office/powerpoint/2010/main" val="3666405375"/>
       </p:ext>
     </p:extLst>
   </p:cSld>
@@ -13410,7 +13410,7 @@
     <a:masterClrMapping/>
   </p:clrMapOvr>
   <mc:AlternateContent xmlns:mc="http://schemas.openxmlformats.org/markup-compatibility/2006">
-    <mc:Choice xmlns:p14="http://schemas.microsoft.com/office/powerpoint/2010/main" xmlns="" Requires="p14">
+    <mc:Choice xmlns="" xmlns:p14="http://schemas.microsoft.com/office/powerpoint/2010/main" Requires="p14">
       <p:transition spd="slow" p14:dur="2000" advClick="0" advTm="5000"/>
     </mc:Choice>
     <mc:Fallback>
@@ -13533,7 +13533,6 @@
               <a:rPr lang="bg-BG" sz="2800" dirty="0" smtClean="0"/>
               <a:t>Примери:</a:t>
             </a:r>
-            <a:endParaRPr lang="bg-BG" sz="2800" dirty="0" smtClean="0"/>
           </a:p>
           <a:p>
             <a:pPr lvl="2"/>
@@ -13762,7 +13761,7 @@
     <a:masterClrMapping/>
   </p:clrMapOvr>
   <mc:AlternateContent xmlns:mc="http://schemas.openxmlformats.org/markup-compatibility/2006">
-    <mc:Choice xmlns:p14="http://schemas.microsoft.com/office/powerpoint/2010/main" xmlns="" Requires="p14">
+    <mc:Choice xmlns="" xmlns:p14="http://schemas.microsoft.com/office/powerpoint/2010/main" Requires="p14">
       <p:transition spd="slow" p14:dur="2000" advClick="0" advTm="5000"/>
     </mc:Choice>
     <mc:Fallback>
@@ -14135,7 +14134,7 @@
           <a:blip r:embed="rId2" cstate="print">
             <a:extLst>
               <a:ext uri="{28A0092B-C50C-407E-A947-70E740481C1C}">
-                <a14:useLocalDpi xmlns:a14="http://schemas.microsoft.com/office/drawing/2010/main" xmlns="" val="0"/>
+                <a14:useLocalDpi xmlns="" xmlns:a14="http://schemas.microsoft.com/office/drawing/2010/main" val="0"/>
               </a:ext>
             </a:extLst>
           </a:blip>
@@ -14159,7 +14158,7 @@
     <a:masterClrMapping/>
   </p:clrMapOvr>
   <mc:AlternateContent xmlns:mc="http://schemas.openxmlformats.org/markup-compatibility/2006">
-    <mc:Choice xmlns:p14="http://schemas.microsoft.com/office/powerpoint/2010/main" xmlns="" Requires="p14">
+    <mc:Choice xmlns="" xmlns:p14="http://schemas.microsoft.com/office/powerpoint/2010/main" Requires="p14">
       <p:transition spd="slow" p14:dur="2000" advClick="0" advTm="5000"/>
     </mc:Choice>
     <mc:Fallback>
@@ -14382,14 +14381,7 @@
                 <a:latin typeface="Consolas" pitchFamily="49" charset="0"/>
                 <a:cs typeface="Consolas" pitchFamily="49" charset="0"/>
               </a:rPr>
-              <a:t>	</a:t>
-            </a:r>
-            <a:r>
-              <a:rPr lang="en-US" sz="2800" b="1" noProof="1" smtClean="0">
-                <a:latin typeface="Consolas" pitchFamily="49" charset="0"/>
-                <a:cs typeface="Consolas" pitchFamily="49" charset="0"/>
-              </a:rPr>
-              <a:t>Id INT </a:t>
+              <a:t>	Id INT </a:t>
             </a:r>
             <a:r>
               <a:rPr lang="en-US" sz="2800" b="1" noProof="1" smtClean="0">
@@ -14462,19 +14454,8 @@
                 <a:latin typeface="Consolas" pitchFamily="49" charset="0"/>
                 <a:cs typeface="Consolas" pitchFamily="49" charset="0"/>
               </a:rPr>
-              <a:t>	CountryId </a:t>
-            </a:r>
-            <a:r>
-              <a:rPr lang="en-US" sz="2800" b="1" noProof="1" smtClean="0">
-                <a:latin typeface="Consolas" pitchFamily="49" charset="0"/>
-                <a:cs typeface="Consolas" pitchFamily="49" charset="0"/>
-              </a:rPr>
-              <a:t>INT</a:t>
-            </a:r>
-            <a:endParaRPr lang="en-US" sz="2800" b="1" noProof="1" smtClean="0">
-              <a:latin typeface="Consolas" pitchFamily="49" charset="0"/>
-              <a:cs typeface="Consolas" pitchFamily="49" charset="0"/>
-            </a:endParaRPr>
+              <a:t>	CountryId INT</a:t>
+            </a:r>
           </a:p>
           <a:p>
             <a:pPr eaLnBrk="0" hangingPunct="0">
@@ -14675,7 +14656,7 @@
     <a:masterClrMapping/>
   </p:clrMapOvr>
   <mc:AlternateContent xmlns:mc="http://schemas.openxmlformats.org/markup-compatibility/2006">
-    <mc:Choice xmlns:p14="http://schemas.microsoft.com/office/powerpoint/2010/main" xmlns="" Requires="p14">
+    <mc:Choice xmlns="" xmlns:p14="http://schemas.microsoft.com/office/powerpoint/2010/main" Requires="p14">
       <p:transition spd="slow" p14:dur="2000" advClick="0" advTm="5000"/>
     </mc:Choice>
     <mc:Fallback>
@@ -15280,7 +15261,7 @@
           <p:nvPr>
             <p:extLst>
               <p:ext uri="{D42A27DB-BD31-4B8C-83A1-F6EECF244321}">
-                <p14:modId xmlns="" xmlns:p14="http://schemas.microsoft.com/office/powerpoint/2010/main" val="1102571627"/>
+                <p14:modId xmlns:p14="http://schemas.microsoft.com/office/powerpoint/2010/main" xmlns="" val="1102571627"/>
               </p:ext>
             </p:extLst>
           </p:nvPr>
@@ -15299,21 +15280,21 @@
                 <a:gridCol w="1046179">
                   <a:extLst>
                     <a:ext uri="{9D8B030D-6E8A-4147-A177-3AD203B41FA5}">
-                      <a16:colId xmlns="" xmlns:a16="http://schemas.microsoft.com/office/drawing/2014/main" val="20000"/>
+                      <a16:colId xmlns:a16="http://schemas.microsoft.com/office/drawing/2014/main" xmlns="" val="20000"/>
                     </a:ext>
                   </a:extLst>
                 </a:gridCol>
                 <a:gridCol w="1336419">
                   <a:extLst>
                     <a:ext uri="{9D8B030D-6E8A-4147-A177-3AD203B41FA5}">
-                      <a16:colId xmlns="" xmlns:a16="http://schemas.microsoft.com/office/drawing/2014/main" val="20001"/>
+                      <a16:colId xmlns:a16="http://schemas.microsoft.com/office/drawing/2014/main" xmlns="" val="20001"/>
                     </a:ext>
                   </a:extLst>
                 </a:gridCol>
                 <a:gridCol w="2646603">
                   <a:extLst>
                     <a:ext uri="{9D8B030D-6E8A-4147-A177-3AD203B41FA5}">
-                      <a16:colId xmlns="" xmlns:a16="http://schemas.microsoft.com/office/drawing/2014/main" val="20002"/>
+                      <a16:colId xmlns:a16="http://schemas.microsoft.com/office/drawing/2014/main" xmlns="" val="20002"/>
                     </a:ext>
                   </a:extLst>
                 </a:gridCol>
@@ -15710,7 +15691,7 @@
                 </a:tc>
                 <a:extLst>
                   <a:ext uri="{0D108BD9-81ED-4DB2-BD59-A6C34878D82A}">
-                    <a16:rowId xmlns="" xmlns:a16="http://schemas.microsoft.com/office/drawing/2014/main" val="10001"/>
+                    <a16:rowId xmlns:a16="http://schemas.microsoft.com/office/drawing/2014/main" xmlns="" val="10001"/>
                   </a:ext>
                 </a:extLst>
               </a:tr>
@@ -15894,7 +15875,7 @@
                 </a:tc>
                 <a:extLst>
                   <a:ext uri="{0D108BD9-81ED-4DB2-BD59-A6C34878D82A}">
-                    <a16:rowId xmlns="" xmlns:a16="http://schemas.microsoft.com/office/drawing/2014/main" val="10002"/>
+                    <a16:rowId xmlns:a16="http://schemas.microsoft.com/office/drawing/2014/main" xmlns="" val="10002"/>
                   </a:ext>
                 </a:extLst>
               </a:tr>
@@ -16602,7 +16583,7 @@
           <p:nvPr>
             <p:extLst>
               <p:ext uri="{D42A27DB-BD31-4B8C-83A1-F6EECF244321}">
-                <p14:modId xmlns="" xmlns:p14="http://schemas.microsoft.com/office/powerpoint/2010/main" val="1102571627"/>
+                <p14:modId xmlns:p14="http://schemas.microsoft.com/office/powerpoint/2010/main" xmlns="" val="1102571627"/>
               </p:ext>
             </p:extLst>
           </p:nvPr>
@@ -16621,14 +16602,14 @@
                 <a:gridCol w="914402">
                   <a:extLst>
                     <a:ext uri="{9D8B030D-6E8A-4147-A177-3AD203B41FA5}">
-                      <a16:colId xmlns="" xmlns:a16="http://schemas.microsoft.com/office/drawing/2014/main" val="20000"/>
+                      <a16:colId xmlns:a16="http://schemas.microsoft.com/office/drawing/2014/main" xmlns="" val="20000"/>
                     </a:ext>
                   </a:extLst>
                 </a:gridCol>
                 <a:gridCol w="1905000">
                   <a:extLst>
                     <a:ext uri="{9D8B030D-6E8A-4147-A177-3AD203B41FA5}">
-                      <a16:colId xmlns="" xmlns:a16="http://schemas.microsoft.com/office/drawing/2014/main" val="20001"/>
+                      <a16:colId xmlns:a16="http://schemas.microsoft.com/office/drawing/2014/main" xmlns="" val="20001"/>
                     </a:ext>
                   </a:extLst>
                 </a:gridCol>
@@ -16764,7 +16745,7 @@
                 </a:tc>
                 <a:extLst>
                   <a:ext uri="{0D108BD9-81ED-4DB2-BD59-A6C34878D82A}">
-                    <a16:rowId xmlns="" xmlns:a16="http://schemas.microsoft.com/office/drawing/2014/main" val="10000"/>
+                    <a16:rowId xmlns:a16="http://schemas.microsoft.com/office/drawing/2014/main" xmlns="" val="10000"/>
                   </a:ext>
                 </a:extLst>
               </a:tr>
@@ -16883,7 +16864,7 @@
                 </a:tc>
                 <a:extLst>
                   <a:ext uri="{0D108BD9-81ED-4DB2-BD59-A6C34878D82A}">
-                    <a16:rowId xmlns="" xmlns:a16="http://schemas.microsoft.com/office/drawing/2014/main" val="10001"/>
+                    <a16:rowId xmlns:a16="http://schemas.microsoft.com/office/drawing/2014/main" xmlns="" val="10001"/>
                   </a:ext>
                 </a:extLst>
               </a:tr>
@@ -17008,7 +16989,7 @@
                 </a:tc>
                 <a:extLst>
                   <a:ext uri="{0D108BD9-81ED-4DB2-BD59-A6C34878D82A}">
-                    <a16:rowId xmlns="" xmlns:a16="http://schemas.microsoft.com/office/drawing/2014/main" val="10002"/>
+                    <a16:rowId xmlns:a16="http://schemas.microsoft.com/office/drawing/2014/main" xmlns="" val="10002"/>
                   </a:ext>
                 </a:extLst>
               </a:tr>
@@ -17210,7 +17191,7 @@
     </p:spTree>
     <p:extLst>
       <p:ext uri="{BB962C8B-B14F-4D97-AF65-F5344CB8AC3E}">
-        <p14:creationId xmlns:p14="http://schemas.microsoft.com/office/powerpoint/2010/main" xmlns="" val="1942099443"/>
+        <p14:creationId xmlns="" xmlns:p14="http://schemas.microsoft.com/office/powerpoint/2010/main" val="1942099443"/>
       </p:ext>
     </p:extLst>
   </p:cSld>
@@ -17602,14 +17583,7 @@
                 <a:latin typeface="Consolas" pitchFamily="49" charset="0"/>
                 <a:cs typeface="Consolas" pitchFamily="49" charset="0"/>
               </a:rPr>
-              <a:t>	</a:t>
-            </a:r>
-            <a:r>
-              <a:rPr lang="en-US" sz="2400" b="1" noProof="1" smtClean="0">
-                <a:latin typeface="Consolas" pitchFamily="49" charset="0"/>
-                <a:cs typeface="Consolas" pitchFamily="49" charset="0"/>
-              </a:rPr>
-              <a:t>Id INT </a:t>
+              <a:t>	Id INT </a:t>
             </a:r>
             <a:r>
               <a:rPr lang="en-US" sz="2400" b="1" noProof="1" smtClean="0">
@@ -17778,14 +17752,7 @@
                 <a:latin typeface="Consolas" pitchFamily="49" charset="0"/>
                 <a:cs typeface="Consolas" pitchFamily="49" charset="0"/>
               </a:rPr>
-              <a:t>	</a:t>
-            </a:r>
-            <a:r>
-              <a:rPr lang="en-US" sz="2400" b="1" noProof="1" smtClean="0">
-                <a:latin typeface="Consolas" pitchFamily="49" charset="0"/>
-                <a:cs typeface="Consolas" pitchFamily="49" charset="0"/>
-              </a:rPr>
-              <a:t>Id INT </a:t>
+              <a:t>	Id INT </a:t>
             </a:r>
             <a:r>
               <a:rPr lang="en-US" sz="2400" b="1" noProof="1" smtClean="0">
@@ -17910,19 +17877,8 @@
                 <a:latin typeface="Consolas" pitchFamily="49" charset="0"/>
                 <a:cs typeface="Consolas" pitchFamily="49" charset="0"/>
               </a:rPr>
-              <a:t> </a:t>
-            </a:r>
-            <a:r>
-              <a:rPr lang="en-US" sz="2400" b="1" noProof="1" smtClean="0">
-                <a:latin typeface="Consolas" pitchFamily="49" charset="0"/>
-                <a:cs typeface="Consolas" pitchFamily="49" charset="0"/>
-              </a:rPr>
-              <a:t>(Id)</a:t>
-            </a:r>
-            <a:endParaRPr lang="en-US" sz="2400" b="1" noProof="1" smtClean="0">
-              <a:latin typeface="Consolas" pitchFamily="49" charset="0"/>
-              <a:cs typeface="Consolas" pitchFamily="49" charset="0"/>
-            </a:endParaRPr>
+              <a:t> (Id)</a:t>
+            </a:r>
           </a:p>
           <a:p>
             <a:pPr eaLnBrk="0" hangingPunct="0">
@@ -18045,7 +18001,7 @@
     <a:masterClrMapping/>
   </p:clrMapOvr>
   <mc:AlternateContent xmlns:mc="http://schemas.openxmlformats.org/markup-compatibility/2006">
-    <mc:Choice xmlns:p14="http://schemas.microsoft.com/office/powerpoint/2010/main" xmlns="" Requires="p14">
+    <mc:Choice xmlns="" xmlns:p14="http://schemas.microsoft.com/office/powerpoint/2010/main" Requires="p14">
       <p:transition spd="slow" p14:dur="2000" advClick="0" advTm="5000"/>
     </mc:Choice>
     <mc:Fallback>
@@ -18232,7 +18188,7 @@
           <p:cNvPr id="9" name="Summary Box Group">
             <a:extLst>
               <a:ext uri="{FF2B5EF4-FFF2-40B4-BE49-F238E27FC236}">
-                <a16:creationId xmlns:a16="http://schemas.microsoft.com/office/drawing/2014/main" xmlns="" id="{EBAFE522-EB7D-4931-A015-9A7E8A98517D}"/>
+                <a16:creationId xmlns="" xmlns:a16="http://schemas.microsoft.com/office/drawing/2014/main" id="{EBAFE522-EB7D-4931-A015-9A7E8A98517D}"/>
               </a:ext>
             </a:extLst>
           </p:cNvPr>
@@ -18252,7 +18208,7 @@
             <p:cNvPr id="10" name="Rounded Rectangle Blue">
               <a:extLst>
                 <a:ext uri="{FF2B5EF4-FFF2-40B4-BE49-F238E27FC236}">
-                  <a16:creationId xmlns:a16="http://schemas.microsoft.com/office/drawing/2014/main" xmlns="" id="{18F78F23-3D09-4B63-8DF9-D49CFBB145EE}"/>
+                  <a16:creationId xmlns="" xmlns:a16="http://schemas.microsoft.com/office/drawing/2014/main" id="{18F78F23-3D09-4B63-8DF9-D49CFBB145EE}"/>
                 </a:ext>
               </a:extLst>
             </p:cNvPr>
@@ -18306,7 +18262,7 @@
             <p:cNvPr id="11" name="Rounded Rectangle Left">
               <a:extLst>
                 <a:ext uri="{FF2B5EF4-FFF2-40B4-BE49-F238E27FC236}">
-                  <a16:creationId xmlns:a16="http://schemas.microsoft.com/office/drawing/2014/main" xmlns="" id="{F12C06CE-2BBE-46C2-B718-813794C58DF9}"/>
+                  <a16:creationId xmlns="" xmlns:a16="http://schemas.microsoft.com/office/drawing/2014/main" id="{F12C06CE-2BBE-46C2-B718-813794C58DF9}"/>
                 </a:ext>
               </a:extLst>
             </p:cNvPr>
@@ -18366,7 +18322,7 @@
             <p:cNvPr id="12" name="Half Frame Top Right">
               <a:extLst>
                 <a:ext uri="{FF2B5EF4-FFF2-40B4-BE49-F238E27FC236}">
-                  <a16:creationId xmlns:a16="http://schemas.microsoft.com/office/drawing/2014/main" xmlns="" id="{66CDBB1E-AF3C-43FC-9F34-2DD691F81726}"/>
+                  <a16:creationId xmlns="" xmlns:a16="http://schemas.microsoft.com/office/drawing/2014/main" id="{66CDBB1E-AF3C-43FC-9F34-2DD691F81726}"/>
                 </a:ext>
               </a:extLst>
             </p:cNvPr>
@@ -18428,7 +18384,7 @@
           <p:cNvPr id="14" name="Text Placeholder Body">
             <a:extLst>
               <a:ext uri="{FF2B5EF4-FFF2-40B4-BE49-F238E27FC236}">
-                <a16:creationId xmlns:a16="http://schemas.microsoft.com/office/drawing/2014/main" xmlns="" id="{0E49D336-45B6-44D3-97C4-E28F8DEA2022}"/>
+                <a16:creationId xmlns="" xmlns:a16="http://schemas.microsoft.com/office/drawing/2014/main" id="{0E49D336-45B6-44D3-97C4-E28F8DEA2022}"/>
               </a:ext>
             </a:extLst>
           </p:cNvPr>
@@ -18703,11 +18659,6 @@
               </a:rPr>
               <a:t> таблици</a:t>
             </a:r>
-            <a:endParaRPr lang="bg-BG" sz="3000" dirty="0" smtClean="0">
-              <a:solidFill>
-                <a:schemeClr val="bg2"/>
-              </a:solidFill>
-            </a:endParaRPr>
           </a:p>
           <a:p>
             <a:pPr marL="360363" indent="-360363" fontAlgn="base">
@@ -18724,7 +18675,7 @@
           <p:cNvPr id="17" name="Slide Number">
             <a:extLst>
               <a:ext uri="{FF2B5EF4-FFF2-40B4-BE49-F238E27FC236}">
-                <a16:creationId xmlns:a16="http://schemas.microsoft.com/office/drawing/2014/main" xmlns="" id="{9DE5559F-55C2-47F1-A321-B593B1EC63C1}"/>
+                <a16:creationId xmlns="" xmlns:a16="http://schemas.microsoft.com/office/drawing/2014/main" id="{9DE5559F-55C2-47F1-A321-B593B1EC63C1}"/>
               </a:ext>
             </a:extLst>
           </p:cNvPr>
@@ -18766,7 +18717,7 @@
           <p:cNvPr id="13" name="Picture SoftUni Mascot">
             <a:extLst>
               <a:ext uri="{FF2B5EF4-FFF2-40B4-BE49-F238E27FC236}">
-                <a16:creationId xmlns:a16="http://schemas.microsoft.com/office/drawing/2014/main" xmlns="" id="{CCC3A316-993C-4741-8826-E104F27650A3}"/>
+                <a16:creationId xmlns="" xmlns:a16="http://schemas.microsoft.com/office/drawing/2014/main" id="{CCC3A316-993C-4741-8826-E104F27650A3}"/>
               </a:ext>
             </a:extLst>
           </p:cNvPr>
@@ -18779,7 +18730,7 @@
           <a:blip r:embed="rId3" cstate="print">
             <a:extLst>
               <a:ext uri="{28A0092B-C50C-407E-A947-70E740481C1C}">
-                <a14:useLocalDpi xmlns:a14="http://schemas.microsoft.com/office/drawing/2010/main" xmlns="" val="0"/>
+                <a14:useLocalDpi xmlns="" xmlns:a14="http://schemas.microsoft.com/office/drawing/2010/main" val="0"/>
               </a:ext>
             </a:extLst>
           </a:blip>
@@ -18824,7 +18775,7 @@
     </p:spTree>
     <p:extLst>
       <p:ext uri="{BB962C8B-B14F-4D97-AF65-F5344CB8AC3E}">
-        <p14:creationId xmlns:p14="http://schemas.microsoft.com/office/powerpoint/2010/main" xmlns="" val="2087190546"/>
+        <p14:creationId xmlns="" xmlns:p14="http://schemas.microsoft.com/office/powerpoint/2010/main" val="2087190546"/>
       </p:ext>
     </p:extLst>
   </p:cSld>
@@ -18832,7 +18783,7 @@
     <a:masterClrMapping/>
   </p:clrMapOvr>
   <mc:AlternateContent xmlns:mc="http://schemas.openxmlformats.org/markup-compatibility/2006">
-    <mc:Choice xmlns:p14="http://schemas.microsoft.com/office/powerpoint/2010/main" xmlns="" Requires="p14">
+    <mc:Choice xmlns="" xmlns:p14="http://schemas.microsoft.com/office/powerpoint/2010/main" Requires="p14">
       <p:transition spd="slow" p14:dur="2000" advClick="0" advTm="5000"/>
     </mc:Choice>
     <mc:Fallback>
@@ -19152,7 +19103,7 @@
           <p:cNvPr id="5" name="Group 4">
             <a:extLst>
               <a:ext uri="{FF2B5EF4-FFF2-40B4-BE49-F238E27FC236}">
-                <a16:creationId xmlns:a16="http://schemas.microsoft.com/office/drawing/2014/main" xmlns="" id="{1A67F800-7980-E3CA-7188-3C478C8E98B8}"/>
+                <a16:creationId xmlns="" xmlns:a16="http://schemas.microsoft.com/office/drawing/2014/main" id="{1A67F800-7980-E3CA-7188-3C478C8E98B8}"/>
               </a:ext>
             </a:extLst>
           </p:cNvPr>
@@ -19172,7 +19123,7 @@
             <p:cNvPr id="7" name="Picture 6" descr="A picture containing text, sign, vector graphics&#10;&#10;Description automatically generated">
               <a:extLst>
                 <a:ext uri="{FF2B5EF4-FFF2-40B4-BE49-F238E27FC236}">
-                  <a16:creationId xmlns:a16="http://schemas.microsoft.com/office/drawing/2014/main" xmlns="" id="{15CE28B1-02BA-4014-E149-BF1EE09447ED}"/>
+                  <a16:creationId xmlns="" xmlns:a16="http://schemas.microsoft.com/office/drawing/2014/main" id="{15CE28B1-02BA-4014-E149-BF1EE09447ED}"/>
                 </a:ext>
               </a:extLst>
             </p:cNvPr>
@@ -19202,7 +19153,7 @@
             <p:cNvPr id="9" name="Picture 8" descr="Logo&#10;&#10;Description automatically generated">
               <a:extLst>
                 <a:ext uri="{FF2B5EF4-FFF2-40B4-BE49-F238E27FC236}">
-                  <a16:creationId xmlns:a16="http://schemas.microsoft.com/office/drawing/2014/main" xmlns="" id="{5F82FF4F-4AD2-4B3B-1445-F3C6BA268522}"/>
+                  <a16:creationId xmlns="" xmlns:a16="http://schemas.microsoft.com/office/drawing/2014/main" id="{5F82FF4F-4AD2-4B3B-1445-F3C6BA268522}"/>
                 </a:ext>
               </a:extLst>
             </p:cNvPr>
@@ -19232,7 +19183,7 @@
             <p:cNvPr id="11" name="Picture 10" descr="Logo&#10;&#10;Description automatically generated">
               <a:extLst>
                 <a:ext uri="{FF2B5EF4-FFF2-40B4-BE49-F238E27FC236}">
-                  <a16:creationId xmlns:a16="http://schemas.microsoft.com/office/drawing/2014/main" xmlns="" id="{68CCA8DB-9EFC-F9BC-57AE-81E4F843E863}"/>
+                  <a16:creationId xmlns="" xmlns:a16="http://schemas.microsoft.com/office/drawing/2014/main" id="{68CCA8DB-9EFC-F9BC-57AE-81E4F843E863}"/>
                 </a:ext>
               </a:extLst>
             </p:cNvPr>
@@ -19262,7 +19213,7 @@
             <p:cNvPr id="13" name="Picture 12" descr="Logo&#10;&#10;Description automatically generated">
               <a:extLst>
                 <a:ext uri="{FF2B5EF4-FFF2-40B4-BE49-F238E27FC236}">
-                  <a16:creationId xmlns:a16="http://schemas.microsoft.com/office/drawing/2014/main" xmlns="" id="{3FDF9297-50FA-E866-B6CE-9D64B1E892BF}"/>
+                  <a16:creationId xmlns="" xmlns:a16="http://schemas.microsoft.com/office/drawing/2014/main" id="{3FDF9297-50FA-E866-B6CE-9D64B1E892BF}"/>
                 </a:ext>
               </a:extLst>
             </p:cNvPr>
@@ -19292,7 +19243,7 @@
             <p:cNvPr id="18" name="Graphic 17">
               <a:extLst>
                 <a:ext uri="{FF2B5EF4-FFF2-40B4-BE49-F238E27FC236}">
-                  <a16:creationId xmlns:a16="http://schemas.microsoft.com/office/drawing/2014/main" xmlns="" id="{2A1BC0C9-7A7B-9C5B-B457-3E86E59EF29E}"/>
+                  <a16:creationId xmlns="" xmlns:a16="http://schemas.microsoft.com/office/drawing/2014/main" id="{2A1BC0C9-7A7B-9C5B-B457-3E86E59EF29E}"/>
                 </a:ext>
               </a:extLst>
             </p:cNvPr>
@@ -19305,7 +19256,7 @@
             <a:blip r:embed="rId7" cstate="print">
               <a:extLst>
                 <a:ext uri="{96DAC541-7B7A-43D3-8B79-37D633B846F1}">
-                  <asvg:svgBlip xmlns:asvg="http://schemas.microsoft.com/office/drawing/2016/SVG/main" xmlns="" r:embed="rId8"/>
+                  <asvg:svgBlip xmlns="" xmlns:asvg="http://schemas.microsoft.com/office/drawing/2016/SVG/main" r:embed="rId8"/>
                 </a:ext>
               </a:extLst>
             </a:blip>
@@ -19328,7 +19279,7 @@
             <p:cNvPr id="20" name="Graphic 19">
               <a:extLst>
                 <a:ext uri="{FF2B5EF4-FFF2-40B4-BE49-F238E27FC236}">
-                  <a16:creationId xmlns:a16="http://schemas.microsoft.com/office/drawing/2014/main" xmlns="" id="{DBE174DA-A182-7E57-06D4-86AFA26D484D}"/>
+                  <a16:creationId xmlns="" xmlns:a16="http://schemas.microsoft.com/office/drawing/2014/main" id="{DBE174DA-A182-7E57-06D4-86AFA26D484D}"/>
                 </a:ext>
               </a:extLst>
             </p:cNvPr>
@@ -19341,7 +19292,7 @@
             <a:blip r:embed="rId9" cstate="print">
               <a:extLst>
                 <a:ext uri="{96DAC541-7B7A-43D3-8B79-37D633B846F1}">
-                  <asvg:svgBlip xmlns:asvg="http://schemas.microsoft.com/office/drawing/2016/SVG/main" xmlns="" r:embed="rId10"/>
+                  <asvg:svgBlip xmlns="" xmlns:asvg="http://schemas.microsoft.com/office/drawing/2016/SVG/main" r:embed="rId10"/>
                 </a:ext>
               </a:extLst>
             </a:blip>
@@ -19364,7 +19315,7 @@
             <p:cNvPr id="22" name="Picture 21" descr="Logo&#10;&#10;Description automatically generated">
               <a:extLst>
                 <a:ext uri="{FF2B5EF4-FFF2-40B4-BE49-F238E27FC236}">
-                  <a16:creationId xmlns:a16="http://schemas.microsoft.com/office/drawing/2014/main" xmlns="" id="{9B7FFC36-A4BC-7A53-AB82-82C398A47538}"/>
+                  <a16:creationId xmlns="" xmlns:a16="http://schemas.microsoft.com/office/drawing/2014/main" id="{9B7FFC36-A4BC-7A53-AB82-82C398A47538}"/>
                 </a:ext>
               </a:extLst>
             </p:cNvPr>
@@ -19394,7 +19345,7 @@
             <p:cNvPr id="36" name="Group 35">
               <a:extLst>
                 <a:ext uri="{FF2B5EF4-FFF2-40B4-BE49-F238E27FC236}">
-                  <a16:creationId xmlns:a16="http://schemas.microsoft.com/office/drawing/2014/main" xmlns="" id="{3FB2AEAC-BDEE-9D5F-67A3-17CEDA699052}"/>
+                  <a16:creationId xmlns="" xmlns:a16="http://schemas.microsoft.com/office/drawing/2014/main" id="{3FB2AEAC-BDEE-9D5F-67A3-17CEDA699052}"/>
                 </a:ext>
               </a:extLst>
             </p:cNvPr>
@@ -19414,7 +19365,7 @@
               <p:cNvPr id="31" name="Straight Connector 30">
                 <a:extLst>
                   <a:ext uri="{FF2B5EF4-FFF2-40B4-BE49-F238E27FC236}">
-                    <a16:creationId xmlns:a16="http://schemas.microsoft.com/office/drawing/2014/main" xmlns="" id="{AA38ABD5-1637-DC80-A922-DF10E4F75CDE}"/>
+                    <a16:creationId xmlns="" xmlns:a16="http://schemas.microsoft.com/office/drawing/2014/main" id="{AA38ABD5-1637-DC80-A922-DF10E4F75CDE}"/>
                   </a:ext>
                 </a:extLst>
               </p:cNvPr>
@@ -19457,7 +19408,7 @@
               <p:cNvPr id="33" name="Picture 32">
                 <a:extLst>
                   <a:ext uri="{FF2B5EF4-FFF2-40B4-BE49-F238E27FC236}">
-                    <a16:creationId xmlns:a16="http://schemas.microsoft.com/office/drawing/2014/main" xmlns="" id="{617B586A-0BC5-5E32-7E67-FD277547ED69}"/>
+                    <a16:creationId xmlns="" xmlns:a16="http://schemas.microsoft.com/office/drawing/2014/main" id="{617B586A-0BC5-5E32-7E67-FD277547ED69}"/>
                   </a:ext>
                 </a:extLst>
               </p:cNvPr>
@@ -19489,7 +19440,7 @@
           <p:cNvPr id="40" name="Picture 39" descr="Logo&#10;&#10;Description automatically generated">
             <a:extLst>
               <a:ext uri="{FF2B5EF4-FFF2-40B4-BE49-F238E27FC236}">
-                <a16:creationId xmlns:a16="http://schemas.microsoft.com/office/drawing/2014/main" xmlns="" id="{9C30DD70-D438-6D27-35D3-8BB874966D84}"/>
+                <a16:creationId xmlns="" xmlns:a16="http://schemas.microsoft.com/office/drawing/2014/main" id="{9C30DD70-D438-6D27-35D3-8BB874966D84}"/>
               </a:ext>
             </a:extLst>
           </p:cNvPr>
@@ -19519,7 +19470,7 @@
           <p:cNvPr id="2" name="Google Shape;441;p37">
             <a:extLst>
               <a:ext uri="{FF2B5EF4-FFF2-40B4-BE49-F238E27FC236}">
-                <a16:creationId xmlns:a16="http://schemas.microsoft.com/office/drawing/2014/main" xmlns="" id="{2AFB472C-93C2-241B-75FA-457782840F92}"/>
+                <a16:creationId xmlns="" xmlns:a16="http://schemas.microsoft.com/office/drawing/2014/main" id="{2AFB472C-93C2-241B-75FA-457782840F92}"/>
               </a:ext>
             </a:extLst>
           </p:cNvPr>
@@ -19824,7 +19775,7 @@
           <p:cNvPr id="14" name="Картина 13">
             <a:extLst>
               <a:ext uri="{FF2B5EF4-FFF2-40B4-BE49-F238E27FC236}">
-                <a16:creationId xmlns:a16="http://schemas.microsoft.com/office/drawing/2014/main" xmlns="" id="{54B365E9-8FD0-6D5B-2DFC-723EE5DDD555}"/>
+                <a16:creationId xmlns="" xmlns:a16="http://schemas.microsoft.com/office/drawing/2014/main" id="{54B365E9-8FD0-6D5B-2DFC-723EE5DDD555}"/>
               </a:ext>
             </a:extLst>
           </p:cNvPr>
@@ -19854,7 +19805,7 @@
           <p:cNvPr id="16" name="Картина 15">
             <a:extLst>
               <a:ext uri="{FF2B5EF4-FFF2-40B4-BE49-F238E27FC236}">
-                <a16:creationId xmlns:a16="http://schemas.microsoft.com/office/drawing/2014/main" xmlns="" id="{3BD6ABFC-02BF-2D42-B42B-6929222F37B6}"/>
+                <a16:creationId xmlns="" xmlns:a16="http://schemas.microsoft.com/office/drawing/2014/main" id="{3BD6ABFC-02BF-2D42-B42B-6929222F37B6}"/>
               </a:ext>
             </a:extLst>
           </p:cNvPr>
@@ -19882,7 +19833,7 @@
     </p:spTree>
     <p:extLst>
       <p:ext uri="{BB962C8B-B14F-4D97-AF65-F5344CB8AC3E}">
-        <p14:creationId xmlns:p14="http://schemas.microsoft.com/office/powerpoint/2010/main" xmlns="" val="2144060659"/>
+        <p14:creationId xmlns="" xmlns:p14="http://schemas.microsoft.com/office/powerpoint/2010/main" val="2144060659"/>
       </p:ext>
     </p:extLst>
   </p:cSld>
@@ -19921,7 +19872,7 @@
           <p:cNvPr id="5" name="Slide Number">
             <a:extLst>
               <a:ext uri="{FF2B5EF4-FFF2-40B4-BE49-F238E27FC236}">
-                <a16:creationId xmlns:a16="http://schemas.microsoft.com/office/drawing/2014/main" xmlns="" id="{F48C3C93-90A1-4D31-BEA6-B54D1106CE31}"/>
+                <a16:creationId xmlns="" xmlns:a16="http://schemas.microsoft.com/office/drawing/2014/main" id="{F48C3C93-90A1-4D31-BEA6-B54D1106CE31}"/>
               </a:ext>
             </a:extLst>
           </p:cNvPr>
@@ -19963,7 +19914,7 @@
           <p:cNvPr id="2" name="Slide Body">
             <a:extLst>
               <a:ext uri="{FF2B5EF4-FFF2-40B4-BE49-F238E27FC236}">
-                <a16:creationId xmlns:a16="http://schemas.microsoft.com/office/drawing/2014/main" xmlns="" id="{980F49B1-E4BE-4389-A747-7AB9B71AD920}"/>
+                <a16:creationId xmlns="" xmlns:a16="http://schemas.microsoft.com/office/drawing/2014/main" id="{980F49B1-E4BE-4389-A747-7AB9B71AD920}"/>
               </a:ext>
             </a:extLst>
           </p:cNvPr>
@@ -20097,7 +20048,7 @@
           <p:cNvPr id="6" name="Picture License" descr="License">
             <a:extLst>
               <a:ext uri="{FF2B5EF4-FFF2-40B4-BE49-F238E27FC236}">
-                <a16:creationId xmlns:a16="http://schemas.microsoft.com/office/drawing/2014/main" xmlns="" id="{A10A2585-858C-4B1E-8846-27CF1C15729E}"/>
+                <a16:creationId xmlns="" xmlns:a16="http://schemas.microsoft.com/office/drawing/2014/main" id="{A10A2585-858C-4B1E-8846-27CF1C15729E}"/>
               </a:ext>
             </a:extLst>
           </p:cNvPr>
@@ -20138,7 +20089,7 @@
           <p:cNvPr id="3" name="Slide Title">
             <a:extLst>
               <a:ext uri="{FF2B5EF4-FFF2-40B4-BE49-F238E27FC236}">
-                <a16:creationId xmlns:a16="http://schemas.microsoft.com/office/drawing/2014/main" xmlns="" id="{E5F1FB41-80C3-4816-BC47-CCC50632E6E8}"/>
+                <a16:creationId xmlns="" xmlns:a16="http://schemas.microsoft.com/office/drawing/2014/main" id="{E5F1FB41-80C3-4816-BC47-CCC50632E6E8}"/>
               </a:ext>
             </a:extLst>
           </p:cNvPr>
@@ -20164,7 +20115,7 @@
     </p:spTree>
     <p:extLst>
       <p:ext uri="{BB962C8B-B14F-4D97-AF65-F5344CB8AC3E}">
-        <p14:creationId xmlns:p14="http://schemas.microsoft.com/office/powerpoint/2010/main" xmlns="" val="3506533871"/>
+        <p14:creationId xmlns="" xmlns:p14="http://schemas.microsoft.com/office/powerpoint/2010/main" val="3506533871"/>
       </p:ext>
     </p:extLst>
   </p:cSld>
@@ -20172,7 +20123,7 @@
     <a:masterClrMapping/>
   </p:clrMapOvr>
   <mc:AlternateContent xmlns:mc="http://schemas.openxmlformats.org/markup-compatibility/2006">
-    <mc:Choice xmlns:p14="http://schemas.microsoft.com/office/powerpoint/2010/main" xmlns="" Requires="p14">
+    <mc:Choice xmlns="" xmlns:p14="http://schemas.microsoft.com/office/powerpoint/2010/main" Requires="p14">
       <p:transition spd="slow" p14:dur="2000" advClick="0" advTm="5000"/>
     </mc:Choice>
     <mc:Fallback>
@@ -20211,7 +20162,7 @@
           <p:cNvPr id="5" name="Slide Number">
             <a:extLst>
               <a:ext uri="{FF2B5EF4-FFF2-40B4-BE49-F238E27FC236}">
-                <a16:creationId xmlns:a16="http://schemas.microsoft.com/office/drawing/2014/main" xmlns="" id="{6A760D59-0056-4F39-B077-DBDBE3D2927E}"/>
+                <a16:creationId xmlns="" xmlns:a16="http://schemas.microsoft.com/office/drawing/2014/main" id="{6A760D59-0056-4F39-B077-DBDBE3D2927E}"/>
               </a:ext>
             </a:extLst>
           </p:cNvPr>
@@ -20452,7 +20403,7 @@
     </p:spTree>
     <p:extLst>
       <p:ext uri="{BB962C8B-B14F-4D97-AF65-F5344CB8AC3E}">
-        <p14:creationId xmlns:p14="http://schemas.microsoft.com/office/powerpoint/2010/main" xmlns="" val="1646986932"/>
+        <p14:creationId xmlns="" xmlns:p14="http://schemas.microsoft.com/office/powerpoint/2010/main" val="1646986932"/>
       </p:ext>
     </p:extLst>
   </p:cSld>
@@ -20460,7 +20411,7 @@
     <a:masterClrMapping/>
   </p:clrMapOvr>
   <mc:AlternateContent xmlns:mc="http://schemas.openxmlformats.org/markup-compatibility/2006">
-    <mc:Choice xmlns:p14="http://schemas.microsoft.com/office/powerpoint/2010/main" xmlns="" Requires="p14">
+    <mc:Choice xmlns="" xmlns:p14="http://schemas.microsoft.com/office/powerpoint/2010/main" Requires="p14">
       <p:transition spd="slow" p14:dur="2000" advClick="0" advTm="5000"/>
     </mc:Choice>
     <mc:Fallback>
@@ -20730,15 +20681,15 @@
           <a:p>
             <a:r>
               <a:rPr lang="bg-BG" dirty="0" smtClean="0"/>
-              <a:t>Таблици, </a:t>
-            </a:r>
-            <a:r>
-              <a:rPr lang="en-US" dirty="0" err="1" smtClean="0"/>
-              <a:t>Primay</a:t>
+              <a:t>Таблици, Първичен ключ</a:t>
             </a:r>
             <a:r>
               <a:rPr lang="en-US" dirty="0" smtClean="0"/>
-              <a:t> Key, Foreign Key</a:t>
+              <a:t>, </a:t>
+            </a:r>
+            <a:r>
+              <a:rPr lang="bg-BG" dirty="0" smtClean="0"/>
+              <a:t>Външен ключ</a:t>
             </a:r>
             <a:endParaRPr lang="en-US" dirty="0"/>
           </a:p>
@@ -20801,7 +20752,7 @@
     <a:masterClrMapping/>
   </p:clrMapOvr>
   <mc:AlternateContent xmlns:mc="http://schemas.openxmlformats.org/markup-compatibility/2006">
-    <mc:Choice xmlns:p14="http://schemas.microsoft.com/office/powerpoint/2010/main" xmlns="" Requires="p14">
+    <mc:Choice xmlns="" xmlns:p14="http://schemas.microsoft.com/office/powerpoint/2010/main" Requires="p14">
       <p:transition spd="slow" p14:dur="2000" advClick="0" advTm="5000"/>
     </mc:Choice>
     <mc:Fallback>
@@ -21056,7 +21007,7 @@
           <p:nvPr>
             <p:extLst>
               <p:ext uri="{D42A27DB-BD31-4B8C-83A1-F6EECF244321}">
-                <p14:modId xmlns="" xmlns:p14="http://schemas.microsoft.com/office/powerpoint/2010/main" val="3040486569"/>
+                <p14:modId xmlns:p14="http://schemas.microsoft.com/office/powerpoint/2010/main" xmlns="" val="3040486569"/>
               </p:ext>
             </p:extLst>
           </p:nvPr>
@@ -21073,28 +21024,28 @@
                 <a:gridCol w="2141554">
                   <a:extLst>
                     <a:ext uri="{9D8B030D-6E8A-4147-A177-3AD203B41FA5}">
-                      <a16:colId xmlns="" xmlns:a16="http://schemas.microsoft.com/office/drawing/2014/main" val="20000"/>
+                      <a16:colId xmlns:a16="http://schemas.microsoft.com/office/drawing/2014/main" xmlns="" val="20000"/>
                     </a:ext>
                   </a:extLst>
                 </a:gridCol>
                 <a:gridCol w="2590125">
                   <a:extLst>
                     <a:ext uri="{9D8B030D-6E8A-4147-A177-3AD203B41FA5}">
-                      <a16:colId xmlns="" xmlns:a16="http://schemas.microsoft.com/office/drawing/2014/main" val="20001"/>
+                      <a16:colId xmlns:a16="http://schemas.microsoft.com/office/drawing/2014/main" xmlns="" val="20001"/>
                     </a:ext>
                   </a:extLst>
                 </a:gridCol>
                 <a:gridCol w="2513945">
                   <a:extLst>
                     <a:ext uri="{9D8B030D-6E8A-4147-A177-3AD203B41FA5}">
-                      <a16:colId xmlns="" xmlns:a16="http://schemas.microsoft.com/office/drawing/2014/main" val="1808587013"/>
+                      <a16:colId xmlns:a16="http://schemas.microsoft.com/office/drawing/2014/main" xmlns="" val="1808587013"/>
                     </a:ext>
                   </a:extLst>
                 </a:gridCol>
                 <a:gridCol w="1675962">
                   <a:extLst>
                     <a:ext uri="{9D8B030D-6E8A-4147-A177-3AD203B41FA5}">
-                      <a16:colId xmlns="" xmlns:a16="http://schemas.microsoft.com/office/drawing/2014/main" val="1545185628"/>
+                      <a16:colId xmlns:a16="http://schemas.microsoft.com/office/drawing/2014/main" xmlns="" val="1545185628"/>
                     </a:ext>
                   </a:extLst>
                 </a:gridCol>
@@ -21530,7 +21481,7 @@
                 </a:tc>
                 <a:extLst>
                   <a:ext uri="{0D108BD9-81ED-4DB2-BD59-A6C34878D82A}">
-                    <a16:rowId xmlns="" xmlns:a16="http://schemas.microsoft.com/office/drawing/2014/main" val="10000"/>
+                    <a16:rowId xmlns:a16="http://schemas.microsoft.com/office/drawing/2014/main" xmlns="" val="10000"/>
                   </a:ext>
                 </a:extLst>
               </a:tr>
@@ -21845,7 +21796,7 @@
                 </a:tc>
                 <a:extLst>
                   <a:ext uri="{0D108BD9-81ED-4DB2-BD59-A6C34878D82A}">
-                    <a16:rowId xmlns="" xmlns:a16="http://schemas.microsoft.com/office/drawing/2014/main" val="10001"/>
+                    <a16:rowId xmlns:a16="http://schemas.microsoft.com/office/drawing/2014/main" xmlns="" val="10001"/>
                   </a:ext>
                 </a:extLst>
               </a:tr>
@@ -22160,7 +22111,7 @@
                 </a:tc>
                 <a:extLst>
                   <a:ext uri="{0D108BD9-81ED-4DB2-BD59-A6C34878D82A}">
-                    <a16:rowId xmlns="" xmlns:a16="http://schemas.microsoft.com/office/drawing/2014/main" val="10002"/>
+                    <a16:rowId xmlns:a16="http://schemas.microsoft.com/office/drawing/2014/main" xmlns="" val="10002"/>
                   </a:ext>
                 </a:extLst>
               </a:tr>
@@ -22475,7 +22426,7 @@
                 </a:tc>
                 <a:extLst>
                   <a:ext uri="{0D108BD9-81ED-4DB2-BD59-A6C34878D82A}">
-                    <a16:rowId xmlns="" xmlns:a16="http://schemas.microsoft.com/office/drawing/2014/main" val="10003"/>
+                    <a16:rowId xmlns:a16="http://schemas.microsoft.com/office/drawing/2014/main" xmlns="" val="10003"/>
                   </a:ext>
                 </a:extLst>
               </a:tr>
@@ -22786,7 +22737,7 @@
                 </a:tc>
                 <a:extLst>
                   <a:ext uri="{0D108BD9-81ED-4DB2-BD59-A6C34878D82A}">
-                    <a16:rowId xmlns="" xmlns:a16="http://schemas.microsoft.com/office/drawing/2014/main" val="10004"/>
+                    <a16:rowId xmlns:a16="http://schemas.microsoft.com/office/drawing/2014/main" xmlns="" val="10004"/>
                   </a:ext>
                 </a:extLst>
               </a:tr>
@@ -23221,7 +23172,7 @@
           <p:cNvPr id="13" name="Slide Number">
             <a:extLst>
               <a:ext uri="{FF2B5EF4-FFF2-40B4-BE49-F238E27FC236}">
-                <a16:creationId xmlns="" xmlns:a16="http://schemas.microsoft.com/office/drawing/2014/main" id="{F80F709C-BB43-4A83-9529-1E089194DC9E}"/>
+                <a16:creationId xmlns:a16="http://schemas.microsoft.com/office/drawing/2014/main" xmlns="" id="{F80F709C-BB43-4A83-9529-1E089194DC9E}"/>
               </a:ext>
             </a:extLst>
           </p:cNvPr>
@@ -23261,7 +23212,7 @@
     </p:spTree>
     <p:extLst>
       <p:ext uri="{BB962C8B-B14F-4D97-AF65-F5344CB8AC3E}">
-        <p14:creationId xmlns="" xmlns:p14="http://schemas.microsoft.com/office/powerpoint/2010/main" val="174766927"/>
+        <p14:creationId xmlns:p14="http://schemas.microsoft.com/office/powerpoint/2010/main" xmlns="" val="174766927"/>
       </p:ext>
     </p:extLst>
   </p:cSld>
@@ -23846,7 +23797,7 @@
     <a:masterClrMapping/>
   </p:clrMapOvr>
   <mc:AlternateContent xmlns:mc="http://schemas.openxmlformats.org/markup-compatibility/2006">
-    <mc:Choice xmlns:p14="http://schemas.microsoft.com/office/powerpoint/2010/main" xmlns="" Requires="p14">
+    <mc:Choice xmlns="" xmlns:p14="http://schemas.microsoft.com/office/powerpoint/2010/main" Requires="p14">
       <p:transition spd="slow" p14:dur="2000" advClick="0" advTm="5000"/>
     </mc:Choice>
     <mc:Fallback>
@@ -24347,15 +24298,7 @@
           <a:p>
             <a:r>
               <a:rPr lang="bg-BG" dirty="0" smtClean="0"/>
-              <a:t>Първичен </a:t>
-            </a:r>
-            <a:r>
-              <a:rPr lang="bg-BG" dirty="0" smtClean="0"/>
-              <a:t>клю</a:t>
-            </a:r>
-            <a:r>
-              <a:rPr lang="bg-BG" dirty="0" smtClean="0"/>
-              <a:t>ч</a:t>
+              <a:t>Първичен ключ</a:t>
             </a:r>
             <a:endParaRPr lang="en-US" dirty="0"/>
           </a:p>
@@ -24393,7 +24336,7 @@
     <a:masterClrMapping/>
   </p:clrMapOvr>
   <mc:AlternateContent xmlns:mc="http://schemas.openxmlformats.org/markup-compatibility/2006">
-    <mc:Choice xmlns:p14="http://schemas.microsoft.com/office/powerpoint/2010/main" xmlns="" Requires="p14">
+    <mc:Choice xmlns="" xmlns:p14="http://schemas.microsoft.com/office/powerpoint/2010/main" Requires="p14">
       <p:transition spd="slow" p14:dur="2000" advClick="0" advTm="5000"/>
     </mc:Choice>
     <mc:Fallback>
@@ -24787,7 +24730,7 @@
           <p:cNvPr id="5" name="Text Placeholder 4">
             <a:extLst>
               <a:ext uri="{FF2B5EF4-FFF2-40B4-BE49-F238E27FC236}">
-                <a16:creationId xmlns="" xmlns:a16="http://schemas.microsoft.com/office/drawing/2014/main" id="{FBED5352-2A36-4F28-AB8D-6335517E5493}"/>
+                <a16:creationId xmlns:a16="http://schemas.microsoft.com/office/drawing/2014/main" xmlns="" id="{FBED5352-2A36-4F28-AB8D-6335517E5493}"/>
               </a:ext>
             </a:extLst>
           </p:cNvPr>
@@ -24931,17 +24874,7 @@
                 <a:latin typeface="Consolas" pitchFamily="49" charset="0"/>
                 <a:cs typeface="Consolas" pitchFamily="49" charset="0"/>
               </a:rPr>
-              <a:t> </a:t>
-            </a:r>
-            <a:r>
-              <a:rPr lang="en-US" sz="3200" b="1" noProof="1" smtClean="0">
-                <a:solidFill>
-                  <a:schemeClr val="tx2"/>
-                </a:solidFill>
-                <a:latin typeface="Consolas" pitchFamily="49" charset="0"/>
-                <a:cs typeface="Consolas" pitchFamily="49" charset="0"/>
-              </a:rPr>
-              <a:t>   </a:t>
+              <a:t>    </a:t>
             </a:r>
             <a:r>
               <a:rPr lang="en-US" sz="3200" b="1" baseline="0" noProof="1" smtClean="0">
@@ -25025,17 +24958,7 @@
                 <a:latin typeface="Consolas" pitchFamily="49" charset="0"/>
                 <a:cs typeface="Consolas" pitchFamily="49" charset="0"/>
               </a:rPr>
-              <a:t> </a:t>
-            </a:r>
-            <a:r>
-              <a:rPr lang="en-US" sz="3200" b="1" noProof="1" smtClean="0">
-                <a:solidFill>
-                  <a:schemeClr val="tx2"/>
-                </a:solidFill>
-                <a:latin typeface="Consolas" pitchFamily="49" charset="0"/>
-                <a:cs typeface="Consolas" pitchFamily="49" charset="0"/>
-              </a:rPr>
-              <a:t>   FirstName NVARCHAR(50),</a:t>
+              <a:t>    FirstName NVARCHAR(50),</a:t>
             </a:r>
           </a:p>
           <a:p>
@@ -25069,17 +24992,7 @@
                 <a:latin typeface="Consolas" pitchFamily="49" charset="0"/>
                 <a:cs typeface="Consolas" pitchFamily="49" charset="0"/>
               </a:rPr>
-              <a:t> </a:t>
-            </a:r>
-            <a:r>
-              <a:rPr lang="en-US" sz="3200" b="1" noProof="1" smtClean="0">
-                <a:solidFill>
-                  <a:schemeClr val="tx2"/>
-                </a:solidFill>
-                <a:latin typeface="Consolas" pitchFamily="49" charset="0"/>
-                <a:cs typeface="Consolas" pitchFamily="49" charset="0"/>
-              </a:rPr>
-              <a:t>   LastName NVARCHAR(50)</a:t>
+              <a:t>    LastName NVARCHAR(50)</a:t>
             </a:r>
             <a:endParaRPr lang="en-US" sz="3200" b="1" baseline="0" noProof="1" smtClean="0">
               <a:solidFill>
@@ -25151,7 +25064,7 @@
           <p:cNvPr id="6" name="AutoShape 5">
             <a:extLst>
               <a:ext uri="{FF2B5EF4-FFF2-40B4-BE49-F238E27FC236}">
-                <a16:creationId xmlns="" xmlns:a16="http://schemas.microsoft.com/office/drawing/2014/main" id="{F571EDF2-BA8D-4C84-8360-12467530B87E}"/>
+                <a16:creationId xmlns:a16="http://schemas.microsoft.com/office/drawing/2014/main" xmlns="" id="{F571EDF2-BA8D-4C84-8360-12467530B87E}"/>
               </a:ext>
             </a:extLst>
           </p:cNvPr>
@@ -25250,7 +25163,7 @@
           <p:cNvPr id="7" name="AutoShape 5">
             <a:extLst>
               <a:ext uri="{FF2B5EF4-FFF2-40B4-BE49-F238E27FC236}">
-                <a16:creationId xmlns="" xmlns:a16="http://schemas.microsoft.com/office/drawing/2014/main" id="{F571EDF2-BA8D-4C84-8360-12467530B87E}"/>
+                <a16:creationId xmlns:a16="http://schemas.microsoft.com/office/drawing/2014/main" xmlns="" id="{F571EDF2-BA8D-4C84-8360-12467530B87E}"/>
               </a:ext>
             </a:extLst>
           </p:cNvPr>
@@ -25350,7 +25263,7 @@
     <a:masterClrMapping/>
   </p:clrMapOvr>
   <mc:AlternateContent xmlns:mc="http://schemas.openxmlformats.org/markup-compatibility/2006">
-    <mc:Choice xmlns:p14="http://schemas.microsoft.com/office/powerpoint/2010/main" xmlns="" Requires="p14">
+    <mc:Choice xmlns="" xmlns:p14="http://schemas.microsoft.com/office/powerpoint/2010/main" Requires="p14">
       <p:transition spd="slow" p14:dur="2000" advClick="0" advTm="5000"/>
     </mc:Choice>
     <mc:Fallback>
@@ -25650,27 +25563,7 @@
             </a:pPr>
             <a:r>
               <a:rPr lang="ru-RU" sz="3400" dirty="0" smtClean="0"/>
-              <a:t>Не се изисква </a:t>
-            </a:r>
-            <a:r>
-              <a:rPr lang="ru-RU" sz="3400" dirty="0" smtClean="0"/>
-              <a:t>изрично </a:t>
-            </a:r>
-            <a:r>
-              <a:rPr lang="ru-RU" sz="3400" dirty="0" smtClean="0"/>
-              <a:t>задаване на </a:t>
-            </a:r>
-            <a:r>
-              <a:rPr lang="ru-RU" sz="3400" dirty="0" smtClean="0"/>
-              <a:t>стойност на първичния ключ </a:t>
-            </a:r>
-            <a:r>
-              <a:rPr lang="ru-RU" sz="3400" dirty="0" smtClean="0"/>
-              <a:t>при вмъкване на </a:t>
-            </a:r>
-            <a:r>
-              <a:rPr lang="ru-RU" sz="3400" dirty="0" smtClean="0"/>
-              <a:t>записи</a:t>
+              <a:t>Не се изисква изрично задаване на стойност на първичния ключ при вмъкване на записи</a:t>
             </a:r>
             <a:endParaRPr lang="en-US" sz="3400" dirty="0" smtClean="0"/>
           </a:p>
@@ -25686,15 +25579,7 @@
                   <a:schemeClr val="bg1"/>
                 </a:solidFill>
               </a:rPr>
-              <a:t>Избягване на </a:t>
-            </a:r>
-            <a:r>
-              <a:rPr lang="bg-BG" sz="3400" b="1" dirty="0" smtClean="0">
-                <a:solidFill>
-                  <a:schemeClr val="bg1"/>
-                </a:solidFill>
-              </a:rPr>
-              <a:t>конфликти</a:t>
+              <a:t>Избягване на конфликти</a:t>
             </a:r>
             <a:endParaRPr lang="en-US" sz="3400" b="1" dirty="0" smtClean="0">
               <a:solidFill>
@@ -25772,7 +25657,7 @@
     <a:masterClrMapping/>
   </p:clrMapOvr>
   <mc:AlternateContent xmlns:mc="http://schemas.openxmlformats.org/markup-compatibility/2006">
-    <mc:Choice xmlns:p14="http://schemas.microsoft.com/office/powerpoint/2010/main" xmlns="" Requires="p14">
+    <mc:Choice xmlns="" xmlns:p14="http://schemas.microsoft.com/office/powerpoint/2010/main" Requires="p14">
       <p:transition spd="slow" p14:dur="2000" advClick="0" advTm="5000"/>
     </mc:Choice>
     <mc:Fallback>
@@ -26218,7 +26103,7 @@
     <a:masterClrMapping/>
   </p:clrMapOvr>
   <mc:AlternateContent xmlns:mc="http://schemas.openxmlformats.org/markup-compatibility/2006">
-    <mc:Choice xmlns:p14="http://schemas.microsoft.com/office/powerpoint/2010/main" xmlns="" Requires="p14">
+    <mc:Choice xmlns="" xmlns:p14="http://schemas.microsoft.com/office/powerpoint/2010/main" Requires="p14">
       <p:transition spd="slow" p14:dur="2000" advClick="0" advTm="5000"/>
     </mc:Choice>
     <mc:Fallback>
@@ -26717,7 +26602,7 @@
   <a:extraClrSchemeLst/>
   <a:extLst>
     <a:ext uri="{05A4C25C-085E-4340-85A3-A5531E510DB2}">
-      <thm15:themeFamily xmlns:thm15="http://schemas.microsoft.com/office/thememl/2012/main" xmlns="" name="SoftUni" id="{D61FAD9B-6E74-4E03-BFE4-B363D484F1DA}" vid="{7089C1A3-635B-4B03-A017-DAF10A3A396B}"/>
+      <thm15:themeFamily xmlns="" xmlns:thm15="http://schemas.microsoft.com/office/thememl/2012/main" name="SoftUni" id="{D61FAD9B-6E74-4E03-BFE4-B363D484F1DA}" vid="{7089C1A3-635B-4B03-A017-DAF10A3A396B}"/>
     </a:ext>
   </a:extLst>
 </a:theme>
@@ -27012,7 +26897,7 @@
   <a:extraClrSchemeLst/>
   <a:extLst>
     <a:ext uri="{05A4C25C-085E-4340-85A3-A5531E510DB2}">
-      <thm15:themeFamily xmlns:thm15="http://schemas.microsoft.com/office/thememl/2012/main" xmlns="" name="Office Theme" id="{62F939B6-93AF-4DB8-9C6B-D6C7DFDC589F}" vid="{4A3C46E8-61CC-4603-A589-7422A47A8E4A}"/>
+      <thm15:themeFamily xmlns="" xmlns:thm15="http://schemas.microsoft.com/office/thememl/2012/main" name="Office Theme" id="{62F939B6-93AF-4DB8-9C6B-D6C7DFDC589F}" vid="{4A3C46E8-61CC-4603-A589-7422A47A8E4A}"/>
     </a:ext>
   </a:extLst>
 </a:theme>
@@ -27307,16 +27192,19 @@
   <a:extraClrSchemeLst/>
   <a:extLst>
     <a:ext uri="{05A4C25C-085E-4340-85A3-A5531E510DB2}">
-      <thm15:themeFamily xmlns:thm15="http://schemas.microsoft.com/office/thememl/2012/main" xmlns="" name="Office Theme" id="{62F939B6-93AF-4DB8-9C6B-D6C7DFDC589F}" vid="{4A3C46E8-61CC-4603-A589-7422A47A8E4A}"/>
+      <thm15:themeFamily xmlns="" xmlns:thm15="http://schemas.microsoft.com/office/thememl/2012/main" name="Office Theme" id="{62F939B6-93AF-4DB8-9C6B-D6C7DFDC589F}" vid="{4A3C46E8-61CC-4603-A589-7422A47A8E4A}"/>
     </a:ext>
   </a:extLst>
 </a:theme>
 </file>
 
 <file path=customXml/item1.xml><?xml version="1.0" encoding="utf-8"?>
-<p:properties xmlns:p="http://schemas.microsoft.com/office/2006/metadata/properties" xmlns:xsi="http://www.w3.org/2001/XMLSchema-instance" xmlns:pc="http://schemas.microsoft.com/office/infopath/2007/PartnerControls">
-  <documentManagement/>
-</p:properties>
+<?mso-contentType ?>
+<FormTemplates xmlns="http://schemas.microsoft.com/sharepoint/v3/contenttype/forms">
+  <Display>DocumentLibraryForm</Display>
+  <Edit>DocumentLibraryForm</Edit>
+  <New>DocumentLibraryForm</New>
+</FormTemplates>
 </file>
 
 <file path=customXml/item2.xml><?xml version="1.0" encoding="utf-8"?>
@@ -27492,26 +27380,15 @@
 </file>
 
 <file path=customXml/item3.xml><?xml version="1.0" encoding="utf-8"?>
-<?mso-contentType ?>
-<FormTemplates xmlns="http://schemas.microsoft.com/sharepoint/v3/contenttype/forms">
-  <Display>DocumentLibraryForm</Display>
-  <Edit>DocumentLibraryForm</Edit>
-  <New>DocumentLibraryForm</New>
-</FormTemplates>
+<p:properties xmlns:p="http://schemas.microsoft.com/office/2006/metadata/properties" xmlns:xsi="http://www.w3.org/2001/XMLSchema-instance" xmlns:pc="http://schemas.microsoft.com/office/infopath/2007/PartnerControls">
+  <documentManagement/>
+</p:properties>
 </file>
 
 <file path=customXml/itemProps1.xml><?xml version="1.0" encoding="utf-8"?>
-<ds:datastoreItem xmlns:ds="http://schemas.openxmlformats.org/officeDocument/2006/customXml" ds:itemID="{5E2F4A33-1866-4BB8-8A35-8D6BDFE8D9F5}">
+<ds:datastoreItem xmlns:ds="http://schemas.openxmlformats.org/officeDocument/2006/customXml" ds:itemID="{68A20BEC-F81B-49CD-951D-E62C4BAE7796}">
   <ds:schemaRefs>
-    <ds:schemaRef ds:uri="http://schemas.microsoft.com/office/infopath/2007/PartnerControls"/>
-    <ds:schemaRef ds:uri="http://purl.org/dc/dcmitype/"/>
-    <ds:schemaRef ds:uri="http://schemas.microsoft.com/office/2006/documentManagement/types"/>
-    <ds:schemaRef ds:uri="http://schemas.microsoft.com/office/2006/metadata/properties"/>
-    <ds:schemaRef ds:uri="http://www.w3.org/XML/1998/namespace"/>
-    <ds:schemaRef ds:uri="4f985cec-e092-4bcf-a1e1-b816bd0221d8"/>
-    <ds:schemaRef ds:uri="http://schemas.openxmlformats.org/package/2006/metadata/core-properties"/>
-    <ds:schemaRef ds:uri="http://purl.org/dc/terms/"/>
-    <ds:schemaRef ds:uri="http://purl.org/dc/elements/1.1/"/>
+    <ds:schemaRef ds:uri="http://schemas.microsoft.com/sharepoint/v3/contenttype/forms"/>
   </ds:schemaRefs>
 </ds:datastoreItem>
 </file>
@@ -27535,9 +27412,17 @@
 </file>
 
 <file path=customXml/itemProps3.xml><?xml version="1.0" encoding="utf-8"?>
-<ds:datastoreItem xmlns:ds="http://schemas.openxmlformats.org/officeDocument/2006/customXml" ds:itemID="{68A20BEC-F81B-49CD-951D-E62C4BAE7796}">
+<ds:datastoreItem xmlns:ds="http://schemas.openxmlformats.org/officeDocument/2006/customXml" ds:itemID="{5E2F4A33-1866-4BB8-8A35-8D6BDFE8D9F5}">
   <ds:schemaRefs>
-    <ds:schemaRef ds:uri="http://schemas.microsoft.com/sharepoint/v3/contenttype/forms"/>
+    <ds:schemaRef ds:uri="http://schemas.microsoft.com/office/infopath/2007/PartnerControls"/>
+    <ds:schemaRef ds:uri="http://purl.org/dc/dcmitype/"/>
+    <ds:schemaRef ds:uri="http://schemas.microsoft.com/office/2006/documentManagement/types"/>
+    <ds:schemaRef ds:uri="http://schemas.microsoft.com/office/2006/metadata/properties"/>
+    <ds:schemaRef ds:uri="http://www.w3.org/XML/1998/namespace"/>
+    <ds:schemaRef ds:uri="4f985cec-e092-4bcf-a1e1-b816bd0221d8"/>
+    <ds:schemaRef ds:uri="http://schemas.openxmlformats.org/package/2006/metadata/core-properties"/>
+    <ds:schemaRef ds:uri="http://purl.org/dc/terms/"/>
+    <ds:schemaRef ds:uri="http://purl.org/dc/elements/1.1/"/>
   </ds:schemaRefs>
 </ds:datastoreItem>
 </file>
</xml_diff>

<commit_message>
Adding more info for composite key
</commit_message>
<xml_diff>
--- a/Courses/Software-Sciences/Module-3-Databases-New/06-Modeling-Databases/06-Modeling-Databases.pptx
+++ b/Courses/Software-Sciences/Module-3-Databases-New/06-Modeling-Databases/06-Modeling-Databases.pptx
@@ -5,10 +5,10 @@
     <p:sldMasterId id="2147483675" r:id="rId4"/>
   </p:sldMasterIdLst>
   <p:notesMasterIdLst>
-    <p:notesMasterId r:id="rId22"/>
+    <p:notesMasterId r:id="rId23"/>
   </p:notesMasterIdLst>
   <p:handoutMasterIdLst>
-    <p:handoutMasterId r:id="rId23"/>
+    <p:handoutMasterId r:id="rId24"/>
   </p:handoutMasterIdLst>
   <p:sldIdLst>
     <p:sldId id="503" r:id="rId5"/>
@@ -21,13 +21,14 @@
     <p:sldId id="1252" r:id="rId12"/>
     <p:sldId id="1246" r:id="rId13"/>
     <p:sldId id="1247" r:id="rId14"/>
-    <p:sldId id="1248" r:id="rId15"/>
-    <p:sldId id="1253" r:id="rId16"/>
-    <p:sldId id="1250" r:id="rId17"/>
-    <p:sldId id="1249" r:id="rId18"/>
-    <p:sldId id="349" r:id="rId19"/>
-    <p:sldId id="256" r:id="rId20"/>
-    <p:sldId id="493" r:id="rId21"/>
+    <p:sldId id="1254" r:id="rId15"/>
+    <p:sldId id="1248" r:id="rId16"/>
+    <p:sldId id="1253" r:id="rId17"/>
+    <p:sldId id="1250" r:id="rId18"/>
+    <p:sldId id="1249" r:id="rId19"/>
+    <p:sldId id="349" r:id="rId20"/>
+    <p:sldId id="256" r:id="rId21"/>
+    <p:sldId id="493" r:id="rId22"/>
   </p:sldIdLst>
   <p:sldSz cx="12192000" cy="6858000"/>
   <p:notesSz cx="6858000" cy="9144000"/>
@@ -128,7 +129,7 @@
   </p:defaultTextStyle>
   <p:extLst>
     <p:ext uri="{521415D9-36F7-43E2-AB2F-B90AF26B5E84}">
-      <p14:sectionLst xmlns="" xmlns:p14="http://schemas.microsoft.com/office/powerpoint/2010/main">
+      <p14:sectionLst xmlns:p14="http://schemas.microsoft.com/office/powerpoint/2010/main" xmlns="">
         <p14:section name="Въведение" id="{A0C7653D-1924-4F56-9E27-AA2B21F1DA92}">
           <p14:sldIdLst>
             <p14:sldId id="503"/>
@@ -187,7 +188,7 @@
       </p14:sectionLst>
     </p:ext>
     <p:ext uri="{EFAFB233-063F-42B5-8137-9DF3F51BA10A}">
-      <p15:sldGuideLst xmlns="" xmlns:p15="http://schemas.microsoft.com/office/powerpoint/2012/main">
+      <p15:sldGuideLst xmlns:p15="http://schemas.microsoft.com/office/powerpoint/2012/main" xmlns="">
         <p15:guide id="1" orient="horz" pos="2184" userDrawn="1">
           <p15:clr>
             <a:srgbClr val="A4A3A4"/>
@@ -201,7 +202,7 @@
       </p15:sldGuideLst>
     </p:ext>
     <p:ext uri="{2D200454-40CA-4A62-9FC3-DE9A4176ACB9}">
-      <p15:notesGuideLst xmlns="" xmlns:p15="http://schemas.microsoft.com/office/powerpoint/2012/main"/>
+      <p15:notesGuideLst xmlns:p15="http://schemas.microsoft.com/office/powerpoint/2012/main" xmlns=""/>
     </p:ext>
   </p:extLst>
 </p:presentation>
@@ -234,7 +235,7 @@
           <p:cNvPr id="2" name="Header Placeholder 1">
             <a:extLst>
               <a:ext uri="{FF2B5EF4-FFF2-40B4-BE49-F238E27FC236}">
-                <a16:creationId xmlns="" xmlns:a16="http://schemas.microsoft.com/office/drawing/2014/main" id="{56F20103-83CC-4A54-8FDE-9D37FC2629C0}"/>
+                <a16:creationId xmlns:a16="http://schemas.microsoft.com/office/drawing/2014/main" xmlns="" id="{56F20103-83CC-4A54-8FDE-9D37FC2629C0}"/>
               </a:ext>
             </a:extLst>
           </p:cNvPr>
@@ -271,7 +272,7 @@
           <p:cNvPr id="3" name="Date Placeholder 2">
             <a:extLst>
               <a:ext uri="{FF2B5EF4-FFF2-40B4-BE49-F238E27FC236}">
-                <a16:creationId xmlns="" xmlns:a16="http://schemas.microsoft.com/office/drawing/2014/main" id="{27A53962-26EF-44E4-9E69-61B1727AB1C2}"/>
+                <a16:creationId xmlns:a16="http://schemas.microsoft.com/office/drawing/2014/main" xmlns="" id="{27A53962-26EF-44E4-9E69-61B1727AB1C2}"/>
               </a:ext>
             </a:extLst>
           </p:cNvPr>
@@ -313,7 +314,7 @@
           <p:cNvPr id="4" name="Footer Placeholder 3">
             <a:extLst>
               <a:ext uri="{FF2B5EF4-FFF2-40B4-BE49-F238E27FC236}">
-                <a16:creationId xmlns="" xmlns:a16="http://schemas.microsoft.com/office/drawing/2014/main" id="{28A6967E-448F-4887-8FCB-34482EFBCC74}"/>
+                <a16:creationId xmlns:a16="http://schemas.microsoft.com/office/drawing/2014/main" xmlns="" id="{28A6967E-448F-4887-8FCB-34482EFBCC74}"/>
               </a:ext>
             </a:extLst>
           </p:cNvPr>
@@ -363,7 +364,7 @@
           <p:cNvPr id="5" name="Slide Number Placeholder 4">
             <a:extLst>
               <a:ext uri="{FF2B5EF4-FFF2-40B4-BE49-F238E27FC236}">
-                <a16:creationId xmlns="" xmlns:a16="http://schemas.microsoft.com/office/drawing/2014/main" id="{8B6554C2-DDBA-40E2-9536-53A07EC50274}"/>
+                <a16:creationId xmlns:a16="http://schemas.microsoft.com/office/drawing/2014/main" xmlns="" id="{8B6554C2-DDBA-40E2-9536-53A07EC50274}"/>
               </a:ext>
             </a:extLst>
           </p:cNvPr>
@@ -403,7 +404,7 @@
     </p:spTree>
     <p:extLst>
       <p:ext uri="{BB962C8B-B14F-4D97-AF65-F5344CB8AC3E}">
-        <p14:creationId xmlns="" xmlns:p14="http://schemas.microsoft.com/office/powerpoint/2010/main" val="4150602968"/>
+        <p14:creationId xmlns:p14="http://schemas.microsoft.com/office/powerpoint/2010/main" xmlns="" val="4150602968"/>
       </p:ext>
     </p:extLst>
   </p:cSld>
@@ -634,7 +635,7 @@
           <p:cNvPr id="8" name="Footer Placeholder 7">
             <a:extLst>
               <a:ext uri="{FF2B5EF4-FFF2-40B4-BE49-F238E27FC236}">
-                <a16:creationId xmlns="" xmlns:a16="http://schemas.microsoft.com/office/drawing/2014/main" id="{CAC3A49B-3196-44DF-AC28-085C72EFBFF0}"/>
+                <a16:creationId xmlns:a16="http://schemas.microsoft.com/office/drawing/2014/main" xmlns="" id="{CAC3A49B-3196-44DF-AC28-085C72EFBFF0}"/>
               </a:ext>
             </a:extLst>
           </p:cNvPr>
@@ -682,7 +683,7 @@
     </p:spTree>
     <p:extLst>
       <p:ext uri="{BB962C8B-B14F-4D97-AF65-F5344CB8AC3E}">
-        <p14:creationId xmlns="" xmlns:p14="http://schemas.microsoft.com/office/powerpoint/2010/main" val="1530847692"/>
+        <p14:creationId xmlns:p14="http://schemas.microsoft.com/office/powerpoint/2010/main" xmlns="" val="1530847692"/>
       </p:ext>
     </p:extLst>
   </p:cSld>
@@ -829,7 +830,7 @@
           <p:cNvPr id="8" name="Slide Image Placeholder 7">
             <a:extLst>
               <a:ext uri="{FF2B5EF4-FFF2-40B4-BE49-F238E27FC236}">
-                <a16:creationId xmlns="" xmlns:a16="http://schemas.microsoft.com/office/drawing/2014/main" id="{78811095-27E9-49AB-972B-D4E20B3963A6}"/>
+                <a16:creationId xmlns:a16="http://schemas.microsoft.com/office/drawing/2014/main" xmlns="" id="{78811095-27E9-49AB-972B-D4E20B3963A6}"/>
               </a:ext>
             </a:extLst>
           </p:cNvPr>
@@ -847,7 +848,7 @@
           <p:cNvPr id="9" name="Notes Placeholder 8">
             <a:extLst>
               <a:ext uri="{FF2B5EF4-FFF2-40B4-BE49-F238E27FC236}">
-                <a16:creationId xmlns="" xmlns:a16="http://schemas.microsoft.com/office/drawing/2014/main" id="{E923224B-0CC3-475A-8628-8A90751AE61A}"/>
+                <a16:creationId xmlns:a16="http://schemas.microsoft.com/office/drawing/2014/main" xmlns="" id="{E923224B-0CC3-475A-8628-8A90751AE61A}"/>
               </a:ext>
             </a:extLst>
           </p:cNvPr>
@@ -872,7 +873,7 @@
           <p:cNvPr id="2" name="Footer Placeholder 1">
             <a:extLst>
               <a:ext uri="{FF2B5EF4-FFF2-40B4-BE49-F238E27FC236}">
-                <a16:creationId xmlns="" xmlns:a16="http://schemas.microsoft.com/office/drawing/2014/main" id="{3288A3F3-90B1-4930-8D00-5603BDABEF10}"/>
+                <a16:creationId xmlns:a16="http://schemas.microsoft.com/office/drawing/2014/main" xmlns="" id="{3288A3F3-90B1-4930-8D00-5603BDABEF10}"/>
               </a:ext>
             </a:extLst>
           </p:cNvPr>
@@ -908,7 +909,7 @@
     </p:spTree>
     <p:extLst>
       <p:ext uri="{BB962C8B-B14F-4D97-AF65-F5344CB8AC3E}">
-        <p14:creationId xmlns="" xmlns:p14="http://schemas.microsoft.com/office/powerpoint/2010/main" val="2594489433"/>
+        <p14:creationId xmlns:p14="http://schemas.microsoft.com/office/powerpoint/2010/main" xmlns="" val="2594489433"/>
       </p:ext>
     </p:extLst>
   </p:cSld>
@@ -940,7 +941,7 @@
           <p:cNvPr id="14" name="Slide Image Placeholder 13">
             <a:extLst>
               <a:ext uri="{FF2B5EF4-FFF2-40B4-BE49-F238E27FC236}">
-                <a16:creationId xmlns="" xmlns:a16="http://schemas.microsoft.com/office/drawing/2014/main" id="{A1F0B3C6-2E53-4CA3-86D1-53D46EC35267}"/>
+                <a16:creationId xmlns:a16="http://schemas.microsoft.com/office/drawing/2014/main" xmlns="" id="{A1F0B3C6-2E53-4CA3-86D1-53D46EC35267}"/>
               </a:ext>
             </a:extLst>
           </p:cNvPr>
@@ -958,7 +959,7 @@
           <p:cNvPr id="15" name="Notes Placeholder 14">
             <a:extLst>
               <a:ext uri="{FF2B5EF4-FFF2-40B4-BE49-F238E27FC236}">
-                <a16:creationId xmlns="" xmlns:a16="http://schemas.microsoft.com/office/drawing/2014/main" id="{149CC699-A079-49A5-A4D6-73B7F849A7DC}"/>
+                <a16:creationId xmlns:a16="http://schemas.microsoft.com/office/drawing/2014/main" xmlns="" id="{149CC699-A079-49A5-A4D6-73B7F849A7DC}"/>
               </a:ext>
             </a:extLst>
           </p:cNvPr>
@@ -983,7 +984,7 @@
           <p:cNvPr id="19" name="Slide Number Placeholder 5">
             <a:extLst>
               <a:ext uri="{FF2B5EF4-FFF2-40B4-BE49-F238E27FC236}">
-                <a16:creationId xmlns="" xmlns:a16="http://schemas.microsoft.com/office/drawing/2014/main" id="{121F4233-7E9A-40D2-9066-2DB14E2FA5AD}"/>
+                <a16:creationId xmlns:a16="http://schemas.microsoft.com/office/drawing/2014/main" xmlns="" id="{121F4233-7E9A-40D2-9066-2DB14E2FA5AD}"/>
               </a:ext>
             </a:extLst>
           </p:cNvPr>
@@ -1113,7 +1114,7 @@
           <p:cNvPr id="2" name="Footer Placeholder 1">
             <a:extLst>
               <a:ext uri="{FF2B5EF4-FFF2-40B4-BE49-F238E27FC236}">
-                <a16:creationId xmlns="" xmlns:a16="http://schemas.microsoft.com/office/drawing/2014/main" id="{D18F1DFF-B3E7-4ABF-97EE-0BBF3A961EC5}"/>
+                <a16:creationId xmlns:a16="http://schemas.microsoft.com/office/drawing/2014/main" xmlns="" id="{D18F1DFF-B3E7-4ABF-97EE-0BBF3A961EC5}"/>
               </a:ext>
             </a:extLst>
           </p:cNvPr>
@@ -1149,7 +1150,7 @@
     </p:spTree>
     <p:extLst>
       <p:ext uri="{BB962C8B-B14F-4D97-AF65-F5344CB8AC3E}">
-        <p14:creationId xmlns="" xmlns:p14="http://schemas.microsoft.com/office/powerpoint/2010/main" val="4028530743"/>
+        <p14:creationId xmlns:p14="http://schemas.microsoft.com/office/powerpoint/2010/main" xmlns="" val="4028530743"/>
       </p:ext>
     </p:extLst>
   </p:cSld>
@@ -1244,7 +1245,7 @@
           <p:cNvPr id="7" name="Footer Placeholder 5">
             <a:extLst>
               <a:ext uri="{FF2B5EF4-FFF2-40B4-BE49-F238E27FC236}">
-                <a16:creationId xmlns:a16="http://schemas.microsoft.com/office/drawing/2014/main" xmlns="" id="{F163D818-5569-4E6E-9BE9-C6247EB177D4}"/>
+                <a16:creationId xmlns="" xmlns:a16="http://schemas.microsoft.com/office/drawing/2014/main" id="{F163D818-5569-4E6E-9BE9-C6247EB177D4}"/>
               </a:ext>
             </a:extLst>
           </p:cNvPr>
@@ -1292,7 +1293,7 @@
     </p:spTree>
     <p:extLst>
       <p:ext uri="{BB962C8B-B14F-4D97-AF65-F5344CB8AC3E}">
-        <p14:creationId xmlns:p14="http://schemas.microsoft.com/office/powerpoint/2010/main" xmlns="" val="1098138642"/>
+        <p14:creationId xmlns="" xmlns:p14="http://schemas.microsoft.com/office/powerpoint/2010/main" val="1098138642"/>
       </p:ext>
     </p:extLst>
   </p:cSld>
@@ -1470,7 +1471,7 @@
           <p:cNvPr id="7" name="Slide Number Placeholder 5">
             <a:extLst>
               <a:ext uri="{FF2B5EF4-FFF2-40B4-BE49-F238E27FC236}">
-                <a16:creationId xmlns="" xmlns:a16="http://schemas.microsoft.com/office/drawing/2014/main" id="{E65F1CA9-65DC-416B-8882-B3A5E415CE67}"/>
+                <a16:creationId xmlns:a16="http://schemas.microsoft.com/office/drawing/2014/main" xmlns="" id="{E65F1CA9-65DC-416B-8882-B3A5E415CE67}"/>
               </a:ext>
             </a:extLst>
           </p:cNvPr>
@@ -1589,7 +1590,7 @@
             <a:fld id="{3EBA5BD7-F043-4D1B-AA17-CD412FC534DE}" type="slidenum">
               <a:rPr lang="en-US" smtClean="0"/>
               <a:pPr/>
-              <a:t>15</a:t>
+              <a:t>16</a:t>
             </a:fld>
             <a:endParaRPr lang="en-US" dirty="0"/>
           </a:p>
@@ -1600,7 +1601,7 @@
           <p:cNvPr id="4" name="Footer Placeholder 3">
             <a:extLst>
               <a:ext uri="{FF2B5EF4-FFF2-40B4-BE49-F238E27FC236}">
-                <a16:creationId xmlns="" xmlns:a16="http://schemas.microsoft.com/office/drawing/2014/main" id="{C5BD11C3-9FCD-4EAE-876D-E766924FAFF2}"/>
+                <a16:creationId xmlns:a16="http://schemas.microsoft.com/office/drawing/2014/main" xmlns="" id="{C5BD11C3-9FCD-4EAE-876D-E766924FAFF2}"/>
               </a:ext>
             </a:extLst>
           </p:cNvPr>
@@ -1636,7 +1637,7 @@
     </p:spTree>
     <p:extLst>
       <p:ext uri="{BB962C8B-B14F-4D97-AF65-F5344CB8AC3E}">
-        <p14:creationId xmlns="" xmlns:p14="http://schemas.microsoft.com/office/powerpoint/2010/main" val="1860974293"/>
+        <p14:creationId xmlns:p14="http://schemas.microsoft.com/office/powerpoint/2010/main" xmlns="" val="1860974293"/>
       </p:ext>
     </p:extLst>
   </p:cSld>
@@ -1712,7 +1713,7 @@
             <a:fld id="{85C0F205-FB23-4B4A-AA1E-CC80DEDB9B7E}" type="slidenum">
               <a:rPr lang="x-none" smtClean="0"/>
               <a:pPr/>
-              <a:t>16</a:t>
+              <a:t>17</a:t>
             </a:fld>
             <a:endParaRPr lang="x-none"/>
           </a:p>
@@ -1721,7 +1722,7 @@
     </p:spTree>
     <p:extLst>
       <p:ext uri="{BB962C8B-B14F-4D97-AF65-F5344CB8AC3E}">
-        <p14:creationId xmlns="" xmlns:p14="http://schemas.microsoft.com/office/powerpoint/2010/main" val="1201445929"/>
+        <p14:creationId xmlns:p14="http://schemas.microsoft.com/office/powerpoint/2010/main" xmlns="" val="1201445929"/>
       </p:ext>
     </p:extLst>
   </p:cSld>
@@ -1784,7 +1785,7 @@
           <p:cNvPr id="6" name="Slide Number Placeholder 5">
             <a:extLst>
               <a:ext uri="{FF2B5EF4-FFF2-40B4-BE49-F238E27FC236}">
-                <a16:creationId xmlns="" xmlns:a16="http://schemas.microsoft.com/office/drawing/2014/main" id="{6627548A-4D3C-449B-81A5-FA4BE4628490}"/>
+                <a16:creationId xmlns:a16="http://schemas.microsoft.com/office/drawing/2014/main" xmlns="" id="{6627548A-4D3C-449B-81A5-FA4BE4628490}"/>
               </a:ext>
             </a:extLst>
           </p:cNvPr>
@@ -1903,7 +1904,7 @@
             <a:fld id="{3EBA5BD7-F043-4D1B-AA17-CD412FC534DE}" type="slidenum">
               <a:rPr lang="en-US" smtClean="0"/>
               <a:pPr/>
-              <a:t>17</a:t>
+              <a:t>18</a:t>
             </a:fld>
             <a:endParaRPr lang="en-US" dirty="0"/>
           </a:p>
@@ -1914,7 +1915,7 @@
           <p:cNvPr id="4" name="Footer Placeholder 3">
             <a:extLst>
               <a:ext uri="{FF2B5EF4-FFF2-40B4-BE49-F238E27FC236}">
-                <a16:creationId xmlns="" xmlns:a16="http://schemas.microsoft.com/office/drawing/2014/main" id="{D2472CE7-61C1-4B7B-B0C8-5A45F0178717}"/>
+                <a16:creationId xmlns:a16="http://schemas.microsoft.com/office/drawing/2014/main" xmlns="" id="{D2472CE7-61C1-4B7B-B0C8-5A45F0178717}"/>
               </a:ext>
             </a:extLst>
           </p:cNvPr>
@@ -1950,7 +1951,7 @@
     </p:spTree>
     <p:extLst>
       <p:ext uri="{BB962C8B-B14F-4D97-AF65-F5344CB8AC3E}">
-        <p14:creationId xmlns="" xmlns:p14="http://schemas.microsoft.com/office/powerpoint/2010/main" val="729041308"/>
+        <p14:creationId xmlns:p14="http://schemas.microsoft.com/office/powerpoint/2010/main" xmlns="" val="729041308"/>
       </p:ext>
     </p:extLst>
   </p:cSld>
@@ -1982,7 +1983,7 @@
           <p:cNvPr id="16" name="Rectangle Bottom">
             <a:extLst>
               <a:ext uri="{FF2B5EF4-FFF2-40B4-BE49-F238E27FC236}">
-                <a16:creationId xmlns="" xmlns:a16="http://schemas.microsoft.com/office/drawing/2014/main" id="{6854D183-0374-4B3E-B2CE-32F308A81591}"/>
+                <a16:creationId xmlns:a16="http://schemas.microsoft.com/office/drawing/2014/main" xmlns="" id="{6854D183-0374-4B3E-B2CE-32F308A81591}"/>
               </a:ext>
             </a:extLst>
           </p:cNvPr>
@@ -2063,7 +2064,7 @@
           <p:cNvPr id="14" name="Picture Logo SoftUni" descr="SoftUni logo">
             <a:extLst>
               <a:ext uri="{FF2B5EF4-FFF2-40B4-BE49-F238E27FC236}">
-                <a16:creationId xmlns="" xmlns:a16="http://schemas.microsoft.com/office/drawing/2014/main" id="{C4D6B2A2-DFF0-4712-BFEC-6676BEC99FEC}"/>
+                <a16:creationId xmlns:a16="http://schemas.microsoft.com/office/drawing/2014/main" xmlns="" id="{C4D6B2A2-DFF0-4712-BFEC-6676BEC99FEC}"/>
               </a:ext>
             </a:extLst>
           </p:cNvPr>
@@ -2086,7 +2087,7 @@
             </a:clrChange>
             <a:extLst>
               <a:ext uri="{28A0092B-C50C-407E-A947-70E740481C1C}">
-                <a14:useLocalDpi xmlns="" xmlns:a14="http://schemas.microsoft.com/office/drawing/2010/main" val="0"/>
+                <a14:useLocalDpi xmlns:a14="http://schemas.microsoft.com/office/drawing/2010/main" xmlns="" val="0"/>
               </a:ext>
             </a:extLst>
           </a:blip>
@@ -2109,7 +2110,7 @@
           <p:cNvPr id="31" name="Text Placeholder Company Site">
             <a:extLst>
               <a:ext uri="{FF2B5EF4-FFF2-40B4-BE49-F238E27FC236}">
-                <a16:creationId xmlns="" xmlns:a16="http://schemas.microsoft.com/office/drawing/2014/main" id="{3E6B87B7-9D33-4EBB-BD4F-C0436BA3FD72}"/>
+                <a16:creationId xmlns:a16="http://schemas.microsoft.com/office/drawing/2014/main" xmlns="" id="{3E6B87B7-9D33-4EBB-BD4F-C0436BA3FD72}"/>
               </a:ext>
             </a:extLst>
           </p:cNvPr>
@@ -2171,7 +2172,7 @@
           <p:cNvPr id="30" name="Text Placeholder Company Name">
             <a:extLst>
               <a:ext uri="{FF2B5EF4-FFF2-40B4-BE49-F238E27FC236}">
-                <a16:creationId xmlns="" xmlns:a16="http://schemas.microsoft.com/office/drawing/2014/main" id="{2EA92DCA-4DB5-4D03-ACD3-A6A296592D0C}"/>
+                <a16:creationId xmlns:a16="http://schemas.microsoft.com/office/drawing/2014/main" xmlns="" id="{2EA92DCA-4DB5-4D03-ACD3-A6A296592D0C}"/>
               </a:ext>
             </a:extLst>
           </p:cNvPr>
@@ -2233,7 +2234,7 @@
           <p:cNvPr id="35" name="Picture SoftUni Mascot" descr="SoftUni mascot">
             <a:extLst>
               <a:ext uri="{FF2B5EF4-FFF2-40B4-BE49-F238E27FC236}">
-                <a16:creationId xmlns="" xmlns:a16="http://schemas.microsoft.com/office/drawing/2014/main" id="{951E7DA9-C5F0-43D9-B013-3BDF9EEF029D}"/>
+                <a16:creationId xmlns:a16="http://schemas.microsoft.com/office/drawing/2014/main" xmlns="" id="{951E7DA9-C5F0-43D9-B013-3BDF9EEF029D}"/>
               </a:ext>
             </a:extLst>
           </p:cNvPr>
@@ -2246,7 +2247,7 @@
           <a:blip r:embed="rId3" cstate="print">
             <a:extLst>
               <a:ext uri="{28A0092B-C50C-407E-A947-70E740481C1C}">
-                <a14:useLocalDpi xmlns="" xmlns:a14="http://schemas.microsoft.com/office/drawing/2010/main" val="0"/>
+                <a14:useLocalDpi xmlns:a14="http://schemas.microsoft.com/office/drawing/2010/main" xmlns="" val="0"/>
               </a:ext>
             </a:extLst>
           </a:blip>
@@ -2269,7 +2270,7 @@
             <a:hlinkClick r:id="rId4"/>
             <a:extLst>
               <a:ext uri="{FF2B5EF4-FFF2-40B4-BE49-F238E27FC236}">
-                <a16:creationId xmlns="" xmlns:a16="http://schemas.microsoft.com/office/drawing/2014/main" id="{F2315EB3-3FE4-4D3B-921E-5F209CEC13CB}"/>
+                <a16:creationId xmlns:a16="http://schemas.microsoft.com/office/drawing/2014/main" xmlns="" id="{F2315EB3-3FE4-4D3B-921E-5F209CEC13CB}"/>
               </a:ext>
             </a:extLst>
           </p:cNvPr>
@@ -2292,7 +2293,7 @@
             </a:clrChange>
             <a:extLst>
               <a:ext uri="{28A0092B-C50C-407E-A947-70E740481C1C}">
-                <a14:useLocalDpi xmlns="" xmlns:a14="http://schemas.microsoft.com/office/drawing/2010/main" val="0"/>
+                <a14:useLocalDpi xmlns:a14="http://schemas.microsoft.com/office/drawing/2010/main" xmlns="" val="0"/>
               </a:ext>
             </a:extLst>
           </a:blip>
@@ -2315,7 +2316,7 @@
           <p:cNvPr id="40" name="Text Placeholder Author Position">
             <a:extLst>
               <a:ext uri="{FF2B5EF4-FFF2-40B4-BE49-F238E27FC236}">
-                <a16:creationId xmlns="" xmlns:a16="http://schemas.microsoft.com/office/drawing/2014/main" id="{CD940256-851E-46C8-8BFB-A5ECA6C7DA07}"/>
+                <a16:creationId xmlns:a16="http://schemas.microsoft.com/office/drawing/2014/main" xmlns="" id="{CD940256-851E-46C8-8BFB-A5ECA6C7DA07}"/>
               </a:ext>
             </a:extLst>
           </p:cNvPr>
@@ -2375,7 +2376,7 @@
           <p:cNvPr id="36" name="Text Placeholder Author Name">
             <a:extLst>
               <a:ext uri="{FF2B5EF4-FFF2-40B4-BE49-F238E27FC236}">
-                <a16:creationId xmlns="" xmlns:a16="http://schemas.microsoft.com/office/drawing/2014/main" id="{3B21F47B-DE1F-442D-A2B7-6866F8786704}"/>
+                <a16:creationId xmlns:a16="http://schemas.microsoft.com/office/drawing/2014/main" xmlns="" id="{3B21F47B-DE1F-442D-A2B7-6866F8786704}"/>
               </a:ext>
             </a:extLst>
           </p:cNvPr>
@@ -2435,7 +2436,7 @@
           <p:cNvPr id="33" name="Picture Placeholder Title Image">
             <a:extLst>
               <a:ext uri="{FF2B5EF4-FFF2-40B4-BE49-F238E27FC236}">
-                <a16:creationId xmlns="" xmlns:a16="http://schemas.microsoft.com/office/drawing/2014/main" id="{A04D819A-89E2-4714-8C56-1838BF467EF7}"/>
+                <a16:creationId xmlns:a16="http://schemas.microsoft.com/office/drawing/2014/main" xmlns="" id="{A04D819A-89E2-4714-8C56-1838BF467EF7}"/>
               </a:ext>
             </a:extLst>
           </p:cNvPr>
@@ -2477,7 +2478,7 @@
           <p:cNvPr id="43" name="Presentation Subtitle">
             <a:extLst>
               <a:ext uri="{FF2B5EF4-FFF2-40B4-BE49-F238E27FC236}">
-                <a16:creationId xmlns="" xmlns:a16="http://schemas.microsoft.com/office/drawing/2014/main" id="{37BDB812-1395-4B02-ABCF-6A331EEE23E5}"/>
+                <a16:creationId xmlns:a16="http://schemas.microsoft.com/office/drawing/2014/main" xmlns="" id="{37BDB812-1395-4B02-ABCF-6A331EEE23E5}"/>
               </a:ext>
             </a:extLst>
           </p:cNvPr>
@@ -2521,7 +2522,7 @@
           <p:cNvPr id="2" name="Presentation Title">
             <a:extLst>
               <a:ext uri="{FF2B5EF4-FFF2-40B4-BE49-F238E27FC236}">
-                <a16:creationId xmlns="" xmlns:a16="http://schemas.microsoft.com/office/drawing/2014/main" id="{A4DF3AB8-E6E3-4FCE-8A4A-ECD147720A5D}"/>
+                <a16:creationId xmlns:a16="http://schemas.microsoft.com/office/drawing/2014/main" xmlns="" id="{A4DF3AB8-E6E3-4FCE-8A4A-ECD147720A5D}"/>
               </a:ext>
             </a:extLst>
           </p:cNvPr>
@@ -2556,7 +2557,7 @@
     </p:spTree>
     <p:extLst>
       <p:ext uri="{BB962C8B-B14F-4D97-AF65-F5344CB8AC3E}">
-        <p14:creationId xmlns="" xmlns:p14="http://schemas.microsoft.com/office/powerpoint/2010/main" val="970179299"/>
+        <p14:creationId xmlns:p14="http://schemas.microsoft.com/office/powerpoint/2010/main" xmlns="" val="970179299"/>
       </p:ext>
     </p:extLst>
   </p:cSld>
@@ -2564,7 +2565,7 @@
     <a:masterClrMapping/>
   </p:clrMapOvr>
   <mc:AlternateContent xmlns:mc="http://schemas.openxmlformats.org/markup-compatibility/2006">
-    <mc:Choice xmlns="" xmlns:p14="http://schemas.microsoft.com/office/powerpoint/2010/main" Requires="p14">
+    <mc:Choice xmlns:p14="http://schemas.microsoft.com/office/powerpoint/2010/main" xmlns="" Requires="p14">
       <p:transition spd="slow" p14:dur="2000" advClick="0" advTm="5000"/>
     </mc:Choice>
     <mc:Fallback>
@@ -2573,7 +2574,7 @@
   </mc:AlternateContent>
   <p:extLst>
     <p:ext uri="{DCECCB84-F9BA-43D5-87BE-67443E8EF086}">
-      <p15:sldGuideLst xmlns="" xmlns:p15="http://schemas.microsoft.com/office/powerpoint/2012/main">
+      <p15:sldGuideLst xmlns:p15="http://schemas.microsoft.com/office/powerpoint/2012/main" xmlns="">
         <p15:guide id="1" orient="horz" pos="2160">
           <p15:clr>
             <a:srgbClr val="FBAE40"/>
@@ -2612,7 +2613,7 @@
           <p:cNvPr id="15" name="Slide Number">
             <a:extLst>
               <a:ext uri="{FF2B5EF4-FFF2-40B4-BE49-F238E27FC236}">
-                <a16:creationId xmlns="" xmlns:a16="http://schemas.microsoft.com/office/drawing/2014/main" id="{F888EE71-82B3-40F1-A63F-7417422FB4A4}"/>
+                <a16:creationId xmlns:a16="http://schemas.microsoft.com/office/drawing/2014/main" xmlns="" id="{F888EE71-82B3-40F1-A63F-7417422FB4A4}"/>
               </a:ext>
             </a:extLst>
           </p:cNvPr>
@@ -2654,7 +2655,7 @@
           <p:cNvPr id="14" name="Text Placeholder Body">
             <a:extLst>
               <a:ext uri="{FF2B5EF4-FFF2-40B4-BE49-F238E27FC236}">
-                <a16:creationId xmlns="" xmlns:a16="http://schemas.microsoft.com/office/drawing/2014/main" id="{A2ABE920-240F-4CF6-AD45-23ED489FAD6E}"/>
+                <a16:creationId xmlns:a16="http://schemas.microsoft.com/office/drawing/2014/main" xmlns="" id="{A2ABE920-240F-4CF6-AD45-23ED489FAD6E}"/>
               </a:ext>
             </a:extLst>
           </p:cNvPr>
@@ -2960,7 +2961,7 @@
           <p:cNvPr id="10" name="Rectangle Down">
             <a:extLst>
               <a:ext uri="{FF2B5EF4-FFF2-40B4-BE49-F238E27FC236}">
-                <a16:creationId xmlns="" xmlns:a16="http://schemas.microsoft.com/office/drawing/2014/main" id="{E9B994EC-35A8-4A11-98CB-25DC28852F94}"/>
+                <a16:creationId xmlns:a16="http://schemas.microsoft.com/office/drawing/2014/main" xmlns="" id="{E9B994EC-35A8-4A11-98CB-25DC28852F94}"/>
               </a:ext>
             </a:extLst>
           </p:cNvPr>
@@ -3041,7 +3042,7 @@
           <p:cNvPr id="11" name="Rectangle Top">
             <a:extLst>
               <a:ext uri="{FF2B5EF4-FFF2-40B4-BE49-F238E27FC236}">
-                <a16:creationId xmlns="" xmlns:a16="http://schemas.microsoft.com/office/drawing/2014/main" id="{274B8F05-DFCE-47BD-BAFD-DF93E1A63BDD}"/>
+                <a16:creationId xmlns:a16="http://schemas.microsoft.com/office/drawing/2014/main" xmlns="" id="{274B8F05-DFCE-47BD-BAFD-DF93E1A63BDD}"/>
               </a:ext>
             </a:extLst>
           </p:cNvPr>
@@ -3122,7 +3123,7 @@
           <p:cNvPr id="12" name="Logo Software University" descr="Software University logo">
             <a:extLst>
               <a:ext uri="{FF2B5EF4-FFF2-40B4-BE49-F238E27FC236}">
-                <a16:creationId xmlns="" xmlns:a16="http://schemas.microsoft.com/office/drawing/2014/main" id="{233CBB95-791E-4630-B3D9-FADFCE7BCF52}"/>
+                <a16:creationId xmlns:a16="http://schemas.microsoft.com/office/drawing/2014/main" xmlns="" id="{233CBB95-791E-4630-B3D9-FADFCE7BCF52}"/>
               </a:ext>
             </a:extLst>
           </p:cNvPr>
@@ -3135,7 +3136,7 @@
           <a:blip r:embed="rId2" cstate="print">
             <a:extLst>
               <a:ext uri="{28A0092B-C50C-407E-A947-70E740481C1C}">
-                <a14:useLocalDpi xmlns="" xmlns:a14="http://schemas.microsoft.com/office/drawing/2010/main" val="0"/>
+                <a14:useLocalDpi xmlns:a14="http://schemas.microsoft.com/office/drawing/2010/main" xmlns="" val="0"/>
               </a:ext>
             </a:extLst>
           </a:blip>
@@ -3158,7 +3159,7 @@
           <p:cNvPr id="13" name="Slide Title">
             <a:extLst>
               <a:ext uri="{FF2B5EF4-FFF2-40B4-BE49-F238E27FC236}">
-                <a16:creationId xmlns="" xmlns:a16="http://schemas.microsoft.com/office/drawing/2014/main" id="{3F218E34-55D7-4290-BFE4-80F31F941551}"/>
+                <a16:creationId xmlns:a16="http://schemas.microsoft.com/office/drawing/2014/main" xmlns="" id="{3F218E34-55D7-4290-BFE4-80F31F941551}"/>
               </a:ext>
             </a:extLst>
           </p:cNvPr>
@@ -3197,7 +3198,7 @@
     </p:spTree>
     <p:extLst>
       <p:ext uri="{BB962C8B-B14F-4D97-AF65-F5344CB8AC3E}">
-        <p14:creationId xmlns="" xmlns:p14="http://schemas.microsoft.com/office/powerpoint/2010/main" val="3774019400"/>
+        <p14:creationId xmlns:p14="http://schemas.microsoft.com/office/powerpoint/2010/main" xmlns="" val="3774019400"/>
       </p:ext>
     </p:extLst>
   </p:cSld>
@@ -3205,7 +3206,7 @@
     <a:masterClrMapping/>
   </p:clrMapOvr>
   <mc:AlternateContent xmlns:mc="http://schemas.openxmlformats.org/markup-compatibility/2006">
-    <mc:Choice xmlns="" xmlns:p14="http://schemas.microsoft.com/office/powerpoint/2010/main" Requires="p14">
+    <mc:Choice xmlns:p14="http://schemas.microsoft.com/office/powerpoint/2010/main" xmlns="" Requires="p14">
       <p:transition spd="slow" p14:dur="2000" advClick="0" advTm="5000"/>
     </mc:Choice>
     <mc:Fallback>
@@ -3245,7 +3246,7 @@
           <p:cNvPr id="35" name="Rectangle Bottom">
             <a:extLst>
               <a:ext uri="{FF2B5EF4-FFF2-40B4-BE49-F238E27FC236}">
-                <a16:creationId xmlns="" xmlns:a16="http://schemas.microsoft.com/office/drawing/2014/main" id="{550A59F9-9A9D-4956-95B4-F78CC0DB1D59}"/>
+                <a16:creationId xmlns:a16="http://schemas.microsoft.com/office/drawing/2014/main" xmlns="" id="{550A59F9-9A9D-4956-95B4-F78CC0DB1D59}"/>
               </a:ext>
             </a:extLst>
           </p:cNvPr>
@@ -3326,7 +3327,7 @@
           <p:cNvPr id="53" name="Rectangle Bottom Copyright">
             <a:extLst>
               <a:ext uri="{FF2B5EF4-FFF2-40B4-BE49-F238E27FC236}">
-                <a16:creationId xmlns="" xmlns:a16="http://schemas.microsoft.com/office/drawing/2014/main" id="{B07FB7FB-DA6C-4F5D-B068-357F0FCE27D8}"/>
+                <a16:creationId xmlns:a16="http://schemas.microsoft.com/office/drawing/2014/main" xmlns="" id="{B07FB7FB-DA6C-4F5D-B068-357F0FCE27D8}"/>
               </a:ext>
             </a:extLst>
           </p:cNvPr>
@@ -3383,7 +3384,7 @@
                 <a:hlinkClick r:id="rId2">
                   <a:extLst>
                     <a:ext uri="{A12FA001-AC4F-418D-AE19-62706E023703}">
-                      <ahyp:hlinkClr xmlns="" xmlns:ahyp="http://schemas.microsoft.com/office/drawing/2018/hyperlinkcolor" val="tx"/>
+                      <ahyp:hlinkClr xmlns:ahyp="http://schemas.microsoft.com/office/drawing/2018/hyperlinkcolor" xmlns="" val="tx"/>
                     </a:ext>
                   </a:extLst>
                 </a:hlinkClick>
@@ -3419,7 +3420,7 @@
           <p:cNvPr id="26" name="Picture SoftUni Mascot" descr="SoftUni mascot with open hand">
             <a:extLst>
               <a:ext uri="{FF2B5EF4-FFF2-40B4-BE49-F238E27FC236}">
-                <a16:creationId xmlns="" xmlns:a16="http://schemas.microsoft.com/office/drawing/2014/main" id="{247CFF3C-C4FA-493D-8505-DF469F4D36A4}"/>
+                <a16:creationId xmlns:a16="http://schemas.microsoft.com/office/drawing/2014/main" xmlns="" id="{247CFF3C-C4FA-493D-8505-DF469F4D36A4}"/>
               </a:ext>
             </a:extLst>
           </p:cNvPr>
@@ -3432,7 +3433,7 @@
           <a:blip r:embed="rId3" cstate="print">
             <a:extLst>
               <a:ext uri="{28A0092B-C50C-407E-A947-70E740481C1C}">
-                <a14:useLocalDpi xmlns="" xmlns:a14="http://schemas.microsoft.com/office/drawing/2010/main" val="0"/>
+                <a14:useLocalDpi xmlns:a14="http://schemas.microsoft.com/office/drawing/2010/main" xmlns="" val="0"/>
               </a:ext>
             </a:extLst>
           </a:blip>
@@ -3455,7 +3456,7 @@
           <p:cNvPr id="2" name="Group SoftUni Brands">
             <a:extLst>
               <a:ext uri="{FF2B5EF4-FFF2-40B4-BE49-F238E27FC236}">
-                <a16:creationId xmlns="" xmlns:a16="http://schemas.microsoft.com/office/drawing/2014/main" id="{418FAE34-C1F8-46C7-A4AE-F270D1E70F25}"/>
+                <a16:creationId xmlns:a16="http://schemas.microsoft.com/office/drawing/2014/main" xmlns="" id="{418FAE34-C1F8-46C7-A4AE-F270D1E70F25}"/>
               </a:ext>
             </a:extLst>
           </p:cNvPr>
@@ -3475,7 +3476,7 @@
             <p:cNvPr id="24" name="Picture SoftUni Kids Logo" descr="SoftUni Kids logo">
               <a:extLst>
                 <a:ext uri="{FF2B5EF4-FFF2-40B4-BE49-F238E27FC236}">
-                  <a16:creationId xmlns="" xmlns:a16="http://schemas.microsoft.com/office/drawing/2014/main" id="{B0812936-74B6-4265-8C08-AEDC8C798702}"/>
+                  <a16:creationId xmlns:a16="http://schemas.microsoft.com/office/drawing/2014/main" xmlns="" id="{B0812936-74B6-4265-8C08-AEDC8C798702}"/>
                 </a:ext>
               </a:extLst>
             </p:cNvPr>
@@ -3488,7 +3489,7 @@
             <a:blip r:embed="rId4" cstate="print">
               <a:extLst>
                 <a:ext uri="{28A0092B-C50C-407E-A947-70E740481C1C}">
-                  <a14:useLocalDpi xmlns="" xmlns:a14="http://schemas.microsoft.com/office/drawing/2010/main" val="0"/>
+                  <a14:useLocalDpi xmlns:a14="http://schemas.microsoft.com/office/drawing/2010/main" xmlns="" val="0"/>
                 </a:ext>
               </a:extLst>
             </a:blip>
@@ -3511,7 +3512,7 @@
             <p:cNvPr id="23" name="Picture SoftUni Foundation Logo" descr="SoftUni Foundation logo">
               <a:extLst>
                 <a:ext uri="{FF2B5EF4-FFF2-40B4-BE49-F238E27FC236}">
-                  <a16:creationId xmlns="" xmlns:a16="http://schemas.microsoft.com/office/drawing/2014/main" id="{6643F71A-2013-433A-8322-FBAAED3162D8}"/>
+                  <a16:creationId xmlns:a16="http://schemas.microsoft.com/office/drawing/2014/main" xmlns="" id="{6643F71A-2013-433A-8322-FBAAED3162D8}"/>
                 </a:ext>
               </a:extLst>
             </p:cNvPr>
@@ -3524,7 +3525,7 @@
             <a:blip r:embed="rId5" cstate="print">
               <a:extLst>
                 <a:ext uri="{28A0092B-C50C-407E-A947-70E740481C1C}">
-                  <a14:useLocalDpi xmlns="" xmlns:a14="http://schemas.microsoft.com/office/drawing/2010/main" val="0"/>
+                  <a14:useLocalDpi xmlns:a14="http://schemas.microsoft.com/office/drawing/2010/main" xmlns="" val="0"/>
                 </a:ext>
               </a:extLst>
             </a:blip>
@@ -3547,7 +3548,7 @@
             <p:cNvPr id="22" name="Picture SoftUni Digital Logo" descr="SoftUni Digital logo">
               <a:extLst>
                 <a:ext uri="{FF2B5EF4-FFF2-40B4-BE49-F238E27FC236}">
-                  <a16:creationId xmlns="" xmlns:a16="http://schemas.microsoft.com/office/drawing/2014/main" id="{0A83D66F-855B-463B-920B-BF239B01A206}"/>
+                  <a16:creationId xmlns:a16="http://schemas.microsoft.com/office/drawing/2014/main" xmlns="" id="{0A83D66F-855B-463B-920B-BF239B01A206}"/>
                 </a:ext>
               </a:extLst>
             </p:cNvPr>
@@ -3560,7 +3561,7 @@
             <a:blip r:embed="rId6" cstate="print">
               <a:extLst>
                 <a:ext uri="{28A0092B-C50C-407E-A947-70E740481C1C}">
-                  <a14:useLocalDpi xmlns="" xmlns:a14="http://schemas.microsoft.com/office/drawing/2010/main" val="0"/>
+                  <a14:useLocalDpi xmlns:a14="http://schemas.microsoft.com/office/drawing/2010/main" xmlns="" val="0"/>
                 </a:ext>
               </a:extLst>
             </a:blip>
@@ -3583,7 +3584,7 @@
             <p:cNvPr id="21" name="Picture SoftUni Creative Logo" descr="SoftUni Creative logo">
               <a:extLst>
                 <a:ext uri="{FF2B5EF4-FFF2-40B4-BE49-F238E27FC236}">
-                  <a16:creationId xmlns="" xmlns:a16="http://schemas.microsoft.com/office/drawing/2014/main" id="{EA755AAE-BA08-481C-9224-0061170EE4B8}"/>
+                  <a16:creationId xmlns:a16="http://schemas.microsoft.com/office/drawing/2014/main" xmlns="" id="{EA755AAE-BA08-481C-9224-0061170EE4B8}"/>
                 </a:ext>
               </a:extLst>
             </p:cNvPr>
@@ -3596,7 +3597,7 @@
             <a:blip r:embed="rId7" cstate="print">
               <a:extLst>
                 <a:ext uri="{28A0092B-C50C-407E-A947-70E740481C1C}">
-                  <a14:useLocalDpi xmlns="" xmlns:a14="http://schemas.microsoft.com/office/drawing/2010/main" val="0"/>
+                  <a14:useLocalDpi xmlns:a14="http://schemas.microsoft.com/office/drawing/2010/main" xmlns="" val="0"/>
                 </a:ext>
               </a:extLst>
             </a:blip>
@@ -3619,7 +3620,7 @@
             <p:cNvPr id="20" name="Picture SoftUni Svetlina Logo" descr="SoftUni Svetlina logo">
               <a:extLst>
                 <a:ext uri="{FF2B5EF4-FFF2-40B4-BE49-F238E27FC236}">
-                  <a16:creationId xmlns="" xmlns:a16="http://schemas.microsoft.com/office/drawing/2014/main" id="{827D15FD-4C66-4B85-98E6-7826AA8F61C6}"/>
+                  <a16:creationId xmlns:a16="http://schemas.microsoft.com/office/drawing/2014/main" xmlns="" id="{827D15FD-4C66-4B85-98E6-7826AA8F61C6}"/>
                 </a:ext>
               </a:extLst>
             </p:cNvPr>
@@ -3632,7 +3633,7 @@
             <a:blip r:embed="rId8" cstate="print">
               <a:extLst>
                 <a:ext uri="{28A0092B-C50C-407E-A947-70E740481C1C}">
-                  <a14:useLocalDpi xmlns="" xmlns:a14="http://schemas.microsoft.com/office/drawing/2010/main" val="0"/>
+                  <a14:useLocalDpi xmlns:a14="http://schemas.microsoft.com/office/drawing/2010/main" xmlns="" val="0"/>
                 </a:ext>
               </a:extLst>
             </a:blip>
@@ -3655,7 +3656,7 @@
             <p:cNvPr id="25" name="Picture Software University Logo" descr="Software University logo">
               <a:extLst>
                 <a:ext uri="{FF2B5EF4-FFF2-40B4-BE49-F238E27FC236}">
-                  <a16:creationId xmlns="" xmlns:a16="http://schemas.microsoft.com/office/drawing/2014/main" id="{C74C190C-5856-41B9-8819-AE8DE0E10980}"/>
+                  <a16:creationId xmlns:a16="http://schemas.microsoft.com/office/drawing/2014/main" xmlns="" id="{C74C190C-5856-41B9-8819-AE8DE0E10980}"/>
                 </a:ext>
               </a:extLst>
             </p:cNvPr>
@@ -3668,7 +3669,7 @@
             <a:blip r:embed="rId9" cstate="print">
               <a:extLst>
                 <a:ext uri="{28A0092B-C50C-407E-A947-70E740481C1C}">
-                  <a14:useLocalDpi xmlns="" xmlns:a14="http://schemas.microsoft.com/office/drawing/2010/main" val="0"/>
+                  <a14:useLocalDpi xmlns:a14="http://schemas.microsoft.com/office/drawing/2010/main" xmlns="" val="0"/>
                 </a:ext>
               </a:extLst>
             </a:blip>
@@ -3691,7 +3692,7 @@
             <p:cNvPr id="33" name="Straight Connector 6">
               <a:extLst>
                 <a:ext uri="{FF2B5EF4-FFF2-40B4-BE49-F238E27FC236}">
-                  <a16:creationId xmlns="" xmlns:a16="http://schemas.microsoft.com/office/drawing/2014/main" id="{5C63D1E8-4A92-4691-8A24-A2FC7E8008E5}"/>
+                  <a16:creationId xmlns:a16="http://schemas.microsoft.com/office/drawing/2014/main" xmlns="" id="{5C63D1E8-4A92-4691-8A24-A2FC7E8008E5}"/>
                 </a:ext>
               </a:extLst>
             </p:cNvPr>
@@ -3730,7 +3731,7 @@
             <p:cNvPr id="32" name="Straight Connector 5">
               <a:extLst>
                 <a:ext uri="{FF2B5EF4-FFF2-40B4-BE49-F238E27FC236}">
-                  <a16:creationId xmlns="" xmlns:a16="http://schemas.microsoft.com/office/drawing/2014/main" id="{6E91D320-3732-40B8-864D-142D0A277ED1}"/>
+                  <a16:creationId xmlns:a16="http://schemas.microsoft.com/office/drawing/2014/main" xmlns="" id="{6E91D320-3732-40B8-864D-142D0A277ED1}"/>
                 </a:ext>
               </a:extLst>
             </p:cNvPr>
@@ -3769,7 +3770,7 @@
             <p:cNvPr id="31" name="Straight Connector 4">
               <a:extLst>
                 <a:ext uri="{FF2B5EF4-FFF2-40B4-BE49-F238E27FC236}">
-                  <a16:creationId xmlns="" xmlns:a16="http://schemas.microsoft.com/office/drawing/2014/main" id="{299ABE09-E33C-46B7-A80D-7BF4A6956211}"/>
+                  <a16:creationId xmlns:a16="http://schemas.microsoft.com/office/drawing/2014/main" xmlns="" id="{299ABE09-E33C-46B7-A80D-7BF4A6956211}"/>
                 </a:ext>
               </a:extLst>
             </p:cNvPr>
@@ -3806,7 +3807,7 @@
             <p:cNvPr id="30" name="Straight Connector 3">
               <a:extLst>
                 <a:ext uri="{FF2B5EF4-FFF2-40B4-BE49-F238E27FC236}">
-                  <a16:creationId xmlns="" xmlns:a16="http://schemas.microsoft.com/office/drawing/2014/main" id="{93DDBF37-0764-47AA-94E3-9A44F3ED8FB5}"/>
+                  <a16:creationId xmlns:a16="http://schemas.microsoft.com/office/drawing/2014/main" xmlns="" id="{93DDBF37-0764-47AA-94E3-9A44F3ED8FB5}"/>
                 </a:ext>
               </a:extLst>
             </p:cNvPr>
@@ -3843,7 +3844,7 @@
             <p:cNvPr id="29" name="Straight Connector 2">
               <a:extLst>
                 <a:ext uri="{FF2B5EF4-FFF2-40B4-BE49-F238E27FC236}">
-                  <a16:creationId xmlns="" xmlns:a16="http://schemas.microsoft.com/office/drawing/2014/main" id="{72BFE2F3-0845-4E5B-9375-E9D4027DD675}"/>
+                  <a16:creationId xmlns:a16="http://schemas.microsoft.com/office/drawing/2014/main" xmlns="" id="{72BFE2F3-0845-4E5B-9375-E9D4027DD675}"/>
                 </a:ext>
               </a:extLst>
             </p:cNvPr>
@@ -3880,7 +3881,7 @@
             <p:cNvPr id="28" name="Straight Connector 1">
               <a:extLst>
                 <a:ext uri="{FF2B5EF4-FFF2-40B4-BE49-F238E27FC236}">
-                  <a16:creationId xmlns="" xmlns:a16="http://schemas.microsoft.com/office/drawing/2014/main" id="{D4E5982E-3110-47E1-A5BB-91B7BECC3093}"/>
+                  <a16:creationId xmlns:a16="http://schemas.microsoft.com/office/drawing/2014/main" xmlns="" id="{D4E5982E-3110-47E1-A5BB-91B7BECC3093}"/>
                 </a:ext>
               </a:extLst>
             </p:cNvPr>
@@ -3917,7 +3918,7 @@
             <p:cNvPr id="27" name="Straight Connector Horizontal">
               <a:extLst>
                 <a:ext uri="{FF2B5EF4-FFF2-40B4-BE49-F238E27FC236}">
-                  <a16:creationId xmlns="" xmlns:a16="http://schemas.microsoft.com/office/drawing/2014/main" id="{5F62FB7C-BD6E-4383-98C1-2CF30F34CAFD}"/>
+                  <a16:creationId xmlns:a16="http://schemas.microsoft.com/office/drawing/2014/main" xmlns="" id="{5F62FB7C-BD6E-4383-98C1-2CF30F34CAFD}"/>
                 </a:ext>
               </a:extLst>
             </p:cNvPr>
@@ -3956,7 +3957,7 @@
             <p:cNvPr id="34" name="Straight Connector 0">
               <a:extLst>
                 <a:ext uri="{FF2B5EF4-FFF2-40B4-BE49-F238E27FC236}">
-                  <a16:creationId xmlns="" xmlns:a16="http://schemas.microsoft.com/office/drawing/2014/main" id="{C84A0FE1-723D-4682-8682-77BAD950EE15}"/>
+                  <a16:creationId xmlns:a16="http://schemas.microsoft.com/office/drawing/2014/main" xmlns="" id="{C84A0FE1-723D-4682-8682-77BAD950EE15}"/>
                 </a:ext>
               </a:extLst>
             </p:cNvPr>
@@ -3993,7 +3994,7 @@
             <p:cNvPr id="18" name="Picture SoftUni Logo" descr="SoftUni logo">
               <a:extLst>
                 <a:ext uri="{FF2B5EF4-FFF2-40B4-BE49-F238E27FC236}">
-                  <a16:creationId xmlns="" xmlns:a16="http://schemas.microsoft.com/office/drawing/2014/main" id="{A0675455-B7FA-4569-A5FD-A3B0F20B2A26}"/>
+                  <a16:creationId xmlns:a16="http://schemas.microsoft.com/office/drawing/2014/main" xmlns="" id="{A0675455-B7FA-4569-A5FD-A3B0F20B2A26}"/>
                 </a:ext>
               </a:extLst>
             </p:cNvPr>
@@ -4006,7 +4007,7 @@
             <a:blip r:embed="rId10" cstate="print">
               <a:extLst>
                 <a:ext uri="{28A0092B-C50C-407E-A947-70E740481C1C}">
-                  <a14:useLocalDpi xmlns="" xmlns:a14="http://schemas.microsoft.com/office/drawing/2010/main" val="0"/>
+                  <a14:useLocalDpi xmlns:a14="http://schemas.microsoft.com/office/drawing/2010/main" xmlns="" val="0"/>
                 </a:ext>
               </a:extLst>
             </a:blip>
@@ -4030,7 +4031,7 @@
           <p:cNvPr id="19" name="Slide Title">
             <a:extLst>
               <a:ext uri="{FF2B5EF4-FFF2-40B4-BE49-F238E27FC236}">
-                <a16:creationId xmlns="" xmlns:a16="http://schemas.microsoft.com/office/drawing/2014/main" id="{7CFDBB16-985C-4CC7-B6DB-B81B36037922}"/>
+                <a16:creationId xmlns:a16="http://schemas.microsoft.com/office/drawing/2014/main" xmlns="" id="{7CFDBB16-985C-4CC7-B6DB-B81B36037922}"/>
               </a:ext>
             </a:extLst>
           </p:cNvPr>
@@ -4133,7 +4134,7 @@
           <p:cNvPr id="36" name="Logo Software University" descr="Software University logo">
             <a:extLst>
               <a:ext uri="{FF2B5EF4-FFF2-40B4-BE49-F238E27FC236}">
-                <a16:creationId xmlns="" xmlns:a16="http://schemas.microsoft.com/office/drawing/2014/main" id="{67FC4D2E-913D-432A-B658-F0D82839FA5E}"/>
+                <a16:creationId xmlns:a16="http://schemas.microsoft.com/office/drawing/2014/main" xmlns="" id="{67FC4D2E-913D-432A-B658-F0D82839FA5E}"/>
               </a:ext>
             </a:extLst>
           </p:cNvPr>
@@ -4156,7 +4157,7 @@
             </a:clrChange>
             <a:extLst>
               <a:ext uri="{28A0092B-C50C-407E-A947-70E740481C1C}">
-                <a14:useLocalDpi xmlns="" xmlns:a14="http://schemas.microsoft.com/office/drawing/2010/main" val="0"/>
+                <a14:useLocalDpi xmlns:a14="http://schemas.microsoft.com/office/drawing/2010/main" xmlns="" val="0"/>
               </a:ext>
             </a:extLst>
           </a:blip>
@@ -4177,7 +4178,7 @@
     </p:spTree>
     <p:extLst>
       <p:ext uri="{BB962C8B-B14F-4D97-AF65-F5344CB8AC3E}">
-        <p14:creationId xmlns="" xmlns:p14="http://schemas.microsoft.com/office/powerpoint/2010/main" val="4192061223"/>
+        <p14:creationId xmlns:p14="http://schemas.microsoft.com/office/powerpoint/2010/main" xmlns="" val="4192061223"/>
       </p:ext>
     </p:extLst>
   </p:cSld>
@@ -4185,7 +4186,7 @@
     <a:masterClrMapping/>
   </p:clrMapOvr>
   <mc:AlternateContent xmlns:mc="http://schemas.openxmlformats.org/markup-compatibility/2006">
-    <mc:Choice xmlns="" xmlns:p14="http://schemas.microsoft.com/office/powerpoint/2010/main" Requires="p14">
+    <mc:Choice xmlns:p14="http://schemas.microsoft.com/office/powerpoint/2010/main" xmlns="" Requires="p14">
       <p:transition spd="slow" p14:dur="2000" advClick="0" advTm="5000"/>
     </mc:Choice>
     <mc:Fallback>
@@ -4194,7 +4195,7 @@
   </mc:AlternateContent>
   <p:extLst>
     <p:ext uri="{DCECCB84-F9BA-43D5-87BE-67443E8EF086}">
-      <p15:sldGuideLst xmlns="" xmlns:p15="http://schemas.microsoft.com/office/powerpoint/2012/main">
+      <p15:sldGuideLst xmlns:p15="http://schemas.microsoft.com/office/powerpoint/2012/main" xmlns="">
         <p15:guide id="1" orient="horz" pos="2160">
           <p15:clr>
             <a:srgbClr val="FBAE40"/>
@@ -4233,7 +4234,7 @@
           <p:cNvPr id="13" name="Slide Number">
             <a:extLst>
               <a:ext uri="{FF2B5EF4-FFF2-40B4-BE49-F238E27FC236}">
-                <a16:creationId xmlns="" xmlns:a16="http://schemas.microsoft.com/office/drawing/2014/main" id="{5B8761D8-B42F-4A70-A0CE-682CEB2AE31B}"/>
+                <a16:creationId xmlns:a16="http://schemas.microsoft.com/office/drawing/2014/main" xmlns="" id="{5B8761D8-B42F-4A70-A0CE-682CEB2AE31B}"/>
               </a:ext>
             </a:extLst>
           </p:cNvPr>
@@ -4276,7 +4277,7 @@
             <a:hlinkClick r:id="rId2" tooltip="Software University Discussion Forum"/>
             <a:extLst>
               <a:ext uri="{FF2B5EF4-FFF2-40B4-BE49-F238E27FC236}">
-                <a16:creationId xmlns="" xmlns:a16="http://schemas.microsoft.com/office/drawing/2014/main" id="{98C579AD-FAF5-4B28-9B52-5457F1E90061}"/>
+                <a16:creationId xmlns:a16="http://schemas.microsoft.com/office/drawing/2014/main" xmlns="" id="{98C579AD-FAF5-4B28-9B52-5457F1E90061}"/>
               </a:ext>
             </a:extLst>
           </p:cNvPr>
@@ -4289,7 +4290,7 @@
           <a:blip r:embed="rId3" cstate="print">
             <a:extLst>
               <a:ext uri="{28A0092B-C50C-407E-A947-70E740481C1C}">
-                <a14:useLocalDpi xmlns="" xmlns:a14="http://schemas.microsoft.com/office/drawing/2010/main"/>
+                <a14:useLocalDpi xmlns:a14="http://schemas.microsoft.com/office/drawing/2010/main" xmlns=""/>
               </a:ext>
             </a:extLst>
           </a:blip>
@@ -4313,7 +4314,7 @@
             <a:hlinkClick r:id="rId4" tooltip="Software University @ Facebook"/>
             <a:extLst>
               <a:ext uri="{FF2B5EF4-FFF2-40B4-BE49-F238E27FC236}">
-                <a16:creationId xmlns="" xmlns:a16="http://schemas.microsoft.com/office/drawing/2014/main" id="{6B2C510E-5EF2-49F6-B926-2BD74CD3C7F8}"/>
+                <a16:creationId xmlns:a16="http://schemas.microsoft.com/office/drawing/2014/main" xmlns="" id="{6B2C510E-5EF2-49F6-B926-2BD74CD3C7F8}"/>
               </a:ext>
             </a:extLst>
           </p:cNvPr>
@@ -4326,7 +4327,7 @@
           <a:blip r:embed="rId5" cstate="print">
             <a:extLst>
               <a:ext uri="{28A0092B-C50C-407E-A947-70E740481C1C}">
-                <a14:useLocalDpi xmlns="" xmlns:a14="http://schemas.microsoft.com/office/drawing/2010/main"/>
+                <a14:useLocalDpi xmlns:a14="http://schemas.microsoft.com/office/drawing/2010/main" xmlns=""/>
               </a:ext>
             </a:extLst>
           </a:blip>
@@ -4344,7 +4345,7 @@
           <a:noFill/>
           <a:extLst>
             <a:ext uri="{909E8E84-426E-40DD-AFC4-6F175D3DCCD1}">
-              <a14:hiddenFill xmlns="" xmlns:a14="http://schemas.microsoft.com/office/drawing/2010/main">
+              <a14:hiddenFill xmlns:a14="http://schemas.microsoft.com/office/drawing/2010/main" xmlns="">
                 <a:solidFill>
                   <a:srgbClr val="FFFFFF"/>
                 </a:solidFill>
@@ -4359,7 +4360,7 @@
             <a:hlinkClick r:id="rId6"/>
             <a:extLst>
               <a:ext uri="{FF2B5EF4-FFF2-40B4-BE49-F238E27FC236}">
-                <a16:creationId xmlns="" xmlns:a16="http://schemas.microsoft.com/office/drawing/2014/main" id="{F4604840-E810-44B7-9FF1-3B28CD68B758}"/>
+                <a16:creationId xmlns:a16="http://schemas.microsoft.com/office/drawing/2014/main" xmlns="" id="{F4604840-E810-44B7-9FF1-3B28CD68B758}"/>
               </a:ext>
             </a:extLst>
           </p:cNvPr>
@@ -4372,7 +4373,7 @@
           <a:blip r:embed="rId7" cstate="print">
             <a:extLst>
               <a:ext uri="{28A0092B-C50C-407E-A947-70E740481C1C}">
-                <a14:useLocalDpi xmlns="" xmlns:a14="http://schemas.microsoft.com/office/drawing/2010/main" val="0"/>
+                <a14:useLocalDpi xmlns:a14="http://schemas.microsoft.com/office/drawing/2010/main" xmlns="" val="0"/>
               </a:ext>
             </a:extLst>
           </a:blip>
@@ -4396,7 +4397,7 @@
             <a:hlinkClick r:id="rId8"/>
             <a:extLst>
               <a:ext uri="{FF2B5EF4-FFF2-40B4-BE49-F238E27FC236}">
-                <a16:creationId xmlns="" xmlns:a16="http://schemas.microsoft.com/office/drawing/2014/main" id="{07C965FA-A87E-4824-AFA8-C67AF548A76A}"/>
+                <a16:creationId xmlns:a16="http://schemas.microsoft.com/office/drawing/2014/main" xmlns="" id="{07C965FA-A87E-4824-AFA8-C67AF548A76A}"/>
               </a:ext>
             </a:extLst>
           </p:cNvPr>
@@ -4409,7 +4410,7 @@
           <a:blip r:embed="rId9" cstate="print">
             <a:extLst>
               <a:ext uri="{28A0092B-C50C-407E-A947-70E740481C1C}">
-                <a14:useLocalDpi xmlns="" xmlns:a14="http://schemas.microsoft.com/office/drawing/2010/main" val="0"/>
+                <a14:useLocalDpi xmlns:a14="http://schemas.microsoft.com/office/drawing/2010/main" xmlns="" val="0"/>
               </a:ext>
             </a:extLst>
           </a:blip>
@@ -4431,7 +4432,7 @@
           <p:cNvPr id="12" name="Slide Body Text">
             <a:extLst>
               <a:ext uri="{FF2B5EF4-FFF2-40B4-BE49-F238E27FC236}">
-                <a16:creationId xmlns="" xmlns:a16="http://schemas.microsoft.com/office/drawing/2014/main" id="{0C1F9416-8B6E-46DE-973C-777785E27A26}"/>
+                <a16:creationId xmlns:a16="http://schemas.microsoft.com/office/drawing/2014/main" xmlns="" id="{0C1F9416-8B6E-46DE-973C-777785E27A26}"/>
               </a:ext>
             </a:extLst>
           </p:cNvPr>
@@ -4556,7 +4557,7 @@
           <p:cNvPr id="10" name="Rectangle Top">
             <a:extLst>
               <a:ext uri="{FF2B5EF4-FFF2-40B4-BE49-F238E27FC236}">
-                <a16:creationId xmlns="" xmlns:a16="http://schemas.microsoft.com/office/drawing/2014/main" id="{86646B95-5E3B-4DE8-9118-031C2C296D8C}"/>
+                <a16:creationId xmlns:a16="http://schemas.microsoft.com/office/drawing/2014/main" xmlns="" id="{86646B95-5E3B-4DE8-9118-031C2C296D8C}"/>
               </a:ext>
             </a:extLst>
           </p:cNvPr>
@@ -4637,7 +4638,7 @@
           <p:cNvPr id="11" name="Logo Software University" descr="Software University logo">
             <a:extLst>
               <a:ext uri="{FF2B5EF4-FFF2-40B4-BE49-F238E27FC236}">
-                <a16:creationId xmlns="" xmlns:a16="http://schemas.microsoft.com/office/drawing/2014/main" id="{58AB1944-B146-4E89-B2D9-426EB610F319}"/>
+                <a16:creationId xmlns:a16="http://schemas.microsoft.com/office/drawing/2014/main" xmlns="" id="{58AB1944-B146-4E89-B2D9-426EB610F319}"/>
               </a:ext>
             </a:extLst>
           </p:cNvPr>
@@ -4650,7 +4651,7 @@
           <a:blip r:embed="rId11" cstate="print">
             <a:extLst>
               <a:ext uri="{28A0092B-C50C-407E-A947-70E740481C1C}">
-                <a14:useLocalDpi xmlns="" xmlns:a14="http://schemas.microsoft.com/office/drawing/2010/main" val="0"/>
+                <a14:useLocalDpi xmlns:a14="http://schemas.microsoft.com/office/drawing/2010/main" xmlns="" val="0"/>
               </a:ext>
             </a:extLst>
           </a:blip>
@@ -4673,7 +4674,7 @@
           <p:cNvPr id="18" name="Slide Title">
             <a:extLst>
               <a:ext uri="{FF2B5EF4-FFF2-40B4-BE49-F238E27FC236}">
-                <a16:creationId xmlns="" xmlns:a16="http://schemas.microsoft.com/office/drawing/2014/main" id="{AE87ED9C-76E1-4D85-9B06-3AF44AABB668}"/>
+                <a16:creationId xmlns:a16="http://schemas.microsoft.com/office/drawing/2014/main" xmlns="" id="{AE87ED9C-76E1-4D85-9B06-3AF44AABB668}"/>
               </a:ext>
             </a:extLst>
           </p:cNvPr>
@@ -4712,7 +4713,7 @@
     </p:spTree>
     <p:extLst>
       <p:ext uri="{BB962C8B-B14F-4D97-AF65-F5344CB8AC3E}">
-        <p14:creationId xmlns="" xmlns:p14="http://schemas.microsoft.com/office/powerpoint/2010/main" val="2196466322"/>
+        <p14:creationId xmlns:p14="http://schemas.microsoft.com/office/powerpoint/2010/main" xmlns="" val="2196466322"/>
       </p:ext>
     </p:extLst>
   </p:cSld>
@@ -4720,7 +4721,7 @@
     <a:masterClrMapping/>
   </p:clrMapOvr>
   <mc:AlternateContent xmlns:mc="http://schemas.openxmlformats.org/markup-compatibility/2006">
-    <mc:Choice xmlns="" xmlns:p14="http://schemas.microsoft.com/office/powerpoint/2010/main" Requires="p14">
+    <mc:Choice xmlns:p14="http://schemas.microsoft.com/office/powerpoint/2010/main" xmlns="" Requires="p14">
       <p:transition spd="slow" p14:dur="2000" advClick="0" advTm="5000"/>
     </mc:Choice>
     <mc:Fallback>
@@ -4752,7 +4753,7 @@
           <p:cNvPr id="9" name="Oval Center Icon">
             <a:extLst>
               <a:ext uri="{FF2B5EF4-FFF2-40B4-BE49-F238E27FC236}">
-                <a16:creationId xmlns="" xmlns:a16="http://schemas.microsoft.com/office/drawing/2014/main" id="{13B9A8FE-2718-4F2C-98D4-CBF86AD69D58}"/>
+                <a16:creationId xmlns:a16="http://schemas.microsoft.com/office/drawing/2014/main" xmlns="" id="{13B9A8FE-2718-4F2C-98D4-CBF86AD69D58}"/>
               </a:ext>
             </a:extLst>
           </p:cNvPr>
@@ -4833,7 +4834,7 @@
           <p:cNvPr id="8" name="Slide Subtitle">
             <a:extLst>
               <a:ext uri="{FF2B5EF4-FFF2-40B4-BE49-F238E27FC236}">
-                <a16:creationId xmlns="" xmlns:a16="http://schemas.microsoft.com/office/drawing/2014/main" id="{588387B4-E99E-4145-9D1D-F17CA5190DFD}"/>
+                <a16:creationId xmlns:a16="http://schemas.microsoft.com/office/drawing/2014/main" xmlns="" id="{588387B4-E99E-4145-9D1D-F17CA5190DFD}"/>
               </a:ext>
             </a:extLst>
           </p:cNvPr>
@@ -4883,7 +4884,7 @@
           <p:cNvPr id="13" name="Slide Title">
             <a:extLst>
               <a:ext uri="{FF2B5EF4-FFF2-40B4-BE49-F238E27FC236}">
-                <a16:creationId xmlns="" xmlns:a16="http://schemas.microsoft.com/office/drawing/2014/main" id="{8A28C56F-AE84-49D0-9AD1-1F0CEEABF710}"/>
+                <a16:creationId xmlns:a16="http://schemas.microsoft.com/office/drawing/2014/main" xmlns="" id="{8A28C56F-AE84-49D0-9AD1-1F0CEEABF710}"/>
               </a:ext>
             </a:extLst>
           </p:cNvPr>
@@ -4928,7 +4929,7 @@
     </p:spTree>
     <p:extLst>
       <p:ext uri="{BB962C8B-B14F-4D97-AF65-F5344CB8AC3E}">
-        <p14:creationId xmlns="" xmlns:p14="http://schemas.microsoft.com/office/powerpoint/2010/main" val="475389923"/>
+        <p14:creationId xmlns:p14="http://schemas.microsoft.com/office/powerpoint/2010/main" xmlns="" val="475389923"/>
       </p:ext>
     </p:extLst>
   </p:cSld>
@@ -4936,7 +4937,7 @@
     <a:masterClrMapping/>
   </p:clrMapOvr>
   <mc:AlternateContent xmlns:mc="http://schemas.openxmlformats.org/markup-compatibility/2006">
-    <mc:Choice xmlns="" xmlns:p14="http://schemas.microsoft.com/office/powerpoint/2010/main" Requires="p14">
+    <mc:Choice xmlns:p14="http://schemas.microsoft.com/office/powerpoint/2010/main" xmlns="" Requires="p14">
       <p:transition spd="slow" p14:dur="2000" advClick="0" advTm="5000"/>
     </mc:Choice>
     <mc:Fallback>
@@ -4969,7 +4970,7 @@
           <p:cNvPr id="2" name="Title 1">
             <a:extLst>
               <a:ext uri="{FF2B5EF4-FFF2-40B4-BE49-F238E27FC236}">
-                <a16:creationId xmlns="" xmlns:a16="http://schemas.microsoft.com/office/drawing/2014/main" id="{5213C145-EA12-94EF-AA17-5F628EA0AD2D}"/>
+                <a16:creationId xmlns:a16="http://schemas.microsoft.com/office/drawing/2014/main" xmlns="" id="{5213C145-EA12-94EF-AA17-5F628EA0AD2D}"/>
               </a:ext>
             </a:extLst>
           </p:cNvPr>
@@ -5007,7 +5008,7 @@
           <p:cNvPr id="3" name="Subtitle 2">
             <a:extLst>
               <a:ext uri="{FF2B5EF4-FFF2-40B4-BE49-F238E27FC236}">
-                <a16:creationId xmlns="" xmlns:a16="http://schemas.microsoft.com/office/drawing/2014/main" id="{5F55E72E-5B45-B6EE-75AE-03B188AD9A08}"/>
+                <a16:creationId xmlns:a16="http://schemas.microsoft.com/office/drawing/2014/main" xmlns="" id="{5F55E72E-5B45-B6EE-75AE-03B188AD9A08}"/>
               </a:ext>
             </a:extLst>
           </p:cNvPr>
@@ -5078,7 +5079,7 @@
           <p:cNvPr id="4" name="Date Placeholder 3">
             <a:extLst>
               <a:ext uri="{FF2B5EF4-FFF2-40B4-BE49-F238E27FC236}">
-                <a16:creationId xmlns="" xmlns:a16="http://schemas.microsoft.com/office/drawing/2014/main" id="{30C6A8EA-0240-01AB-A7C2-BD1CD885E1C1}"/>
+                <a16:creationId xmlns:a16="http://schemas.microsoft.com/office/drawing/2014/main" xmlns="" id="{30C6A8EA-0240-01AB-A7C2-BD1CD885E1C1}"/>
               </a:ext>
             </a:extLst>
           </p:cNvPr>
@@ -5108,7 +5109,7 @@
           <p:cNvPr id="5" name="Footer Placeholder 4">
             <a:extLst>
               <a:ext uri="{FF2B5EF4-FFF2-40B4-BE49-F238E27FC236}">
-                <a16:creationId xmlns="" xmlns:a16="http://schemas.microsoft.com/office/drawing/2014/main" id="{F95CBF96-4249-1541-E44E-FBCECA233B3C}"/>
+                <a16:creationId xmlns:a16="http://schemas.microsoft.com/office/drawing/2014/main" xmlns="" id="{F95CBF96-4249-1541-E44E-FBCECA233B3C}"/>
               </a:ext>
             </a:extLst>
           </p:cNvPr>
@@ -5133,7 +5134,7 @@
           <p:cNvPr id="6" name="Slide Number Placeholder 5">
             <a:extLst>
               <a:ext uri="{FF2B5EF4-FFF2-40B4-BE49-F238E27FC236}">
-                <a16:creationId xmlns="" xmlns:a16="http://schemas.microsoft.com/office/drawing/2014/main" id="{7ACB54F2-814F-F79B-8CD7-FA3133365CBC}"/>
+                <a16:creationId xmlns:a16="http://schemas.microsoft.com/office/drawing/2014/main" xmlns="" id="{7ACB54F2-814F-F79B-8CD7-FA3133365CBC}"/>
               </a:ext>
             </a:extLst>
           </p:cNvPr>
@@ -5161,7 +5162,7 @@
     </p:spTree>
     <p:extLst>
       <p:ext uri="{BB962C8B-B14F-4D97-AF65-F5344CB8AC3E}">
-        <p14:creationId xmlns="" xmlns:p14="http://schemas.microsoft.com/office/powerpoint/2010/main" val="2773863354"/>
+        <p14:creationId xmlns:p14="http://schemas.microsoft.com/office/powerpoint/2010/main" xmlns="" val="2773863354"/>
       </p:ext>
     </p:extLst>
   </p:cSld>
@@ -5193,7 +5194,7 @@
           <p:cNvPr id="8" name="Rectangle Top">
             <a:extLst>
               <a:ext uri="{FF2B5EF4-FFF2-40B4-BE49-F238E27FC236}">
-                <a16:creationId xmlns="" xmlns:a16="http://schemas.microsoft.com/office/drawing/2014/main" id="{454BD9C2-93A6-4860-A758-846ED0E1C8FA}"/>
+                <a16:creationId xmlns:a16="http://schemas.microsoft.com/office/drawing/2014/main" xmlns="" id="{454BD9C2-93A6-4860-A758-846ED0E1C8FA}"/>
               </a:ext>
             </a:extLst>
           </p:cNvPr>
@@ -5274,7 +5275,7 @@
           <p:cNvPr id="7" name="Slide Number">
             <a:extLst>
               <a:ext uri="{FF2B5EF4-FFF2-40B4-BE49-F238E27FC236}">
-                <a16:creationId xmlns="" xmlns:a16="http://schemas.microsoft.com/office/drawing/2014/main" id="{C1780DB1-0AF0-4108-AFE1-9DA99F0DBCB8}"/>
+                <a16:creationId xmlns:a16="http://schemas.microsoft.com/office/drawing/2014/main" xmlns="" id="{C1780DB1-0AF0-4108-AFE1-9DA99F0DBCB8}"/>
               </a:ext>
             </a:extLst>
           </p:cNvPr>
@@ -5316,7 +5317,7 @@
           <p:cNvPr id="3" name="Slide Body Text">
             <a:extLst>
               <a:ext uri="{FF2B5EF4-FFF2-40B4-BE49-F238E27FC236}">
-                <a16:creationId xmlns="" xmlns:a16="http://schemas.microsoft.com/office/drawing/2014/main" id="{5A9D2960-6D42-439F-82E8-812822013A10}"/>
+                <a16:creationId xmlns:a16="http://schemas.microsoft.com/office/drawing/2014/main" xmlns="" id="{5A9D2960-6D42-439F-82E8-812822013A10}"/>
               </a:ext>
             </a:extLst>
           </p:cNvPr>
@@ -5394,7 +5395,7 @@
           <p:cNvPr id="13" name="Rectangle Top">
             <a:extLst>
               <a:ext uri="{FF2B5EF4-FFF2-40B4-BE49-F238E27FC236}">
-                <a16:creationId xmlns="" xmlns:a16="http://schemas.microsoft.com/office/drawing/2014/main" id="{391AFA4E-7870-4561-A1B8-AC956B0C8931}"/>
+                <a16:creationId xmlns:a16="http://schemas.microsoft.com/office/drawing/2014/main" xmlns="" id="{391AFA4E-7870-4561-A1B8-AC956B0C8931}"/>
               </a:ext>
             </a:extLst>
           </p:cNvPr>
@@ -5475,7 +5476,7 @@
           <p:cNvPr id="12" name="Logo Software University" descr="Software University logo">
             <a:extLst>
               <a:ext uri="{FF2B5EF4-FFF2-40B4-BE49-F238E27FC236}">
-                <a16:creationId xmlns="" xmlns:a16="http://schemas.microsoft.com/office/drawing/2014/main" id="{B1D3B425-B9BF-43ED-9DEC-C05002FBA22F}"/>
+                <a16:creationId xmlns:a16="http://schemas.microsoft.com/office/drawing/2014/main" xmlns="" id="{B1D3B425-B9BF-43ED-9DEC-C05002FBA22F}"/>
               </a:ext>
             </a:extLst>
           </p:cNvPr>
@@ -5488,7 +5489,7 @@
           <a:blip r:embed="rId2" cstate="print">
             <a:extLst>
               <a:ext uri="{28A0092B-C50C-407E-A947-70E740481C1C}">
-                <a14:useLocalDpi xmlns="" xmlns:a14="http://schemas.microsoft.com/office/drawing/2010/main" val="0"/>
+                <a14:useLocalDpi xmlns:a14="http://schemas.microsoft.com/office/drawing/2010/main" xmlns="" val="0"/>
               </a:ext>
             </a:extLst>
           </a:blip>
@@ -5511,7 +5512,7 @@
           <p:cNvPr id="6" name="Slide Title">
             <a:extLst>
               <a:ext uri="{FF2B5EF4-FFF2-40B4-BE49-F238E27FC236}">
-                <a16:creationId xmlns="" xmlns:a16="http://schemas.microsoft.com/office/drawing/2014/main" id="{19B5B676-7892-440F-8191-7109B2C59885}"/>
+                <a16:creationId xmlns:a16="http://schemas.microsoft.com/office/drawing/2014/main" xmlns="" id="{19B5B676-7892-440F-8191-7109B2C59885}"/>
               </a:ext>
             </a:extLst>
           </p:cNvPr>
@@ -5550,7 +5551,7 @@
     </p:spTree>
     <p:extLst>
       <p:ext uri="{BB962C8B-B14F-4D97-AF65-F5344CB8AC3E}">
-        <p14:creationId xmlns="" xmlns:p14="http://schemas.microsoft.com/office/powerpoint/2010/main" val="2685365194"/>
+        <p14:creationId xmlns:p14="http://schemas.microsoft.com/office/powerpoint/2010/main" xmlns="" val="2685365194"/>
       </p:ext>
     </p:extLst>
   </p:cSld>
@@ -5558,7 +5559,7 @@
     <a:masterClrMapping/>
   </p:clrMapOvr>
   <mc:AlternateContent xmlns:mc="http://schemas.openxmlformats.org/markup-compatibility/2006">
-    <mc:Choice xmlns="" xmlns:p14="http://schemas.microsoft.com/office/powerpoint/2010/main" Requires="p14">
+    <mc:Choice xmlns:p14="http://schemas.microsoft.com/office/powerpoint/2010/main" xmlns="" Requires="p14">
       <p:transition spd="slow" p14:dur="2000" advClick="0" advTm="5000"/>
     </mc:Choice>
     <mc:Fallback>
@@ -6668,7 +6669,7 @@
     </p:spTree>
     <p:extLst>
       <p:ext uri="{BB962C8B-B14F-4D97-AF65-F5344CB8AC3E}">
-        <p14:creationId xmlns="" xmlns:p14="http://schemas.microsoft.com/office/powerpoint/2010/main" val="2531485629"/>
+        <p14:creationId xmlns:p14="http://schemas.microsoft.com/office/powerpoint/2010/main" xmlns="" val="2531485629"/>
       </p:ext>
     </p:extLst>
   </p:cSld>
@@ -6864,7 +6865,7 @@
     </p:spTree>
     <p:extLst>
       <p:ext uri="{BB962C8B-B14F-4D97-AF65-F5344CB8AC3E}">
-        <p14:creationId xmlns="" xmlns:p14="http://schemas.microsoft.com/office/powerpoint/2010/main" val="3529216409"/>
+        <p14:creationId xmlns:p14="http://schemas.microsoft.com/office/powerpoint/2010/main" xmlns="" val="3529216409"/>
       </p:ext>
     </p:extLst>
   </p:cSld>
@@ -6872,7 +6873,7 @@
     <a:masterClrMapping/>
   </p:clrMapOvr>
   <mc:AlternateContent xmlns:mc="http://schemas.openxmlformats.org/markup-compatibility/2006">
-    <mc:Choice xmlns="" xmlns:p14="http://schemas.microsoft.com/office/powerpoint/2010/main" Requires="p14">
+    <mc:Choice xmlns:p14="http://schemas.microsoft.com/office/powerpoint/2010/main" xmlns="" Requires="p14">
       <p:transition spd="slow" p14:dur="2000" advClick="0" advTm="5000"/>
     </mc:Choice>
     <mc:Fallback>
@@ -6904,7 +6905,7 @@
           <p:cNvPr id="7" name="Slide Number">
             <a:extLst>
               <a:ext uri="{FF2B5EF4-FFF2-40B4-BE49-F238E27FC236}">
-                <a16:creationId xmlns="" xmlns:a16="http://schemas.microsoft.com/office/drawing/2014/main" id="{C1780DB1-0AF0-4108-AFE1-9DA99F0DBCB8}"/>
+                <a16:creationId xmlns:a16="http://schemas.microsoft.com/office/drawing/2014/main" xmlns="" id="{C1780DB1-0AF0-4108-AFE1-9DA99F0DBCB8}"/>
               </a:ext>
             </a:extLst>
           </p:cNvPr>
@@ -6946,7 +6947,7 @@
           <p:cNvPr id="3" name="Slide Body Text">
             <a:extLst>
               <a:ext uri="{FF2B5EF4-FFF2-40B4-BE49-F238E27FC236}">
-                <a16:creationId xmlns="" xmlns:a16="http://schemas.microsoft.com/office/drawing/2014/main" id="{5A9D2960-6D42-439F-82E8-812822013A10}"/>
+                <a16:creationId xmlns:a16="http://schemas.microsoft.com/office/drawing/2014/main" xmlns="" id="{5A9D2960-6D42-439F-82E8-812822013A10}"/>
               </a:ext>
             </a:extLst>
           </p:cNvPr>
@@ -7024,7 +7025,7 @@
           <p:cNvPr id="13" name="Rectangle Top">
             <a:extLst>
               <a:ext uri="{FF2B5EF4-FFF2-40B4-BE49-F238E27FC236}">
-                <a16:creationId xmlns="" xmlns:a16="http://schemas.microsoft.com/office/drawing/2014/main" id="{391AFA4E-7870-4561-A1B8-AC956B0C8931}"/>
+                <a16:creationId xmlns:a16="http://schemas.microsoft.com/office/drawing/2014/main" xmlns="" id="{391AFA4E-7870-4561-A1B8-AC956B0C8931}"/>
               </a:ext>
             </a:extLst>
           </p:cNvPr>
@@ -7105,7 +7106,7 @@
           <p:cNvPr id="12" name="Logo Software University" descr="Software University logo">
             <a:extLst>
               <a:ext uri="{FF2B5EF4-FFF2-40B4-BE49-F238E27FC236}">
-                <a16:creationId xmlns="" xmlns:a16="http://schemas.microsoft.com/office/drawing/2014/main" id="{B1D3B425-B9BF-43ED-9DEC-C05002FBA22F}"/>
+                <a16:creationId xmlns:a16="http://schemas.microsoft.com/office/drawing/2014/main" xmlns="" id="{B1D3B425-B9BF-43ED-9DEC-C05002FBA22F}"/>
               </a:ext>
             </a:extLst>
           </p:cNvPr>
@@ -7118,7 +7119,7 @@
           <a:blip r:embed="rId2" cstate="print">
             <a:extLst>
               <a:ext uri="{28A0092B-C50C-407E-A947-70E740481C1C}">
-                <a14:useLocalDpi xmlns="" xmlns:a14="http://schemas.microsoft.com/office/drawing/2010/main" val="0"/>
+                <a14:useLocalDpi xmlns:a14="http://schemas.microsoft.com/office/drawing/2010/main" xmlns="" val="0"/>
               </a:ext>
             </a:extLst>
           </a:blip>
@@ -7141,7 +7142,7 @@
           <p:cNvPr id="6" name="Slide Title">
             <a:extLst>
               <a:ext uri="{FF2B5EF4-FFF2-40B4-BE49-F238E27FC236}">
-                <a16:creationId xmlns="" xmlns:a16="http://schemas.microsoft.com/office/drawing/2014/main" id="{19B5B676-7892-440F-8191-7109B2C59885}"/>
+                <a16:creationId xmlns:a16="http://schemas.microsoft.com/office/drawing/2014/main" xmlns="" id="{19B5B676-7892-440F-8191-7109B2C59885}"/>
               </a:ext>
             </a:extLst>
           </p:cNvPr>
@@ -7180,7 +7181,7 @@
     </p:spTree>
     <p:extLst>
       <p:ext uri="{BB962C8B-B14F-4D97-AF65-F5344CB8AC3E}">
-        <p14:creationId xmlns="" xmlns:p14="http://schemas.microsoft.com/office/powerpoint/2010/main" val="1102970716"/>
+        <p14:creationId xmlns:p14="http://schemas.microsoft.com/office/powerpoint/2010/main" xmlns="" val="1102970716"/>
       </p:ext>
     </p:extLst>
   </p:cSld>
@@ -7188,7 +7189,7 @@
     <a:masterClrMapping/>
   </p:clrMapOvr>
   <mc:AlternateContent xmlns:mc="http://schemas.openxmlformats.org/markup-compatibility/2006">
-    <mc:Choice xmlns="" xmlns:p14="http://schemas.microsoft.com/office/powerpoint/2010/main" Requires="p14">
+    <mc:Choice xmlns:p14="http://schemas.microsoft.com/office/powerpoint/2010/main" xmlns="" Requires="p14">
       <p:transition spd="slow" p14:dur="2000" advClick="0" advTm="5000"/>
     </mc:Choice>
     <mc:Fallback>
@@ -7220,7 +7221,7 @@
           <p:cNvPr id="9" name="Slide Number">
             <a:extLst>
               <a:ext uri="{FF2B5EF4-FFF2-40B4-BE49-F238E27FC236}">
-                <a16:creationId xmlns="" xmlns:a16="http://schemas.microsoft.com/office/drawing/2014/main" id="{0020EB61-2079-41A3-B356-B1D8D48D786E}"/>
+                <a16:creationId xmlns:a16="http://schemas.microsoft.com/office/drawing/2014/main" xmlns="" id="{0020EB61-2079-41A3-B356-B1D8D48D786E}"/>
               </a:ext>
             </a:extLst>
           </p:cNvPr>
@@ -7337,7 +7338,7 @@
           <p:cNvPr id="7" name="Slide Body Text">
             <a:extLst>
               <a:ext uri="{FF2B5EF4-FFF2-40B4-BE49-F238E27FC236}">
-                <a16:creationId xmlns="" xmlns:a16="http://schemas.microsoft.com/office/drawing/2014/main" id="{CB4CB13C-66A1-466B-A6C1-B0BABF5CFEC1}"/>
+                <a16:creationId xmlns:a16="http://schemas.microsoft.com/office/drawing/2014/main" xmlns="" id="{CB4CB13C-66A1-466B-A6C1-B0BABF5CFEC1}"/>
               </a:ext>
             </a:extLst>
           </p:cNvPr>
@@ -7435,7 +7436,7 @@
           <p:cNvPr id="3" name="Logo Software University" descr="Software University logo">
             <a:extLst>
               <a:ext uri="{FF2B5EF4-FFF2-40B4-BE49-F238E27FC236}">
-                <a16:creationId xmlns="" xmlns:a16="http://schemas.microsoft.com/office/drawing/2014/main" id="{5573C101-930B-47AC-967A-A64513DFFDEE}"/>
+                <a16:creationId xmlns:a16="http://schemas.microsoft.com/office/drawing/2014/main" xmlns="" id="{5573C101-930B-47AC-967A-A64513DFFDEE}"/>
               </a:ext>
             </a:extLst>
           </p:cNvPr>
@@ -7458,7 +7459,7 @@
             </a:clrChange>
             <a:extLst>
               <a:ext uri="{28A0092B-C50C-407E-A947-70E740481C1C}">
-                <a14:useLocalDpi xmlns="" xmlns:a14="http://schemas.microsoft.com/office/drawing/2010/main" val="0"/>
+                <a14:useLocalDpi xmlns:a14="http://schemas.microsoft.com/office/drawing/2010/main" xmlns="" val="0"/>
               </a:ext>
             </a:extLst>
           </a:blip>
@@ -7481,7 +7482,7 @@
           <p:cNvPr id="8" name="Slide Title">
             <a:extLst>
               <a:ext uri="{FF2B5EF4-FFF2-40B4-BE49-F238E27FC236}">
-                <a16:creationId xmlns="" xmlns:a16="http://schemas.microsoft.com/office/drawing/2014/main" id="{E2DA9691-CDF5-499C-94BB-AAA61DAC1BFB}"/>
+                <a16:creationId xmlns:a16="http://schemas.microsoft.com/office/drawing/2014/main" xmlns="" id="{E2DA9691-CDF5-499C-94BB-AAA61DAC1BFB}"/>
               </a:ext>
             </a:extLst>
           </p:cNvPr>
@@ -7518,7 +7519,7 @@
           <p:cNvPr id="10" name="Group 9">
             <a:extLst>
               <a:ext uri="{FF2B5EF4-FFF2-40B4-BE49-F238E27FC236}">
-                <a16:creationId xmlns="" xmlns:a16="http://schemas.microsoft.com/office/drawing/2014/main" id="{43CDBCC2-1C96-44BC-B992-7B0C49C34904}"/>
+                <a16:creationId xmlns:a16="http://schemas.microsoft.com/office/drawing/2014/main" xmlns="" id="{43CDBCC2-1C96-44BC-B992-7B0C49C34904}"/>
               </a:ext>
             </a:extLst>
           </p:cNvPr>
@@ -7538,7 +7539,7 @@
             <p:cNvPr id="11" name="Group 10">
               <a:extLst>
                 <a:ext uri="{FF2B5EF4-FFF2-40B4-BE49-F238E27FC236}">
-                  <a16:creationId xmlns="" xmlns:a16="http://schemas.microsoft.com/office/drawing/2014/main" id="{7D71B3A8-4D39-42CF-9255-81EA3A622DD6}"/>
+                  <a16:creationId xmlns:a16="http://schemas.microsoft.com/office/drawing/2014/main" xmlns="" id="{7D71B3A8-4D39-42CF-9255-81EA3A622DD6}"/>
                 </a:ext>
               </a:extLst>
             </p:cNvPr>
@@ -7558,7 +7559,7 @@
               <p:cNvPr id="25" name="Oval 24">
                 <a:extLst>
                   <a:ext uri="{FF2B5EF4-FFF2-40B4-BE49-F238E27FC236}">
-                    <a16:creationId xmlns="" xmlns:a16="http://schemas.microsoft.com/office/drawing/2014/main" id="{B98059F9-1874-426D-8AF7-A12C21F37DD9}"/>
+                    <a16:creationId xmlns:a16="http://schemas.microsoft.com/office/drawing/2014/main" xmlns="" id="{B98059F9-1874-426D-8AF7-A12C21F37DD9}"/>
                   </a:ext>
                 </a:extLst>
               </p:cNvPr>
@@ -7610,7 +7611,7 @@
               <p:cNvPr id="26" name="Rectangle 5">
                 <a:extLst>
                   <a:ext uri="{FF2B5EF4-FFF2-40B4-BE49-F238E27FC236}">
-                    <a16:creationId xmlns="" xmlns:a16="http://schemas.microsoft.com/office/drawing/2014/main" id="{A3A1E077-DBDF-48F0-A924-604984B940A2}"/>
+                    <a16:creationId xmlns:a16="http://schemas.microsoft.com/office/drawing/2014/main" xmlns="" id="{A3A1E077-DBDF-48F0-A924-604984B940A2}"/>
                   </a:ext>
                 </a:extLst>
               </p:cNvPr>
@@ -7755,7 +7756,7 @@
               <p:cNvPr id="27" name="Rectangle 5">
                 <a:extLst>
                   <a:ext uri="{FF2B5EF4-FFF2-40B4-BE49-F238E27FC236}">
-                    <a16:creationId xmlns="" xmlns:a16="http://schemas.microsoft.com/office/drawing/2014/main" id="{798B1F51-1FA4-4199-81C7-62356C936CC9}"/>
+                    <a16:creationId xmlns:a16="http://schemas.microsoft.com/office/drawing/2014/main" xmlns="" id="{798B1F51-1FA4-4199-81C7-62356C936CC9}"/>
                   </a:ext>
                 </a:extLst>
               </p:cNvPr>
@@ -7900,7 +7901,7 @@
               <p:cNvPr id="28" name="Arc 27">
                 <a:extLst>
                   <a:ext uri="{FF2B5EF4-FFF2-40B4-BE49-F238E27FC236}">
-                    <a16:creationId xmlns="" xmlns:a16="http://schemas.microsoft.com/office/drawing/2014/main" id="{40A224C8-1233-40F7-96AB-BFF79AF6CDCB}"/>
+                    <a16:creationId xmlns:a16="http://schemas.microsoft.com/office/drawing/2014/main" xmlns="" id="{40A224C8-1233-40F7-96AB-BFF79AF6CDCB}"/>
                   </a:ext>
                 </a:extLst>
               </p:cNvPr>
@@ -7959,7 +7960,7 @@
               <p:cNvPr id="29" name="Arc 28">
                 <a:extLst>
                   <a:ext uri="{FF2B5EF4-FFF2-40B4-BE49-F238E27FC236}">
-                    <a16:creationId xmlns="" xmlns:a16="http://schemas.microsoft.com/office/drawing/2014/main" id="{B57C7CCC-E218-4321-8C7B-3F0C5753C7A1}"/>
+                    <a16:creationId xmlns:a16="http://schemas.microsoft.com/office/drawing/2014/main" xmlns="" id="{B57C7CCC-E218-4321-8C7B-3F0C5753C7A1}"/>
                   </a:ext>
                 </a:extLst>
               </p:cNvPr>
@@ -8019,7 +8020,7 @@
             <p:cNvPr id="13" name="Rectangle: Rounded Corners 12">
               <a:extLst>
                 <a:ext uri="{FF2B5EF4-FFF2-40B4-BE49-F238E27FC236}">
-                  <a16:creationId xmlns="" xmlns:a16="http://schemas.microsoft.com/office/drawing/2014/main" id="{6AF309CA-A56C-4ABC-B293-420F4EB1A9B4}"/>
+                  <a16:creationId xmlns:a16="http://schemas.microsoft.com/office/drawing/2014/main" xmlns="" id="{6AF309CA-A56C-4ABC-B293-420F4EB1A9B4}"/>
                 </a:ext>
               </a:extLst>
             </p:cNvPr>
@@ -8073,7 +8074,7 @@
             <p:cNvPr id="14" name="Rectangle: Rounded Corners 13">
               <a:extLst>
                 <a:ext uri="{FF2B5EF4-FFF2-40B4-BE49-F238E27FC236}">
-                  <a16:creationId xmlns="" xmlns:a16="http://schemas.microsoft.com/office/drawing/2014/main" id="{07955808-2AC7-44EB-8B6D-82B974E53A3C}"/>
+                  <a16:creationId xmlns:a16="http://schemas.microsoft.com/office/drawing/2014/main" xmlns="" id="{07955808-2AC7-44EB-8B6D-82B974E53A3C}"/>
                 </a:ext>
               </a:extLst>
             </p:cNvPr>
@@ -8134,7 +8135,7 @@
             <p:cNvPr id="15" name="Straight Connector 14">
               <a:extLst>
                 <a:ext uri="{FF2B5EF4-FFF2-40B4-BE49-F238E27FC236}">
-                  <a16:creationId xmlns="" xmlns:a16="http://schemas.microsoft.com/office/drawing/2014/main" id="{AC6420D7-AEAB-45EF-8D46-11EB06E4AFEA}"/>
+                  <a16:creationId xmlns:a16="http://schemas.microsoft.com/office/drawing/2014/main" xmlns="" id="{AC6420D7-AEAB-45EF-8D46-11EB06E4AFEA}"/>
                 </a:ext>
               </a:extLst>
             </p:cNvPr>
@@ -8180,7 +8181,7 @@
             <p:cNvPr id="16" name="Straight Connector 15">
               <a:extLst>
                 <a:ext uri="{FF2B5EF4-FFF2-40B4-BE49-F238E27FC236}">
-                  <a16:creationId xmlns="" xmlns:a16="http://schemas.microsoft.com/office/drawing/2014/main" id="{76C7FABC-6773-44F6-990B-3EB082BE9B35}"/>
+                  <a16:creationId xmlns:a16="http://schemas.microsoft.com/office/drawing/2014/main" xmlns="" id="{76C7FABC-6773-44F6-990B-3EB082BE9B35}"/>
                 </a:ext>
               </a:extLst>
             </p:cNvPr>
@@ -8226,7 +8227,7 @@
             <p:cNvPr id="17" name="Group 16">
               <a:extLst>
                 <a:ext uri="{FF2B5EF4-FFF2-40B4-BE49-F238E27FC236}">
-                  <a16:creationId xmlns="" xmlns:a16="http://schemas.microsoft.com/office/drawing/2014/main" id="{1FAD48E1-DC45-4B3D-9CE5-613250708496}"/>
+                  <a16:creationId xmlns:a16="http://schemas.microsoft.com/office/drawing/2014/main" xmlns="" id="{1FAD48E1-DC45-4B3D-9CE5-613250708496}"/>
                 </a:ext>
               </a:extLst>
             </p:cNvPr>
@@ -8249,7 +8250,7 @@
               <p:cNvPr id="23" name="Straight Connector 22">
                 <a:extLst>
                   <a:ext uri="{FF2B5EF4-FFF2-40B4-BE49-F238E27FC236}">
-                    <a16:creationId xmlns="" xmlns:a16="http://schemas.microsoft.com/office/drawing/2014/main" id="{B01FD1D1-046F-457B-AB63-2702CE3E906E}"/>
+                    <a16:creationId xmlns:a16="http://schemas.microsoft.com/office/drawing/2014/main" xmlns="" id="{B01FD1D1-046F-457B-AB63-2702CE3E906E}"/>
                   </a:ext>
                 </a:extLst>
               </p:cNvPr>
@@ -8293,7 +8294,7 @@
               <p:cNvPr id="24" name="Straight Connector 23">
                 <a:extLst>
                   <a:ext uri="{FF2B5EF4-FFF2-40B4-BE49-F238E27FC236}">
-                    <a16:creationId xmlns="" xmlns:a16="http://schemas.microsoft.com/office/drawing/2014/main" id="{895660C3-C72C-43EE-9C4A-170F85E5BE08}"/>
+                    <a16:creationId xmlns:a16="http://schemas.microsoft.com/office/drawing/2014/main" xmlns="" id="{895660C3-C72C-43EE-9C4A-170F85E5BE08}"/>
                   </a:ext>
                 </a:extLst>
               </p:cNvPr>
@@ -8338,7 +8339,7 @@
             <p:cNvPr id="19" name="Straight Connector 18">
               <a:extLst>
                 <a:ext uri="{FF2B5EF4-FFF2-40B4-BE49-F238E27FC236}">
-                  <a16:creationId xmlns="" xmlns:a16="http://schemas.microsoft.com/office/drawing/2014/main" id="{A74EE503-8FC0-42A6-8860-CA4EE42272E4}"/>
+                  <a16:creationId xmlns:a16="http://schemas.microsoft.com/office/drawing/2014/main" xmlns="" id="{A74EE503-8FC0-42A6-8860-CA4EE42272E4}"/>
                 </a:ext>
               </a:extLst>
             </p:cNvPr>
@@ -8384,7 +8385,7 @@
             <p:cNvPr id="12" name="Rectangle: Rounded Corners 11">
               <a:extLst>
                 <a:ext uri="{FF2B5EF4-FFF2-40B4-BE49-F238E27FC236}">
-                  <a16:creationId xmlns="" xmlns:a16="http://schemas.microsoft.com/office/drawing/2014/main" id="{F4189FDA-9FE8-490B-8A70-2E941811021F}"/>
+                  <a16:creationId xmlns:a16="http://schemas.microsoft.com/office/drawing/2014/main" xmlns="" id="{F4189FDA-9FE8-490B-8A70-2E941811021F}"/>
                 </a:ext>
               </a:extLst>
             </p:cNvPr>
@@ -8438,7 +8439,7 @@
             <p:cNvPr id="18" name="Group 17">
               <a:extLst>
                 <a:ext uri="{FF2B5EF4-FFF2-40B4-BE49-F238E27FC236}">
-                  <a16:creationId xmlns="" xmlns:a16="http://schemas.microsoft.com/office/drawing/2014/main" id="{FDA3EFCD-0DF8-419D-8533-D781521E597E}"/>
+                  <a16:creationId xmlns:a16="http://schemas.microsoft.com/office/drawing/2014/main" xmlns="" id="{FDA3EFCD-0DF8-419D-8533-D781521E597E}"/>
                 </a:ext>
               </a:extLst>
             </p:cNvPr>
@@ -8461,7 +8462,7 @@
               <p:cNvPr id="21" name="Straight Connector 20">
                 <a:extLst>
                   <a:ext uri="{FF2B5EF4-FFF2-40B4-BE49-F238E27FC236}">
-                    <a16:creationId xmlns="" xmlns:a16="http://schemas.microsoft.com/office/drawing/2014/main" id="{C3CC6A5A-182E-4A09-9C04-EB191881D789}"/>
+                    <a16:creationId xmlns:a16="http://schemas.microsoft.com/office/drawing/2014/main" xmlns="" id="{C3CC6A5A-182E-4A09-9C04-EB191881D789}"/>
                   </a:ext>
                 </a:extLst>
               </p:cNvPr>
@@ -8505,7 +8506,7 @@
               <p:cNvPr id="22" name="Straight Connector 21">
                 <a:extLst>
                   <a:ext uri="{FF2B5EF4-FFF2-40B4-BE49-F238E27FC236}">
-                    <a16:creationId xmlns="" xmlns:a16="http://schemas.microsoft.com/office/drawing/2014/main" id="{440C8953-0555-48CC-8255-78F17E053EE7}"/>
+                    <a16:creationId xmlns:a16="http://schemas.microsoft.com/office/drawing/2014/main" xmlns="" id="{440C8953-0555-48CC-8255-78F17E053EE7}"/>
                   </a:ext>
                 </a:extLst>
               </p:cNvPr>
@@ -8551,7 +8552,7 @@
           <p:cNvPr id="34" name="Straight Connector 33">
             <a:extLst>
               <a:ext uri="{FF2B5EF4-FFF2-40B4-BE49-F238E27FC236}">
-                <a16:creationId xmlns="" xmlns:a16="http://schemas.microsoft.com/office/drawing/2014/main" id="{29B538CA-8CCB-43FB-B5E5-5FC04EBC1F54}"/>
+                <a16:creationId xmlns:a16="http://schemas.microsoft.com/office/drawing/2014/main" xmlns="" id="{29B538CA-8CCB-43FB-B5E5-5FC04EBC1F54}"/>
               </a:ext>
             </a:extLst>
           </p:cNvPr>
@@ -8596,7 +8597,7 @@
     </p:spTree>
     <p:extLst>
       <p:ext uri="{BB962C8B-B14F-4D97-AF65-F5344CB8AC3E}">
-        <p14:creationId xmlns="" xmlns:p14="http://schemas.microsoft.com/office/powerpoint/2010/main" val="743545348"/>
+        <p14:creationId xmlns:p14="http://schemas.microsoft.com/office/powerpoint/2010/main" xmlns="" val="743545348"/>
       </p:ext>
     </p:extLst>
   </p:cSld>
@@ -8604,7 +8605,7 @@
     <a:masterClrMapping/>
   </p:clrMapOvr>
   <mc:AlternateContent xmlns:mc="http://schemas.openxmlformats.org/markup-compatibility/2006">
-    <mc:Choice xmlns="" xmlns:p14="http://schemas.microsoft.com/office/powerpoint/2010/main" Requires="p14">
+    <mc:Choice xmlns:p14="http://schemas.microsoft.com/office/powerpoint/2010/main" xmlns="" Requires="p14">
       <p:transition spd="slow" p14:dur="2000" advClick="0" advTm="5000"/>
     </mc:Choice>
     <mc:Fallback>
@@ -8636,7 +8637,7 @@
           <p:cNvPr id="9" name="Slide Number">
             <a:extLst>
               <a:ext uri="{FF2B5EF4-FFF2-40B4-BE49-F238E27FC236}">
-                <a16:creationId xmlns="" xmlns:a16="http://schemas.microsoft.com/office/drawing/2014/main" id="{1865BF6B-7F07-4E9C-879F-80E36EEB3405}"/>
+                <a16:creationId xmlns:a16="http://schemas.microsoft.com/office/drawing/2014/main" xmlns="" id="{1865BF6B-7F07-4E9C-879F-80E36EEB3405}"/>
               </a:ext>
             </a:extLst>
           </p:cNvPr>
@@ -8678,7 +8679,7 @@
           <p:cNvPr id="12" name="Rectangle Left">
             <a:extLst>
               <a:ext uri="{FF2B5EF4-FFF2-40B4-BE49-F238E27FC236}">
-                <a16:creationId xmlns="" xmlns:a16="http://schemas.microsoft.com/office/drawing/2014/main" id="{345FB1C8-7F66-4D5C-ACCE-AE919936BCFD}"/>
+                <a16:creationId xmlns:a16="http://schemas.microsoft.com/office/drawing/2014/main" xmlns="" id="{345FB1C8-7F66-4D5C-ACCE-AE919936BCFD}"/>
               </a:ext>
             </a:extLst>
           </p:cNvPr>
@@ -8759,7 +8760,7 @@
           <p:cNvPr id="15" name="Slide Body Text">
             <a:extLst>
               <a:ext uri="{FF2B5EF4-FFF2-40B4-BE49-F238E27FC236}">
-                <a16:creationId xmlns="" xmlns:a16="http://schemas.microsoft.com/office/drawing/2014/main" id="{6157C8DE-E0AF-422B-BBB1-F0AF1264B5E9}"/>
+                <a16:creationId xmlns:a16="http://schemas.microsoft.com/office/drawing/2014/main" xmlns="" id="{6157C8DE-E0AF-422B-BBB1-F0AF1264B5E9}"/>
               </a:ext>
             </a:extLst>
           </p:cNvPr>
@@ -8857,7 +8858,7 @@
           <p:cNvPr id="16" name="Logo Software University" descr="Software University logo">
             <a:extLst>
               <a:ext uri="{FF2B5EF4-FFF2-40B4-BE49-F238E27FC236}">
-                <a16:creationId xmlns="" xmlns:a16="http://schemas.microsoft.com/office/drawing/2014/main" id="{EFEBB553-EACE-4B4F-8B4F-7629FDD910A4}"/>
+                <a16:creationId xmlns:a16="http://schemas.microsoft.com/office/drawing/2014/main" xmlns="" id="{EFEBB553-EACE-4B4F-8B4F-7629FDD910A4}"/>
               </a:ext>
             </a:extLst>
           </p:cNvPr>
@@ -8880,7 +8881,7 @@
             </a:clrChange>
             <a:extLst>
               <a:ext uri="{28A0092B-C50C-407E-A947-70E740481C1C}">
-                <a14:useLocalDpi xmlns="" xmlns:a14="http://schemas.microsoft.com/office/drawing/2010/main" val="0"/>
+                <a14:useLocalDpi xmlns:a14="http://schemas.microsoft.com/office/drawing/2010/main" xmlns="" val="0"/>
               </a:ext>
             </a:extLst>
           </a:blip>
@@ -8903,7 +8904,7 @@
           <p:cNvPr id="13" name="Slide Title">
             <a:extLst>
               <a:ext uri="{FF2B5EF4-FFF2-40B4-BE49-F238E27FC236}">
-                <a16:creationId xmlns="" xmlns:a16="http://schemas.microsoft.com/office/drawing/2014/main" id="{0D5CC956-5C4A-44BE-8F8B-327FAFA51E97}"/>
+                <a16:creationId xmlns:a16="http://schemas.microsoft.com/office/drawing/2014/main" xmlns="" id="{0D5CC956-5C4A-44BE-8F8B-327FAFA51E97}"/>
               </a:ext>
             </a:extLst>
           </p:cNvPr>
@@ -8940,7 +8941,7 @@
           <p:cNvPr id="33" name="Group 32">
             <a:extLst>
               <a:ext uri="{FF2B5EF4-FFF2-40B4-BE49-F238E27FC236}">
-                <a16:creationId xmlns="" xmlns:a16="http://schemas.microsoft.com/office/drawing/2014/main" id="{7CF60135-47AA-48F0-96BA-0E795668ABDB}"/>
+                <a16:creationId xmlns:a16="http://schemas.microsoft.com/office/drawing/2014/main" xmlns="" id="{7CF60135-47AA-48F0-96BA-0E795668ABDB}"/>
               </a:ext>
             </a:extLst>
           </p:cNvPr>
@@ -8960,7 +8961,7 @@
             <p:cNvPr id="34" name="Group 33">
               <a:extLst>
                 <a:ext uri="{FF2B5EF4-FFF2-40B4-BE49-F238E27FC236}">
-                  <a16:creationId xmlns="" xmlns:a16="http://schemas.microsoft.com/office/drawing/2014/main" id="{2823380E-3936-41AF-BDF7-DA54D75BBF6B}"/>
+                  <a16:creationId xmlns:a16="http://schemas.microsoft.com/office/drawing/2014/main" xmlns="" id="{2823380E-3936-41AF-BDF7-DA54D75BBF6B}"/>
                 </a:ext>
               </a:extLst>
             </p:cNvPr>
@@ -8980,7 +8981,7 @@
               <p:cNvPr id="47" name="Oval 46">
                 <a:extLst>
                   <a:ext uri="{FF2B5EF4-FFF2-40B4-BE49-F238E27FC236}">
-                    <a16:creationId xmlns="" xmlns:a16="http://schemas.microsoft.com/office/drawing/2014/main" id="{52B047D9-D8DD-45C7-9BC8-6D4F682F5182}"/>
+                    <a16:creationId xmlns:a16="http://schemas.microsoft.com/office/drawing/2014/main" xmlns="" id="{52B047D9-D8DD-45C7-9BC8-6D4F682F5182}"/>
                   </a:ext>
                 </a:extLst>
               </p:cNvPr>
@@ -9032,7 +9033,7 @@
               <p:cNvPr id="48" name="Rectangle 5">
                 <a:extLst>
                   <a:ext uri="{FF2B5EF4-FFF2-40B4-BE49-F238E27FC236}">
-                    <a16:creationId xmlns="" xmlns:a16="http://schemas.microsoft.com/office/drawing/2014/main" id="{4D84FE51-BD8E-47EA-9463-CE02FEA31766}"/>
+                    <a16:creationId xmlns:a16="http://schemas.microsoft.com/office/drawing/2014/main" xmlns="" id="{4D84FE51-BD8E-47EA-9463-CE02FEA31766}"/>
                   </a:ext>
                 </a:extLst>
               </p:cNvPr>
@@ -9177,7 +9178,7 @@
               <p:cNvPr id="49" name="Rectangle 5">
                 <a:extLst>
                   <a:ext uri="{FF2B5EF4-FFF2-40B4-BE49-F238E27FC236}">
-                    <a16:creationId xmlns="" xmlns:a16="http://schemas.microsoft.com/office/drawing/2014/main" id="{F5C8F037-C197-4219-AC87-3A81763512BC}"/>
+                    <a16:creationId xmlns:a16="http://schemas.microsoft.com/office/drawing/2014/main" xmlns="" id="{F5C8F037-C197-4219-AC87-3A81763512BC}"/>
                   </a:ext>
                 </a:extLst>
               </p:cNvPr>
@@ -9322,7 +9323,7 @@
               <p:cNvPr id="50" name="Arc 49">
                 <a:extLst>
                   <a:ext uri="{FF2B5EF4-FFF2-40B4-BE49-F238E27FC236}">
-                    <a16:creationId xmlns="" xmlns:a16="http://schemas.microsoft.com/office/drawing/2014/main" id="{786EE401-CF8E-439B-94A0-EE6F3A7D5798}"/>
+                    <a16:creationId xmlns:a16="http://schemas.microsoft.com/office/drawing/2014/main" xmlns="" id="{786EE401-CF8E-439B-94A0-EE6F3A7D5798}"/>
                   </a:ext>
                 </a:extLst>
               </p:cNvPr>
@@ -9381,7 +9382,7 @@
               <p:cNvPr id="51" name="Arc 50">
                 <a:extLst>
                   <a:ext uri="{FF2B5EF4-FFF2-40B4-BE49-F238E27FC236}">
-                    <a16:creationId xmlns="" xmlns:a16="http://schemas.microsoft.com/office/drawing/2014/main" id="{8D9ACD38-B3EB-4A63-9730-CBF0501BF235}"/>
+                    <a16:creationId xmlns:a16="http://schemas.microsoft.com/office/drawing/2014/main" xmlns="" id="{8D9ACD38-B3EB-4A63-9730-CBF0501BF235}"/>
                   </a:ext>
                 </a:extLst>
               </p:cNvPr>
@@ -9441,7 +9442,7 @@
             <p:cNvPr id="35" name="Rectangle: Rounded Corners 34">
               <a:extLst>
                 <a:ext uri="{FF2B5EF4-FFF2-40B4-BE49-F238E27FC236}">
-                  <a16:creationId xmlns="" xmlns:a16="http://schemas.microsoft.com/office/drawing/2014/main" id="{64EE493E-A353-4C75-A3B9-D48ABA2C57CC}"/>
+                  <a16:creationId xmlns:a16="http://schemas.microsoft.com/office/drawing/2014/main" xmlns="" id="{64EE493E-A353-4C75-A3B9-D48ABA2C57CC}"/>
                 </a:ext>
               </a:extLst>
             </p:cNvPr>
@@ -9495,7 +9496,7 @@
             <p:cNvPr id="36" name="Rectangle: Rounded Corners 35">
               <a:extLst>
                 <a:ext uri="{FF2B5EF4-FFF2-40B4-BE49-F238E27FC236}">
-                  <a16:creationId xmlns="" xmlns:a16="http://schemas.microsoft.com/office/drawing/2014/main" id="{718408B9-204E-42E3-9E79-33E047E869BC}"/>
+                  <a16:creationId xmlns:a16="http://schemas.microsoft.com/office/drawing/2014/main" xmlns="" id="{718408B9-204E-42E3-9E79-33E047E869BC}"/>
                 </a:ext>
               </a:extLst>
             </p:cNvPr>
@@ -9556,7 +9557,7 @@
             <p:cNvPr id="37" name="Straight Connector 36">
               <a:extLst>
                 <a:ext uri="{FF2B5EF4-FFF2-40B4-BE49-F238E27FC236}">
-                  <a16:creationId xmlns="" xmlns:a16="http://schemas.microsoft.com/office/drawing/2014/main" id="{0AB66D97-DF6F-4CD2-AF13-42B5C852F673}"/>
+                  <a16:creationId xmlns:a16="http://schemas.microsoft.com/office/drawing/2014/main" xmlns="" id="{0AB66D97-DF6F-4CD2-AF13-42B5C852F673}"/>
                 </a:ext>
               </a:extLst>
             </p:cNvPr>
@@ -9602,7 +9603,7 @@
             <p:cNvPr id="38" name="Straight Connector 37">
               <a:extLst>
                 <a:ext uri="{FF2B5EF4-FFF2-40B4-BE49-F238E27FC236}">
-                  <a16:creationId xmlns="" xmlns:a16="http://schemas.microsoft.com/office/drawing/2014/main" id="{F2AFBA69-C196-4703-8AAB-5F72A8EDCEB5}"/>
+                  <a16:creationId xmlns:a16="http://schemas.microsoft.com/office/drawing/2014/main" xmlns="" id="{F2AFBA69-C196-4703-8AAB-5F72A8EDCEB5}"/>
                 </a:ext>
               </a:extLst>
             </p:cNvPr>
@@ -9648,7 +9649,7 @@
             <p:cNvPr id="39" name="Group 38">
               <a:extLst>
                 <a:ext uri="{FF2B5EF4-FFF2-40B4-BE49-F238E27FC236}">
-                  <a16:creationId xmlns="" xmlns:a16="http://schemas.microsoft.com/office/drawing/2014/main" id="{9AFC66C1-0C1C-4332-9C4E-782574C896B8}"/>
+                  <a16:creationId xmlns:a16="http://schemas.microsoft.com/office/drawing/2014/main" xmlns="" id="{9AFC66C1-0C1C-4332-9C4E-782574C896B8}"/>
                 </a:ext>
               </a:extLst>
             </p:cNvPr>
@@ -9671,7 +9672,7 @@
               <p:cNvPr id="45" name="Straight Connector 44">
                 <a:extLst>
                   <a:ext uri="{FF2B5EF4-FFF2-40B4-BE49-F238E27FC236}">
-                    <a16:creationId xmlns="" xmlns:a16="http://schemas.microsoft.com/office/drawing/2014/main" id="{872CA8AD-EAF6-40BE-9DDE-ECDB4A980CA5}"/>
+                    <a16:creationId xmlns:a16="http://schemas.microsoft.com/office/drawing/2014/main" xmlns="" id="{872CA8AD-EAF6-40BE-9DDE-ECDB4A980CA5}"/>
                   </a:ext>
                 </a:extLst>
               </p:cNvPr>
@@ -9715,7 +9716,7 @@
               <p:cNvPr id="46" name="Straight Connector 45">
                 <a:extLst>
                   <a:ext uri="{FF2B5EF4-FFF2-40B4-BE49-F238E27FC236}">
-                    <a16:creationId xmlns="" xmlns:a16="http://schemas.microsoft.com/office/drawing/2014/main" id="{57DD3EC7-1A13-4AFE-BD6F-DA12C281FAFB}"/>
+                    <a16:creationId xmlns:a16="http://schemas.microsoft.com/office/drawing/2014/main" xmlns="" id="{57DD3EC7-1A13-4AFE-BD6F-DA12C281FAFB}"/>
                   </a:ext>
                 </a:extLst>
               </p:cNvPr>
@@ -9760,7 +9761,7 @@
             <p:cNvPr id="40" name="Straight Connector 39">
               <a:extLst>
                 <a:ext uri="{FF2B5EF4-FFF2-40B4-BE49-F238E27FC236}">
-                  <a16:creationId xmlns="" xmlns:a16="http://schemas.microsoft.com/office/drawing/2014/main" id="{E46151FA-19E9-4E84-A082-EDAC6F76EA9D}"/>
+                  <a16:creationId xmlns:a16="http://schemas.microsoft.com/office/drawing/2014/main" xmlns="" id="{E46151FA-19E9-4E84-A082-EDAC6F76EA9D}"/>
                 </a:ext>
               </a:extLst>
             </p:cNvPr>
@@ -9806,7 +9807,7 @@
             <p:cNvPr id="41" name="Rectangle: Rounded Corners 40">
               <a:extLst>
                 <a:ext uri="{FF2B5EF4-FFF2-40B4-BE49-F238E27FC236}">
-                  <a16:creationId xmlns="" xmlns:a16="http://schemas.microsoft.com/office/drawing/2014/main" id="{3423EEF0-5B70-4091-B2DA-0740D2609643}"/>
+                  <a16:creationId xmlns:a16="http://schemas.microsoft.com/office/drawing/2014/main" xmlns="" id="{3423EEF0-5B70-4091-B2DA-0740D2609643}"/>
                 </a:ext>
               </a:extLst>
             </p:cNvPr>
@@ -9860,7 +9861,7 @@
             <p:cNvPr id="42" name="Group 41">
               <a:extLst>
                 <a:ext uri="{FF2B5EF4-FFF2-40B4-BE49-F238E27FC236}">
-                  <a16:creationId xmlns="" xmlns:a16="http://schemas.microsoft.com/office/drawing/2014/main" id="{49A8AAA7-98E7-4224-B027-830FFCC285A3}"/>
+                  <a16:creationId xmlns:a16="http://schemas.microsoft.com/office/drawing/2014/main" xmlns="" id="{49A8AAA7-98E7-4224-B027-830FFCC285A3}"/>
                 </a:ext>
               </a:extLst>
             </p:cNvPr>
@@ -9883,7 +9884,7 @@
               <p:cNvPr id="43" name="Straight Connector 42">
                 <a:extLst>
                   <a:ext uri="{FF2B5EF4-FFF2-40B4-BE49-F238E27FC236}">
-                    <a16:creationId xmlns="" xmlns:a16="http://schemas.microsoft.com/office/drawing/2014/main" id="{2129EC38-471E-4685-973E-BA7A7F567C42}"/>
+                    <a16:creationId xmlns:a16="http://schemas.microsoft.com/office/drawing/2014/main" xmlns="" id="{2129EC38-471E-4685-973E-BA7A7F567C42}"/>
                   </a:ext>
                 </a:extLst>
               </p:cNvPr>
@@ -9927,7 +9928,7 @@
               <p:cNvPr id="44" name="Straight Connector 43">
                 <a:extLst>
                   <a:ext uri="{FF2B5EF4-FFF2-40B4-BE49-F238E27FC236}">
-                    <a16:creationId xmlns="" xmlns:a16="http://schemas.microsoft.com/office/drawing/2014/main" id="{678142BE-84C9-4834-B6CC-6623E401661C}"/>
+                    <a16:creationId xmlns:a16="http://schemas.microsoft.com/office/drawing/2014/main" xmlns="" id="{678142BE-84C9-4834-B6CC-6623E401661C}"/>
                   </a:ext>
                 </a:extLst>
               </p:cNvPr>
@@ -9971,7 +9972,7 @@
     </p:spTree>
     <p:extLst>
       <p:ext uri="{BB962C8B-B14F-4D97-AF65-F5344CB8AC3E}">
-        <p14:creationId xmlns="" xmlns:p14="http://schemas.microsoft.com/office/powerpoint/2010/main" val="1679651758"/>
+        <p14:creationId xmlns:p14="http://schemas.microsoft.com/office/powerpoint/2010/main" xmlns="" val="1679651758"/>
       </p:ext>
     </p:extLst>
   </p:cSld>
@@ -9979,7 +9980,7 @@
     <a:masterClrMapping/>
   </p:clrMapOvr>
   <mc:AlternateContent xmlns:mc="http://schemas.openxmlformats.org/markup-compatibility/2006">
-    <mc:Choice xmlns="" xmlns:p14="http://schemas.microsoft.com/office/powerpoint/2010/main" Requires="p14">
+    <mc:Choice xmlns:p14="http://schemas.microsoft.com/office/powerpoint/2010/main" xmlns="" Requires="p14">
       <p:transition spd="slow" p14:dur="2000" advClick="0" advTm="5000"/>
     </mc:Choice>
     <mc:Fallback>
@@ -10011,7 +10012,7 @@
           <p:cNvPr id="5" name="Slide Number">
             <a:extLst>
               <a:ext uri="{FF2B5EF4-FFF2-40B4-BE49-F238E27FC236}">
-                <a16:creationId xmlns="" xmlns:a16="http://schemas.microsoft.com/office/drawing/2014/main" id="{F0B8C963-1813-4B69-AD27-6D02EBBBB569}"/>
+                <a16:creationId xmlns:a16="http://schemas.microsoft.com/office/drawing/2014/main" xmlns="" id="{F0B8C963-1813-4B69-AD27-6D02EBBBB569}"/>
               </a:ext>
             </a:extLst>
           </p:cNvPr>
@@ -10053,7 +10054,7 @@
           <p:cNvPr id="3" name="Rectangle Left">
             <a:extLst>
               <a:ext uri="{FF2B5EF4-FFF2-40B4-BE49-F238E27FC236}">
-                <a16:creationId xmlns="" xmlns:a16="http://schemas.microsoft.com/office/drawing/2014/main" id="{345FB1C8-7F66-4D5C-ACCE-AE919936BCFD}"/>
+                <a16:creationId xmlns:a16="http://schemas.microsoft.com/office/drawing/2014/main" xmlns="" id="{345FB1C8-7F66-4D5C-ACCE-AE919936BCFD}"/>
               </a:ext>
             </a:extLst>
           </p:cNvPr>
@@ -10134,7 +10135,7 @@
           <p:cNvPr id="7" name="Slide Body Text">
             <a:extLst>
               <a:ext uri="{FF2B5EF4-FFF2-40B4-BE49-F238E27FC236}">
-                <a16:creationId xmlns="" xmlns:a16="http://schemas.microsoft.com/office/drawing/2014/main" id="{7296EDA7-D37D-4B31-A888-371F0804124F}"/>
+                <a16:creationId xmlns:a16="http://schemas.microsoft.com/office/drawing/2014/main" xmlns="" id="{7296EDA7-D37D-4B31-A888-371F0804124F}"/>
               </a:ext>
             </a:extLst>
           </p:cNvPr>
@@ -10232,7 +10233,7 @@
           <p:cNvPr id="6" name="Slide Title">
             <a:extLst>
               <a:ext uri="{FF2B5EF4-FFF2-40B4-BE49-F238E27FC236}">
-                <a16:creationId xmlns="" xmlns:a16="http://schemas.microsoft.com/office/drawing/2014/main" id="{55A88B09-3557-48A3-BF27-42699C269215}"/>
+                <a16:creationId xmlns:a16="http://schemas.microsoft.com/office/drawing/2014/main" xmlns="" id="{55A88B09-3557-48A3-BF27-42699C269215}"/>
               </a:ext>
             </a:extLst>
           </p:cNvPr>
@@ -10269,7 +10270,7 @@
           <p:cNvPr id="28" name="Group 27">
             <a:extLst>
               <a:ext uri="{FF2B5EF4-FFF2-40B4-BE49-F238E27FC236}">
-                <a16:creationId xmlns="" xmlns:a16="http://schemas.microsoft.com/office/drawing/2014/main" id="{C4248838-4E67-439E-AE0A-0043D2CB04D6}"/>
+                <a16:creationId xmlns:a16="http://schemas.microsoft.com/office/drawing/2014/main" xmlns="" id="{C4248838-4E67-439E-AE0A-0043D2CB04D6}"/>
               </a:ext>
             </a:extLst>
           </p:cNvPr>
@@ -10289,7 +10290,7 @@
             <p:cNvPr id="29" name="Group 28">
               <a:extLst>
                 <a:ext uri="{FF2B5EF4-FFF2-40B4-BE49-F238E27FC236}">
-                  <a16:creationId xmlns="" xmlns:a16="http://schemas.microsoft.com/office/drawing/2014/main" id="{810CFD6A-2427-49D5-846A-5F93601D4184}"/>
+                  <a16:creationId xmlns:a16="http://schemas.microsoft.com/office/drawing/2014/main" xmlns="" id="{810CFD6A-2427-49D5-846A-5F93601D4184}"/>
                 </a:ext>
               </a:extLst>
             </p:cNvPr>
@@ -10309,7 +10310,7 @@
               <p:cNvPr id="42" name="Oval 41">
                 <a:extLst>
                   <a:ext uri="{FF2B5EF4-FFF2-40B4-BE49-F238E27FC236}">
-                    <a16:creationId xmlns="" xmlns:a16="http://schemas.microsoft.com/office/drawing/2014/main" id="{017B1AE5-5C36-4839-BA1F-B404EA44E701}"/>
+                    <a16:creationId xmlns:a16="http://schemas.microsoft.com/office/drawing/2014/main" xmlns="" id="{017B1AE5-5C36-4839-BA1F-B404EA44E701}"/>
                   </a:ext>
                 </a:extLst>
               </p:cNvPr>
@@ -10361,7 +10362,7 @@
               <p:cNvPr id="43" name="Rectangle 5">
                 <a:extLst>
                   <a:ext uri="{FF2B5EF4-FFF2-40B4-BE49-F238E27FC236}">
-                    <a16:creationId xmlns="" xmlns:a16="http://schemas.microsoft.com/office/drawing/2014/main" id="{FB963D79-BB49-4A1D-BA66-EA0670C79BAE}"/>
+                    <a16:creationId xmlns:a16="http://schemas.microsoft.com/office/drawing/2014/main" xmlns="" id="{FB963D79-BB49-4A1D-BA66-EA0670C79BAE}"/>
                   </a:ext>
                 </a:extLst>
               </p:cNvPr>
@@ -10506,7 +10507,7 @@
               <p:cNvPr id="44" name="Rectangle 5">
                 <a:extLst>
                   <a:ext uri="{FF2B5EF4-FFF2-40B4-BE49-F238E27FC236}">
-                    <a16:creationId xmlns="" xmlns:a16="http://schemas.microsoft.com/office/drawing/2014/main" id="{6D7746D8-B913-493B-AAE9-25BC6893D40E}"/>
+                    <a16:creationId xmlns:a16="http://schemas.microsoft.com/office/drawing/2014/main" xmlns="" id="{6D7746D8-B913-493B-AAE9-25BC6893D40E}"/>
                   </a:ext>
                 </a:extLst>
               </p:cNvPr>
@@ -10651,7 +10652,7 @@
               <p:cNvPr id="45" name="Arc 44">
                 <a:extLst>
                   <a:ext uri="{FF2B5EF4-FFF2-40B4-BE49-F238E27FC236}">
-                    <a16:creationId xmlns="" xmlns:a16="http://schemas.microsoft.com/office/drawing/2014/main" id="{29031C02-E965-417B-8799-96061B14F30D}"/>
+                    <a16:creationId xmlns:a16="http://schemas.microsoft.com/office/drawing/2014/main" xmlns="" id="{29031C02-E965-417B-8799-96061B14F30D}"/>
                   </a:ext>
                 </a:extLst>
               </p:cNvPr>
@@ -10710,7 +10711,7 @@
               <p:cNvPr id="46" name="Arc 45">
                 <a:extLst>
                   <a:ext uri="{FF2B5EF4-FFF2-40B4-BE49-F238E27FC236}">
-                    <a16:creationId xmlns="" xmlns:a16="http://schemas.microsoft.com/office/drawing/2014/main" id="{26BFD8A6-BC99-4B16-BA10-08A9E5C681C0}"/>
+                    <a16:creationId xmlns:a16="http://schemas.microsoft.com/office/drawing/2014/main" xmlns="" id="{26BFD8A6-BC99-4B16-BA10-08A9E5C681C0}"/>
                   </a:ext>
                 </a:extLst>
               </p:cNvPr>
@@ -10770,7 +10771,7 @@
             <p:cNvPr id="30" name="Rectangle: Rounded Corners 29">
               <a:extLst>
                 <a:ext uri="{FF2B5EF4-FFF2-40B4-BE49-F238E27FC236}">
-                  <a16:creationId xmlns="" xmlns:a16="http://schemas.microsoft.com/office/drawing/2014/main" id="{B310277F-A78E-4FB9-9EA9-88BE4F1D585B}"/>
+                  <a16:creationId xmlns:a16="http://schemas.microsoft.com/office/drawing/2014/main" xmlns="" id="{B310277F-A78E-4FB9-9EA9-88BE4F1D585B}"/>
                 </a:ext>
               </a:extLst>
             </p:cNvPr>
@@ -10824,7 +10825,7 @@
             <p:cNvPr id="31" name="Rectangle: Rounded Corners 30">
               <a:extLst>
                 <a:ext uri="{FF2B5EF4-FFF2-40B4-BE49-F238E27FC236}">
-                  <a16:creationId xmlns="" xmlns:a16="http://schemas.microsoft.com/office/drawing/2014/main" id="{A92CF92B-C212-4542-83AE-A0058B5BB5EA}"/>
+                  <a16:creationId xmlns:a16="http://schemas.microsoft.com/office/drawing/2014/main" xmlns="" id="{A92CF92B-C212-4542-83AE-A0058B5BB5EA}"/>
                 </a:ext>
               </a:extLst>
             </p:cNvPr>
@@ -10885,7 +10886,7 @@
             <p:cNvPr id="32" name="Straight Connector 31">
               <a:extLst>
                 <a:ext uri="{FF2B5EF4-FFF2-40B4-BE49-F238E27FC236}">
-                  <a16:creationId xmlns="" xmlns:a16="http://schemas.microsoft.com/office/drawing/2014/main" id="{563B4374-5C0D-461F-B3BD-78D99614D365}"/>
+                  <a16:creationId xmlns:a16="http://schemas.microsoft.com/office/drawing/2014/main" xmlns="" id="{563B4374-5C0D-461F-B3BD-78D99614D365}"/>
                 </a:ext>
               </a:extLst>
             </p:cNvPr>
@@ -10931,7 +10932,7 @@
             <p:cNvPr id="33" name="Straight Connector 32">
               <a:extLst>
                 <a:ext uri="{FF2B5EF4-FFF2-40B4-BE49-F238E27FC236}">
-                  <a16:creationId xmlns="" xmlns:a16="http://schemas.microsoft.com/office/drawing/2014/main" id="{FBC6FDE7-AEA1-4230-8433-4C088A0FF5F9}"/>
+                  <a16:creationId xmlns:a16="http://schemas.microsoft.com/office/drawing/2014/main" xmlns="" id="{FBC6FDE7-AEA1-4230-8433-4C088A0FF5F9}"/>
                 </a:ext>
               </a:extLst>
             </p:cNvPr>
@@ -10977,7 +10978,7 @@
             <p:cNvPr id="34" name="Group 33">
               <a:extLst>
                 <a:ext uri="{FF2B5EF4-FFF2-40B4-BE49-F238E27FC236}">
-                  <a16:creationId xmlns="" xmlns:a16="http://schemas.microsoft.com/office/drawing/2014/main" id="{C4D1021D-07C7-4331-8FF6-36980A30978B}"/>
+                  <a16:creationId xmlns:a16="http://schemas.microsoft.com/office/drawing/2014/main" xmlns="" id="{C4D1021D-07C7-4331-8FF6-36980A30978B}"/>
                 </a:ext>
               </a:extLst>
             </p:cNvPr>
@@ -11000,7 +11001,7 @@
               <p:cNvPr id="40" name="Straight Connector 39">
                 <a:extLst>
                   <a:ext uri="{FF2B5EF4-FFF2-40B4-BE49-F238E27FC236}">
-                    <a16:creationId xmlns="" xmlns:a16="http://schemas.microsoft.com/office/drawing/2014/main" id="{13B7FE99-95CF-45D5-966B-87A979B93431}"/>
+                    <a16:creationId xmlns:a16="http://schemas.microsoft.com/office/drawing/2014/main" xmlns="" id="{13B7FE99-95CF-45D5-966B-87A979B93431}"/>
                   </a:ext>
                 </a:extLst>
               </p:cNvPr>
@@ -11044,7 +11045,7 @@
               <p:cNvPr id="41" name="Straight Connector 40">
                 <a:extLst>
                   <a:ext uri="{FF2B5EF4-FFF2-40B4-BE49-F238E27FC236}">
-                    <a16:creationId xmlns="" xmlns:a16="http://schemas.microsoft.com/office/drawing/2014/main" id="{71BBA69B-19FF-4ADB-A739-AD8136A5F0A6}"/>
+                    <a16:creationId xmlns:a16="http://schemas.microsoft.com/office/drawing/2014/main" xmlns="" id="{71BBA69B-19FF-4ADB-A739-AD8136A5F0A6}"/>
                   </a:ext>
                 </a:extLst>
               </p:cNvPr>
@@ -11089,7 +11090,7 @@
             <p:cNvPr id="35" name="Straight Connector 34">
               <a:extLst>
                 <a:ext uri="{FF2B5EF4-FFF2-40B4-BE49-F238E27FC236}">
-                  <a16:creationId xmlns="" xmlns:a16="http://schemas.microsoft.com/office/drawing/2014/main" id="{BFD1D86B-562B-40B2-8E46-34233EFEE7FC}"/>
+                  <a16:creationId xmlns:a16="http://schemas.microsoft.com/office/drawing/2014/main" xmlns="" id="{BFD1D86B-562B-40B2-8E46-34233EFEE7FC}"/>
                 </a:ext>
               </a:extLst>
             </p:cNvPr>
@@ -11135,7 +11136,7 @@
             <p:cNvPr id="36" name="Rectangle: Rounded Corners 35">
               <a:extLst>
                 <a:ext uri="{FF2B5EF4-FFF2-40B4-BE49-F238E27FC236}">
-                  <a16:creationId xmlns="" xmlns:a16="http://schemas.microsoft.com/office/drawing/2014/main" id="{388C17BD-16A1-43C5-BFFA-2FF9174719E1}"/>
+                  <a16:creationId xmlns:a16="http://schemas.microsoft.com/office/drawing/2014/main" xmlns="" id="{388C17BD-16A1-43C5-BFFA-2FF9174719E1}"/>
                 </a:ext>
               </a:extLst>
             </p:cNvPr>
@@ -11189,7 +11190,7 @@
             <p:cNvPr id="37" name="Group 36">
               <a:extLst>
                 <a:ext uri="{FF2B5EF4-FFF2-40B4-BE49-F238E27FC236}">
-                  <a16:creationId xmlns="" xmlns:a16="http://schemas.microsoft.com/office/drawing/2014/main" id="{1B3B910E-ACFC-4F28-8E28-F02E1588B87E}"/>
+                  <a16:creationId xmlns:a16="http://schemas.microsoft.com/office/drawing/2014/main" xmlns="" id="{1B3B910E-ACFC-4F28-8E28-F02E1588B87E}"/>
                 </a:ext>
               </a:extLst>
             </p:cNvPr>
@@ -11212,7 +11213,7 @@
               <p:cNvPr id="38" name="Straight Connector 37">
                 <a:extLst>
                   <a:ext uri="{FF2B5EF4-FFF2-40B4-BE49-F238E27FC236}">
-                    <a16:creationId xmlns="" xmlns:a16="http://schemas.microsoft.com/office/drawing/2014/main" id="{F57772B6-06C0-4F54-AA94-D3F92DA4716A}"/>
+                    <a16:creationId xmlns:a16="http://schemas.microsoft.com/office/drawing/2014/main" xmlns="" id="{F57772B6-06C0-4F54-AA94-D3F92DA4716A}"/>
                   </a:ext>
                 </a:extLst>
               </p:cNvPr>
@@ -11256,7 +11257,7 @@
               <p:cNvPr id="39" name="Straight Connector 38">
                 <a:extLst>
                   <a:ext uri="{FF2B5EF4-FFF2-40B4-BE49-F238E27FC236}">
-                    <a16:creationId xmlns="" xmlns:a16="http://schemas.microsoft.com/office/drawing/2014/main" id="{23370C1F-7876-4278-AB20-78F6CAA385E2}"/>
+                    <a16:creationId xmlns:a16="http://schemas.microsoft.com/office/drawing/2014/main" xmlns="" id="{23370C1F-7876-4278-AB20-78F6CAA385E2}"/>
                   </a:ext>
                 </a:extLst>
               </p:cNvPr>
@@ -11300,7 +11301,7 @@
     </p:spTree>
     <p:extLst>
       <p:ext uri="{BB962C8B-B14F-4D97-AF65-F5344CB8AC3E}">
-        <p14:creationId xmlns="" xmlns:p14="http://schemas.microsoft.com/office/powerpoint/2010/main" val="3284562556"/>
+        <p14:creationId xmlns:p14="http://schemas.microsoft.com/office/powerpoint/2010/main" xmlns="" val="3284562556"/>
       </p:ext>
     </p:extLst>
   </p:cSld>
@@ -11308,7 +11309,7 @@
     <a:masterClrMapping/>
   </p:clrMapOvr>
   <mc:AlternateContent xmlns:mc="http://schemas.openxmlformats.org/markup-compatibility/2006">
-    <mc:Choice xmlns="" xmlns:p14="http://schemas.microsoft.com/office/powerpoint/2010/main" Requires="p14">
+    <mc:Choice xmlns:p14="http://schemas.microsoft.com/office/powerpoint/2010/main" xmlns="" Requires="p14">
       <p:transition spd="slow" p14:dur="2000" advClick="0" advTm="5000"/>
     </mc:Choice>
     <mc:Fallback>
@@ -11340,7 +11341,7 @@
           <p:cNvPr id="8" name="Slide Number">
             <a:extLst>
               <a:ext uri="{FF2B5EF4-FFF2-40B4-BE49-F238E27FC236}">
-                <a16:creationId xmlns="" xmlns:a16="http://schemas.microsoft.com/office/drawing/2014/main" id="{509D954E-A844-4072-A556-DE584BEB9321}"/>
+                <a16:creationId xmlns:a16="http://schemas.microsoft.com/office/drawing/2014/main" xmlns="" id="{509D954E-A844-4072-A556-DE584BEB9321}"/>
               </a:ext>
             </a:extLst>
           </p:cNvPr>
@@ -11382,7 +11383,7 @@
           <p:cNvPr id="6" name="Code Box">
             <a:extLst>
               <a:ext uri="{FF2B5EF4-FFF2-40B4-BE49-F238E27FC236}">
-                <a16:creationId xmlns="" xmlns:a16="http://schemas.microsoft.com/office/drawing/2014/main" id="{3278A82F-5546-4977-9F75-2A933B415945}"/>
+                <a16:creationId xmlns:a16="http://schemas.microsoft.com/office/drawing/2014/main" xmlns="" id="{3278A82F-5546-4977-9F75-2A933B415945}"/>
               </a:ext>
             </a:extLst>
           </p:cNvPr>
@@ -11469,7 +11470,7 @@
           <p:cNvPr id="21" name="Slide Body Text">
             <a:extLst>
               <a:ext uri="{FF2B5EF4-FFF2-40B4-BE49-F238E27FC236}">
-                <a16:creationId xmlns="" xmlns:a16="http://schemas.microsoft.com/office/drawing/2014/main" id="{04F318BE-2BAD-4677-871C-D78A4BF0CBA6}"/>
+                <a16:creationId xmlns:a16="http://schemas.microsoft.com/office/drawing/2014/main" xmlns="" id="{04F318BE-2BAD-4677-871C-D78A4BF0CBA6}"/>
               </a:ext>
             </a:extLst>
           </p:cNvPr>
@@ -11516,7 +11517,7 @@
           <p:cNvPr id="9" name="Rectangle Top">
             <a:extLst>
               <a:ext uri="{FF2B5EF4-FFF2-40B4-BE49-F238E27FC236}">
-                <a16:creationId xmlns="" xmlns:a16="http://schemas.microsoft.com/office/drawing/2014/main" id="{A15CE03A-0933-4E5D-9EA1-718D4F802FFC}"/>
+                <a16:creationId xmlns:a16="http://schemas.microsoft.com/office/drawing/2014/main" xmlns="" id="{A15CE03A-0933-4E5D-9EA1-718D4F802FFC}"/>
               </a:ext>
             </a:extLst>
           </p:cNvPr>
@@ -11597,7 +11598,7 @@
           <p:cNvPr id="10" name="Logo Software University" descr="Software University logo">
             <a:extLst>
               <a:ext uri="{FF2B5EF4-FFF2-40B4-BE49-F238E27FC236}">
-                <a16:creationId xmlns="" xmlns:a16="http://schemas.microsoft.com/office/drawing/2014/main" id="{8C01D7AF-7CBD-46E1-99F3-8EB60E838D91}"/>
+                <a16:creationId xmlns:a16="http://schemas.microsoft.com/office/drawing/2014/main" xmlns="" id="{8C01D7AF-7CBD-46E1-99F3-8EB60E838D91}"/>
               </a:ext>
             </a:extLst>
           </p:cNvPr>
@@ -11610,7 +11611,7 @@
           <a:blip r:embed="rId2" cstate="print">
             <a:extLst>
               <a:ext uri="{28A0092B-C50C-407E-A947-70E740481C1C}">
-                <a14:useLocalDpi xmlns="" xmlns:a14="http://schemas.microsoft.com/office/drawing/2010/main" val="0"/>
+                <a14:useLocalDpi xmlns:a14="http://schemas.microsoft.com/office/drawing/2010/main" xmlns="" val="0"/>
               </a:ext>
             </a:extLst>
           </a:blip>
@@ -11633,7 +11634,7 @@
           <p:cNvPr id="11" name="Slide Title">
             <a:extLst>
               <a:ext uri="{FF2B5EF4-FFF2-40B4-BE49-F238E27FC236}">
-                <a16:creationId xmlns="" xmlns:a16="http://schemas.microsoft.com/office/drawing/2014/main" id="{47D60833-F0A9-4F29-8C06-A963A7C8BE93}"/>
+                <a16:creationId xmlns:a16="http://schemas.microsoft.com/office/drawing/2014/main" xmlns="" id="{47D60833-F0A9-4F29-8C06-A963A7C8BE93}"/>
               </a:ext>
             </a:extLst>
           </p:cNvPr>
@@ -11672,7 +11673,7 @@
     </p:spTree>
     <p:extLst>
       <p:ext uri="{BB962C8B-B14F-4D97-AF65-F5344CB8AC3E}">
-        <p14:creationId xmlns="" xmlns:p14="http://schemas.microsoft.com/office/powerpoint/2010/main" val="1000829826"/>
+        <p14:creationId xmlns:p14="http://schemas.microsoft.com/office/powerpoint/2010/main" xmlns="" val="1000829826"/>
       </p:ext>
     </p:extLst>
   </p:cSld>
@@ -11680,7 +11681,7 @@
     <a:masterClrMapping/>
   </p:clrMapOvr>
   <mc:AlternateContent xmlns:mc="http://schemas.openxmlformats.org/markup-compatibility/2006">
-    <mc:Choice xmlns="" xmlns:p14="http://schemas.microsoft.com/office/powerpoint/2010/main" Requires="p14">
+    <mc:Choice xmlns:p14="http://schemas.microsoft.com/office/powerpoint/2010/main" xmlns="" Requires="p14">
       <p:transition spd="slow" p14:dur="2000" advClick="0" advTm="5000"/>
     </mc:Choice>
     <mc:Fallback>
@@ -11712,7 +11713,7 @@
           <p:cNvPr id="10" name="Slide Number">
             <a:extLst>
               <a:ext uri="{FF2B5EF4-FFF2-40B4-BE49-F238E27FC236}">
-                <a16:creationId xmlns="" xmlns:a16="http://schemas.microsoft.com/office/drawing/2014/main" id="{39DDE17E-5472-41F3-AF5F-54DFF10DC63C}"/>
+                <a16:creationId xmlns:a16="http://schemas.microsoft.com/office/drawing/2014/main" xmlns="" id="{39DDE17E-5472-41F3-AF5F-54DFF10DC63C}"/>
               </a:ext>
             </a:extLst>
           </p:cNvPr>
@@ -11754,7 +11755,7 @@
           <p:cNvPr id="9" name="Picture SoftUni Mascot" descr="SoftUni mascot with laptop">
             <a:extLst>
               <a:ext uri="{FF2B5EF4-FFF2-40B4-BE49-F238E27FC236}">
-                <a16:creationId xmlns="" xmlns:a16="http://schemas.microsoft.com/office/drawing/2014/main" id="{DC4365F6-D2C1-47B4-8477-38FD2C7711AA}"/>
+                <a16:creationId xmlns:a16="http://schemas.microsoft.com/office/drawing/2014/main" xmlns="" id="{DC4365F6-D2C1-47B4-8477-38FD2C7711AA}"/>
               </a:ext>
             </a:extLst>
           </p:cNvPr>
@@ -11767,7 +11768,7 @@
           <a:blip r:embed="rId2" cstate="print">
             <a:extLst>
               <a:ext uri="{28A0092B-C50C-407E-A947-70E740481C1C}">
-                <a14:useLocalDpi xmlns="" xmlns:a14="http://schemas.microsoft.com/office/drawing/2010/main" val="0"/>
+                <a14:useLocalDpi xmlns:a14="http://schemas.microsoft.com/office/drawing/2010/main" xmlns="" val="0"/>
               </a:ext>
             </a:extLst>
           </a:blip>
@@ -11790,7 +11791,7 @@
           <p:cNvPr id="23" name="Slide Body Text">
             <a:extLst>
               <a:ext uri="{FF2B5EF4-FFF2-40B4-BE49-F238E27FC236}">
-                <a16:creationId xmlns="" xmlns:a16="http://schemas.microsoft.com/office/drawing/2014/main" id="{889D93F4-ABFA-46BF-8E5D-FE6562ACB20F}"/>
+                <a16:creationId xmlns:a16="http://schemas.microsoft.com/office/drawing/2014/main" xmlns="" id="{889D93F4-ABFA-46BF-8E5D-FE6562ACB20F}"/>
               </a:ext>
             </a:extLst>
           </p:cNvPr>
@@ -11881,7 +11882,7 @@
           <p:cNvPr id="8" name="Rectangle Top">
             <a:extLst>
               <a:ext uri="{FF2B5EF4-FFF2-40B4-BE49-F238E27FC236}">
-                <a16:creationId xmlns="" xmlns:a16="http://schemas.microsoft.com/office/drawing/2014/main" id="{930E0800-9260-4369-8330-8264DD33C5CE}"/>
+                <a16:creationId xmlns:a16="http://schemas.microsoft.com/office/drawing/2014/main" xmlns="" id="{930E0800-9260-4369-8330-8264DD33C5CE}"/>
               </a:ext>
             </a:extLst>
           </p:cNvPr>
@@ -11962,7 +11963,7 @@
           <p:cNvPr id="11" name="Logo Software University" descr="Software University logo">
             <a:extLst>
               <a:ext uri="{FF2B5EF4-FFF2-40B4-BE49-F238E27FC236}">
-                <a16:creationId xmlns="" xmlns:a16="http://schemas.microsoft.com/office/drawing/2014/main" id="{14F779A7-4A91-448B-BEFA-956C70A1C22F}"/>
+                <a16:creationId xmlns:a16="http://schemas.microsoft.com/office/drawing/2014/main" xmlns="" id="{14F779A7-4A91-448B-BEFA-956C70A1C22F}"/>
               </a:ext>
             </a:extLst>
           </p:cNvPr>
@@ -11975,7 +11976,7 @@
           <a:blip r:embed="rId3" cstate="print">
             <a:extLst>
               <a:ext uri="{28A0092B-C50C-407E-A947-70E740481C1C}">
-                <a14:useLocalDpi xmlns="" xmlns:a14="http://schemas.microsoft.com/office/drawing/2010/main" val="0"/>
+                <a14:useLocalDpi xmlns:a14="http://schemas.microsoft.com/office/drawing/2010/main" xmlns="" val="0"/>
               </a:ext>
             </a:extLst>
           </a:blip>
@@ -11998,7 +11999,7 @@
           <p:cNvPr id="13" name="Slide Title">
             <a:extLst>
               <a:ext uri="{FF2B5EF4-FFF2-40B4-BE49-F238E27FC236}">
-                <a16:creationId xmlns="" xmlns:a16="http://schemas.microsoft.com/office/drawing/2014/main" id="{357D7BE1-6358-42CC-94F3-7BCDD91DCB6D}"/>
+                <a16:creationId xmlns:a16="http://schemas.microsoft.com/office/drawing/2014/main" xmlns="" id="{357D7BE1-6358-42CC-94F3-7BCDD91DCB6D}"/>
               </a:ext>
             </a:extLst>
           </p:cNvPr>
@@ -12037,7 +12038,7 @@
     </p:spTree>
     <p:extLst>
       <p:ext uri="{BB962C8B-B14F-4D97-AF65-F5344CB8AC3E}">
-        <p14:creationId xmlns="" xmlns:p14="http://schemas.microsoft.com/office/powerpoint/2010/main" val="1028724482"/>
+        <p14:creationId xmlns:p14="http://schemas.microsoft.com/office/powerpoint/2010/main" xmlns="" val="1028724482"/>
       </p:ext>
     </p:extLst>
   </p:cSld>
@@ -12045,7 +12046,7 @@
     <a:masterClrMapping/>
   </p:clrMapOvr>
   <mc:AlternateContent xmlns:mc="http://schemas.openxmlformats.org/markup-compatibility/2006">
-    <mc:Choice xmlns="" xmlns:p14="http://schemas.microsoft.com/office/powerpoint/2010/main" Requires="p14">
+    <mc:Choice xmlns:p14="http://schemas.microsoft.com/office/powerpoint/2010/main" xmlns="" Requires="p14">
       <p:transition spd="slow" p14:dur="2000" advClick="0" advTm="5000"/>
     </mc:Choice>
     <mc:Fallback>
@@ -12157,7 +12158,7 @@
           <p:cNvPr id="11" name="Slide Number">
             <a:extLst>
               <a:ext uri="{FF2B5EF4-FFF2-40B4-BE49-F238E27FC236}">
-                <a16:creationId xmlns="" xmlns:a16="http://schemas.microsoft.com/office/drawing/2014/main" id="{6750ECE4-94E0-469B-B8E4-562792823B0F}"/>
+                <a16:creationId xmlns:a16="http://schemas.microsoft.com/office/drawing/2014/main" xmlns="" id="{6750ECE4-94E0-469B-B8E4-562792823B0F}"/>
               </a:ext>
             </a:extLst>
           </p:cNvPr>
@@ -12280,7 +12281,7 @@
           <p:cNvPr id="12" name="Logo Software University Down" descr="Software University logo">
             <a:extLst>
               <a:ext uri="{FF2B5EF4-FFF2-40B4-BE49-F238E27FC236}">
-                <a16:creationId xmlns="" xmlns:a16="http://schemas.microsoft.com/office/drawing/2014/main" id="{7028D2F0-1E67-414B-A93D-D3F8F131A132}"/>
+                <a16:creationId xmlns:a16="http://schemas.microsoft.com/office/drawing/2014/main" xmlns="" id="{7028D2F0-1E67-414B-A93D-D3F8F131A132}"/>
               </a:ext>
             </a:extLst>
           </p:cNvPr>
@@ -12293,7 +12294,7 @@
           <a:blip r:embed="rId2" cstate="print">
             <a:extLst>
               <a:ext uri="{28A0092B-C50C-407E-A947-70E740481C1C}">
-                <a14:useLocalDpi xmlns="" xmlns:a14="http://schemas.microsoft.com/office/drawing/2010/main" val="0"/>
+                <a14:useLocalDpi xmlns:a14="http://schemas.microsoft.com/office/drawing/2010/main" xmlns="" val="0"/>
               </a:ext>
             </a:extLst>
           </a:blip>
@@ -12316,7 +12317,7 @@
           <p:cNvPr id="10" name="Text Placeholder Right">
             <a:extLst>
               <a:ext uri="{FF2B5EF4-FFF2-40B4-BE49-F238E27FC236}">
-                <a16:creationId xmlns="" xmlns:a16="http://schemas.microsoft.com/office/drawing/2014/main" id="{AF69A59F-C564-4A04-B1CC-31C261499991}"/>
+                <a16:creationId xmlns:a16="http://schemas.microsoft.com/office/drawing/2014/main" xmlns="" id="{AF69A59F-C564-4A04-B1CC-31C261499991}"/>
               </a:ext>
             </a:extLst>
           </p:cNvPr>
@@ -12394,7 +12395,7 @@
           <p:cNvPr id="9" name="Text Placeholder Left">
             <a:extLst>
               <a:ext uri="{FF2B5EF4-FFF2-40B4-BE49-F238E27FC236}">
-                <a16:creationId xmlns="" xmlns:a16="http://schemas.microsoft.com/office/drawing/2014/main" id="{C8A626D2-456B-41EF-9818-EA8DD7E314DA}"/>
+                <a16:creationId xmlns:a16="http://schemas.microsoft.com/office/drawing/2014/main" xmlns="" id="{C8A626D2-456B-41EF-9818-EA8DD7E314DA}"/>
               </a:ext>
             </a:extLst>
           </p:cNvPr>
@@ -12472,7 +12473,7 @@
           <p:cNvPr id="13" name="Rectangle Top">
             <a:extLst>
               <a:ext uri="{FF2B5EF4-FFF2-40B4-BE49-F238E27FC236}">
-                <a16:creationId xmlns="" xmlns:a16="http://schemas.microsoft.com/office/drawing/2014/main" id="{E03301DA-D0AF-46FD-8740-2F761250203A}"/>
+                <a16:creationId xmlns:a16="http://schemas.microsoft.com/office/drawing/2014/main" xmlns="" id="{E03301DA-D0AF-46FD-8740-2F761250203A}"/>
               </a:ext>
             </a:extLst>
           </p:cNvPr>
@@ -12553,7 +12554,7 @@
           <p:cNvPr id="14" name="Logo Software University" descr="Software University logo">
             <a:extLst>
               <a:ext uri="{FF2B5EF4-FFF2-40B4-BE49-F238E27FC236}">
-                <a16:creationId xmlns="" xmlns:a16="http://schemas.microsoft.com/office/drawing/2014/main" id="{19A67BB9-D880-4EAD-B90E-89C4219BFC0B}"/>
+                <a16:creationId xmlns:a16="http://schemas.microsoft.com/office/drawing/2014/main" xmlns="" id="{19A67BB9-D880-4EAD-B90E-89C4219BFC0B}"/>
               </a:ext>
             </a:extLst>
           </p:cNvPr>
@@ -12566,7 +12567,7 @@
           <a:blip r:embed="rId3" cstate="print">
             <a:extLst>
               <a:ext uri="{28A0092B-C50C-407E-A947-70E740481C1C}">
-                <a14:useLocalDpi xmlns="" xmlns:a14="http://schemas.microsoft.com/office/drawing/2010/main" val="0"/>
+                <a14:useLocalDpi xmlns:a14="http://schemas.microsoft.com/office/drawing/2010/main" xmlns="" val="0"/>
               </a:ext>
             </a:extLst>
           </a:blip>
@@ -12589,7 +12590,7 @@
           <p:cNvPr id="15" name="Slide Title">
             <a:extLst>
               <a:ext uri="{FF2B5EF4-FFF2-40B4-BE49-F238E27FC236}">
-                <a16:creationId xmlns="" xmlns:a16="http://schemas.microsoft.com/office/drawing/2014/main" id="{EA9A94D1-F9F6-4D7B-85E3-896A987B6A4D}"/>
+                <a16:creationId xmlns:a16="http://schemas.microsoft.com/office/drawing/2014/main" xmlns="" id="{EA9A94D1-F9F6-4D7B-85E3-896A987B6A4D}"/>
               </a:ext>
             </a:extLst>
           </p:cNvPr>
@@ -12628,7 +12629,7 @@
     </p:spTree>
     <p:extLst>
       <p:ext uri="{BB962C8B-B14F-4D97-AF65-F5344CB8AC3E}">
-        <p14:creationId xmlns="" xmlns:p14="http://schemas.microsoft.com/office/powerpoint/2010/main" val="3044033461"/>
+        <p14:creationId xmlns:p14="http://schemas.microsoft.com/office/powerpoint/2010/main" xmlns="" val="3044033461"/>
       </p:ext>
     </p:extLst>
   </p:cSld>
@@ -12636,7 +12637,7 @@
     <a:masterClrMapping/>
   </p:clrMapOvr>
   <mc:AlternateContent xmlns:mc="http://schemas.openxmlformats.org/markup-compatibility/2006">
-    <mc:Choice xmlns="" xmlns:p14="http://schemas.microsoft.com/office/powerpoint/2010/main" Requires="p14">
+    <mc:Choice xmlns:p14="http://schemas.microsoft.com/office/powerpoint/2010/main" xmlns="" Requires="p14">
       <p:transition spd="slow" p14:dur="2000" advClick="0" advTm="5000"/>
     </mc:Choice>
     <mc:Fallback>
@@ -12645,7 +12646,7 @@
   </mc:AlternateContent>
   <p:extLst>
     <p:ext uri="{DCECCB84-F9BA-43D5-87BE-67443E8EF086}">
-      <p15:sldGuideLst xmlns="" xmlns:p15="http://schemas.microsoft.com/office/powerpoint/2012/main">
+      <p15:sldGuideLst xmlns:p15="http://schemas.microsoft.com/office/powerpoint/2012/main" xmlns="">
         <p15:guide id="1" orient="horz" pos="2160">
           <p15:clr>
             <a:srgbClr val="FBAE40"/>
@@ -12692,7 +12693,7 @@
           <p:cNvPr id="4" name="Picture Background" descr="SoftUni Background">
             <a:extLst>
               <a:ext uri="{FF2B5EF4-FFF2-40B4-BE49-F238E27FC236}">
-                <a16:creationId xmlns="" xmlns:a16="http://schemas.microsoft.com/office/drawing/2014/main" id="{5BE90A63-DDD9-4B3B-A234-DF69B9BC812F}"/>
+                <a16:creationId xmlns:a16="http://schemas.microsoft.com/office/drawing/2014/main" xmlns="" id="{5BE90A63-DDD9-4B3B-A234-DF69B9BC812F}"/>
               </a:ext>
             </a:extLst>
           </p:cNvPr>
@@ -12721,7 +12722,7 @@
           <p:cNvPr id="11" name="Slide Body Text">
             <a:extLst>
               <a:ext uri="{FF2B5EF4-FFF2-40B4-BE49-F238E27FC236}">
-                <a16:creationId xmlns="" xmlns:a16="http://schemas.microsoft.com/office/drawing/2014/main" id="{90CBFB32-9F46-4F2F-8A54-9EE8BED27855}"/>
+                <a16:creationId xmlns:a16="http://schemas.microsoft.com/office/drawing/2014/main" xmlns="" id="{90CBFB32-9F46-4F2F-8A54-9EE8BED27855}"/>
               </a:ext>
             </a:extLst>
           </p:cNvPr>
@@ -12789,7 +12790,7 @@
           <p:cNvPr id="10" name="Slide Title">
             <a:extLst>
               <a:ext uri="{FF2B5EF4-FFF2-40B4-BE49-F238E27FC236}">
-                <a16:creationId xmlns="" xmlns:a16="http://schemas.microsoft.com/office/drawing/2014/main" id="{B770C392-3003-4C35-9625-BB041F8257BA}"/>
+                <a16:creationId xmlns:a16="http://schemas.microsoft.com/office/drawing/2014/main" xmlns="" id="{B770C392-3003-4C35-9625-BB041F8257BA}"/>
               </a:ext>
             </a:extLst>
           </p:cNvPr>
@@ -12826,7 +12827,7 @@
     </p:spTree>
     <p:extLst>
       <p:ext uri="{BB962C8B-B14F-4D97-AF65-F5344CB8AC3E}">
-        <p14:creationId xmlns="" xmlns:p14="http://schemas.microsoft.com/office/powerpoint/2010/main" val="156789181"/>
+        <p14:creationId xmlns:p14="http://schemas.microsoft.com/office/powerpoint/2010/main" xmlns="" val="156789181"/>
       </p:ext>
     </p:extLst>
   </p:cSld>
@@ -12850,7 +12851,7 @@
     <p:sldLayoutId id="2147483696" r:id="rId16"/>
   </p:sldLayoutIdLst>
   <mc:AlternateContent xmlns:mc="http://schemas.openxmlformats.org/markup-compatibility/2006">
-    <mc:Choice xmlns="" xmlns:p14="http://schemas.microsoft.com/office/powerpoint/2010/main" Requires="p14">
+    <mc:Choice xmlns:p14="http://schemas.microsoft.com/office/powerpoint/2010/main" xmlns="" Requires="p14">
       <p:transition spd="slow" p14:dur="2000" advClick="0" advTm="5000"/>
     </mc:Choice>
     <mc:Fallback>
@@ -13140,7 +13141,7 @@
   </p:txStyles>
   <p:extLst>
     <p:ext uri="{27BBF7A9-308A-43DC-89C8-2F10F3537804}">
-      <p15:sldGuideLst xmlns="" xmlns:p15="http://schemas.microsoft.com/office/powerpoint/2012/main">
+      <p15:sldGuideLst xmlns:p15="http://schemas.microsoft.com/office/powerpoint/2012/main" xmlns="">
         <p15:guide id="1" orient="horz" pos="2160">
           <p15:clr>
             <a:srgbClr val="F26B43"/>
@@ -13236,7 +13237,7 @@
           <p:cNvPr id="10" name="Author Position">
             <a:extLst>
               <a:ext uri="{FF2B5EF4-FFF2-40B4-BE49-F238E27FC236}">
-                <a16:creationId xmlns="" xmlns:a16="http://schemas.microsoft.com/office/drawing/2014/main" id="{F585BC4C-0F13-4FD4-8F23-99FD46618370}"/>
+                <a16:creationId xmlns:a16="http://schemas.microsoft.com/office/drawing/2014/main" xmlns="" id="{F585BC4C-0F13-4FD4-8F23-99FD46618370}"/>
               </a:ext>
             </a:extLst>
           </p:cNvPr>
@@ -13269,7 +13270,7 @@
           <p:cNvPr id="9" name="Author Name">
             <a:extLst>
               <a:ext uri="{FF2B5EF4-FFF2-40B4-BE49-F238E27FC236}">
-                <a16:creationId xmlns="" xmlns:a16="http://schemas.microsoft.com/office/drawing/2014/main" id="{FA396BB6-2053-4690-9672-BC528007D370}"/>
+                <a16:creationId xmlns:a16="http://schemas.microsoft.com/office/drawing/2014/main" xmlns="" id="{FA396BB6-2053-4690-9672-BC528007D370}"/>
               </a:ext>
             </a:extLst>
           </p:cNvPr>
@@ -13302,7 +13303,7 @@
           <p:cNvPr id="3" name="Presentation Subtitle">
             <a:extLst>
               <a:ext uri="{FF2B5EF4-FFF2-40B4-BE49-F238E27FC236}">
-                <a16:creationId xmlns="" xmlns:a16="http://schemas.microsoft.com/office/drawing/2014/main" id="{A004DC04-DA2A-41C0-8578-4B8D2F08EA7D}"/>
+                <a16:creationId xmlns:a16="http://schemas.microsoft.com/office/drawing/2014/main" xmlns="" id="{A004DC04-DA2A-41C0-8578-4B8D2F08EA7D}"/>
               </a:ext>
             </a:extLst>
           </p:cNvPr>
@@ -13338,7 +13339,7 @@
           <p:cNvPr id="16" name="Title 15">
             <a:extLst>
               <a:ext uri="{FF2B5EF4-FFF2-40B4-BE49-F238E27FC236}">
-                <a16:creationId xmlns="" xmlns:a16="http://schemas.microsoft.com/office/drawing/2014/main" id="{09D526E5-16F9-CDC3-F025-1D308EB5C234}"/>
+                <a16:creationId xmlns:a16="http://schemas.microsoft.com/office/drawing/2014/main" xmlns="" id="{09D526E5-16F9-CDC3-F025-1D308EB5C234}"/>
               </a:ext>
             </a:extLst>
           </p:cNvPr>
@@ -13402,7 +13403,7 @@
     </p:spTree>
     <p:extLst>
       <p:ext uri="{BB962C8B-B14F-4D97-AF65-F5344CB8AC3E}">
-        <p14:creationId xmlns="" xmlns:p14="http://schemas.microsoft.com/office/powerpoint/2010/main" val="3666405375"/>
+        <p14:creationId xmlns:p14="http://schemas.microsoft.com/office/powerpoint/2010/main" xmlns="" val="3666405375"/>
       </p:ext>
     </p:extLst>
   </p:cSld>
@@ -13410,7 +13411,7 @@
     <a:masterClrMapping/>
   </p:clrMapOvr>
   <mc:AlternateContent xmlns:mc="http://schemas.openxmlformats.org/markup-compatibility/2006">
-    <mc:Choice xmlns="" xmlns:p14="http://schemas.microsoft.com/office/powerpoint/2010/main" Requires="p14">
+    <mc:Choice xmlns:p14="http://schemas.microsoft.com/office/powerpoint/2010/main" xmlns="" Requires="p14">
       <p:transition spd="slow" p14:dur="2000" advClick="0" advTm="5000"/>
     </mc:Choice>
     <mc:Fallback>
@@ -13749,7 +13750,15 @@
           <a:p>
             <a:r>
               <a:rPr lang="bg-BG" dirty="0" smtClean="0"/>
-              <a:t>Комбиниран ключ</a:t>
+              <a:t>Комбиниран </a:t>
+            </a:r>
+            <a:r>
+              <a:rPr lang="bg-BG" dirty="0" smtClean="0"/>
+              <a:t>ключ</a:t>
+            </a:r>
+            <a:r>
+              <a:rPr lang="en-US" dirty="0" smtClean="0"/>
+              <a:t> (1)</a:t>
             </a:r>
             <a:endParaRPr lang="en-US" dirty="0"/>
           </a:p>
@@ -13761,7 +13770,7 @@
     <a:masterClrMapping/>
   </p:clrMapOvr>
   <mc:AlternateContent xmlns:mc="http://schemas.openxmlformats.org/markup-compatibility/2006">
-    <mc:Choice xmlns="" xmlns:p14="http://schemas.microsoft.com/office/powerpoint/2010/main" Requires="p14">
+    <mc:Choice xmlns:p14="http://schemas.microsoft.com/office/powerpoint/2010/main" xmlns="" Requires="p14">
       <p:transition spd="slow" p14:dur="2000" advClick="0" advTm="5000"/>
     </mc:Choice>
     <mc:Fallback>
@@ -14096,6 +14105,217 @@
       </p:grpSpPr>
       <p:sp>
         <p:nvSpPr>
+          <p:cNvPr id="2" name="Slide Number Placeholder 1"/>
+          <p:cNvSpPr>
+            <a:spLocks noGrp="1"/>
+          </p:cNvSpPr>
+          <p:nvPr>
+            <p:ph type="sldNum" sz="quarter" idx="5"/>
+          </p:nvPr>
+        </p:nvSpPr>
+        <p:spPr/>
+        <p:txBody>
+          <a:bodyPr/>
+          <a:lstStyle/>
+          <a:p>
+            <a:fld id="{2BF067CD-8E6B-4360-9AA8-C5DF2A48A6D1}" type="slidenum">
+              <a:rPr lang="en-US" noProof="0" smtClean="0"/>
+              <a:pPr/>
+              <a:t>11</a:t>
+            </a:fld>
+            <a:endParaRPr lang="en-US" noProof="0" dirty="0"/>
+          </a:p>
+        </p:txBody>
+      </p:sp>
+      <p:sp>
+        <p:nvSpPr>
+          <p:cNvPr id="3" name="Text Placeholder 2"/>
+          <p:cNvSpPr>
+            <a:spLocks noGrp="1"/>
+          </p:cNvSpPr>
+          <p:nvPr>
+            <p:ph type="body" sz="quarter" idx="10"/>
+          </p:nvPr>
+        </p:nvSpPr>
+        <p:spPr>
+          <a:xfrm>
+            <a:off x="190402" y="1196125"/>
+            <a:ext cx="11849198" cy="5528766"/>
+          </a:xfrm>
+        </p:spPr>
+        <p:txBody>
+          <a:bodyPr>
+            <a:normAutofit/>
+          </a:bodyPr>
+          <a:lstStyle/>
+          <a:p>
+            <a:r>
+              <a:rPr lang="ru-RU" sz="3600" dirty="0" smtClean="0"/>
+              <a:t>Съчетава </a:t>
+            </a:r>
+            <a:r>
+              <a:rPr lang="ru-RU" sz="3600" b="1" dirty="0" smtClean="0">
+                <a:solidFill>
+                  <a:schemeClr val="bg1"/>
+                </a:solidFill>
+              </a:rPr>
+              <a:t>повече от един </a:t>
+            </a:r>
+            <a:r>
+              <a:rPr lang="ru-RU" sz="3600" dirty="0" smtClean="0"/>
+              <a:t>атрибут за уникална </a:t>
+            </a:r>
+            <a:r>
+              <a:rPr lang="ru-RU" sz="3600" dirty="0" smtClean="0"/>
+              <a:t>идентификация</a:t>
+            </a:r>
+            <a:endParaRPr lang="en-US" sz="3600" dirty="0" smtClean="0"/>
+          </a:p>
+          <a:p>
+            <a:r>
+              <a:rPr lang="ru-RU" sz="3600" dirty="0" smtClean="0"/>
+              <a:t>Предотвратяване на </a:t>
+            </a:r>
+            <a:r>
+              <a:rPr lang="ru-RU" sz="3600" b="1" dirty="0" smtClean="0">
+                <a:solidFill>
+                  <a:schemeClr val="bg1"/>
+                </a:solidFill>
+              </a:rPr>
+              <a:t>дубликати</a:t>
+            </a:r>
+            <a:r>
+              <a:rPr lang="ru-RU" sz="3600" dirty="0" smtClean="0"/>
+              <a:t> на данни във връзка със специфични </a:t>
+            </a:r>
+            <a:r>
+              <a:rPr lang="ru-RU" sz="3600" dirty="0" smtClean="0"/>
+              <a:t>условия</a:t>
+            </a:r>
+          </a:p>
+          <a:p>
+            <a:r>
+              <a:rPr lang="ru-RU" sz="3600" dirty="0" smtClean="0"/>
+              <a:t>Изисква се внимание при </a:t>
+            </a:r>
+            <a:r>
+              <a:rPr lang="ru-RU" sz="3600" dirty="0" smtClean="0"/>
+              <a:t>избора на </a:t>
+            </a:r>
+            <a:r>
+              <a:rPr lang="ru-RU" sz="3600" b="1" dirty="0" smtClean="0">
+                <a:solidFill>
+                  <a:schemeClr val="bg1"/>
+                </a:solidFill>
+              </a:rPr>
+              <a:t>подходящи колони </a:t>
+            </a:r>
+            <a:r>
+              <a:rPr lang="ru-RU" sz="3600" dirty="0" smtClean="0"/>
+              <a:t>за </a:t>
+            </a:r>
+            <a:r>
+              <a:rPr lang="ru-RU" sz="3600" b="1" dirty="0" smtClean="0">
+                <a:solidFill>
+                  <a:schemeClr val="bg1"/>
+                </a:solidFill>
+              </a:rPr>
+              <a:t>композитния </a:t>
+            </a:r>
+            <a:r>
+              <a:rPr lang="ru-RU" sz="3600" b="1" dirty="0" smtClean="0">
+                <a:solidFill>
+                  <a:schemeClr val="bg1"/>
+                </a:solidFill>
+              </a:rPr>
+              <a:t>ключ</a:t>
+            </a:r>
+            <a:endParaRPr lang="ru-RU" sz="3600" b="1" dirty="0" smtClean="0">
+              <a:solidFill>
+                <a:schemeClr val="bg1"/>
+              </a:solidFill>
+            </a:endParaRPr>
+          </a:p>
+          <a:p>
+            <a:pPr lvl="1"/>
+            <a:r>
+              <a:rPr lang="ru-RU" sz="3600" dirty="0" smtClean="0"/>
+              <a:t>Избягване на </a:t>
+            </a:r>
+            <a:r>
+              <a:rPr lang="ru-RU" sz="3600" dirty="0" smtClean="0"/>
+              <a:t>прекомерно усложняване</a:t>
+            </a:r>
+            <a:endParaRPr lang="en-US" sz="3600" dirty="0"/>
+          </a:p>
+        </p:txBody>
+      </p:sp>
+      <p:sp>
+        <p:nvSpPr>
+          <p:cNvPr id="4" name="Title 3"/>
+          <p:cNvSpPr>
+            <a:spLocks noGrp="1"/>
+          </p:cNvSpPr>
+          <p:nvPr>
+            <p:ph type="title"/>
+          </p:nvPr>
+        </p:nvSpPr>
+        <p:spPr/>
+        <p:txBody>
+          <a:bodyPr/>
+          <a:lstStyle/>
+          <a:p>
+            <a:r>
+              <a:rPr lang="bg-BG" dirty="0" smtClean="0"/>
+              <a:t>Комбиниран ключ</a:t>
+            </a:r>
+            <a:r>
+              <a:rPr lang="en-US" dirty="0" smtClean="0"/>
+              <a:t> </a:t>
+            </a:r>
+            <a:r>
+              <a:rPr lang="en-US" dirty="0" smtClean="0"/>
+              <a:t>(2)</a:t>
+            </a:r>
+            <a:endParaRPr lang="en-US" dirty="0"/>
+          </a:p>
+        </p:txBody>
+      </p:sp>
+    </p:spTree>
+  </p:cSld>
+  <p:clrMapOvr>
+    <a:masterClrMapping/>
+  </p:clrMapOvr>
+  <mc:AlternateContent xmlns:mc="http://schemas.openxmlformats.org/markup-compatibility/2006">
+    <mc:Choice xmlns:p14="http://schemas.microsoft.com/office/powerpoint/2010/main" xmlns="" Requires="p14">
+      <p:transition spd="slow" p14:dur="2000" advClick="0" advTm="5000"/>
+    </mc:Choice>
+    <mc:Fallback>
+      <p:transition spd="slow" advClick="0" advTm="5000"/>
+    </mc:Fallback>
+  </mc:AlternateContent>
+</p:sld>
+</file>
+
+<file path=ppt/slides/slide12.xml><?xml version="1.0" encoding="utf-8"?>
+<p:sld xmlns:a="http://schemas.openxmlformats.org/drawingml/2006/main" xmlns:r="http://schemas.openxmlformats.org/officeDocument/2006/relationships" xmlns:p="http://schemas.openxmlformats.org/presentationml/2006/main">
+  <p:cSld>
+    <p:spTree>
+      <p:nvGrpSpPr>
+        <p:cNvPr id="1" name=""/>
+        <p:cNvGrpSpPr/>
+        <p:nvPr/>
+      </p:nvGrpSpPr>
+      <p:grpSpPr>
+        <a:xfrm>
+          <a:off x="0" y="0"/>
+          <a:ext cx="0" cy="0"/>
+          <a:chOff x="0" y="0"/>
+          <a:chExt cx="0" cy="0"/>
+        </a:xfrm>
+      </p:grpSpPr>
+      <p:sp>
+        <p:nvSpPr>
           <p:cNvPr id="3" name="Title 2"/>
           <p:cNvSpPr>
             <a:spLocks noGrp="1"/>
@@ -14134,7 +14354,7 @@
           <a:blip r:embed="rId2" cstate="print">
             <a:extLst>
               <a:ext uri="{28A0092B-C50C-407E-A947-70E740481C1C}">
-                <a14:useLocalDpi xmlns="" xmlns:a14="http://schemas.microsoft.com/office/drawing/2010/main" val="0"/>
+                <a14:useLocalDpi xmlns:a14="http://schemas.microsoft.com/office/drawing/2010/main" xmlns="" val="0"/>
               </a:ext>
             </a:extLst>
           </a:blip>
@@ -14158,7 +14378,7 @@
     <a:masterClrMapping/>
   </p:clrMapOvr>
   <mc:AlternateContent xmlns:mc="http://schemas.openxmlformats.org/markup-compatibility/2006">
-    <mc:Choice xmlns="" xmlns:p14="http://schemas.microsoft.com/office/powerpoint/2010/main" Requires="p14">
+    <mc:Choice xmlns:p14="http://schemas.microsoft.com/office/powerpoint/2010/main" xmlns="" Requires="p14">
       <p:transition spd="slow" p14:dur="2000" advClick="0" advTm="5000"/>
     </mc:Choice>
     <mc:Fallback>
@@ -14175,7 +14395,7 @@
 </p:sld>
 </file>
 
-<file path=ppt/slides/slide12.xml><?xml version="1.0" encoding="utf-8"?>
+<file path=ppt/slides/slide13.xml><?xml version="1.0" encoding="utf-8"?>
 <p:sld xmlns:a="http://schemas.openxmlformats.org/drawingml/2006/main" xmlns:r="http://schemas.openxmlformats.org/officeDocument/2006/relationships" xmlns:p="http://schemas.openxmlformats.org/presentationml/2006/main">
   <p:cSld>
     <p:spTree>
@@ -14210,7 +14430,7 @@
             <a:fld id="{2BF067CD-8E6B-4360-9AA8-C5DF2A48A6D1}" type="slidenum">
               <a:rPr lang="en-US" noProof="0" smtClean="0"/>
               <a:pPr/>
-              <a:t>12</a:t>
+              <a:t>13</a:t>
             </a:fld>
             <a:endParaRPr lang="en-US" noProof="0" dirty="0"/>
           </a:p>
@@ -14656,7 +14876,7 @@
     <a:masterClrMapping/>
   </p:clrMapOvr>
   <mc:AlternateContent xmlns:mc="http://schemas.openxmlformats.org/markup-compatibility/2006">
-    <mc:Choice xmlns="" xmlns:p14="http://schemas.microsoft.com/office/powerpoint/2010/main" Requires="p14">
+    <mc:Choice xmlns:p14="http://schemas.microsoft.com/office/powerpoint/2010/main" xmlns="" Requires="p14">
       <p:transition spd="slow" p14:dur="2000" advClick="0" advTm="5000"/>
     </mc:Choice>
     <mc:Fallback>
@@ -14775,7 +14995,7 @@
 </p:sld>
 </file>
 
-<file path=ppt/slides/slide13.xml><?xml version="1.0" encoding="utf-8"?>
+<file path=ppt/slides/slide14.xml><?xml version="1.0" encoding="utf-8"?>
 <p:sld xmlns:a="http://schemas.openxmlformats.org/drawingml/2006/main" xmlns:r="http://schemas.openxmlformats.org/officeDocument/2006/relationships" xmlns:p="http://schemas.openxmlformats.org/presentationml/2006/main">
   <p:cSld>
     <p:spTree>
@@ -14823,7 +15043,7 @@
               <a:pPr>
                 <a:defRPr/>
               </a:pPr>
-              <a:t>13</a:t>
+              <a:t>14</a:t>
             </a:fld>
             <a:endParaRPr lang="en-US" dirty="0"/>
           </a:p>
@@ -15261,7 +15481,7 @@
           <p:nvPr>
             <p:extLst>
               <p:ext uri="{D42A27DB-BD31-4B8C-83A1-F6EECF244321}">
-                <p14:modId xmlns:p14="http://schemas.microsoft.com/office/powerpoint/2010/main" xmlns="" val="1102571627"/>
+                <p14:modId xmlns="" xmlns:p14="http://schemas.microsoft.com/office/powerpoint/2010/main" val="1102571627"/>
               </p:ext>
             </p:extLst>
           </p:nvPr>
@@ -15280,21 +15500,21 @@
                 <a:gridCol w="1046179">
                   <a:extLst>
                     <a:ext uri="{9D8B030D-6E8A-4147-A177-3AD203B41FA5}">
-                      <a16:colId xmlns:a16="http://schemas.microsoft.com/office/drawing/2014/main" xmlns="" val="20000"/>
+                      <a16:colId xmlns="" xmlns:a16="http://schemas.microsoft.com/office/drawing/2014/main" val="20000"/>
                     </a:ext>
                   </a:extLst>
                 </a:gridCol>
                 <a:gridCol w="1336419">
                   <a:extLst>
                     <a:ext uri="{9D8B030D-6E8A-4147-A177-3AD203B41FA5}">
-                      <a16:colId xmlns:a16="http://schemas.microsoft.com/office/drawing/2014/main" xmlns="" val="20001"/>
+                      <a16:colId xmlns="" xmlns:a16="http://schemas.microsoft.com/office/drawing/2014/main" val="20001"/>
                     </a:ext>
                   </a:extLst>
                 </a:gridCol>
                 <a:gridCol w="2646603">
                   <a:extLst>
                     <a:ext uri="{9D8B030D-6E8A-4147-A177-3AD203B41FA5}">
-                      <a16:colId xmlns:a16="http://schemas.microsoft.com/office/drawing/2014/main" xmlns="" val="20002"/>
+                      <a16:colId xmlns="" xmlns:a16="http://schemas.microsoft.com/office/drawing/2014/main" val="20002"/>
                     </a:ext>
                   </a:extLst>
                 </a:gridCol>
@@ -15691,7 +15911,7 @@
                 </a:tc>
                 <a:extLst>
                   <a:ext uri="{0D108BD9-81ED-4DB2-BD59-A6C34878D82A}">
-                    <a16:rowId xmlns:a16="http://schemas.microsoft.com/office/drawing/2014/main" xmlns="" val="10001"/>
+                    <a16:rowId xmlns="" xmlns:a16="http://schemas.microsoft.com/office/drawing/2014/main" val="10001"/>
                   </a:ext>
                 </a:extLst>
               </a:tr>
@@ -15875,7 +16095,7 @@
                 </a:tc>
                 <a:extLst>
                   <a:ext uri="{0D108BD9-81ED-4DB2-BD59-A6C34878D82A}">
-                    <a16:rowId xmlns:a16="http://schemas.microsoft.com/office/drawing/2014/main" xmlns="" val="10002"/>
+                    <a16:rowId xmlns="" xmlns:a16="http://schemas.microsoft.com/office/drawing/2014/main" val="10002"/>
                   </a:ext>
                 </a:extLst>
               </a:tr>
@@ -16583,7 +16803,7 @@
           <p:nvPr>
             <p:extLst>
               <p:ext uri="{D42A27DB-BD31-4B8C-83A1-F6EECF244321}">
-                <p14:modId xmlns:p14="http://schemas.microsoft.com/office/powerpoint/2010/main" xmlns="" val="1102571627"/>
+                <p14:modId xmlns="" xmlns:p14="http://schemas.microsoft.com/office/powerpoint/2010/main" val="1102571627"/>
               </p:ext>
             </p:extLst>
           </p:nvPr>
@@ -16602,14 +16822,14 @@
                 <a:gridCol w="914402">
                   <a:extLst>
                     <a:ext uri="{9D8B030D-6E8A-4147-A177-3AD203B41FA5}">
-                      <a16:colId xmlns:a16="http://schemas.microsoft.com/office/drawing/2014/main" xmlns="" val="20000"/>
+                      <a16:colId xmlns="" xmlns:a16="http://schemas.microsoft.com/office/drawing/2014/main" val="20000"/>
                     </a:ext>
                   </a:extLst>
                 </a:gridCol>
                 <a:gridCol w="1905000">
                   <a:extLst>
                     <a:ext uri="{9D8B030D-6E8A-4147-A177-3AD203B41FA5}">
-                      <a16:colId xmlns:a16="http://schemas.microsoft.com/office/drawing/2014/main" xmlns="" val="20001"/>
+                      <a16:colId xmlns="" xmlns:a16="http://schemas.microsoft.com/office/drawing/2014/main" val="20001"/>
                     </a:ext>
                   </a:extLst>
                 </a:gridCol>
@@ -16745,7 +16965,7 @@
                 </a:tc>
                 <a:extLst>
                   <a:ext uri="{0D108BD9-81ED-4DB2-BD59-A6C34878D82A}">
-                    <a16:rowId xmlns:a16="http://schemas.microsoft.com/office/drawing/2014/main" xmlns="" val="10000"/>
+                    <a16:rowId xmlns="" xmlns:a16="http://schemas.microsoft.com/office/drawing/2014/main" val="10000"/>
                   </a:ext>
                 </a:extLst>
               </a:tr>
@@ -16864,7 +17084,7 @@
                 </a:tc>
                 <a:extLst>
                   <a:ext uri="{0D108BD9-81ED-4DB2-BD59-A6C34878D82A}">
-                    <a16:rowId xmlns:a16="http://schemas.microsoft.com/office/drawing/2014/main" xmlns="" val="10001"/>
+                    <a16:rowId xmlns="" xmlns:a16="http://schemas.microsoft.com/office/drawing/2014/main" val="10001"/>
                   </a:ext>
                 </a:extLst>
               </a:tr>
@@ -16989,7 +17209,7 @@
                 </a:tc>
                 <a:extLst>
                   <a:ext uri="{0D108BD9-81ED-4DB2-BD59-A6C34878D82A}">
-                    <a16:rowId xmlns:a16="http://schemas.microsoft.com/office/drawing/2014/main" xmlns="" val="10002"/>
+                    <a16:rowId xmlns="" xmlns:a16="http://schemas.microsoft.com/office/drawing/2014/main" val="10002"/>
                   </a:ext>
                 </a:extLst>
               </a:tr>
@@ -17191,7 +17411,7 @@
     </p:spTree>
     <p:extLst>
       <p:ext uri="{BB962C8B-B14F-4D97-AF65-F5344CB8AC3E}">
-        <p14:creationId xmlns="" xmlns:p14="http://schemas.microsoft.com/office/powerpoint/2010/main" val="1942099443"/>
+        <p14:creationId xmlns:p14="http://schemas.microsoft.com/office/powerpoint/2010/main" xmlns="" val="1942099443"/>
       </p:ext>
     </p:extLst>
   </p:cSld>
@@ -17372,7 +17592,7 @@
 </p:sld>
 </file>
 
-<file path=ppt/slides/slide14.xml><?xml version="1.0" encoding="utf-8"?>
+<file path=ppt/slides/slide15.xml><?xml version="1.0" encoding="utf-8"?>
 <p:sld xmlns:a="http://schemas.openxmlformats.org/drawingml/2006/main" xmlns:r="http://schemas.openxmlformats.org/officeDocument/2006/relationships" xmlns:p="http://schemas.openxmlformats.org/presentationml/2006/main">
   <p:cSld>
     <p:spTree>
@@ -17407,7 +17627,7 @@
             <a:fld id="{2BF067CD-8E6B-4360-9AA8-C5DF2A48A6D1}" type="slidenum">
               <a:rPr lang="en-US" noProof="0" smtClean="0"/>
               <a:pPr/>
-              <a:t>14</a:t>
+              <a:t>15</a:t>
             </a:fld>
             <a:endParaRPr lang="en-US" noProof="0" dirty="0"/>
           </a:p>
@@ -18001,7 +18221,7 @@
     <a:masterClrMapping/>
   </p:clrMapOvr>
   <mc:AlternateContent xmlns:mc="http://schemas.openxmlformats.org/markup-compatibility/2006">
-    <mc:Choice xmlns="" xmlns:p14="http://schemas.microsoft.com/office/powerpoint/2010/main" Requires="p14">
+    <mc:Choice xmlns:p14="http://schemas.microsoft.com/office/powerpoint/2010/main" xmlns="" Requires="p14">
       <p:transition spd="slow" p14:dur="2000" advClick="0" advTm="5000"/>
     </mc:Choice>
     <mc:Fallback>
@@ -18166,7 +18386,7 @@
 </p:sld>
 </file>
 
-<file path=ppt/slides/slide15.xml><?xml version="1.0" encoding="utf-8"?>
+<file path=ppt/slides/slide16.xml><?xml version="1.0" encoding="utf-8"?>
 <p:sld xmlns:a="http://schemas.openxmlformats.org/drawingml/2006/main" xmlns:r="http://schemas.openxmlformats.org/officeDocument/2006/relationships" xmlns:p="http://schemas.openxmlformats.org/presentationml/2006/main">
   <p:cSld>
     <p:spTree>
@@ -18188,7 +18408,7 @@
           <p:cNvPr id="9" name="Summary Box Group">
             <a:extLst>
               <a:ext uri="{FF2B5EF4-FFF2-40B4-BE49-F238E27FC236}">
-                <a16:creationId xmlns="" xmlns:a16="http://schemas.microsoft.com/office/drawing/2014/main" id="{EBAFE522-EB7D-4931-A015-9A7E8A98517D}"/>
+                <a16:creationId xmlns:a16="http://schemas.microsoft.com/office/drawing/2014/main" xmlns="" id="{EBAFE522-EB7D-4931-A015-9A7E8A98517D}"/>
               </a:ext>
             </a:extLst>
           </p:cNvPr>
@@ -18208,7 +18428,7 @@
             <p:cNvPr id="10" name="Rounded Rectangle Blue">
               <a:extLst>
                 <a:ext uri="{FF2B5EF4-FFF2-40B4-BE49-F238E27FC236}">
-                  <a16:creationId xmlns="" xmlns:a16="http://schemas.microsoft.com/office/drawing/2014/main" id="{18F78F23-3D09-4B63-8DF9-D49CFBB145EE}"/>
+                  <a16:creationId xmlns:a16="http://schemas.microsoft.com/office/drawing/2014/main" xmlns="" id="{18F78F23-3D09-4B63-8DF9-D49CFBB145EE}"/>
                 </a:ext>
               </a:extLst>
             </p:cNvPr>
@@ -18262,7 +18482,7 @@
             <p:cNvPr id="11" name="Rounded Rectangle Left">
               <a:extLst>
                 <a:ext uri="{FF2B5EF4-FFF2-40B4-BE49-F238E27FC236}">
-                  <a16:creationId xmlns="" xmlns:a16="http://schemas.microsoft.com/office/drawing/2014/main" id="{F12C06CE-2BBE-46C2-B718-813794C58DF9}"/>
+                  <a16:creationId xmlns:a16="http://schemas.microsoft.com/office/drawing/2014/main" xmlns="" id="{F12C06CE-2BBE-46C2-B718-813794C58DF9}"/>
                 </a:ext>
               </a:extLst>
             </p:cNvPr>
@@ -18322,7 +18542,7 @@
             <p:cNvPr id="12" name="Half Frame Top Right">
               <a:extLst>
                 <a:ext uri="{FF2B5EF4-FFF2-40B4-BE49-F238E27FC236}">
-                  <a16:creationId xmlns="" xmlns:a16="http://schemas.microsoft.com/office/drawing/2014/main" id="{66CDBB1E-AF3C-43FC-9F34-2DD691F81726}"/>
+                  <a16:creationId xmlns:a16="http://schemas.microsoft.com/office/drawing/2014/main" xmlns="" id="{66CDBB1E-AF3C-43FC-9F34-2DD691F81726}"/>
                 </a:ext>
               </a:extLst>
             </p:cNvPr>
@@ -18384,7 +18604,7 @@
           <p:cNvPr id="14" name="Text Placeholder Body">
             <a:extLst>
               <a:ext uri="{FF2B5EF4-FFF2-40B4-BE49-F238E27FC236}">
-                <a16:creationId xmlns="" xmlns:a16="http://schemas.microsoft.com/office/drawing/2014/main" id="{0E49D336-45B6-44D3-97C4-E28F8DEA2022}"/>
+                <a16:creationId xmlns:a16="http://schemas.microsoft.com/office/drawing/2014/main" xmlns="" id="{0E49D336-45B6-44D3-97C4-E28F8DEA2022}"/>
               </a:ext>
             </a:extLst>
           </p:cNvPr>
@@ -18675,7 +18895,7 @@
           <p:cNvPr id="17" name="Slide Number">
             <a:extLst>
               <a:ext uri="{FF2B5EF4-FFF2-40B4-BE49-F238E27FC236}">
-                <a16:creationId xmlns="" xmlns:a16="http://schemas.microsoft.com/office/drawing/2014/main" id="{9DE5559F-55C2-47F1-A321-B593B1EC63C1}"/>
+                <a16:creationId xmlns:a16="http://schemas.microsoft.com/office/drawing/2014/main" xmlns="" id="{9DE5559F-55C2-47F1-A321-B593B1EC63C1}"/>
               </a:ext>
             </a:extLst>
           </p:cNvPr>
@@ -18706,7 +18926,7 @@
             <a:fld id="{2BF067CD-8E6B-4360-9AA8-C5DF2A48A6D1}" type="slidenum">
               <a:rPr lang="en-US" smtClean="0"/>
               <a:pPr/>
-              <a:t>15</a:t>
+              <a:t>16</a:t>
             </a:fld>
             <a:endParaRPr lang="en-US" dirty="0"/>
           </a:p>
@@ -18717,7 +18937,7 @@
           <p:cNvPr id="13" name="Picture SoftUni Mascot">
             <a:extLst>
               <a:ext uri="{FF2B5EF4-FFF2-40B4-BE49-F238E27FC236}">
-                <a16:creationId xmlns="" xmlns:a16="http://schemas.microsoft.com/office/drawing/2014/main" id="{CCC3A316-993C-4741-8826-E104F27650A3}"/>
+                <a16:creationId xmlns:a16="http://schemas.microsoft.com/office/drawing/2014/main" xmlns="" id="{CCC3A316-993C-4741-8826-E104F27650A3}"/>
               </a:ext>
             </a:extLst>
           </p:cNvPr>
@@ -18730,7 +18950,7 @@
           <a:blip r:embed="rId3" cstate="print">
             <a:extLst>
               <a:ext uri="{28A0092B-C50C-407E-A947-70E740481C1C}">
-                <a14:useLocalDpi xmlns="" xmlns:a14="http://schemas.microsoft.com/office/drawing/2010/main" val="0"/>
+                <a14:useLocalDpi xmlns:a14="http://schemas.microsoft.com/office/drawing/2010/main" xmlns="" val="0"/>
               </a:ext>
             </a:extLst>
           </a:blip>
@@ -18775,7 +18995,7 @@
     </p:spTree>
     <p:extLst>
       <p:ext uri="{BB962C8B-B14F-4D97-AF65-F5344CB8AC3E}">
-        <p14:creationId xmlns="" xmlns:p14="http://schemas.microsoft.com/office/powerpoint/2010/main" val="2087190546"/>
+        <p14:creationId xmlns:p14="http://schemas.microsoft.com/office/powerpoint/2010/main" xmlns="" val="2087190546"/>
       </p:ext>
     </p:extLst>
   </p:cSld>
@@ -18783,7 +19003,7 @@
     <a:masterClrMapping/>
   </p:clrMapOvr>
   <mc:AlternateContent xmlns:mc="http://schemas.openxmlformats.org/markup-compatibility/2006">
-    <mc:Choice xmlns="" xmlns:p14="http://schemas.microsoft.com/office/powerpoint/2010/main" Requires="p14">
+    <mc:Choice xmlns:p14="http://schemas.microsoft.com/office/powerpoint/2010/main" xmlns="" Requires="p14">
       <p:transition spd="slow" p14:dur="2000" advClick="0" advTm="5000"/>
     </mc:Choice>
     <mc:Fallback>
@@ -19081,7 +19301,7 @@
 </p:sld>
 </file>
 
-<file path=ppt/slides/slide16.xml><?xml version="1.0" encoding="utf-8"?>
+<file path=ppt/slides/slide17.xml><?xml version="1.0" encoding="utf-8"?>
 <p:sld xmlns:a="http://schemas.openxmlformats.org/drawingml/2006/main" xmlns:r="http://schemas.openxmlformats.org/officeDocument/2006/relationships" xmlns:p="http://schemas.openxmlformats.org/presentationml/2006/main">
   <p:cSld>
     <p:spTree>
@@ -19103,7 +19323,7 @@
           <p:cNvPr id="5" name="Group 4">
             <a:extLst>
               <a:ext uri="{FF2B5EF4-FFF2-40B4-BE49-F238E27FC236}">
-                <a16:creationId xmlns="" xmlns:a16="http://schemas.microsoft.com/office/drawing/2014/main" id="{1A67F800-7980-E3CA-7188-3C478C8E98B8}"/>
+                <a16:creationId xmlns:a16="http://schemas.microsoft.com/office/drawing/2014/main" xmlns="" id="{1A67F800-7980-E3CA-7188-3C478C8E98B8}"/>
               </a:ext>
             </a:extLst>
           </p:cNvPr>
@@ -19123,7 +19343,7 @@
             <p:cNvPr id="7" name="Picture 6" descr="A picture containing text, sign, vector graphics&#10;&#10;Description automatically generated">
               <a:extLst>
                 <a:ext uri="{FF2B5EF4-FFF2-40B4-BE49-F238E27FC236}">
-                  <a16:creationId xmlns="" xmlns:a16="http://schemas.microsoft.com/office/drawing/2014/main" id="{15CE28B1-02BA-4014-E149-BF1EE09447ED}"/>
+                  <a16:creationId xmlns:a16="http://schemas.microsoft.com/office/drawing/2014/main" xmlns="" id="{15CE28B1-02BA-4014-E149-BF1EE09447ED}"/>
                 </a:ext>
               </a:extLst>
             </p:cNvPr>
@@ -19153,7 +19373,7 @@
             <p:cNvPr id="9" name="Picture 8" descr="Logo&#10;&#10;Description automatically generated">
               <a:extLst>
                 <a:ext uri="{FF2B5EF4-FFF2-40B4-BE49-F238E27FC236}">
-                  <a16:creationId xmlns="" xmlns:a16="http://schemas.microsoft.com/office/drawing/2014/main" id="{5F82FF4F-4AD2-4B3B-1445-F3C6BA268522}"/>
+                  <a16:creationId xmlns:a16="http://schemas.microsoft.com/office/drawing/2014/main" xmlns="" id="{5F82FF4F-4AD2-4B3B-1445-F3C6BA268522}"/>
                 </a:ext>
               </a:extLst>
             </p:cNvPr>
@@ -19183,7 +19403,7 @@
             <p:cNvPr id="11" name="Picture 10" descr="Logo&#10;&#10;Description automatically generated">
               <a:extLst>
                 <a:ext uri="{FF2B5EF4-FFF2-40B4-BE49-F238E27FC236}">
-                  <a16:creationId xmlns="" xmlns:a16="http://schemas.microsoft.com/office/drawing/2014/main" id="{68CCA8DB-9EFC-F9BC-57AE-81E4F843E863}"/>
+                  <a16:creationId xmlns:a16="http://schemas.microsoft.com/office/drawing/2014/main" xmlns="" id="{68CCA8DB-9EFC-F9BC-57AE-81E4F843E863}"/>
                 </a:ext>
               </a:extLst>
             </p:cNvPr>
@@ -19213,7 +19433,7 @@
             <p:cNvPr id="13" name="Picture 12" descr="Logo&#10;&#10;Description automatically generated">
               <a:extLst>
                 <a:ext uri="{FF2B5EF4-FFF2-40B4-BE49-F238E27FC236}">
-                  <a16:creationId xmlns="" xmlns:a16="http://schemas.microsoft.com/office/drawing/2014/main" id="{3FDF9297-50FA-E866-B6CE-9D64B1E892BF}"/>
+                  <a16:creationId xmlns:a16="http://schemas.microsoft.com/office/drawing/2014/main" xmlns="" id="{3FDF9297-50FA-E866-B6CE-9D64B1E892BF}"/>
                 </a:ext>
               </a:extLst>
             </p:cNvPr>
@@ -19243,7 +19463,7 @@
             <p:cNvPr id="18" name="Graphic 17">
               <a:extLst>
                 <a:ext uri="{FF2B5EF4-FFF2-40B4-BE49-F238E27FC236}">
-                  <a16:creationId xmlns="" xmlns:a16="http://schemas.microsoft.com/office/drawing/2014/main" id="{2A1BC0C9-7A7B-9C5B-B457-3E86E59EF29E}"/>
+                  <a16:creationId xmlns:a16="http://schemas.microsoft.com/office/drawing/2014/main" xmlns="" id="{2A1BC0C9-7A7B-9C5B-B457-3E86E59EF29E}"/>
                 </a:ext>
               </a:extLst>
             </p:cNvPr>
@@ -19256,7 +19476,7 @@
             <a:blip r:embed="rId7" cstate="print">
               <a:extLst>
                 <a:ext uri="{96DAC541-7B7A-43D3-8B79-37D633B846F1}">
-                  <asvg:svgBlip xmlns="" xmlns:asvg="http://schemas.microsoft.com/office/drawing/2016/SVG/main" r:embed="rId8"/>
+                  <asvg:svgBlip xmlns:asvg="http://schemas.microsoft.com/office/drawing/2016/SVG/main" xmlns="" r:embed="rId8"/>
                 </a:ext>
               </a:extLst>
             </a:blip>
@@ -19279,7 +19499,7 @@
             <p:cNvPr id="20" name="Graphic 19">
               <a:extLst>
                 <a:ext uri="{FF2B5EF4-FFF2-40B4-BE49-F238E27FC236}">
-                  <a16:creationId xmlns="" xmlns:a16="http://schemas.microsoft.com/office/drawing/2014/main" id="{DBE174DA-A182-7E57-06D4-86AFA26D484D}"/>
+                  <a16:creationId xmlns:a16="http://schemas.microsoft.com/office/drawing/2014/main" xmlns="" id="{DBE174DA-A182-7E57-06D4-86AFA26D484D}"/>
                 </a:ext>
               </a:extLst>
             </p:cNvPr>
@@ -19292,7 +19512,7 @@
             <a:blip r:embed="rId9" cstate="print">
               <a:extLst>
                 <a:ext uri="{96DAC541-7B7A-43D3-8B79-37D633B846F1}">
-                  <asvg:svgBlip xmlns="" xmlns:asvg="http://schemas.microsoft.com/office/drawing/2016/SVG/main" r:embed="rId10"/>
+                  <asvg:svgBlip xmlns:asvg="http://schemas.microsoft.com/office/drawing/2016/SVG/main" xmlns="" r:embed="rId10"/>
                 </a:ext>
               </a:extLst>
             </a:blip>
@@ -19315,7 +19535,7 @@
             <p:cNvPr id="22" name="Picture 21" descr="Logo&#10;&#10;Description automatically generated">
               <a:extLst>
                 <a:ext uri="{FF2B5EF4-FFF2-40B4-BE49-F238E27FC236}">
-                  <a16:creationId xmlns="" xmlns:a16="http://schemas.microsoft.com/office/drawing/2014/main" id="{9B7FFC36-A4BC-7A53-AB82-82C398A47538}"/>
+                  <a16:creationId xmlns:a16="http://schemas.microsoft.com/office/drawing/2014/main" xmlns="" id="{9B7FFC36-A4BC-7A53-AB82-82C398A47538}"/>
                 </a:ext>
               </a:extLst>
             </p:cNvPr>
@@ -19345,7 +19565,7 @@
             <p:cNvPr id="36" name="Group 35">
               <a:extLst>
                 <a:ext uri="{FF2B5EF4-FFF2-40B4-BE49-F238E27FC236}">
-                  <a16:creationId xmlns="" xmlns:a16="http://schemas.microsoft.com/office/drawing/2014/main" id="{3FB2AEAC-BDEE-9D5F-67A3-17CEDA699052}"/>
+                  <a16:creationId xmlns:a16="http://schemas.microsoft.com/office/drawing/2014/main" xmlns="" id="{3FB2AEAC-BDEE-9D5F-67A3-17CEDA699052}"/>
                 </a:ext>
               </a:extLst>
             </p:cNvPr>
@@ -19365,7 +19585,7 @@
               <p:cNvPr id="31" name="Straight Connector 30">
                 <a:extLst>
                   <a:ext uri="{FF2B5EF4-FFF2-40B4-BE49-F238E27FC236}">
-                    <a16:creationId xmlns="" xmlns:a16="http://schemas.microsoft.com/office/drawing/2014/main" id="{AA38ABD5-1637-DC80-A922-DF10E4F75CDE}"/>
+                    <a16:creationId xmlns:a16="http://schemas.microsoft.com/office/drawing/2014/main" xmlns="" id="{AA38ABD5-1637-DC80-A922-DF10E4F75CDE}"/>
                   </a:ext>
                 </a:extLst>
               </p:cNvPr>
@@ -19408,7 +19628,7 @@
               <p:cNvPr id="33" name="Picture 32">
                 <a:extLst>
                   <a:ext uri="{FF2B5EF4-FFF2-40B4-BE49-F238E27FC236}">
-                    <a16:creationId xmlns="" xmlns:a16="http://schemas.microsoft.com/office/drawing/2014/main" id="{617B586A-0BC5-5E32-7E67-FD277547ED69}"/>
+                    <a16:creationId xmlns:a16="http://schemas.microsoft.com/office/drawing/2014/main" xmlns="" id="{617B586A-0BC5-5E32-7E67-FD277547ED69}"/>
                   </a:ext>
                 </a:extLst>
               </p:cNvPr>
@@ -19440,7 +19660,7 @@
           <p:cNvPr id="40" name="Picture 39" descr="Logo&#10;&#10;Description automatically generated">
             <a:extLst>
               <a:ext uri="{FF2B5EF4-FFF2-40B4-BE49-F238E27FC236}">
-                <a16:creationId xmlns="" xmlns:a16="http://schemas.microsoft.com/office/drawing/2014/main" id="{9C30DD70-D438-6D27-35D3-8BB874966D84}"/>
+                <a16:creationId xmlns:a16="http://schemas.microsoft.com/office/drawing/2014/main" xmlns="" id="{9C30DD70-D438-6D27-35D3-8BB874966D84}"/>
               </a:ext>
             </a:extLst>
           </p:cNvPr>
@@ -19470,7 +19690,7 @@
           <p:cNvPr id="2" name="Google Shape;441;p37">
             <a:extLst>
               <a:ext uri="{FF2B5EF4-FFF2-40B4-BE49-F238E27FC236}">
-                <a16:creationId xmlns="" xmlns:a16="http://schemas.microsoft.com/office/drawing/2014/main" id="{2AFB472C-93C2-241B-75FA-457782840F92}"/>
+                <a16:creationId xmlns:a16="http://schemas.microsoft.com/office/drawing/2014/main" xmlns="" id="{2AFB472C-93C2-241B-75FA-457782840F92}"/>
               </a:ext>
             </a:extLst>
           </p:cNvPr>
@@ -19775,7 +19995,7 @@
           <p:cNvPr id="14" name="Картина 13">
             <a:extLst>
               <a:ext uri="{FF2B5EF4-FFF2-40B4-BE49-F238E27FC236}">
-                <a16:creationId xmlns="" xmlns:a16="http://schemas.microsoft.com/office/drawing/2014/main" id="{54B365E9-8FD0-6D5B-2DFC-723EE5DDD555}"/>
+                <a16:creationId xmlns:a16="http://schemas.microsoft.com/office/drawing/2014/main" xmlns="" id="{54B365E9-8FD0-6D5B-2DFC-723EE5DDD555}"/>
               </a:ext>
             </a:extLst>
           </p:cNvPr>
@@ -19805,7 +20025,7 @@
           <p:cNvPr id="16" name="Картина 15">
             <a:extLst>
               <a:ext uri="{FF2B5EF4-FFF2-40B4-BE49-F238E27FC236}">
-                <a16:creationId xmlns="" xmlns:a16="http://schemas.microsoft.com/office/drawing/2014/main" id="{3BD6ABFC-02BF-2D42-B42B-6929222F37B6}"/>
+                <a16:creationId xmlns:a16="http://schemas.microsoft.com/office/drawing/2014/main" xmlns="" id="{3BD6ABFC-02BF-2D42-B42B-6929222F37B6}"/>
               </a:ext>
             </a:extLst>
           </p:cNvPr>
@@ -19833,7 +20053,7 @@
     </p:spTree>
     <p:extLst>
       <p:ext uri="{BB962C8B-B14F-4D97-AF65-F5344CB8AC3E}">
-        <p14:creationId xmlns="" xmlns:p14="http://schemas.microsoft.com/office/powerpoint/2010/main" val="2144060659"/>
+        <p14:creationId xmlns:p14="http://schemas.microsoft.com/office/powerpoint/2010/main" xmlns="" val="2144060659"/>
       </p:ext>
     </p:extLst>
   </p:cSld>
@@ -19850,7 +20070,7 @@
 </p:sld>
 </file>
 
-<file path=ppt/slides/slide17.xml><?xml version="1.0" encoding="utf-8"?>
+<file path=ppt/slides/slide18.xml><?xml version="1.0" encoding="utf-8"?>
 <p:sld xmlns:a="http://schemas.openxmlformats.org/drawingml/2006/main" xmlns:r="http://schemas.openxmlformats.org/officeDocument/2006/relationships" xmlns:p="http://schemas.openxmlformats.org/presentationml/2006/main">
   <p:cSld>
     <p:spTree>
@@ -19872,7 +20092,7 @@
           <p:cNvPr id="5" name="Slide Number">
             <a:extLst>
               <a:ext uri="{FF2B5EF4-FFF2-40B4-BE49-F238E27FC236}">
-                <a16:creationId xmlns="" xmlns:a16="http://schemas.microsoft.com/office/drawing/2014/main" id="{F48C3C93-90A1-4D31-BEA6-B54D1106CE31}"/>
+                <a16:creationId xmlns:a16="http://schemas.microsoft.com/office/drawing/2014/main" xmlns="" id="{F48C3C93-90A1-4D31-BEA6-B54D1106CE31}"/>
               </a:ext>
             </a:extLst>
           </p:cNvPr>
@@ -19903,7 +20123,7 @@
             <a:fld id="{2BF067CD-8E6B-4360-9AA8-C5DF2A48A6D1}" type="slidenum">
               <a:rPr lang="en-US" smtClean="0"/>
               <a:pPr/>
-              <a:t>17</a:t>
+              <a:t>18</a:t>
             </a:fld>
             <a:endParaRPr lang="en-US" dirty="0"/>
           </a:p>
@@ -19914,7 +20134,7 @@
           <p:cNvPr id="2" name="Slide Body">
             <a:extLst>
               <a:ext uri="{FF2B5EF4-FFF2-40B4-BE49-F238E27FC236}">
-                <a16:creationId xmlns="" xmlns:a16="http://schemas.microsoft.com/office/drawing/2014/main" id="{980F49B1-E4BE-4389-A747-7AB9B71AD920}"/>
+                <a16:creationId xmlns:a16="http://schemas.microsoft.com/office/drawing/2014/main" xmlns="" id="{980F49B1-E4BE-4389-A747-7AB9B71AD920}"/>
               </a:ext>
             </a:extLst>
           </p:cNvPr>
@@ -20048,7 +20268,7 @@
           <p:cNvPr id="6" name="Picture License" descr="License">
             <a:extLst>
               <a:ext uri="{FF2B5EF4-FFF2-40B4-BE49-F238E27FC236}">
-                <a16:creationId xmlns="" xmlns:a16="http://schemas.microsoft.com/office/drawing/2014/main" id="{A10A2585-858C-4B1E-8846-27CF1C15729E}"/>
+                <a16:creationId xmlns:a16="http://schemas.microsoft.com/office/drawing/2014/main" xmlns="" id="{A10A2585-858C-4B1E-8846-27CF1C15729E}"/>
               </a:ext>
             </a:extLst>
           </p:cNvPr>
@@ -20089,7 +20309,7 @@
           <p:cNvPr id="3" name="Slide Title">
             <a:extLst>
               <a:ext uri="{FF2B5EF4-FFF2-40B4-BE49-F238E27FC236}">
-                <a16:creationId xmlns="" xmlns:a16="http://schemas.microsoft.com/office/drawing/2014/main" id="{E5F1FB41-80C3-4816-BC47-CCC50632E6E8}"/>
+                <a16:creationId xmlns:a16="http://schemas.microsoft.com/office/drawing/2014/main" xmlns="" id="{E5F1FB41-80C3-4816-BC47-CCC50632E6E8}"/>
               </a:ext>
             </a:extLst>
           </p:cNvPr>
@@ -20115,7 +20335,7 @@
     </p:spTree>
     <p:extLst>
       <p:ext uri="{BB962C8B-B14F-4D97-AF65-F5344CB8AC3E}">
-        <p14:creationId xmlns="" xmlns:p14="http://schemas.microsoft.com/office/powerpoint/2010/main" val="3506533871"/>
+        <p14:creationId xmlns:p14="http://schemas.microsoft.com/office/powerpoint/2010/main" xmlns="" val="3506533871"/>
       </p:ext>
     </p:extLst>
   </p:cSld>
@@ -20123,7 +20343,7 @@
     <a:masterClrMapping/>
   </p:clrMapOvr>
   <mc:AlternateContent xmlns:mc="http://schemas.openxmlformats.org/markup-compatibility/2006">
-    <mc:Choice xmlns="" xmlns:p14="http://schemas.microsoft.com/office/powerpoint/2010/main" Requires="p14">
+    <mc:Choice xmlns:p14="http://schemas.microsoft.com/office/powerpoint/2010/main" xmlns="" Requires="p14">
       <p:transition spd="slow" p14:dur="2000" advClick="0" advTm="5000"/>
     </mc:Choice>
     <mc:Fallback>
@@ -20162,7 +20382,7 @@
           <p:cNvPr id="5" name="Slide Number">
             <a:extLst>
               <a:ext uri="{FF2B5EF4-FFF2-40B4-BE49-F238E27FC236}">
-                <a16:creationId xmlns="" xmlns:a16="http://schemas.microsoft.com/office/drawing/2014/main" id="{6A760D59-0056-4F39-B077-DBDBE3D2927E}"/>
+                <a16:creationId xmlns:a16="http://schemas.microsoft.com/office/drawing/2014/main" xmlns="" id="{6A760D59-0056-4F39-B077-DBDBE3D2927E}"/>
               </a:ext>
             </a:extLst>
           </p:cNvPr>
@@ -20403,7 +20623,7 @@
     </p:spTree>
     <p:extLst>
       <p:ext uri="{BB962C8B-B14F-4D97-AF65-F5344CB8AC3E}">
-        <p14:creationId xmlns="" xmlns:p14="http://schemas.microsoft.com/office/powerpoint/2010/main" val="1646986932"/>
+        <p14:creationId xmlns:p14="http://schemas.microsoft.com/office/powerpoint/2010/main" xmlns="" val="1646986932"/>
       </p:ext>
     </p:extLst>
   </p:cSld>
@@ -20411,7 +20631,7 @@
     <a:masterClrMapping/>
   </p:clrMapOvr>
   <mc:AlternateContent xmlns:mc="http://schemas.openxmlformats.org/markup-compatibility/2006">
-    <mc:Choice xmlns="" xmlns:p14="http://schemas.microsoft.com/office/powerpoint/2010/main" Requires="p14">
+    <mc:Choice xmlns:p14="http://schemas.microsoft.com/office/powerpoint/2010/main" xmlns="" Requires="p14">
       <p:transition spd="slow" p14:dur="2000" advClick="0" advTm="5000"/>
     </mc:Choice>
     <mc:Fallback>
@@ -20752,7 +20972,7 @@
     <a:masterClrMapping/>
   </p:clrMapOvr>
   <mc:AlternateContent xmlns:mc="http://schemas.openxmlformats.org/markup-compatibility/2006">
-    <mc:Choice xmlns="" xmlns:p14="http://schemas.microsoft.com/office/powerpoint/2010/main" Requires="p14">
+    <mc:Choice xmlns:p14="http://schemas.microsoft.com/office/powerpoint/2010/main" xmlns="" Requires="p14">
       <p:transition spd="slow" p14:dur="2000" advClick="0" advTm="5000"/>
     </mc:Choice>
     <mc:Fallback>
@@ -21007,7 +21227,7 @@
           <p:nvPr>
             <p:extLst>
               <p:ext uri="{D42A27DB-BD31-4B8C-83A1-F6EECF244321}">
-                <p14:modId xmlns:p14="http://schemas.microsoft.com/office/powerpoint/2010/main" xmlns="" val="3040486569"/>
+                <p14:modId xmlns="" xmlns:p14="http://schemas.microsoft.com/office/powerpoint/2010/main" val="3040486569"/>
               </p:ext>
             </p:extLst>
           </p:nvPr>
@@ -21024,28 +21244,28 @@
                 <a:gridCol w="2141554">
                   <a:extLst>
                     <a:ext uri="{9D8B030D-6E8A-4147-A177-3AD203B41FA5}">
-                      <a16:colId xmlns:a16="http://schemas.microsoft.com/office/drawing/2014/main" xmlns="" val="20000"/>
+                      <a16:colId xmlns="" xmlns:a16="http://schemas.microsoft.com/office/drawing/2014/main" val="20000"/>
                     </a:ext>
                   </a:extLst>
                 </a:gridCol>
                 <a:gridCol w="2590125">
                   <a:extLst>
                     <a:ext uri="{9D8B030D-6E8A-4147-A177-3AD203B41FA5}">
-                      <a16:colId xmlns:a16="http://schemas.microsoft.com/office/drawing/2014/main" xmlns="" val="20001"/>
+                      <a16:colId xmlns="" xmlns:a16="http://schemas.microsoft.com/office/drawing/2014/main" val="20001"/>
                     </a:ext>
                   </a:extLst>
                 </a:gridCol>
                 <a:gridCol w="2513945">
                   <a:extLst>
                     <a:ext uri="{9D8B030D-6E8A-4147-A177-3AD203B41FA5}">
-                      <a16:colId xmlns:a16="http://schemas.microsoft.com/office/drawing/2014/main" xmlns="" val="1808587013"/>
+                      <a16:colId xmlns="" xmlns:a16="http://schemas.microsoft.com/office/drawing/2014/main" val="1808587013"/>
                     </a:ext>
                   </a:extLst>
                 </a:gridCol>
                 <a:gridCol w="1675962">
                   <a:extLst>
                     <a:ext uri="{9D8B030D-6E8A-4147-A177-3AD203B41FA5}">
-                      <a16:colId xmlns:a16="http://schemas.microsoft.com/office/drawing/2014/main" xmlns="" val="1545185628"/>
+                      <a16:colId xmlns="" xmlns:a16="http://schemas.microsoft.com/office/drawing/2014/main" val="1545185628"/>
                     </a:ext>
                   </a:extLst>
                 </a:gridCol>
@@ -21481,7 +21701,7 @@
                 </a:tc>
                 <a:extLst>
                   <a:ext uri="{0D108BD9-81ED-4DB2-BD59-A6C34878D82A}">
-                    <a16:rowId xmlns:a16="http://schemas.microsoft.com/office/drawing/2014/main" xmlns="" val="10000"/>
+                    <a16:rowId xmlns="" xmlns:a16="http://schemas.microsoft.com/office/drawing/2014/main" val="10000"/>
                   </a:ext>
                 </a:extLst>
               </a:tr>
@@ -21796,7 +22016,7 @@
                 </a:tc>
                 <a:extLst>
                   <a:ext uri="{0D108BD9-81ED-4DB2-BD59-A6C34878D82A}">
-                    <a16:rowId xmlns:a16="http://schemas.microsoft.com/office/drawing/2014/main" xmlns="" val="10001"/>
+                    <a16:rowId xmlns="" xmlns:a16="http://schemas.microsoft.com/office/drawing/2014/main" val="10001"/>
                   </a:ext>
                 </a:extLst>
               </a:tr>
@@ -22111,7 +22331,7 @@
                 </a:tc>
                 <a:extLst>
                   <a:ext uri="{0D108BD9-81ED-4DB2-BD59-A6C34878D82A}">
-                    <a16:rowId xmlns:a16="http://schemas.microsoft.com/office/drawing/2014/main" xmlns="" val="10002"/>
+                    <a16:rowId xmlns="" xmlns:a16="http://schemas.microsoft.com/office/drawing/2014/main" val="10002"/>
                   </a:ext>
                 </a:extLst>
               </a:tr>
@@ -22426,7 +22646,7 @@
                 </a:tc>
                 <a:extLst>
                   <a:ext uri="{0D108BD9-81ED-4DB2-BD59-A6C34878D82A}">
-                    <a16:rowId xmlns:a16="http://schemas.microsoft.com/office/drawing/2014/main" xmlns="" val="10003"/>
+                    <a16:rowId xmlns="" xmlns:a16="http://schemas.microsoft.com/office/drawing/2014/main" val="10003"/>
                   </a:ext>
                 </a:extLst>
               </a:tr>
@@ -22737,7 +22957,7 @@
                 </a:tc>
                 <a:extLst>
                   <a:ext uri="{0D108BD9-81ED-4DB2-BD59-A6C34878D82A}">
-                    <a16:rowId xmlns:a16="http://schemas.microsoft.com/office/drawing/2014/main" xmlns="" val="10004"/>
+                    <a16:rowId xmlns="" xmlns:a16="http://schemas.microsoft.com/office/drawing/2014/main" val="10004"/>
                   </a:ext>
                 </a:extLst>
               </a:tr>
@@ -23172,7 +23392,7 @@
           <p:cNvPr id="13" name="Slide Number">
             <a:extLst>
               <a:ext uri="{FF2B5EF4-FFF2-40B4-BE49-F238E27FC236}">
-                <a16:creationId xmlns:a16="http://schemas.microsoft.com/office/drawing/2014/main" xmlns="" id="{F80F709C-BB43-4A83-9529-1E089194DC9E}"/>
+                <a16:creationId xmlns="" xmlns:a16="http://schemas.microsoft.com/office/drawing/2014/main" id="{F80F709C-BB43-4A83-9529-1E089194DC9E}"/>
               </a:ext>
             </a:extLst>
           </p:cNvPr>
@@ -23212,7 +23432,7 @@
     </p:spTree>
     <p:extLst>
       <p:ext uri="{BB962C8B-B14F-4D97-AF65-F5344CB8AC3E}">
-        <p14:creationId xmlns:p14="http://schemas.microsoft.com/office/powerpoint/2010/main" xmlns="" val="174766927"/>
+        <p14:creationId xmlns="" xmlns:p14="http://schemas.microsoft.com/office/powerpoint/2010/main" val="174766927"/>
       </p:ext>
     </p:extLst>
   </p:cSld>
@@ -23797,7 +24017,7 @@
     <a:masterClrMapping/>
   </p:clrMapOvr>
   <mc:AlternateContent xmlns:mc="http://schemas.openxmlformats.org/markup-compatibility/2006">
-    <mc:Choice xmlns="" xmlns:p14="http://schemas.microsoft.com/office/powerpoint/2010/main" Requires="p14">
+    <mc:Choice xmlns:p14="http://schemas.microsoft.com/office/powerpoint/2010/main" xmlns="" Requires="p14">
       <p:transition spd="slow" p14:dur="2000" advClick="0" advTm="5000"/>
     </mc:Choice>
     <mc:Fallback>
@@ -24336,7 +24556,7 @@
     <a:masterClrMapping/>
   </p:clrMapOvr>
   <mc:AlternateContent xmlns:mc="http://schemas.openxmlformats.org/markup-compatibility/2006">
-    <mc:Choice xmlns="" xmlns:p14="http://schemas.microsoft.com/office/powerpoint/2010/main" Requires="p14">
+    <mc:Choice xmlns:p14="http://schemas.microsoft.com/office/powerpoint/2010/main" xmlns="" Requires="p14">
       <p:transition spd="slow" p14:dur="2000" advClick="0" advTm="5000"/>
     </mc:Choice>
     <mc:Fallback>
@@ -24730,7 +24950,7 @@
           <p:cNvPr id="5" name="Text Placeholder 4">
             <a:extLst>
               <a:ext uri="{FF2B5EF4-FFF2-40B4-BE49-F238E27FC236}">
-                <a16:creationId xmlns:a16="http://schemas.microsoft.com/office/drawing/2014/main" xmlns="" id="{FBED5352-2A36-4F28-AB8D-6335517E5493}"/>
+                <a16:creationId xmlns="" xmlns:a16="http://schemas.microsoft.com/office/drawing/2014/main" id="{FBED5352-2A36-4F28-AB8D-6335517E5493}"/>
               </a:ext>
             </a:extLst>
           </p:cNvPr>
@@ -25064,7 +25284,7 @@
           <p:cNvPr id="6" name="AutoShape 5">
             <a:extLst>
               <a:ext uri="{FF2B5EF4-FFF2-40B4-BE49-F238E27FC236}">
-                <a16:creationId xmlns:a16="http://schemas.microsoft.com/office/drawing/2014/main" xmlns="" id="{F571EDF2-BA8D-4C84-8360-12467530B87E}"/>
+                <a16:creationId xmlns="" xmlns:a16="http://schemas.microsoft.com/office/drawing/2014/main" id="{F571EDF2-BA8D-4C84-8360-12467530B87E}"/>
               </a:ext>
             </a:extLst>
           </p:cNvPr>
@@ -25163,7 +25383,7 @@
           <p:cNvPr id="7" name="AutoShape 5">
             <a:extLst>
               <a:ext uri="{FF2B5EF4-FFF2-40B4-BE49-F238E27FC236}">
-                <a16:creationId xmlns:a16="http://schemas.microsoft.com/office/drawing/2014/main" xmlns="" id="{F571EDF2-BA8D-4C84-8360-12467530B87E}"/>
+                <a16:creationId xmlns="" xmlns:a16="http://schemas.microsoft.com/office/drawing/2014/main" id="{F571EDF2-BA8D-4C84-8360-12467530B87E}"/>
               </a:ext>
             </a:extLst>
           </p:cNvPr>
@@ -25263,7 +25483,7 @@
     <a:masterClrMapping/>
   </p:clrMapOvr>
   <mc:AlternateContent xmlns:mc="http://schemas.openxmlformats.org/markup-compatibility/2006">
-    <mc:Choice xmlns="" xmlns:p14="http://schemas.microsoft.com/office/powerpoint/2010/main" Requires="p14">
+    <mc:Choice xmlns:p14="http://schemas.microsoft.com/office/powerpoint/2010/main" xmlns="" Requires="p14">
       <p:transition spd="slow" p14:dur="2000" advClick="0" advTm="5000"/>
     </mc:Choice>
     <mc:Fallback>
@@ -25657,7 +25877,7 @@
     <a:masterClrMapping/>
   </p:clrMapOvr>
   <mc:AlternateContent xmlns:mc="http://schemas.openxmlformats.org/markup-compatibility/2006">
-    <mc:Choice xmlns="" xmlns:p14="http://schemas.microsoft.com/office/powerpoint/2010/main" Requires="p14">
+    <mc:Choice xmlns:p14="http://schemas.microsoft.com/office/powerpoint/2010/main" xmlns="" Requires="p14">
       <p:transition spd="slow" p14:dur="2000" advClick="0" advTm="5000"/>
     </mc:Choice>
     <mc:Fallback>
@@ -26103,7 +26323,7 @@
     <a:masterClrMapping/>
   </p:clrMapOvr>
   <mc:AlternateContent xmlns:mc="http://schemas.openxmlformats.org/markup-compatibility/2006">
-    <mc:Choice xmlns="" xmlns:p14="http://schemas.microsoft.com/office/powerpoint/2010/main" Requires="p14">
+    <mc:Choice xmlns:p14="http://schemas.microsoft.com/office/powerpoint/2010/main" xmlns="" Requires="p14">
       <p:transition spd="slow" p14:dur="2000" advClick="0" advTm="5000"/>
     </mc:Choice>
     <mc:Fallback>
@@ -26602,7 +26822,7 @@
   <a:extraClrSchemeLst/>
   <a:extLst>
     <a:ext uri="{05A4C25C-085E-4340-85A3-A5531E510DB2}">
-      <thm15:themeFamily xmlns="" xmlns:thm15="http://schemas.microsoft.com/office/thememl/2012/main" name="SoftUni" id="{D61FAD9B-6E74-4E03-BFE4-B363D484F1DA}" vid="{7089C1A3-635B-4B03-A017-DAF10A3A396B}"/>
+      <thm15:themeFamily xmlns:thm15="http://schemas.microsoft.com/office/thememl/2012/main" xmlns="" name="SoftUni" id="{D61FAD9B-6E74-4E03-BFE4-B363D484F1DA}" vid="{7089C1A3-635B-4B03-A017-DAF10A3A396B}"/>
     </a:ext>
   </a:extLst>
 </a:theme>
@@ -26897,7 +27117,7 @@
   <a:extraClrSchemeLst/>
   <a:extLst>
     <a:ext uri="{05A4C25C-085E-4340-85A3-A5531E510DB2}">
-      <thm15:themeFamily xmlns="" xmlns:thm15="http://schemas.microsoft.com/office/thememl/2012/main" name="Office Theme" id="{62F939B6-93AF-4DB8-9C6B-D6C7DFDC589F}" vid="{4A3C46E8-61CC-4603-A589-7422A47A8E4A}"/>
+      <thm15:themeFamily xmlns:thm15="http://schemas.microsoft.com/office/thememl/2012/main" xmlns="" name="Office Theme" id="{62F939B6-93AF-4DB8-9C6B-D6C7DFDC589F}" vid="{4A3C46E8-61CC-4603-A589-7422A47A8E4A}"/>
     </a:ext>
   </a:extLst>
 </a:theme>
@@ -27192,19 +27412,16 @@
   <a:extraClrSchemeLst/>
   <a:extLst>
     <a:ext uri="{05A4C25C-085E-4340-85A3-A5531E510DB2}">
-      <thm15:themeFamily xmlns="" xmlns:thm15="http://schemas.microsoft.com/office/thememl/2012/main" name="Office Theme" id="{62F939B6-93AF-4DB8-9C6B-D6C7DFDC589F}" vid="{4A3C46E8-61CC-4603-A589-7422A47A8E4A}"/>
+      <thm15:themeFamily xmlns:thm15="http://schemas.microsoft.com/office/thememl/2012/main" xmlns="" name="Office Theme" id="{62F939B6-93AF-4DB8-9C6B-D6C7DFDC589F}" vid="{4A3C46E8-61CC-4603-A589-7422A47A8E4A}"/>
     </a:ext>
   </a:extLst>
 </a:theme>
 </file>
 
 <file path=customXml/item1.xml><?xml version="1.0" encoding="utf-8"?>
-<?mso-contentType ?>
-<FormTemplates xmlns="http://schemas.microsoft.com/sharepoint/v3/contenttype/forms">
-  <Display>DocumentLibraryForm</Display>
-  <Edit>DocumentLibraryForm</Edit>
-  <New>DocumentLibraryForm</New>
-</FormTemplates>
+<p:properties xmlns:p="http://schemas.microsoft.com/office/2006/metadata/properties" xmlns:xsi="http://www.w3.org/2001/XMLSchema-instance" xmlns:pc="http://schemas.microsoft.com/office/infopath/2007/PartnerControls">
+  <documentManagement/>
+</p:properties>
 </file>
 
 <file path=customXml/item2.xml><?xml version="1.0" encoding="utf-8"?>
@@ -27380,15 +27597,26 @@
 </file>
 
 <file path=customXml/item3.xml><?xml version="1.0" encoding="utf-8"?>
-<p:properties xmlns:p="http://schemas.microsoft.com/office/2006/metadata/properties" xmlns:xsi="http://www.w3.org/2001/XMLSchema-instance" xmlns:pc="http://schemas.microsoft.com/office/infopath/2007/PartnerControls">
-  <documentManagement/>
-</p:properties>
+<?mso-contentType ?>
+<FormTemplates xmlns="http://schemas.microsoft.com/sharepoint/v3/contenttype/forms">
+  <Display>DocumentLibraryForm</Display>
+  <Edit>DocumentLibraryForm</Edit>
+  <New>DocumentLibraryForm</New>
+</FormTemplates>
 </file>
 
 <file path=customXml/itemProps1.xml><?xml version="1.0" encoding="utf-8"?>
-<ds:datastoreItem xmlns:ds="http://schemas.openxmlformats.org/officeDocument/2006/customXml" ds:itemID="{68A20BEC-F81B-49CD-951D-E62C4BAE7796}">
+<ds:datastoreItem xmlns:ds="http://schemas.openxmlformats.org/officeDocument/2006/customXml" ds:itemID="{5E2F4A33-1866-4BB8-8A35-8D6BDFE8D9F5}">
   <ds:schemaRefs>
-    <ds:schemaRef ds:uri="http://schemas.microsoft.com/sharepoint/v3/contenttype/forms"/>
+    <ds:schemaRef ds:uri="http://schemas.microsoft.com/office/infopath/2007/PartnerControls"/>
+    <ds:schemaRef ds:uri="http://purl.org/dc/dcmitype/"/>
+    <ds:schemaRef ds:uri="http://schemas.microsoft.com/office/2006/documentManagement/types"/>
+    <ds:schemaRef ds:uri="http://schemas.microsoft.com/office/2006/metadata/properties"/>
+    <ds:schemaRef ds:uri="http://www.w3.org/XML/1998/namespace"/>
+    <ds:schemaRef ds:uri="4f985cec-e092-4bcf-a1e1-b816bd0221d8"/>
+    <ds:schemaRef ds:uri="http://schemas.openxmlformats.org/package/2006/metadata/core-properties"/>
+    <ds:schemaRef ds:uri="http://purl.org/dc/terms/"/>
+    <ds:schemaRef ds:uri="http://purl.org/dc/elements/1.1/"/>
   </ds:schemaRefs>
 </ds:datastoreItem>
 </file>
@@ -27412,17 +27640,9 @@
 </file>
 
 <file path=customXml/itemProps3.xml><?xml version="1.0" encoding="utf-8"?>
-<ds:datastoreItem xmlns:ds="http://schemas.openxmlformats.org/officeDocument/2006/customXml" ds:itemID="{5E2F4A33-1866-4BB8-8A35-8D6BDFE8D9F5}">
+<ds:datastoreItem xmlns:ds="http://schemas.openxmlformats.org/officeDocument/2006/customXml" ds:itemID="{68A20BEC-F81B-49CD-951D-E62C4BAE7796}">
   <ds:schemaRefs>
-    <ds:schemaRef ds:uri="http://schemas.microsoft.com/office/infopath/2007/PartnerControls"/>
-    <ds:schemaRef ds:uri="http://purl.org/dc/dcmitype/"/>
-    <ds:schemaRef ds:uri="http://schemas.microsoft.com/office/2006/documentManagement/types"/>
-    <ds:schemaRef ds:uri="http://schemas.microsoft.com/office/2006/metadata/properties"/>
-    <ds:schemaRef ds:uri="http://www.w3.org/XML/1998/namespace"/>
-    <ds:schemaRef ds:uri="4f985cec-e092-4bcf-a1e1-b816bd0221d8"/>
-    <ds:schemaRef ds:uri="http://schemas.openxmlformats.org/package/2006/metadata/core-properties"/>
-    <ds:schemaRef ds:uri="http://purl.org/dc/terms/"/>
-    <ds:schemaRef ds:uri="http://purl.org/dc/elements/1.1/"/>
+    <ds:schemaRef ds:uri="http://schemas.microsoft.com/sharepoint/v3/contenttype/forms"/>
   </ds:schemaRefs>
 </ds:datastoreItem>
 </file>
</xml_diff>

<commit_message>
Fixes on Modeling Databases slides
</commit_message>
<xml_diff>
--- a/Courses/Software-Sciences/Module-3-Databases-New/06-Modeling-Databases/06-Modeling-Databases.pptx
+++ b/Courses/Software-Sciences/Module-3-Databases-New/06-Modeling-Databases/06-Modeling-Databases.pptx
@@ -417,7 +417,7 @@
           <a:p>
             <a:fld id="{4E087215-0C8F-4762-A664-737A353EC9A4}" type="datetimeFigureOut">
               <a:rPr lang="bg-BG" smtClean="0"/>
-              <a:t>6.10.2023 г.</a:t>
+              <a:t>15.10.2023 г.</a:t>
             </a:fld>
             <a:endParaRPr lang="bg-BG"/>
           </a:p>
@@ -613,7 +613,7 @@
           <a:p>
             <a:fld id="{72D84649-876A-46C9-8472-14CB09C070D8}" type="datetimeFigureOut">
               <a:rPr lang="en-US" smtClean="0"/>
-              <a:t>10/6/2023</a:t>
+              <a:t>10/15/2023</a:t>
             </a:fld>
             <a:endParaRPr lang="en-US"/>
           </a:p>
@@ -15042,7 +15042,7 @@
                                         <p:tgtEl>
                                           <p:spTgt spid="444419">
                                             <p:txEl>
-                                              <p:pRg st="3" end="3"/>
+                                              <p:pRg st="2" end="2"/>
                                             </p:txEl>
                                           </p:spTgt>
                                         </p:tgtEl>
@@ -15084,6 +15084,55 @@
                                     <p:set>
                                       <p:cBhvr>
                                         <p:cTn id="10" dur="1" fill="hold">
+                                          <p:stCondLst>
+                                            <p:cond delay="0"/>
+                                          </p:stCondLst>
+                                        </p:cTn>
+                                        <p:tgtEl>
+                                          <p:spTgt spid="444419">
+                                            <p:txEl>
+                                              <p:pRg st="3" end="3"/>
+                                            </p:txEl>
+                                          </p:spTgt>
+                                        </p:tgtEl>
+                                        <p:attrNameLst>
+                                          <p:attrName>style.visibility</p:attrName>
+                                        </p:attrNameLst>
+                                      </p:cBhvr>
+                                      <p:to>
+                                        <p:strVal val="visible"/>
+                                      </p:to>
+                                    </p:set>
+                                  </p:childTnLst>
+                                </p:cTn>
+                              </p:par>
+                            </p:childTnLst>
+                          </p:cTn>
+                        </p:par>
+                      </p:childTnLst>
+                    </p:cTn>
+                  </p:par>
+                  <p:par>
+                    <p:cTn id="11" fill="hold">
+                      <p:stCondLst>
+                        <p:cond delay="indefinite"/>
+                      </p:stCondLst>
+                      <p:childTnLst>
+                        <p:par>
+                          <p:cTn id="12" fill="hold">
+                            <p:stCondLst>
+                              <p:cond delay="0"/>
+                            </p:stCondLst>
+                            <p:childTnLst>
+                              <p:par>
+                                <p:cTn id="13" presetID="1" presetClass="entr" presetSubtype="0" fill="hold" nodeType="clickEffect">
+                                  <p:stCondLst>
+                                    <p:cond delay="0"/>
+                                  </p:stCondLst>
+                                  <p:childTnLst>
+                                    <p:set>
+                                      <p:cBhvr>
+                                        <p:cTn id="14" dur="1" fill="hold">
                                           <p:stCondLst>
                                             <p:cond delay="0"/>
                                           </p:stCondLst>

</xml_diff>